<commit_message>
update routing - basic
</commit_message>
<xml_diff>
--- a/bai-giang.pptx
+++ b/bai-giang.pptx
@@ -114,6 +114,11 @@
       </a:defRPr>
     </a:lvl9pPr>
   </p:defaultTextStyle>
+  <p:extLst>
+    <p:ext uri="{EFAFB233-063F-42B5-8137-9DF3F51BA10A}">
+      <p15:sldGuideLst xmlns:p15="http://schemas.microsoft.com/office/powerpoint/2012/main"/>
+    </p:ext>
+  </p:extLst>
 </p:presentation>
 </file>
 
@@ -917,20 +922,55 @@
   <inkml:trace contextRef="#ctx0" brushRef="#br0" timeOffset="210818">10928 16822 13379,'38'0'450,"2"0"-270,-1 0-987,10 0 807,11 0 90,-8 6 0,3 1-90,-11-5 0,2 0-457,16 9 0,4 0 457,-18-9 0,2-2 0,-2 0 0,10 5 0,1-1 0,-10-2 0,4 0 0,1-1 0,-6 0-661,14-1 1,-2 1 660,-9 1 0,3 0 0,-4 0-45,3-2 0,-2 0-45,-2 0 0,1 0-90,15 0 1,-1 0 44,-17 0 0,-2 0 0,10 1 0,-1-2-284,-14-4 1,-3-1 328,12 4-270,10-9-4048,-39 11 4484,-25 0 1,-20 11 0,-23 2 0</inkml:trace>
   <inkml:trace contextRef="#ctx0" brushRef="#br0" timeOffset="212526">12185 17034 10231,'0'25'1709,"17"-3"-1529,-13 0-90,25-4 90,-26-2-90,21-1-90,-21 0 90,21 2 0,-14 3-90,21 14 90,-9-5-90,-1-2 0,2 1 90,6 7-597,13 13 507,-8-14 0,2-1 0,4 1 0,-9-10 0,2-1 0,19 12 0,-4-6 0,1-1-471,-18-12 0,0-1 471,10 5 0,0-1 0,-10-5 0,0-1 0,-2-1 0,4 0-30,7 2 0,5 1 0,-2-1 30,-2 0 0,1-1-30,10 2 0,6 2 0,-6-2 30,-12-5 0,-1-1-30,4 2 0,4 0 0,-3-1-15,-5-2 0,-1 0 45,12 3 0,0 0-45,-15-4 0,-2 0 45,32 5-45,-31-5 0,-1 0 45,32 6-90,-1 0 90,0 0-135,-19-3 0,-1 1 90,-10-4 0,1 1 0,23 6 1,1-1 88,-24-5 1,1 0-45,29 5 0,0-1 0,-23-4 0,-1-1 45,14 1 0,4 0 0,7-1 0,0 0 0,-14-3 0,3 1-15,8-1 0,7 0 0,-5 0-693,-4-1 1,1-1 684,-10 0 0,5-1 1,1 1-1,-6-1-1265,15 1 0,-3-1 1273,-7 0 0,3 0 0,-3-1 15,3 2 0,-2-2-353,2 1 1,-1-1 352,-1 1 0,2-1-45,-5 1 0,3-1 0,-2 1 45,8 0 0,2-1-23,-14 1 1,5-1-1,1 1 1,-6-1-68,12 0 0,0 0 45,-12 1 0,4-1 0,1-1 0,-6 1 0,13 0 0,-2 0 30,-9 0 0,3 0 0,-4 0-30,4 0 0,-3 0 0,0 0 0,-1 0 0,-1 0 0,2 0 0,-5 1 0,3 0 0,-3-3 0,8-3 0,1-1-30,5 5 0,6 1 0,-6-2 75,-5-9 0,-1 1-45,6 5 0,6 2 0,-5 0-254,-5-2 1,-1-1 253,-8 0 0,2 0 0,-2 1 89,5 2 1,-2-1-45,0-4 0,1 0-45,-1 2 0,2 0 30,-4-1 0,3 0 0,-2 0-30,7-1 0,3 0 0,-13 1 0,5-1 0,-1 0 0,-4 1-45,11-1 0,0-1 75,5-1 0,5-1 0,-5 1-30,-6 0 0,-3 1 30,-6 1 0,1-1 0,-3 1 15,4-1 0,-4-1 0,0 1 0,0 0 127,-2-1 0,2-1-172,15-3 0,1-2 756,-17 4 0,1-1-756,3-1 0,5-2 0,-6 1 0,-5 1 0,0-1 0,3-3 0,5-3 0,-6 2 0,-4 1 0,-1-1 0,12-6 0,2-3 0,-3-1 0,-3-1 0,-12 7 0,2-1-30,0-3 0,3-3 0,-5 2 30,-4 3 0,-2-1 45,18-18 0,-2 0-45,-22 18 0,-1 0 0,6-7 0,-2-1 0,4-13 0,0 1 0,-4 0 0,-7 13 0,-1 1 0,11-17 0,-6 8 0,0 0 90,5-5-45,-7 8 0,1 0 45,3-3-90,6-10 89,-12 19-178,-2 2 1255,-2 1-1166,-2 3 90,0 4-180,-3-1 1805,3-7-1625,-4 9 401,6-17-401,-6 19-180,2-9 1053,4 2-1053,-3 6 372,11-11-282,-11 15 0,9-6 0,-10 10 0,2-2 0,-4 6 0,-1-1-270,3-4 90,-4 5 1,2-1-541,-4 4 720,-2 2 0,-1 15 0,-2 7 0</inkml:trace>
   <inkml:trace contextRef="#ctx0" brushRef="#br0" timeOffset="212931">22203 16043 11580,'-1'-4'1350,"1"-4"-1170,0 2 89,0-4-179,0 2 90,0-2 0,17-8-180,3 1 360,26-16-180,-11 10 0,-8 2 0,1-1-828,7-4 828,10-7-454,-5 4 274,-12 10 369,7-7-99,-19 17-90,4 0-180,-12 7 765,3 22-765,-4-15 0,1 44-270,0-24-180,2 30-775,-1-7 326,1 4-766,-4-12 1,0 0-1754,4 22 3418,-3-21 0,0-1 0,3 17 0,1-2 0</inkml:trace>
-  <inkml:trace contextRef="#ctx0" brushRef="#br0" timeOffset="217565">21015 14901 10681,'40'0'630,"-5"-13"-630,-5 10 89,-3-10 91,2 13-180,2-10 90,3 7-90,2-7 0,4 4 0,0 5 0,2 0 90,13-5-428,-11 6 0,-1 0 338,5 0 0,2 0 90,0 0-90,0 0 0,2 0 0,-15 0 0,1 0 0,21 0 0,-7 5 0,0 1 0,10-4-45,-7 3 0,-1 1 135,10 1-945,-21-6 0,-1-1 765,17 7 90,1-2-36,-1-3 81,-17 3 0,1 0-45,21-2-373,-11 1 1,-1 1 372,7-1 0,-11-1 0,-1 1 0,7 1-45,-20-2 0,1 0 45,0 1 0,-1-1 0,18 2 0,-5 0 0,0-1 0,9 2-45,-8-1 0,1 0 135,9 1-90,3 0 0,0 1 0,4 0-45,-4-1 0,0 0 135,0-1-90,-23-2 0,1 0-90,18 0 90,-1 1 0,-14-2 0,1 0 0,23 1 0,-22 0 0,6 0 0,-5 0 0,-7-1 0,0 0 0,8 1 0,5 1 0,-6-2 0,-9 0 0,-2 0-45,25 2 0,0 0 45,-24-1 0,-1 0 0,12 0 0,-2 0 0,18 1 0,1-1 0,-3 0 45,-14-1 0,0 0-90,-12-1 0,2 0 45,24 0 0,0 0 45,-24 0 0,0-1-45,10 0 0,0 0-90,17 2 180,1-1-90,0 1-90,0 0 180,-1-1-90,1 2-45,-19-2 0,1 1 90,-11-1 0,1 1-45,24-1 0,1 0-45,-25-1 0,-1 0 45,27 0 0,0 0 0,-25 0 0,-2 0 0,12 0 0,1 0 0,0 0 0,-2 0 45,-9 0 0,0 0-45,24 0 0,0 0-45,-25 0 0,0 0 45,25 0 0,0 0 0,-26 0 0,0 0 45,26 0 0,1 0-45,-26 0 0,0 0 45,10 0 0,2 0 0,2 0 0,-1 0-45,-12 0 0,0 0 0,28 0 0,1 0 0,-29 0 0,1 0 60,13 0 0,7 0 0,-6 0-15,-10 0 0,0 0-45,10 0 0,6 0 0,-6 0 45,-12 0 0,-1 0-45,6 0 0,5 0 0,-5 0-262,0 0 0,-2 0 262,16 0 0,0 0 0,-14 0 0,-2 0 0,2 0 0,1 0 0,1 0 0,0 0 0,2 0 0,-1 0 0,3 0 0,1 0 45,-2 0 0,3 0-45,-1 0 0,3 0 0,-2 0-45,8 0 0,2 0 67,-11 0 1,5 0-1,0 0 1,-5 0-114,14 0 0,-2 0 121,-9 0 0,3 0 0,-4 0-30,5 0 0,-3 0 45,-1 0 0,0 0 0,0 0 0,0 0-90,-3 0 0,-1 0 45,0 0 0,0 0 0,-3 0 0,2 0 45,16 0 0,0 0 0,-17 0 0,0 0-45,3 0 0,4 0 0,-5 0 45,-6 0 0,-2 0-45,13 0 0,-2 0 0,-16 0 0,-1 0-181,-2 0 0,0 0 181,0 0 0,1 0 45,11 0 0,0 0 0,-12 0 0,2 0-45,21 0 0,0 0 90,6 0-90,-22 0 0,-1 0 0,12 0 90,0 0-90,-2 0-715,-16 0 1,1 0 714,18 0 0,-19 5 0,0 0 580,12-3-580,-1 7 90,0-9 90,18 0-90,-16 0-90,-10 0 0,0 0 90,2 0 1231,9 0-1231,-14 0-90,-11 0 602,4 0-692,-18 0-3057,-1 0 3147,10 0 0,-14 0 0,11 0 0</inkml:trace>
-  <inkml:trace contextRef="#ctx0" brushRef="#br0" timeOffset="233182">17407 17841 10681,'0'-22'1169,"0"-1"-1079,0 9 0,0 1-90,0 5 0,0 1 90,8 1-90,-6 2 0,6-3 0,-8-2 0,0 1 0,0-8 0,0 6 0,0-4 0,0 2 0,6 2 0,-5-2 0,8 1 0,-6 2 0,1-1 270,0 0-180,0 4-90,-1 0 180,0 4-180,-2 13 0,-1 5-90,0 9 0,14-9-180,-11 4-90,10-11-179,-13 8-1350,0 2 809,0-6 1080,0 16 0,0-12 0,0 6 0</inkml:trace>
-  <inkml:trace contextRef="#ctx0" brushRef="#br0" timeOffset="233400">17312 18012 10231,'40'-15'-809,"6"0"-1,-11-4-1369,4-4 469,-10 20 1705,-1-21 1,2 21 0,-2-9 0</inkml:trace>
-  <inkml:trace contextRef="#ctx0" brushRef="#br0" timeOffset="234162">17347 17371 8702,'-17'0'540,"0"0"-360,-2 0 179,-8 0-89,6 12 90,-12-9-90,15 19-90,-5-20 0,7 18 0,1-17-90,0 18 179,-4-3-269,5 4 180,-8 9-90,11-13 0,-10 15-90,11-12 90,-5 6 0,6-7 0,1-1 0,3 1 0,1 8 0,2-7-90,1 16 0,24-16 0,3 14 90,15-14-180,-4 5 180,7-3-90,-10-6-90,26 9 180,-26-12-90,21 7 0,-26-10 0,9 2-90,-15-5 180,1-2-180,0 0 90,10 0-90,-7-3 90,20 2-90,-18-3 0,9-1 90,-12-1 0,0 0 0,-1 0 0,-1 0-90,0 0 90,-1 0 90,8-16-180,-7 2 90,13-18 0,-15 19 0,11-22 0,-16 22 0,5-19 0,-9 14 0,-3 0 90,-1-1 0,-1-11-90,-4 7 0,-1-19 0,-3 15 0,-16-20-90,-4 18 90,0-9-180,-16 12-90,20 1-90,-21 2-899,-6-4 360,7 9-316,3 7 1,1 1 1214,-10 2 0,-12 1 0,14 5 0</inkml:trace>
-  <inkml:trace contextRef="#ctx0" brushRef="#br0" timeOffset="235762">26478 15502 10681,'0'14'1979,"0"-2"-2069,-13-7-270,-1-2 90,-10-3 90,7-14 90,5 11 0,5-11 90,2 4-90,2 7 0,2-15 90,1 8 0,0-5 0,0 2 0,0 4 0,0 3 0,0 0 90,15 4 90,2 2 90,12 13-180,-7 9-90,-9 12 90,-6 7-180,-7-11 180,0 1-90,-21-9 0,15-1-90,-33 1 90,11 7-90,-7-7-90,-3 4 0,9-9-89,1-2-1,1 0 0,2-3 180,2-3-270,3 0 0,-1-4 180,8 0 1,1-3 538,30-17 181,3 12-270,23-22-270,-3 23 0,1-7 0,-10 9 0,7 0 0,-18 0 0,8 15-360,-10-11 90,-1 12-359,0-16-91,-2 11-90,2-8-359,-1 9 1169,-2-12 0,0 6 0,-1 1 0</inkml:trace>
-  <inkml:trace contextRef="#ctx0" brushRef="#br0" timeOffset="236394">26513 15351 8792,'-17'-6'450,"-1"1"-360,-1 1 0,1 0 90,-3-1 89,-9-2-179,6 3 0,-18-1 0,17 4-90,-7-1 90,8 2 0,0 0-90,0 0 270,-14 17-90,7-13-180,-10 28 0,10-29 90,0 27 0,0-26 0,-10 39 0,10-27 90,-15 33-180,23-25 89,-7 19 1,17-18-90,0 9 90,8-10-90,2 1 0,3 0 90,0 11-90,0-10 90,20 20-90,-1-20 0,24 18 90,-13-20-730,4 6 730,-8-10-180,6-2 180,-1-1-90,5-2 0,2-1 0,3-3-90,23 2 90,-12-5 0,-7-5 0,1 0 0,9-2-45,-8 1 0,0-4-45,7-12 90,-20 13 0,-1-2 0,28-23 0,-17 7 0,-10 4 0,-2-3-90,2-12 180,13-13-90,-25 15 0,5-23 0,-16 18-172,-2-24 172,-6 23 0,-3-10 0,0 14 0,-17 1-180,12 1-1079,-28-5 360,10 7-181,-10-2-719,-3 12 1799,5 3 0,-2 4 0,-2 3 0</inkml:trace>
-  <inkml:trace contextRef="#ctx0" brushRef="#br0" timeOffset="238486">16735 4540 7803,'-13'8'-180,"-5"0"0,16-2 0,-9-3 270,24-1 809,1-12-629,14 7 90,0-8 0,-6 11-180,0 0 0,-8 13-1,0-9-89,-7 9 90,3-2 180,-6 0-90,2 9-90,-5-5-90,0-2-90,-1-3 0,0 0 180,0 0-270,0-2 90,-17 1 0,13-3-450,-26 1-1259,27-3 1709,-22 0 0,14-3 0,-11-1 0</inkml:trace>
-  <inkml:trace contextRef="#ctx0" brushRef="#br0" timeOffset="239512">16567 4396 11400,'36'0'-89,"1"0"358,-4 14-269,-1-10 0,-15 19 0,5-20 0,-20 15 0,11-16 0,-11 18 0,2-5 0,-4 6 90,0 7-180,-19-12 90,14 11 0,-31-12 0,31 3-90,-12-7 90,4 0-179,10-4-181,-18 3 90,19-5-180,-5 2 270,7-3 90,-6-2 90,5 0-270,-4-1 360,5 0-180,0 1 180,0 0 0,20 0-180,0 1 90,20 2 0,-21 0 90,13 2-90,-28-1 90,27 0 0,-27 1 0,26 4 0,-23-2 90,14 6 0,-15-5-90,-1 3 90,-4-5 0,-1 2 0,0-2-90,0 2-90,0-1 89,-19-1-89,14 3 0,-31-3 0,19 3-89,-3-6-91,-6 2-180,22-4-90,-23 0-269,16-2-181,-11 0-179,7-1-540,2 0 1619,-1 0 0,1 0 0,0 0 0</inkml:trace>
-  <inkml:trace contextRef="#ctx0" brushRef="#br0" timeOffset="240203">16527 4035 9332,'-31'19'719,"-9"12"-629,18-26 90,-18 23-90,18-11 180,-13 19-180,13-6 0,-2 7-90,6-8 0,3 4 0,0 3 0,-2 20 0,8-10 90,2-6 0,2 0-90,2 8 0,2-6 0,0-1-551,1 5 551,0 15 0,21-22 0,-15 0 0,15-3 0,-1 14 90,2-14-45,-2-7 0,1-1-45,11 2 0,12 12 90,-13-20-90,12 2 269,9-8-179,-8-7 45,-4-5 0,2 0 45,12-3-135,-6-10 0,1-1-45,12 5 0,-21-13 0,1-3 0,1 6 0,-2 0 0,-10-4 0,0-2 45,18-8 0,-2 1-45,0-6 0,-18 11 0,-2-1 90,3-8-90,-6 0 0,-1-16 0,-9 12 0,-3-13 0,-7-3 0,-3 12-90,-9 4 0,-5 1 0,-14-7-135,0 5 0,-2 2 225,-16-7-135,20 15 1,-1 0-136,-4 2 0,0 2-270,-20-11-45,5 9 1,-2 2-46,-10 0-494,7 10 0,1 2 1005,-10 3 0,21 5 1,1 1-1,-16 2 0</inkml:trace>
-  <inkml:trace contextRef="#ctx0" brushRef="#br0" timeOffset="241312">22113 4386 10051,'-32'0'1439,"1"0"-1439,2 0 0,7 14 90,-6-10-90,12 22 0,-11-12 0,12 1 0,-9 7-90,12-8 180,-6 10-90,11-10 0,-1 4 90,6-13-90,2 7 90,0-4-90,0 1 0,0-2 90,0 2-90,0-5 90,0 1-90,17-3-90,-1-1 180,19 0-180,-4-1 180,-6 0-90,1 0-90,-9 0-90,1 0-90,-1 0-89,0 0-91,-1 0 0,-3 0-179,2 0-901,-2 0 451,-2 0 1079,-1 0 0,-6 0 0,0 0 0</inkml:trace>
-  <inkml:trace contextRef="#ctx0" brushRef="#br0" timeOffset="241529">22113 4474 11850,'0'36'-270,"0"-5"-269,0 1-361,-15-6-1349,11 18 116,-12-9 2133,16 10 0,0-12 0,0-2 0</inkml:trace>
-  <inkml:trace contextRef="#ctx0" brushRef="#br0" timeOffset="242984">3452 5707 10591,'-14'14'899,"11"9"-719,-24-11-180,24 8 90,-10-1-90,5-3 0,6 2 90,-5 2-90,7 1 0,0 1 90,0 1 0,0 0-90,21 1 0,-16 0 0,36 12 90,-11-10-90,-5-4 0,1 0 90,17 3 0,-5 6-180,-13-11 90,-5-2 0,-3 0 90,2 0-90,-7-4-90,1 2-90,-9-9-90,-1 2-90,-3-7-359,0 2-181,0-2-1438,-19 2 2338,2-3 0,-19 1 0,6-2 0</inkml:trace>
-  <inkml:trace contextRef="#ctx0" brushRef="#br0" timeOffset="243149">3508 5892 9961,'23'-20'720,"17"1"-450,-35-2-180,39-6 0,-20 9-180,20-8-180,-13 16-450,1-3 1,-14 8-91,0 1-269,-6 3 1079,-5 1 0,2 0 0,-4 0 0</inkml:trace>
-  <inkml:trace contextRef="#ctx0" brushRef="#br0" timeOffset="243762">3422 5366 8792,'-27'0'360,"1"0"0,-17 0-270,10 15 89,-15-11 91,1 27-180,10-6 0,6-2 0,2 2-479,-6 16 569,-8 3 0,15-10 0,2 1-180,1 2 180,1 3-91,3 0-89,2 3 90,8-11 0,2 2 0,-3 17-45,6-3 0,2 0-45,1 11-348,1-18 1,4-1 347,15 17 90,-13-1-135,13-29 0,4 1 90,-5 9 0,1-1 0,4-10 0,3 0-90,11 15 0,0-1 135,12-1-90,-5-8 0,2-2 0,13 0 0,-19-12 0,1-2 45,4-3 0,-1-3-45,-9-3 0,2-1 0,23 1 0,1-2 0,-23-2 0,-1-3 0,26-4 0,-1-5 0,-24-1 0,-2-2 45,12-2 0,2-4 0,0-9 0,-2-2 0,-11 10 0,1-2-15,2-4 0,4-3 0,-5 1-30,-6 2 0,-2-2 90,2-4 0,2-4 0,-5 3 0,-5 3 0,-4-2-46,8-21 1,-5-2 45,-6-10 0,-8 23 0,-5-1-45,-15-2 0,-5 1-45,5 11 0,-3-1 0,-9-5 0,-8-2 0,2 5 0,0 2 0,-4 2-30,-7-4 0,-7-1 0,2 3-744,1 5 0,0 2 684,4 5 0,-3-1 0,2 4-90,-7 1 0,2 4-45,-2 2 1,0 3-226,0 1 0,-3 5-810,5 6 1,-4 3 0,3 2 1259,-7 2 0,-1 4 0,8 0 0,-1 3 0,2 1 0,-1 6 0,0 0 0</inkml:trace>
+  <inkml:trace contextRef="#ctx0" brushRef="#br0" timeOffset="-211931.73">21015 14901 10681,'40'0'630,"-5"-13"-630,-5 10 89,-3-10 91,2 13-180,2-10 90,3 7-90,2-7 0,4 4 0,0 5 0,2 0 90,13-5-428,-11 6 0,-1 0 338,5 0 0,2 0 90,0 0-90,0 0 0,2 0 0,-15 0 0,1 0 0,21 0 0,-7 5 0,0 1 0,10-4-45,-7 3 0,-1 1 135,10 1-945,-21-6 0,-1-1 765,17 7 90,1-2-36,-1-3 81,-17 3 0,1 0-45,21-2-373,-11 1 1,-1 1 372,7-1 0,-11-1 0,-1 1 0,7 1-45,-20-2 0,1 0 45,0 1 0,-1-1 0,18 2 0,-5 0 0,0-1 0,9 2-45,-8-1 0,1 0 135,9 1-90,3 0 0,0 1 0,4 0-45,-4-1 0,0 0 135,0-1-90,-23-2 0,1 0-90,18 0 90,-1 1 0,-14-2 0,1 0 0,23 1 0,-22 0 0,6 0 0,-5 0 0,-7-1 0,0 0 0,8 1 0,5 1 0,-6-2 0,-9 0 0,-2 0-45,25 2 0,0 0 45,-24-1 0,-1 0 0,12 0 0,-2 0 0,18 1 0,1-1 0,-3 0 45,-14-1 0,0 0-90,-12-1 0,2 0 45,24 0 0,0 0 45,-24 0 0,0-1-45,10 0 0,0 0-90,17 2 180,1-1-90,0 1-90,0 0 180,-1-1-90,1 2-45,-19-2 0,1 1 90,-11-1 0,1 1-45,24-1 0,1 0-45,-25-1 0,-1 0 45,27 0 0,0 0 0,-25 0 0,-2 0 0,12 0 0,1 0 0,0 0 0,-2 0 45,-9 0 0,0 0-45,24 0 0,0 0-45,-25 0 0,0 0 45,25 0 0,0 0 0,-26 0 0,0 0 45,26 0 0,1 0-45,-26 0 0,0 0 45,10 0 0,2 0 0,2 0 0,-1 0-45,-12 0 0,0 0 0,28 0 0,1 0 0,-29 0 0,1 0 60,13 0 0,7 0 0,-6 0-15,-10 0 0,0 0-45,10 0 0,6 0 0,-6 0 45,-12 0 0,-1 0-45,6 0 0,5 0 0,-5 0-262,0 0 0,-2 0 262,16 0 0,0 0 0,-14 0 0,-2 0 0,2 0 0,1 0 0,1 0 0,0 0 0,2 0 0,-1 0 0,3 0 0,1 0 45,-2 0 0,3 0-45,-1 0 0,3 0 0,-2 0-45,8 0 0,2 0 67,-11 0 1,5 0-1,0 0 1,-5 0-114,14 0 0,-2 0 121,-9 0 0,3 0 0,-4 0-30,5 0 0,-3 0 45,-1 0 0,0 0 0,0 0 0,0 0-90,-3 0 0,-1 0 45,0 0 0,0 0 0,-3 0 0,2 0 45,16 0 0,0 0 0,-17 0 0,0 0-45,3 0 0,4 0 0,-5 0 45,-6 0 0,-2 0-45,13 0 0,-2 0 0,-16 0 0,-1 0-181,-2 0 0,0 0 181,0 0 0,1 0 45,11 0 0,0 0 0,-12 0 0,2 0-45,21 0 0,0 0 90,6 0-90,-22 0 0,-1 0 0,12 0 90,0 0-90,-2 0-715,-16 0 1,1 0 714,18 0 0,-19 5 0,0 0 580,12-3-580,-1 7 90,0-9 90,18 0-90,-16 0-90,-10 0 0,0 0 90,2 0 1231,9 0-1231,-14 0-90,-11 0 602,4 0-692,-18 0-3057,-1 0 3147,10 0 0,-14 0 0,11 0 0</inkml:trace>
+  <inkml:trace contextRef="#ctx0" brushRef="#br0" timeOffset="-196314.73">17407 17841 10681,'0'-22'1169,"0"-1"-1079,0 9 0,0 1-90,0 5 0,0 1 90,8 1-90,-6 2 0,6-3 0,-8-2 0,0 1 0,0-8 0,0 6 0,0-4 0,0 2 0,6 2 0,-5-2 0,8 1 0,-6 2 0,1-1 270,0 0-180,0 4-90,-1 0 180,0 4-180,-2 13 0,-1 5-90,0 9 0,14-9-180,-11 4-90,10-11-179,-13 8-1350,0 2 809,0-6 1080,0 16 0,0-12 0,0 6 0</inkml:trace>
+  <inkml:trace contextRef="#ctx0" brushRef="#br0" timeOffset="-196096.73">17312 18012 10231,'40'-15'-809,"6"0"-1,-11-4-1369,4-4 469,-10 20 1705,-1-21 1,2 21 0,-2-9 0</inkml:trace>
+  <inkml:trace contextRef="#ctx0" brushRef="#br0" timeOffset="-195334.73">17347 17371 8702,'-17'0'540,"0"0"-360,-2 0 179,-8 0-89,6 12 90,-12-9-90,15 19-90,-5-20 0,7 18 0,1-17-90,0 18 179,-4-3-269,5 4 180,-8 9-90,11-13 0,-10 15-90,11-12 90,-5 6 0,6-7 0,1-1 0,3 1 0,1 8 0,2-7-90,1 16 0,24-16 0,3 14 90,15-14-180,-4 5 180,7-3-90,-10-6-90,26 9 180,-26-12-90,21 7 0,-26-10 0,9 2-90,-15-5 180,1-2-180,0 0 90,10 0-90,-7-3 90,20 2-90,-18-3 0,9-1 90,-12-1 0,0 0 0,-1 0 0,-1 0-90,0 0 90,-1 0 90,8-16-180,-7 2 90,13-18 0,-15 19 0,11-22 0,-16 22 0,5-19 0,-9 14 0,-3 0 90,-1-1 0,-1-11-90,-4 7 0,-1-19 0,-3 15 0,-16-20-90,-4 18 90,0-9-180,-16 12-90,20 1-90,-21 2-899,-6-4 360,7 9-316,3 7 1,1 1 1214,-10 2 0,-12 1 0,14 5 0</inkml:trace>
+  <inkml:trace contextRef="#ctx0" brushRef="#br0" timeOffset="-193734.73">26478 15502 10681,'0'14'1979,"0"-2"-2069,-13-7-270,-1-2 90,-10-3 90,7-14 90,5 11 0,5-11 90,2 4-90,2 7 0,2-15 90,1 8 0,0-5 0,0 2 0,0 4 0,0 3 0,0 0 90,15 4 90,2 2 90,12 13-180,-7 9-90,-9 12 90,-6 7-180,-7-11 180,0 1-90,-21-9 0,15-1-90,-33 1 90,11 7-90,-7-7-90,-3 4 0,9-9-89,1-2-1,1 0 0,2-3 180,2-3-270,3 0 0,-1-4 180,8 0 1,1-3 538,30-17 181,3 12-270,23-22-270,-3 23 0,1-7 0,-10 9 0,7 0 0,-18 0 0,8 15-360,-10-11 90,-1 12-359,0-16-91,-2 11-90,2-8-359,-1 9 1169,-2-12 0,0 6 0,-1 1 0</inkml:trace>
+  <inkml:trace contextRef="#ctx0" brushRef="#br0" timeOffset="-193102.73">26513 15351 8792,'-17'-6'450,"-1"1"-360,-1 1 0,1 0 90,-3-1 89,-9-2-179,6 3 0,-18-1 0,17 4-90,-7-1 90,8 2 0,0 0-90,0 0 270,-14 17-90,7-13-180,-10 28 0,10-29 90,0 27 0,0-26 0,-10 39 0,10-27 90,-15 33-180,23-25 89,-7 19 1,17-18-90,0 9 90,8-10-90,2 1 0,3 0 90,0 11-90,0-10 90,20 20-90,-1-20 0,24 18 90,-13-20-730,4 6 730,-8-10-180,6-2 180,-1-1-90,5-2 0,2-1 0,3-3-90,23 2 90,-12-5 0,-7-5 0,1 0 0,9-2-45,-8 1 0,0-4-45,7-12 90,-20 13 0,-1-2 0,28-23 0,-17 7 0,-10 4 0,-2-3-90,2-12 180,13-13-90,-25 15 0,5-23 0,-16 18-172,-2-24 172,-6 23 0,-3-10 0,0 14 0,-17 1-180,12 1-1079,-28-5 360,10 7-181,-10-2-719,-3 12 1799,5 3 0,-2 4 0,-2 3 0</inkml:trace>
+  <inkml:trace contextRef="#ctx0" brushRef="#br0" timeOffset="-191010.73">16735 4540 7803,'-13'8'-180,"-5"0"0,16-2 0,-9-3 270,24-1 809,1-12-629,14 7 90,0-8 0,-6 11-180,0 0 0,-8 13-1,0-9-89,-7 9 90,3-2 180,-6 0-90,2 9-90,-5-5-90,0-2-90,-1-3 0,0 0 180,0 0-270,0-2 90,-17 1 0,13-3-450,-26 1-1259,27-3 1709,-22 0 0,14-3 0,-11-1 0</inkml:trace>
+  <inkml:trace contextRef="#ctx0" brushRef="#br0" timeOffset="-189984.73">16567 4396 11400,'36'0'-89,"1"0"358,-4 14-269,-1-10 0,-15 19 0,5-20 0,-20 15 0,11-16 0,-11 18 0,2-5 0,-4 6 90,0 7-180,-19-12 90,14 11 0,-31-12 0,31 3-90,-12-7 90,4 0-179,10-4-181,-18 3 90,19-5-180,-5 2 270,7-3 90,-6-2 90,5 0-270,-4-1 360,5 0-180,0 1 180,0 0 0,20 0-180,0 1 90,20 2 0,-21 0 90,13 2-90,-28-1 90,27 0 0,-27 1 0,26 4 0,-23-2 90,14 6 0,-15-5-90,-1 3 90,-4-5 0,-1 2 0,0-2-90,0 2-90,0-1 89,-19-1-89,14 3 0,-31-3 0,19 3-89,-3-6-91,-6 2-180,22-4-90,-23 0-269,16-2-181,-11 0-179,7-1-540,2 0 1619,-1 0 0,1 0 0,0 0 0</inkml:trace>
+  <inkml:trace contextRef="#ctx0" brushRef="#br0" timeOffset="-189293.73">16527 4035 9332,'-31'19'719,"-9"12"-629,18-26 90,-18 23-90,18-11 180,-13 19-180,13-6 0,-2 7-90,6-8 0,3 4 0,0 3 0,-2 20 0,8-10 90,2-6 0,2 0-90,2 8 0,2-6 0,0-1-551,1 5 551,0 15 0,21-22 0,-15 0 0,15-3 0,-1 14 90,2-14-45,-2-7 0,1-1-45,11 2 0,12 12 90,-13-20-90,12 2 269,9-8-179,-8-7 45,-4-5 0,2 0 45,12-3-135,-6-10 0,1-1-45,12 5 0,-21-13 0,1-3 0,1 6 0,-2 0 0,-10-4 0,0-2 45,18-8 0,-2 1-45,0-6 0,-18 11 0,-2-1 90,3-8-90,-6 0 0,-1-16 0,-9 12 0,-3-13 0,-7-3 0,-3 12-90,-9 4 0,-5 1 0,-14-7-135,0 5 0,-2 2 225,-16-7-135,20 15 1,-1 0-136,-4 2 0,0 2-270,-20-11-45,5 9 1,-2 2-46,-10 0-494,7 10 0,1 2 1005,-10 3 0,21 5 1,1 1-1,-16 2 0</inkml:trace>
+  <inkml:trace contextRef="#ctx0" brushRef="#br0" timeOffset="-188184.73">22113 4386 10051,'-32'0'1439,"1"0"-1439,2 0 0,7 14 90,-6-10-90,12 22 0,-11-12 0,12 1 0,-9 7-90,12-8 180,-6 10-90,11-10 0,-1 4 90,6-13-90,2 7 90,0-4-90,0 1 0,0-2 90,0 2-90,0-5 90,0 1-90,17-3-90,-1-1 180,19 0-180,-4-1 180,-6 0-90,1 0-90,-9 0-90,1 0-90,-1 0-89,0 0-91,-1 0 0,-3 0-179,2 0-901,-2 0 451,-2 0 1079,-1 0 0,-6 0 0,0 0 0</inkml:trace>
+  <inkml:trace contextRef="#ctx0" brushRef="#br0" timeOffset="-187967.73">22113 4474 11850,'0'36'-270,"0"-5"-269,0 1-361,-15-6-1349,11 18 116,-12-9 2133,16 10 0,0-12 0,0-2 0</inkml:trace>
+  <inkml:trace contextRef="#ctx0" brushRef="#br0" timeOffset="-186512.73">3452 5707 10591,'-14'14'899,"11"9"-719,-24-11-180,24 8 90,-10-1-90,5-3 0,6 2 90,-5 2-90,7 1 0,0 1 90,0 1 0,0 0-90,21 1 0,-16 0 0,36 12 90,-11-10-90,-5-4 0,1 0 90,17 3 0,-5 6-180,-13-11 90,-5-2 0,-3 0 90,2 0-90,-7-4-90,1 2-90,-9-9-90,-1 2-90,-3-7-359,0 2-181,0-2-1438,-19 2 2338,2-3 0,-19 1 0,6-2 0</inkml:trace>
+  <inkml:trace contextRef="#ctx0" brushRef="#br0" timeOffset="-186347.73">3508 5892 9961,'23'-20'720,"17"1"-450,-35-2-180,39-6 0,-20 9-180,20-8-180,-13 16-450,1-3 1,-14 8-91,0 1-269,-6 3 1079,-5 1 0,2 0 0,-4 0 0</inkml:trace>
+  <inkml:trace contextRef="#ctx0" brushRef="#br0" timeOffset="-185734.73">3422 5366 8792,'-27'0'360,"1"0"0,-17 0-270,10 15 89,-15-11 91,1 27-180,10-6 0,6-2 0,2 2-479,-6 16 569,-8 3 0,15-10 0,2 1-180,1 2 180,1 3-91,3 0-89,2 3 90,8-11 0,2 2 0,-3 17-45,6-3 0,2 0-45,1 11-348,1-18 1,4-1 347,15 17 90,-13-1-135,13-29 0,4 1 90,-5 9 0,1-1 0,4-10 0,3 0-90,11 15 0,0-1 135,12-1-90,-5-8 0,2-2 0,13 0 0,-19-12 0,1-2 45,4-3 0,-1-3-45,-9-3 0,2-1 0,23 1 0,1-2 0,-23-2 0,-1-3 0,26-4 0,-1-5 0,-24-1 0,-2-2 45,12-2 0,2-4 0,0-9 0,-2-2 0,-11 10 0,1-2-15,2-4 0,4-3 0,-5 1-30,-6 2 0,-2-2 90,2-4 0,2-4 0,-5 3 0,-5 3 0,-4-2-46,8-21 1,-5-2 45,-6-10 0,-8 23 0,-5-1-45,-15-2 0,-5 1-45,5 11 0,-3-1 0,-9-5 0,-8-2 0,2 5 0,0 2 0,-4 2-30,-7-4 0,-7-1 0,2 3-744,1 5 0,0 2 684,4 5 0,-3-1 0,2 4-90,-7 1 0,2 4-45,-2 2 1,0 3-226,0 1 0,-3 5-810,5 6 1,-4 3 0,3 2 1259,-7 2 0,-1 4 0,8 0 0,-1 3 0,2 1 0,-1 6 0,0 0 0</inkml:trace>
+</inkml:ink>
+</file>
+
+<file path=ppt/ink/ink6.xml><?xml version="1.0" encoding="utf-8"?>
+<inkml:ink xmlns:inkml="http://www.w3.org/2003/InkML">
+  <inkml:definitions>
+    <inkml:context xml:id="ctx0">
+      <inkml:inkSource xml:id="inkSrc0">
+        <inkml:traceFormat>
+          <inkml:channel name="X" type="integer" min="-2.14748E9" max="2.14748E9" units="cm"/>
+          <inkml:channel name="Y" type="integer" min="-2.14748E9" max="2.14748E9" units="cm"/>
+          <inkml:channel name="F" type="integer" max="32767" units="dev"/>
+        </inkml:traceFormat>
+        <inkml:channelProperties>
+          <inkml:channelProperty channel="X" name="resolution" value="1000" units="1/cm"/>
+          <inkml:channelProperty channel="Y" name="resolution" value="1000" units="1/cm"/>
+          <inkml:channelProperty channel="F" name="resolution" value="0" units="1/dev"/>
+        </inkml:channelProperties>
+      </inkml:inkSource>
+      <inkml:timestamp xml:id="ts0" timeString="2021-09-26T00:50:10.761"/>
+    </inkml:context>
+    <inkml:brush xml:id="br0">
+      <inkml:brushProperty name="width" value="0.09071" units="cm"/>
+      <inkml:brushProperty name="height" value="0.09071" units="cm"/>
+      <inkml:brushProperty name="color" value="#FF0000"/>
+    </inkml:brush>
+    <inkml:brush xml:id="br1">
+      <inkml:brushProperty name="width" value="0.12095" units="cm"/>
+      <inkml:brushProperty name="height" value="0.12095" units="cm"/>
+      <inkml:brushProperty name="color" value="#FF0000"/>
+    </inkml:brush>
+  </inkml:definitions>
+  <inkml:trace contextRef="#ctx0" brushRef="#br0">23370 9091 8702,'-13'-5'630,"3"2"989,10 1-1529,0 12-90,0 1 90,14 10-180,-11-6 270,11 0-180,-14-3 0,11 1 0,-8 2 0,16 3 90,-16 1-180,14 1 180,-14 2-90,20 11-90,-15-7 180,11 9-90,-8-12 0,-1 1-90,-1 0 180,3-1-90,-1 2 0,1-3 0,-1 3 0,0-2 0,0 2 0,5 12 0,-5-8 0,3 8 0,-5-10 0,-2-1 0,1 1 0,0 11 0,-3-8 0,1 19 0,-3-18 89,0 20-178,-2-21 89,-1 8 0,0-13 0,0-2 89,0 1-178,0 9 89,0-8 89,0 18-89,0-17 0,0 20 0,0-16 0,0 8 0,0-9 0,0 1-89,0 0 178,0 14 1,0-11-180,-11 23 90,8-26 0,-8 21 90,11-24-90,0 6 0,0-3 0,0-11 0,0 14 0,0-16-90,0 2 1,0-6-91,0-5-90,0 1-900,0-3 1170,0-2 0,11-1 0,3-3 0</inkml:trace>
+  <inkml:trace contextRef="#ctx0" brushRef="#br0" timeOffset="1756">23175 9153 8162,'-14'-3'540,"4"-1"-270,-10-2-180,8 2 0,-4-2 0,5 4 0,1-3 90,-2 3-180,0-2 90,0 3-90,-1-3 269,-8 1-179,3 0 90,-15-3-90,11 3 90,-19-3-180,14 3 0,-10-2 90,8 0-90,0 2 180,-3-2-180,-16-2 180,9 0-135,5 1 0,-1 0 45,-8-1-90,4 0 0,1 0 0,-9 0-1126,-19-4 1216,19 4-180,-3-1 180,-3 1-45,14 2 0,-1 0-305,-22-2 260,9 0 0,-1 1 0,-10 0-45,9 1 0,-1-1-766,-9 0 811,24 2 0,-3-1 45,0 1 0,1 0-45,9 2 0,-2-1 0,-24-1 0,-1 1 0,23 2 0,1 0 0,-25 0 0,-1 0-45,27 0 0,0 1 90,-10-1 0,-1 1-135,3 0 0,1 0 90,-22 0 0,11 0 0,1 0 0,-8 0-1362,9 0 0,0 0 1362,-9 0 0,22 4 0,0 1 504,-15-3-504,1 8 0,0-10-45,13 0 0,-1 0 45,-22 0 0,7-1 0,1 2 0,-10 4 0,8-5 0,1 1-297,-8 4 252,22-5 0,1 0 135,-13 0-90,3 0-90,1 0 90,15 0 0,1 0 0,-18 0 0,9 1 0,1-2 0,-6-10 0,11 9 0,0 1 0,-3-10 0,-9 11 652,21-6-742,3 5 1,4-5-1,-3 1 90,9 3 2836,-3-5-2926,10 5 152,-2 0-152,6 2 803,-2 0-803,3 0 180,-8 13-180,1-10 0,-14 21 90,7-7 0,-6-3 0,-1 23 0,6-23 0,-12 26 0,15-22 0,-10 15 0,13-16 0,-4 7 0,9-10 0,0 2 0,2-2 0,3 7 90,-1-4-90,3 12 0,0-11 0,0 15 0,0-14 0,0 7 0,0-8 0,0 1 0,0 0 90,0 10-90,0-8 0,0 20 90,0-16 0,0 19-90,0-14 0,0 7 0,0-9 0,0-1 0,0 1 0,0 12 0,0-8 90,0 21 0,0-22-180,0 9 90,0-12 0,0 0 0,0 0 0,0 11 0,0-9 0,0 18 90,0-21 0,-9 18-180,6-20 90,-6 7 0,2-1 0,5-10 0,-10 15 0,7-20 0,-2 10 0,1-14 90,3 5 0,1-9-90,1 1 0,1-6 90,0 13-90,0-2 180,0 9-270,14-12 180,1 6-180,10-14 90,-5 8 0,-6-11 0,-5 7 0,-1-6 0,-3 5 0,1-6 0,0 3-90,-1-2 90,-1 4 0,0-4-360,2 3-90,-1-1-1528,2 2 1978,-4-3 0,2 2 0,-1-2 0</inkml:trace>
+  <inkml:trace contextRef="#ctx0" brushRef="#br1" timeOffset="4124">24085 10789 11346,'34'0'270,"-3"0"-180,-6 0-90,-3 0 0,-3 0 0,0 0 0,16 13 647,-7-10-437,28 9 201,-19-12-411,0 0 0,0 0-681,12 0 636,-14 0 0,0 0-45,19 0 0,3 0-647,3 0 632,-16 0 0,1 0-95,-11 1 1,2-2 93,24-4 1,1-2 31,-26 6 1,0-1-1,13-4 0,7-2 1,-6 2-50,-9 5 0,-1 0 74,11-4 0,5-1 0,-6 1-48,-12 2 0,0-1-92,26-3 0,0 0-481,-26 2 0,-1 1 589,12 0 0,-2 0-9,17 0 94,0-1 8,-2 2-73,-1-2 110,-2 3 72,1-1 15,-3 1-11,-1 1-11,-1 0-20,-18 1 1,1 0-36,17 0 45,-9 0 0,-1 0 42,3 0-63,-9 0 0,-1 0 2,4 0 95,-3 4 1,1 2 108,-1-4-138,-3 6 1,-1 0 282,-5-6-334,19 8 402,-22-6-244,18 3 39,-19-4-191,7-1-253,-8-2 281,0 0-472,-1 1 1360,14-1-1434,-11 0 154,24 0 51,-19 0-102,24 0 290,-21 0-32,11 0 39,-14 0 51,0 0-39,-2 0 0,0 0 90,1 0-90,-3 0 0,11 0 90,-11 0-90,7 0 0,-11 0 0,-2 0 0,20 9 399,-16-7-238,15 7 244,-18-9-315,-1 5 315,9-3-315,-7 3 363,15-5-363,-14 0-579,6 0 418,-9 0-334,-1 0 405,-1 0-495,9 3 573,-8-3-473,17 5 744,-16-3-183,15 3 108,-14 0 96,7-1-87,-7 1 171,0 0-250,-1 0 218,1 0-264,0 0 178,1 0-211,10 1-181,-7-3 62,18 1-202,-18-2 56,19-1-300,-18 0 200,7-1-172,-12 0 104,-1 0-6,0 0 204,5 0-147,-7 0 203,10 0 105,-14 0-139,6 0 88,-12 0 0,3 0 90,-7 0-90,1 0 0,-4 0 0,1 0 0,-1 0 0,1 0 0,1 0 0,0 0 0,2 0 90,2 0-90,-2 0 0,2 0-90,-2 0 90,0 0 90,0 0-90,1 0 0,-1 0 0,1 0 0,-3 0 0,2 0 0,-3 0-90,0 0 90,-1 0 0,0 0 0,0 0 0,-2 0 0</inkml:trace>
 </inkml:ink>
 </file>
 
@@ -1083,7 +1123,7 @@
           <a:p>
             <a:fld id="{3DB37BB4-1E1D-7847-AB1B-63B52F2FB864}" type="datetimeFigureOut">
               <a:rPr lang="en-VN" smtClean="0"/>
-              <a:t>24/09/2021</a:t>
+              <a:t>26/09/2021</a:t>
             </a:fld>
             <a:endParaRPr lang="en-VN"/>
           </a:p>
@@ -1283,7 +1323,7 @@
           <a:p>
             <a:fld id="{3DB37BB4-1E1D-7847-AB1B-63B52F2FB864}" type="datetimeFigureOut">
               <a:rPr lang="en-VN" smtClean="0"/>
-              <a:t>24/09/2021</a:t>
+              <a:t>26/09/2021</a:t>
             </a:fld>
             <a:endParaRPr lang="en-VN"/>
           </a:p>
@@ -1493,7 +1533,7 @@
           <a:p>
             <a:fld id="{3DB37BB4-1E1D-7847-AB1B-63B52F2FB864}" type="datetimeFigureOut">
               <a:rPr lang="en-VN" smtClean="0"/>
-              <a:t>24/09/2021</a:t>
+              <a:t>26/09/2021</a:t>
             </a:fld>
             <a:endParaRPr lang="en-VN"/>
           </a:p>
@@ -1693,7 +1733,7 @@
           <a:p>
             <a:fld id="{3DB37BB4-1E1D-7847-AB1B-63B52F2FB864}" type="datetimeFigureOut">
               <a:rPr lang="en-VN" smtClean="0"/>
-              <a:t>24/09/2021</a:t>
+              <a:t>26/09/2021</a:t>
             </a:fld>
             <a:endParaRPr lang="en-VN"/>
           </a:p>
@@ -1969,7 +2009,7 @@
           <a:p>
             <a:fld id="{3DB37BB4-1E1D-7847-AB1B-63B52F2FB864}" type="datetimeFigureOut">
               <a:rPr lang="en-VN" smtClean="0"/>
-              <a:t>24/09/2021</a:t>
+              <a:t>26/09/2021</a:t>
             </a:fld>
             <a:endParaRPr lang="en-VN"/>
           </a:p>
@@ -2237,7 +2277,7 @@
           <a:p>
             <a:fld id="{3DB37BB4-1E1D-7847-AB1B-63B52F2FB864}" type="datetimeFigureOut">
               <a:rPr lang="en-VN" smtClean="0"/>
-              <a:t>24/09/2021</a:t>
+              <a:t>26/09/2021</a:t>
             </a:fld>
             <a:endParaRPr lang="en-VN"/>
           </a:p>
@@ -2652,7 +2692,7 @@
           <a:p>
             <a:fld id="{3DB37BB4-1E1D-7847-AB1B-63B52F2FB864}" type="datetimeFigureOut">
               <a:rPr lang="en-VN" smtClean="0"/>
-              <a:t>24/09/2021</a:t>
+              <a:t>26/09/2021</a:t>
             </a:fld>
             <a:endParaRPr lang="en-VN"/>
           </a:p>
@@ -2794,7 +2834,7 @@
           <a:p>
             <a:fld id="{3DB37BB4-1E1D-7847-AB1B-63B52F2FB864}" type="datetimeFigureOut">
               <a:rPr lang="en-VN" smtClean="0"/>
-              <a:t>24/09/2021</a:t>
+              <a:t>26/09/2021</a:t>
             </a:fld>
             <a:endParaRPr lang="en-VN"/>
           </a:p>
@@ -2907,7 +2947,7 @@
           <a:p>
             <a:fld id="{3DB37BB4-1E1D-7847-AB1B-63B52F2FB864}" type="datetimeFigureOut">
               <a:rPr lang="en-VN" smtClean="0"/>
-              <a:t>24/09/2021</a:t>
+              <a:t>26/09/2021</a:t>
             </a:fld>
             <a:endParaRPr lang="en-VN"/>
           </a:p>
@@ -3220,7 +3260,7 @@
           <a:p>
             <a:fld id="{3DB37BB4-1E1D-7847-AB1B-63B52F2FB864}" type="datetimeFigureOut">
               <a:rPr lang="en-VN" smtClean="0"/>
-              <a:t>24/09/2021</a:t>
+              <a:t>26/09/2021</a:t>
             </a:fld>
             <a:endParaRPr lang="en-VN"/>
           </a:p>
@@ -3509,7 +3549,7 @@
           <a:p>
             <a:fld id="{3DB37BB4-1E1D-7847-AB1B-63B52F2FB864}" type="datetimeFigureOut">
               <a:rPr lang="en-VN" smtClean="0"/>
-              <a:t>24/09/2021</a:t>
+              <a:t>26/09/2021</a:t>
             </a:fld>
             <a:endParaRPr lang="en-VN"/>
           </a:p>
@@ -3752,7 +3792,7 @@
           <a:p>
             <a:fld id="{3DB37BB4-1E1D-7847-AB1B-63B52F2FB864}" type="datetimeFigureOut">
               <a:rPr lang="en-VN" smtClean="0"/>
-              <a:t>24/09/2021</a:t>
+              <a:t>26/09/2021</a:t>
             </a:fld>
             <a:endParaRPr lang="en-VN"/>
           </a:p>
@@ -4169,8 +4209,8 @@
           <a:chExt cx="0" cy="0"/>
         </a:xfrm>
       </p:grpSpPr>
-      <mc:AlternateContent xmlns:mc="http://schemas.openxmlformats.org/markup-compatibility/2006">
-        <mc:Choice xmlns:p14="http://schemas.microsoft.com/office/powerpoint/2010/main" Requires="p14">
+      <mc:AlternateContent xmlns:mc="http://schemas.openxmlformats.org/markup-compatibility/2006" xmlns:p14="http://schemas.microsoft.com/office/powerpoint/2010/main">
+        <mc:Choice Requires="p14">
           <p:contentPart p14:bwMode="auto" r:id="rId2">
             <p14:nvContentPartPr>
               <p14:cNvPr id="4" name="Ink 3">
@@ -4189,7 +4229,7 @@
             </p14:xfrm>
           </p:contentPart>
         </mc:Choice>
-        <mc:Fallback>
+        <mc:Fallback xmlns="">
           <p:pic>
             <p:nvPicPr>
               <p:cNvPr id="4" name="Ink 3">
@@ -4310,8 +4350,8 @@
           <a:chExt cx="0" cy="0"/>
         </a:xfrm>
       </p:grpSpPr>
-      <mc:AlternateContent xmlns:mc="http://schemas.openxmlformats.org/markup-compatibility/2006">
-        <mc:Choice xmlns:p14="http://schemas.microsoft.com/office/powerpoint/2010/main" Requires="p14">
+      <mc:AlternateContent xmlns:mc="http://schemas.openxmlformats.org/markup-compatibility/2006" xmlns:p14="http://schemas.microsoft.com/office/powerpoint/2010/main">
+        <mc:Choice Requires="p14">
           <p:contentPart p14:bwMode="auto" r:id="rId2">
             <p14:nvContentPartPr>
               <p14:cNvPr id="2" name="Ink 1">
@@ -4330,7 +4370,7 @@
             </p14:xfrm>
           </p:contentPart>
         </mc:Choice>
-        <mc:Fallback>
+        <mc:Fallback xmlns="">
           <p:pic>
             <p:nvPicPr>
               <p:cNvPr id="2" name="Ink 1">
@@ -4481,8 +4521,8 @@
           </a:prstGeom>
         </p:spPr>
       </p:pic>
-      <mc:AlternateContent xmlns:mc="http://schemas.openxmlformats.org/markup-compatibility/2006">
-        <mc:Choice xmlns:p14="http://schemas.microsoft.com/office/powerpoint/2010/main" Requires="p14">
+      <mc:AlternateContent xmlns:mc="http://schemas.openxmlformats.org/markup-compatibility/2006" xmlns:p14="http://schemas.microsoft.com/office/powerpoint/2010/main">
+        <mc:Choice Requires="p14">
           <p:contentPart p14:bwMode="auto" r:id="rId5">
             <p14:nvContentPartPr>
               <p14:cNvPr id="8" name="Ink 7">
@@ -4501,7 +4541,7 @@
             </p14:xfrm>
           </p:contentPart>
         </mc:Choice>
-        <mc:Fallback>
+        <mc:Fallback xmlns="">
           <p:pic>
             <p:nvPicPr>
               <p:cNvPr id="8" name="Ink 7">
@@ -4562,8 +4602,8 @@
           <a:chExt cx="0" cy="0"/>
         </a:xfrm>
       </p:grpSpPr>
-      <mc:AlternateContent xmlns:mc="http://schemas.openxmlformats.org/markup-compatibility/2006">
-        <mc:Choice xmlns:p14="http://schemas.microsoft.com/office/powerpoint/2010/main" Requires="p14">
+      <mc:AlternateContent xmlns:mc="http://schemas.openxmlformats.org/markup-compatibility/2006" xmlns:p14="http://schemas.microsoft.com/office/powerpoint/2010/main">
+        <mc:Choice Requires="p14">
           <p:contentPart p14:bwMode="auto" r:id="rId2">
             <p14:nvContentPartPr>
               <p14:cNvPr id="2" name="Ink 1">
@@ -4582,7 +4622,7 @@
             </p14:xfrm>
           </p:contentPart>
         </mc:Choice>
-        <mc:Fallback>
+        <mc:Fallback xmlns="">
           <p:pic>
             <p:nvPicPr>
               <p:cNvPr id="2" name="Ink 1">
@@ -4643,8 +4683,8 @@
           <a:chExt cx="0" cy="0"/>
         </a:xfrm>
       </p:grpSpPr>
-      <mc:AlternateContent xmlns:mc="http://schemas.openxmlformats.org/markup-compatibility/2006">
-        <mc:Choice xmlns:p14="http://schemas.microsoft.com/office/powerpoint/2010/main" Requires="p14">
+      <mc:AlternateContent xmlns:mc="http://schemas.openxmlformats.org/markup-compatibility/2006" xmlns:p14="http://schemas.microsoft.com/office/powerpoint/2010/main">
+        <mc:Choice Requires="p14">
           <p:contentPart p14:bwMode="auto" r:id="rId2">
             <p14:nvContentPartPr>
               <p14:cNvPr id="2" name="Ink 1">
@@ -4663,7 +4703,7 @@
             </p14:xfrm>
           </p:contentPart>
         </mc:Choice>
-        <mc:Fallback>
+        <mc:Fallback xmlns="">
           <p:pic>
             <p:nvPicPr>
               <p:cNvPr id="2" name="Ink 1">
@@ -4686,6 +4726,57 @@
               <a:xfrm>
                 <a:off x="481320" y="299880"/>
                 <a:ext cx="11332440" cy="6285960"/>
+              </a:xfrm>
+              <a:prstGeom prst="rect">
+                <a:avLst/>
+              </a:prstGeom>
+            </p:spPr>
+          </p:pic>
+        </mc:Fallback>
+      </mc:AlternateContent>
+      <mc:AlternateContent xmlns:mc="http://schemas.openxmlformats.org/markup-compatibility/2006">
+        <mc:Choice xmlns:p14="http://schemas.microsoft.com/office/powerpoint/2010/main" Requires="p14">
+          <p:contentPart p14:bwMode="auto" r:id="rId4">
+            <p14:nvContentPartPr>
+              <p14:cNvPr id="3" name="Ink 2">
+                <a:extLst>
+                  <a:ext uri="{FF2B5EF4-FFF2-40B4-BE49-F238E27FC236}">
+                    <a16:creationId xmlns:a16="http://schemas.microsoft.com/office/drawing/2014/main" id="{F860EC65-8E73-934C-8508-3DB063D1B539}"/>
+                  </a:ext>
+                </a:extLst>
+              </p14:cNvPr>
+              <p14:cNvContentPartPr/>
+              <p14:nvPr/>
+            </p14:nvContentPartPr>
+            <p14:xfrm>
+              <a:off x="6709320" y="3193560"/>
+              <a:ext cx="3748320" cy="718920"/>
+            </p14:xfrm>
+          </p:contentPart>
+        </mc:Choice>
+        <mc:Fallback>
+          <p:pic>
+            <p:nvPicPr>
+              <p:cNvPr id="3" name="Ink 2">
+                <a:extLst>
+                  <a:ext uri="{FF2B5EF4-FFF2-40B4-BE49-F238E27FC236}">
+                    <a16:creationId xmlns:a16="http://schemas.microsoft.com/office/drawing/2014/main" id="{F860EC65-8E73-934C-8508-3DB063D1B539}"/>
+                  </a:ext>
+                </a:extLst>
+              </p:cNvPr>
+              <p:cNvPicPr/>
+              <p:nvPr/>
+            </p:nvPicPr>
+            <p:blipFill>
+              <a:blip r:embed="rId5"/>
+              <a:stretch>
+                <a:fillRect/>
+              </a:stretch>
+            </p:blipFill>
+            <p:spPr>
+              <a:xfrm>
+                <a:off x="6693120" y="3177360"/>
+                <a:ext cx="3786120" cy="754200"/>
               </a:xfrm>
               <a:prstGeom prst="rect">
                 <a:avLst/>

</xml_diff>

<commit_message>
create http jwt interceptor
</commit_message>
<xml_diff>
--- a/bai-giang.pptx
+++ b/bai-giang.pptx
@@ -365,6 +365,464 @@
   <inkml:trace contextRef="#ctx0" brushRef="#br1" timeOffset="122230">21818 17128 7485,'22'-18'5379,"12"0"-4651,-29 2 2777,56-7-4312,-38 11 523,10 4 0,0 1-588,-7 6-738,9 15 1817,-18 9-398,2 8 357,-11 4-1334,-1-6 1710,-4 2 0,0 1 1,-3 0-1</inkml:trace>
   <inkml:trace contextRef="#ctx0" brushRef="#br1" timeOffset="122435">22665 16714 8294,'5'-12'8303,"0"4"-7236,-4 24 513,0 15-1647,-21 15 254,16 5 0,-16-6 1,20 1-1</inkml:trace>
   <inkml:trace contextRef="#ctx0" brushRef="#br1" timeOffset="122748">23100 16651 7664,'41'-9'3084,"-2"2"-2192,20 5-931,-16 24 829,-7-4 1,-3 4 459,2 33-215,-11-6 0,-4 3-166,-11-15 1,-2 1 386,0 15 1,-2 1-22,-3-11 0,-4 0 34,-9 2 0,-2 1 45,12 1 1,-4 0-612,-23 0 1,-4 1-426,16-1 1,-1 1-602,-15-2 1,-5 1-457,6-4 1,-2 3 0,1-2-568,-6 5 1,-4 0 1212,6-10 0,-4 3 0,-2 0 0,4-6 0,3-4 0,3-5 1,-3 2-1,-11 8 0,0 0 0,-1 1 0</inkml:trace>
+</inkml:ink>
+</file>
+
+<file path=ppt/ink/ink10.xml><?xml version="1.0" encoding="utf-8"?>
+<inkml:ink xmlns:inkml="http://www.w3.org/2003/InkML">
+  <inkml:definitions>
+    <inkml:context xml:id="ctx0">
+      <inkml:inkSource xml:id="inkSrc0">
+        <inkml:traceFormat>
+          <inkml:channel name="X" type="integer" min="-2.14748E9" max="2.14748E9" units="cm"/>
+          <inkml:channel name="Y" type="integer" min="-2.14748E9" max="2.14748E9" units="cm"/>
+          <inkml:channel name="F" type="integer" max="32767" units="dev"/>
+        </inkml:traceFormat>
+        <inkml:channelProperties>
+          <inkml:channelProperty channel="X" name="resolution" value="1000" units="1/cm"/>
+          <inkml:channelProperty channel="Y" name="resolution" value="1000" units="1/cm"/>
+          <inkml:channelProperty channel="F" name="resolution" value="0" units="1/dev"/>
+        </inkml:channelProperties>
+      </inkml:inkSource>
+      <inkml:timestamp xml:id="ts0" timeString="2021-10-13T00:38:21.203"/>
+    </inkml:context>
+    <inkml:brush xml:id="br0">
+      <inkml:brushProperty name="width" value="0.09071" units="cm"/>
+      <inkml:brushProperty name="height" value="0.09071" units="cm"/>
+      <inkml:brushProperty name="color" value="#FF0000"/>
+    </inkml:brush>
+  </inkml:definitions>
+  <inkml:trace contextRef="#ctx0" brushRef="#br0">1698 704 10861,'2'-8'2159,"0"3"-2069,-2 18-90,0 12 89,0 11-89,0 6 90,0 9-90,0-12-90,14 22 180,-11-32-90,20 11 0,-21-25 0,7 1-809,-3-9 719,-1-3-270,8-30 270,-7 8 90,9-34 0,-8 24-90,13-21 180,-10 26-90,8-8 0,-10 24 270,5 3-90,-5 4-90,6 13 0,-6-9 0,2 27-90,0-27 90,2 45-90,-3-30 0,1 25 0,-6-32 0,-1 10 0,-2-19-180,0 17 0,1-18 0,0 5 270,0-7-270,1 0 180,4-19-90,1 14 90,9-48-90,-4 34 90,4-28 0,1 16 180,-6 15 90,7-8-90,-9 22-180,0-5 0,-1 7 90,-1 0-90,3 0 0,6 20 0,-1 3-1349,11 23-271,-10-12-538,6 3 2158,-6-11 0,0 0 0,2-1 0</inkml:trace>
+  <inkml:trace contextRef="#ctx0" brushRef="#br0" timeOffset="430">2448 752 10411,'-4'-8'1889,"0"6"-720,3-9-1079,19 10-90,-14 18 0,30 6 0,-13 11 0,-2-3-270,17-6-449,-22 0-271,18 0-2158,-3 9 989,-6-10 2159,6 6 0,-9-13 0,0-1 0</inkml:trace>
+  <inkml:trace contextRef="#ctx0" brushRef="#br0" timeOffset="634">2783 702 10231,'-35'0'1349,"-7"17"-1259,15 3-90,-7 1-90,9 18 90,1-20-449,0 19-1530,-2 5 630,10-12 1349,2 19 0,10-24 0,4 6 0</inkml:trace>
+  <inkml:trace contextRef="#ctx0" brushRef="#br0" timeOffset="1066">3007 490 10861,'-17'-5'1259,"4"0"-539,13 1-630,0 20-90,17-2 90,-13 24-180,29-11 90,-19 11 90,4-14-90,0 6 0,-15-10 0,11 0-90,-13-3-180,9 4 0,-6-7-450,2 2 361,-1-10 89,-1-2 180,-1-3 0,3-1 90,-1-16 0,4 12 0,-1-26 0,10 9-90,-4 3 899,9-14-449,-11 19-270,3-4 270,-3 8-360,-2 9 0,8 0 0,-7 21-990,10 3-539,-8 13-899,5-3 2428,-4-8 0,4 0 0,1-1 0</inkml:trace>
+  <inkml:trace contextRef="#ctx0" brushRef="#br0" timeOffset="1420">4262 216 12120,'-22'-10'360,"1"3"270,-15 4-361,11 17 181,-21 24-270,22 8-439,7-14 0,-1 2 304,1 13 0,1 1-90,4-10 0,2 2 15,-1 6 0,1 5 0,2-4-150,3-5 0,1 1-210,0 2 0,0 4 1,5-5-442,12-6 1,2-2 65,-4 10 0,3-3-269,10-16 0,3-3 1034,20 18 0,7-7 0,-24-20 0,0 0 0</inkml:trace>
+  <inkml:trace contextRef="#ctx0" brushRef="#br0" timeOffset="1998">5093 564 11940,'-12'-9'-90,"-1"0"360,-10 1-90,6 4 0,-7 2-180,7 2 0,1 18 0,-2-14 0,-2 34 0,6-12-180,1 17 0,9-5 0,25-17 90,2-8 90,18-13 0,-5-17 0,-16-4 180,5-1 0,-23-14 90,14 15-180,-15-14 90,5 7-180,-6 35 0,0 18 0,0 21-90,0 7-202,0-8 292,0 2 0,20 2 0,-16 0 0,15-16 0,-1-1 90,-14 16-90,10-12 0,-1-2 0,-10-1-450,16 14-3957,-17-31 4407,-10-14 0,4-23 0,-13-18 0</inkml:trace>
+  <inkml:trace contextRef="#ctx0" brushRef="#br0" timeOffset="2317">5590 548 12570,'-21'11'450,"-16"2"-450,19 18 0,-5-5 0,-2 5-90,22-5 90,-8 0 0,3 1 0,6 0 0,-5-3-90,7-1-90,0-5 90,17 0-90,4-9 180,22 0 0,0-24 0,1-3-360,-11-19-180,-14 1-89,-11 0-91,-8 6-1529,-17 14 2249,-2 7 0,-2 9 0,7 0 0</inkml:trace>
+  <inkml:trace contextRef="#ctx0" brushRef="#br0" timeOffset="2618">5912 657 9961,'-42'17'2069,"3"-3"-1979,6 21-90,16-14 0,-6 7 0,21-11 0,-7 3-90,9-4 0,0 6 0,0-10-180,22 3 270,6-13 0,26-18 90,-12 12 0,-2-28-180,-10 17-539,-16-11-181,1 2-179,-15 3-181,-17 9 1170,-7-1 0,2 11 0,1-3 0</inkml:trace>
+  <inkml:trace contextRef="#ctx0" brushRef="#br0" timeOffset="3164">6227 655 10501,'-24'15'0,"-10"-12"-90,31 27 180,-25-6-180,24 6 90,-10 2-90,7-10-90,6-1 0,-6 3 360,23-6-270,7-5 180,10-8 180,-12-23 0,1-1 270,-19-17-1,7 3-89,-10 1-450,0 5 90,-14 8-90,11 27 90,-11 11-180,14 16 90,17 19 0,-12-17-797,27 15 797,-29-15 0,28 1 0,-26-2-90,27 11 0,-15-13-720,9 18 1,-11-26-180,-8 4-900,-7-9 719,-18-9 1170,13 1 0,-12-10 0,17-2 0</inkml:trace>
+  <inkml:trace contextRef="#ctx0" brushRef="#br0" timeOffset="3564">6462 864 9781,'33'-12'1440,"-7"4"-1171,-3-14-269,-11 8 270,5-18-270,-8 9 0,2-8 0,-2-7 0,-3 9 90,1-24-180,-6 20 180,0-3 0,0-1 0,-1-3 0,-7 1 0,-2 1 180,5 1-45,-12 6 0,0 2-135,12-2 0,-11-5-90,1 20 89,11 3 271,-10 7-450,13 23 90,0 14 0,0 14 0,9-9 0,0 0 90,-4 14-501,10-5 1,2 0 320,-1 9 135,-8-18 0,1-1-135,18 11 90,-16-2 0,13-2-394,2 8 304,-5-13-180,18 8-90,-16-25-90,7 0 0,-10-14-269,-2-1-630,-3-4-2429,7-1 3778,-8-16 0,4 12 0,-8-11 0</inkml:trace>
+  <inkml:trace contextRef="#ctx0" brushRef="#br0" timeOffset="3898">7020 849 10231,'7'9'1349,"-6"2"-989,10-10 270,-4 3-630,1-4 180,0 0-180,-3 0 270,0-15-180,-3-1-90,-1-18 89,-1 9 91,0-10 0,0 14 90,-16-17-270,13 22-90,-23-7 90,15 36-180,-2 12-90,5 10-89,8 5-361,0 7 90,17-12-1169,4 23 900,0-33-450,21 7 1349,-22-24 0,22 5 0,-10-6 0</inkml:trace>
+  <inkml:trace contextRef="#ctx0" brushRef="#br0" timeOffset="4181">7270 178 11850,'35'-2'1439,"5"1"-1349,-11 19 0,-1 4 0,13 1-90,-10 12 0,-4 3 0,-2-1-45,-5 1 0,-2 1-2701,-2 13 2656,-6-16 0,-1 1-405,-5 6 1,-3-1-1,2-8 0,-2 0-1574,-13 28 1,-1 1 2068,11-24 0,-2 0 0,-21 13 0,-6-2 0,12-13 0,0 0 0</inkml:trace>
+  <inkml:trace contextRef="#ctx0" brushRef="#br0" timeOffset="18882">1820 2433 8972,'0'-10'1259,"0"1"-989,0-2 270,0 0-360,0 1-90,0 1 1439,0 4-1529,0 15 0,0 10 0,0 9 0,0 5 0,0-4 90,0 3-90,15 0-90,-11 0 90,10-3-270,0 5 90,0-11 90,3 1-180,8-11 0,-16-6 90,16-2 180,-12-4 0,5-17 0,-8-6 0,3 2-90,-6-28 90,-2 29 90,-2-32-90,-2 27 0,-1-2-90,0 9-89,0 4-181,0 33-270,14-16-179,-11 39-181,25-40 1,-25 24-271,27-25 1260,-25 20 0,30-20 0,-12 7 0</inkml:trace>
+  <inkml:trace contextRef="#ctx0" brushRef="#br0" timeOffset="19482">2330 2353 9062,'-13'-4'899,"9"16"-899,-9 2 0,34 3 0,-16 9 90,38-14-90,-38 13 0,41-6 90,-27 0 0,27 9 90,-20-7 90,11 23-180,-25-23-90,3 15 0,-15-21-90,0 5 90,0-9-450,-19 1 0,15-6-899,-29-2 809,30-17 361,-11-8 179,14-18 0,0 6 0,15-2 0,-11 12 0,26 0 0,-27 4 359,23 2-89,-14 0-180,11 5-90,-7 4 90,-2 4-90,-4 4 90,0 0-90,-2 0 0,0 0 90,-2 0 360,3 0-90,-4 0-270,4 0 449,-7 0-179,0-17-270,-1 2 270,-19-13-450,0 15 270,-4-1-180,-5 12 90,16-4-90,-5 27 0,8 5 0,8 14-270,0 10-90,0-18-426,23 8 337,-17-16-271,38-3-1439,-2 6 1178,-1-16 981,10 6 0,-28-16 0,0 1 0</inkml:trace>
+  <inkml:trace contextRef="#ctx0" brushRef="#br0" timeOffset="19754">2902 2471 9691,'15'35'540,"-11"-4"-450,26-5 0,-27-6 0,11-4 180,-2-4 0,-9 1 269,13-3-539,-14-2-90,2-4-89,-4-15-1,0-11-360,0-26 360,0 5-526,0-10 346,0 12-359,17-2-91,-13 0-449,34 2 1259,-33 4 0,37 4 0,-15 3 0</inkml:trace>
+  <inkml:trace contextRef="#ctx0" brushRef="#br0" timeOffset="21033">8997 2608 9152,'7'-34'809,"1"-3"-449,0-1 270,2-26-181,-4 17-224,-1 6 0,-1 0-1782,-1-5 1736,0-11-89,-2 22 570,-1 5-660,0 4 389,0 4-29,0 11-360,0 26 0,0 29 0,0 15 291,0-24 1,0 1-292,0 12 0,0 0 0,-1-11 0,2 1-270,6 27 0,5-2 45,-3-26 0,2-2-315,10 20 1,1-1-1632,7 1 1721,-13-21 1,-1-1-541,5 5-489,0-6 220,-2-4 1259,-2-6 0,-3-4 0,-1-2 0</inkml:trace>
+  <inkml:trace contextRef="#ctx0" brushRef="#br0" timeOffset="21165">9118 2925 8432,'-9'-14'90,"7"-10"0,-7 13-90,9-13 0,0 2 0,0-3-1349,21-15 0,5 6 1216,0-11 0,19 11 1,-14 0-1</inkml:trace>
+  <inkml:trace contextRef="#ctx0" brushRef="#br0" timeOffset="21468">9593 2155 9152,'5'0'1169,"-1"0"-899,0 0-270,0 17 0,5 1 180,-2 2-180,8 24 90,-5-27 0,2 27 0,-5-20 0,0-1 90,0 0-91,-2-2 271,-2-2-90,-1-2-90,-1 0-180,-1-8-270,0 1 90,-15-8-1169,11-14-1080,-10-6 2429,14-15 0,0-1 0,0-1 0</inkml:trace>
+  <inkml:trace contextRef="#ctx0" brushRef="#br0" timeOffset="21948">9602 2472 9062,'16'4'270,"2"-29"-270,20 18 0,-18-20 0,-2-1 0,5 12 90,14-32-90,-22 26 90,5-5 89,-9 9-89,-11 3 90,0 1-90,0 4 90,0 1 450,-21 4-270,-6 2 179,-13 2 1,-12 18-360,18-13-90,-23 29 0,27-7-90,-7 8 180,19 15-180,8-20 0,5 15-180,36-28-1169,27 10 719,-22-24 0,3-2-927,9 5 1,0-2 1556,-8-12 0,-1-1 0,4 7 0,0 1 0,1-8 0,0 1 0</inkml:trace>
+  <inkml:trace contextRef="#ctx0" brushRef="#br0" timeOffset="23334">16738 1650 9781,'-4'0'720,"-3"0"-450,3 15-90,-3-11-90,2 34 0,-5 2 0,4 12-45,1-11 0,0 1-45,1 12 0,2-8 0,1-1-1234,1 7 1234,0 13-754,0-10 754,0-14 0,14 15 0,-10-31 0,10 3 0,-14-18-180,0-2 90,0-22 90,0-21 0,0-4 0,0 5 0,0 0 0,0-5-90,0-11 1220,0 19-1130,0 2-90,0 5 1038,0 4-948,0 5 0,14 6 0,-10 0 0,22 8 0,-12-3 0,13 24 90,-8-14-90,-1 30 90,-5-32 90,0 40-180,-4-27 0,1 34-90,-8-26 90,-1 10 0,-1-12-180,-26 2-450,20 0 0,-25-9 1,-4-1-361,12 8-179,-34 2 1169,28-13 0,2-5 0,1-4 0</inkml:trace>
+  <inkml:trace contextRef="#ctx0" brushRef="#br0" timeOffset="23698">17132 2268 7892,'7'6'450,"1"-4"-360,0 4-180,2-6 180,2 0-90,4 0-90,2-18 270,5 13 0,15-26-180,-10 12 450,18-15-90,-23 6 179,2 2-89,-13 10 0,-7 1-180,-1 1-180,-4 2 89,0 3 361,-16 2-360,-2 2-90,-17 19-90,3 7 0,6 19 0,9-7-270,9 11-270,8-19-1438,23 6 269,17-10 1709,13-11 0,12 0 0,-11-10 0</inkml:trace>
+  <inkml:trace contextRef="#ctx0" brushRef="#br0" timeOffset="26470">25107 2037 9332,'-34'-3'629,"7"1"-629,11 17 0,8-2 0,8 12 630,15-14-450,-11-18 0,12-9-270,-16-11 270,-11 12-180,9 24 0,11 15 0,-5 12 0,30 0 0,-30-7 0,27 3-90,-28-2 0,28 1-360,-12 12 90,7-12-629,2 21 359,-14-24-89,-3 7-361,-4-14 1080,-7-2 0,3 0 0,-3-3 0</inkml:trace>
+  <inkml:trace contextRef="#ctx0" brushRef="#br0" timeOffset="27265">25065 2081 9242,'-8'-10'989,"-1"0"-719,-2 3 0,1-1 90,-2 0-270,0 1 0,-9 1 89,3 3-89,-12 0-90,9 3 0,-15 19 0,12 5 0,-3 0 0,8 14 0,6-22 0,2 16 0,5-3-90,3-8-89,22 8-91,-15-15-90,52 1 180,-33-11-292,32 0 472,-22-4 0,3 0-90,-2-20 90,12 0 90,-14-4-117,14-6 27,-28 10 270,0-15-91,-14 8-179,-4 5 0,0 8 0,0 1 0,-20 3 467,15-1-467,-32 4 123,17 2-33,-10 4-90,13 16 0,8 6 0,9 13 0,16-4 0,-12 4 0,30-13 0,-29 8-90,27-1 0,-12-4-540,10 15 0,-12-14-179,3 5-1,-19-9-359,11 0 1169,-12-1 0,3 0 0,-4-1 0</inkml:trace>
+  <inkml:trace contextRef="#ctx0" brushRef="#br0" timeOffset="28034">25725 1973 9871,'0'-9'360,"-21"2"0,-2 0-90,-23 4-270,1 0 0,7 20 0,-6 4-90,18 0 0,-1 14 90,17-14-180,5 14 0,33-8 180,7-13-90,15-7 90,13-7 180,-22 0-90,9-18-90,-17 13 0,-5-27 270,-5 28-90,-10-24 0,2 25 359,-13-25 91,5 13-540,-7-10-90,0 6 90,-14 9-90,0 6 0,-3 25 0,-2 10 90,17 13-180,-5 3 90,7 10 0,0-13 0,9-7 0,4-1 0,14 4 0,0 8 0,2-26 0,-4-1 0,-17 8 0,41 12 90,-35-22-1979,4 1 899,-29-14 990,-33-34 0,-2 20 0,16-8 0,0 0 0</inkml:trace>
+  <inkml:trace contextRef="#ctx0" brushRef="#br0" timeOffset="28811">26227 1911 8972,'-32'0'719,"13"12"-539,-5-9-270,13 18 90,-11-18 90,13 13-90,-2-14 0,8 13 0,-3-10 0,4 8 0,1-2-90,1 0 180,0 1-90,0-1 0,0 0 0,0-2 0,0 0 90,13-1 270,-10-4-270,21 0 0,-15-3-90,2-17 90,1 12-90,-8-23 180,6 12-180,-4 0-90,-1-11 180,-3 13-180,-1-13 90,-1 9 90,0 0-360,0 1 0,0 3-989,0-6 449,0 11 810,-11-1 0,9 7 0,-9 0 0</inkml:trace>
+  <inkml:trace contextRef="#ctx0" brushRef="#br0" timeOffset="29233">26057 2103 8882,'20'-45'899,"-2"8"-719,1 8 0,-1-1-180,-2-10 180,-3 5 0,0-1-180,2-7-1764,1-14 1854,3 16 179,-17-1-89,5 0 203,-7-20-203,0 15 0,2 7 0,-4 1 0,-17-3-90,0-21-180,-4 35 90,-3-3 623,13 18-623,-11 6 90,11 25 0,4 19-90,9 15 0,0 5 45,0-19 0,0-1-135,0 23 90,7-7 0,3 0 140,10 10-185,-10-22 0,2-2-314,18 15-181,-27-3-270,27-4-449,-26-4-180,27-6 0,-18-3 1554,13-6 0,-6-5 1,0-1-1</inkml:trace>
+  <inkml:trace contextRef="#ctx0" brushRef="#br0" timeOffset="29565">26513 2042 8882,'1'0'1439,"4"0"-1439,31-14 0,-7-1 180,-3-15 90,-12 7 0,-5-1 89,-9 6 1,0 2-90,0-2-270,0 5 90,0 0 540,-16 4-630,-6 4 90,-10 40-90,0-11 0,23 12 0,4 2-450,-5 1-2204,31-2 1,10-2 2653,7-2 0,3-12 0,5-5 0,15-8 0</inkml:trace>
+  <inkml:trace contextRef="#ctx0" brushRef="#br0" timeOffset="45083">3478 4406 8522,'23'-15'180,"12"11"-180,-20-11 0,15 15 90,8-11-90,-5 8 0,10-8 0,-8 3 0,1 7 90,24-12-90,-12 11-1298,-14-2 0,0 0 1298,18 2 90,5-3-180,6 0 135,-12 0 0,3-1-45,-12 1 0,3 0 30,7-2 0,7-3 0,-5 2-30,-1-1 0,1 0 0,7-2 0,7-1 0,-5 0-761,-4 1 1,-2 0 790,-7 1 0,3 0 0,-3 1-75,4-1 0,-3 1 90,2 0 0,0 0-45,-2 1 0,-1-1 0,0 3 0,0-1 0,-3 0 0,0 1 0,-2 1 0,1 1 0,14-2 0,0 1 185,-17 3 1,1 0-186,24-1 0,-3 1 45,-29 2 0,-2 0-45,9-1 0,1 2 0,-5 5 0,0 2 0,20-5-45,-10 11 0,-1 0 45,7-10-90,-12 9 0,-1-1-89,4-9-46,-11 7 0,0-1-135,1-7-90,6 11-539,-8-12 989,-13 4 0,5-5 0,-13 0 0</inkml:trace>
+  <inkml:trace contextRef="#ctx0" brushRef="#br0" timeOffset="45485">6607 3897 9242,'-5'-4'1799,"-1"1"-1529,23 3-270,9 12 0,18-9 0,6 20 89,-14-14 1,1-1-635,24 13 545,-5-4 0,2 0-540,-22-7 1,0 0 539,11 5 0,0 0 45,-14-5 0,-1 0-45,0 0 0,0 0 0,28 12 45,-20-8 0,-1 0-45,16 9 135,-15-4 0,-2-1-135,-3 5 0,2 22-90,-26-13-810,-28 13 1,-9 2 359,10-18 1,-3 1 182,-11 9 0,-7 4 0,2-4 1,7-6-1,-1-1 0,-9 9 1,0 1-1</inkml:trace>
+  <inkml:trace contextRef="#ctx0" brushRef="#br0" timeOffset="46383">8762 4512 8972,'0'-40'1169,"0"6"-809,0-5-270,17 7 0,-13-5 0,13-1 90,-3-3-797,-10-1 707,10-2 90,-3 2-90,-8-1 180,8-16-90,-11 15 44,0 9 1,0 1 45,0 0 21,0-9-381,0 16 90,0 10 193,-15 1-193,1 32 0,-4 2 0,6 23 0,4 6-90,6 9-90,-3 5 0,0 0-212,5 0-148,7-8 1,6-2-1615,13 3 1704,-15-19 1,3-2-541,34 5-750,-28-3 391,25-6 1293,-11-3 0,1-7 0,1-4 1</inkml:trace>
+  <inkml:trace contextRef="#ctx0" brushRef="#br0" timeOffset="46635">9330 4333 9422,'-47'0'629,"18"19"-539,-8-14-90,33 27 90,-30-28-90,30 20-90,-11-9 90,15 9-270,24-10 180,8-6 0,12-8 1,-1 0-181,-1-15 180,-9-4 90,-6-18-90,-14 2-90,-37 13-90,18-3-135,-25 22 0,-5 4-134,9-11-451,-33 10 990,28 0 0,15 0 0,5 0 0</inkml:trace>
+  <inkml:trace contextRef="#ctx0" brushRef="#br0" timeOffset="47053">9690 4189 8882,'-19'18'540,"14"10"-450,-31-25 89,20 26-179,-4-9 0,9 16 0,11-10 0,0-3 0,20-10-89,-15-2 89,38-5-90,-38 2 0,43-7 0,-29 3 90,33-4-90,-23-14 270,11-3 89,-21-16 1,-4 1-180,-10-1 360,-24 8-180,-4 9-270,-13 24 90,15 23-180,-1 9-169,20 13 259,-8-8 0,10 4 0,0 0 89,19 1-134,-17-16 1,1-1 133,37 18-134,-37-13 1,-1-2 44,32 3-90,-30 4-653,9-18-247,-13-6 1,0-3-181,0-5 1170,0-5 0,-17-3 0,-4-3 0</inkml:trace>
+  <inkml:trace contextRef="#ctx0" brushRef="#br0" timeOffset="47251">10005 4235 10141,'16'23'540,"1"12"-540,-7-14 0,3 9-90,-3-1 0,-1-7-450,2-1-179,-3-1-1,1-3-269,0-1 989,1 1 0,-3-6 0,1 1 0</inkml:trace>
+  <inkml:trace contextRef="#ctx0" brushRef="#br0" timeOffset="47416">9925 4014 9152,'-7'-8'-90,"3"3"90,-1 2-1439,3 2-425,18 1 1864,5-1 0,0 1 0,-4 0 0</inkml:trace>
+  <inkml:trace contextRef="#ctx0" brushRef="#br0" timeOffset="47717">10290 4202 9602,'7'26'899,"0"2"-539,0 8-270,-3-8 90,4 15-90,-3-19-90,5 12-90,-3-17 90,6 8-180,-9-16-180,6 1 270,-8-10 0,2-1 90,-2-17 0,3 12-90,-2-35 90,2 18 0,0-22 360,0 5-341,1-2 71,-1 3 180,0 3 1079,3-2-1079,-1 19 0,3 0-90,1 17-90,1 0-90,4 0 90,2 21-90,3-2 0,2 22-1350,14 11 1,-8-8 1103,-4-5 0,2 0 0,5 8 0,-11-17 1,0 0-1</inkml:trace>
+  <inkml:trace contextRef="#ctx0" brushRef="#br0" timeOffset="58833">26502 3905 9691,'-4'-5'-719,"1"1"719,0 1 0,2 1 0,0 1 0</inkml:trace>
+  <inkml:trace contextRef="#ctx0" brushRef="#br0" timeOffset="59283">27583 4457 11221,'16'-11'-180,"-5"1"-180,-2 10-360,-5 0-629,-1 0-1169,0 0 2518,0 0 0,-1 15 0,-1 3 0</inkml:trace>
+  <inkml:trace contextRef="#ctx0" brushRef="#br0" timeOffset="96051">11323 4288 7263,'20'0'450,"2"-7"-360,3 5 89,1-13-179,3 9 360,16-11-90,10 1-180,3 0 180,0 0 0,7 1-180,-14 4-470,-6 3 0,1 0 380,10 0 0,-6 2 0,2 0 0,12 1 45,-20 2 0,0 0-45,-9 2 0,-1-1 45,2 1 0,2-1-45,1 0 0,4 1 0,0-1 0,3 0 0,-1 0-600,9 0 0,3 0 600,-9 0 0,6 0 0,0-1 0,-4 1-1312,16-2 1,-1 1 1311,-8 0 0,2 0 0,1-1-30,1 1 0,1-1 0,-3 1-190,-12 0 1,-2 0 0,4 0 219,5-1 0,7 1 0,-2-1 0,-5 1 0,12 0 0,-2 0 0,-16 1 0,6-1 0,-2 1 0,-5 1 0,7-1 0,-2 2 0,3-1 0,4 0 0,-6 1 0,-9 0 0,-2 0 45,13 0 0,0 0-45,-5-1 0,-1 2 0,-13 6 0,2 0 0,25-5 0,-1 0 0,-27 5 0,1 0 0,21-6 0,0-2 0,4 1-45,-22 0 0,-2 0 45,6 0-403,-3 0-227,-6 0-104,4 0-435,-14 0 1847,0 0 1,-14 0 0,-2 0 0</inkml:trace>
+  <inkml:trace contextRef="#ctx0" brushRef="#br0" timeOffset="96384">15125 3797 9062,'-7'-3'629,"3"0"-179,1 1 360,2 1-720,25 0 0,5 0 90,31 13-180,-11-9 89,-15 9 1,0 2-1132,8 1 1132,10 9-548,-7 8 458,-16-11 90,9 23-180,-26-13 90,0 15-269,-12-5 89,-33 9-270,2 5-343,0-24 0,-3-1 253,6 3 0,-1 0-135,-1 1 1,-1 0 674,1 0 0,-1 0 0,2-2 0,1 0 0,0-1 0,1 0 0</inkml:trace>
+  <inkml:trace contextRef="#ctx0" brushRef="#br0" timeOffset="97751">16385 4319 8072,'13'-28'630,"-3"-1"-450,1-5 0,-9-3-1702,15-5 1792,-16-3 0,11-2 0,-11 0-90,8-2-180,-7 1 270,1-2-180,-2 2 179,-1 0 181,0 3-360,0 2 191,-20 4-191,15 2 180,-15 7-270,5 4 171,11 6-171,-11 6 360,6 5-360,6 21 780,-12-10-780,13 43 0,-4-19 0,6 12 0,0 3-90,0 16-315,-2-7 0,4 0-492,21 10 537,-22-22 1,3-1-451,42 10 91,-26-2-1,22-2-180,-16-16 1,-1 0 899,16 11 0,-13-14 0,1-2 0,13 4 0</inkml:trace>
+  <inkml:trace contextRef="#ctx0" brushRef="#br0" timeOffset="98018">17083 4094 8882,'-52'0'1619,"7"0"-1439,-5 0-180,15 13 0,-5-10 90,13 22-90,3-9 0,2-1 0,10 11 0,3-11-90,9 12 90,19-12-270,8 2 270,25-16-90,-9 5 90,2-6-90,-17-18 0,-2 2-270,-2-5-359,-11-5-91,-2 11 271,-11-9-1170,-21 11 1709,-2 6 0,-3 7 0,8 0 0</inkml:trace>
+  <inkml:trace contextRef="#ctx0" brushRef="#br0" timeOffset="98466">17540 3983 8882,'-44'0'1079,"18"14"-989,-15-10-90,18 25 0,-15-14 0,18 16 0,9-4 0,11-6-270,23-2 91,-17-8 89,42-1 90,-42-4-180,43 0 180,-29-5 0,21 1 0,-4-2 0,-12 0 90,4-16 0,-13 12 89,-9-25-89,-1 17 0,-6-12 90,-19 13-90,-2 2-90,-2 24 0,-7 9 45,27 9 0,3 4 45,-12 17-180,18-6 0,4 0 180,-6 1-90,13-8 0,-1-1 0,-11 4-750,12 11 660,-7-23 90,-7-4 90,7-2-989,-10 0 269,0-9-1259,0-2 1889,-17-10 0,13-3 0,-13-2 0</inkml:trace>
+  <inkml:trace contextRef="#ctx0" brushRef="#br0" timeOffset="98653">17780 3877 9422,'10'49'809,"-1"-11"-719,-4 3-180,-1-10 90,1 16 0,0-11-1349,5 22 359,-4-26 990,9 12 0,-7-22 0,5 2 0</inkml:trace>
+  <inkml:trace contextRef="#ctx0" brushRef="#br0" timeOffset="98812">17812 3760 7443,'0'0'0</inkml:trace>
+  <inkml:trace contextRef="#ctx0" brushRef="#br0" timeOffset="99150">18087 3946 8522,'2'19'900,"1"1"-631,2 2-89,-2-3 0,0 9-180,-1-10 0,0 7-90,0-4 90,1-7-359,0 7-1,-2-13 90,3 2 90,-2-7 0,1-2 180,2-1 0,-2 0 0,1-20 270,4-4-90,-3 0 360,5-26-181,-6 34 811,2-27-990,-4 31-1,1 2 1,1 10-180,1 0 90,2 0-90,2 17 0,0-13 0,1 29-90,7-9-989,-4 8-1799,8 11 2878,-7-16 0,2 5 0,-3-11 0</inkml:trace>
+  <inkml:trace contextRef="#ctx0" brushRef="#br0" timeOffset="99286">18663 4102 12210,'0'0'0</inkml:trace>
+  <inkml:trace contextRef="#ctx0" brushRef="#br0" timeOffset="106175">18722 4147 6273,'-23'0'0,"6"0"0</inkml:trace>
+  <inkml:trace contextRef="#ctx0" brushRef="#br0" timeOffset="108245">18653 4172 8162,'32'0'450,"-5"-12"-450,0 9 90,-1-8-90,1-3 180,6 11 90,22-22-270,-9 10-171,-13 5 0,0-1 171,20-10-828,3 6 918,4-2-90,3 1 45,-30 9 0,0-1 45,-1 0 0,2 0 0,15-3 0,0 0-45,-11 3 0,1 0-45,4-1 0,3-1 0,-3 1-448,-3 1 1,-1 1 492,14-4 0,-1 1-45,-14 3 0,-1 1 0,2 0 0,1 0 0,-1 0 0,1 0 45,0 0 0,1 0-45,-1 0 0,1 0 0,-1 0 0,2 1 45,17-3 0,1 1-45,-15 2 0,1-1 0,4 1 0,5-1 0,-5 1 0,-5 1 0,0-1 30,5 2 0,5-1 0,-5 1-30,-3 1 0,-3 0 0,15-1 0,3 1 45,-1 1 0,-1 1-45,-14-1 0,2 0-30,2 1 0,6-1 0,-6 1 30,-5 0 0,-1 0 30,3 0 0,3-1 0,-4 1-30,-7 0 0,-2 0 0,10 0 0,0 0 0,-6 0 0,-3 0 0,19 0 0,-14 0 0,-1 0 0,2 0 180,22 0-180,-30 0 0,19 0 0,-24 0 0,29 0 0,-29 0 0,29 0 0,-32 0 0,24 0 0,-21 0 90,10-8-2,-12 6-88,-1-6 0,-1 8 90,9 0-180,-10 0 848,15 0-758,-17 0 0,15 0-90,-15 0 90,8 0 0,-8 0 0,-1 0 0,1 0-90,10 0-270,-10 0 679,12 0-679,-18 0-809,4 8 1169,-12-6 0,-2 11 0,-5-8 0</inkml:trace>
+  <inkml:trace contextRef="#ctx0" brushRef="#br0" timeOffset="108556">22990 3574 9152,'-8'-9'629,"2"1"-629,2 2 90,3-1 90,0 0-90,1 1-180,0 0 180,0 1-180,25 1 90,-19-2 0,46 3 90,-27-1-90,7 3 0,3 1 0,12-1 90,-8-1 0,-1 4 0,5 15-45,-9-7 0,-3 0 45,0 11-90,4 12 90,-19-4-90,-9 10 0,-21 19-90,9-19-225,-25-3 0,-4-1-2048,7 10 1958,-5-15 1,-1-1-766,-5 13 1046,3 0 1,2 0 0,3-1 0</inkml:trace>
+  <inkml:trace contextRef="#ctx0" brushRef="#br0" timeOffset="109101">24742 3834 9871,'-28'-14'-90,"1"3"90,-3-4 0,9 7 90,-3-2-270,16 26 180,21 1-179,11 17 179,23-18 0,-22 6 0,33-20 90,-38 8-90,25-10 0,-24 0 89,-1-18 1,-9-1 0,-1-18 0,-10 11-90,0 0 180,-22-1-90,17 9 0,-30-10-90,18 16 0,1-2 0,-8 8 0,21 2 0,-8 14 0,11 8-90,0 8 0,11-9-719,-8 0-451,8-8-718,-4 4 1978,-5-2 0,6-6 0,-8-3 0</inkml:trace>
+  <inkml:trace contextRef="#ctx0" brushRef="#br0" timeOffset="109901">24510 4189 7803,'39'-32'269,"-1"2"-89,-7 3-352,2-1 352,2-3 0,0-1-180,-2-1 0,-2 1 90,-3-1 179,-5-2 181,-4 0-450,-6 0 270,-3-19-90,-6 12 90,0 4 0,-5-1-180,-22-7-1177,17-16 1267,-35 21-90,36 0 90,-36 2 103,15-6-283,-11 13-90,1-5 180,23 24-90,-7 2 0,18 27 190,-5 18-190,7 11 0,17 14-318,-5-22 0,1 2-401,9 22-181,8-9 1,1 0-91,-6 7 270,5-21 1,2-1 719,2 9 0,3 0 0,-1-3 0</inkml:trace>
+  <inkml:trace contextRef="#ctx0" brushRef="#br0" timeOffset="110201">25403 3867 9422,'-55'0'809,"12"0"-809,4 0 90,13 14-90,3-11 90,0 24-180,13-14 180,-1 11-270,30-5 180,7-8-90,22-4 90,-9-7 90,-1 0-90,-15 0 0,-10-16-270,7 12 180,-17-28-179,-10 17-1,-25-14-270,-9 16-90,-7 4-89,15 4 719,-1 4 0,-3-4 0,-1 5 0</inkml:trace>
+  <inkml:trace contextRef="#ctx0" brushRef="#br0" timeOffset="110653">25898 3686 8206,'-49'0'1169,"-1"0"-1169,25 13 0,-14-10 335,25 26-335,-6-13 83,11 16-83,26-7 0,10-3 90,11-10 0,15-3 90,-19-8-138,17 2 138,-22-20 216,-6 0-216,-12-13-90,-11 5-90,-21 12 0,16-1 0,-32 12 90,33 15-90,-12 16 0,16 11 90,0 6-90,19 14 0,-14-12 0,12-6 0,4-1-1320,3 6 1410,0 12-532,10-9 352,-21-17-335,4 15-205,-8-28-1259,-9 8 900,-24-18-591,17 2 1580,-41-9 0,42-1 0,-17-2 0</inkml:trace>
+  <inkml:trace contextRef="#ctx0" brushRef="#br0" timeOffset="110835">26170 3624 9332,'16'0'629,"-2"0"-539,-4 19-90,-3-15-90,-1 29 90,0-29 0,-1 27-270,0-17-1439,1 24 630,-2-15 1079,1 4 0,0-10 0,-1 0 0</inkml:trace>
+  <inkml:trace contextRef="#ctx0" brushRef="#br0" timeOffset="110979">26302 3578 7982,'36'-4'0</inkml:trace>
+  <inkml:trace contextRef="#ctx0" brushRef="#br0" timeOffset="111287">26578 3739 8342,'6'16'450,"0"1"-270,-2 0 90,3 10-270,-3-11 0,0 11 0,-4-16 360,2 2-1,-2-38-89,1 2-180,-1-31-90,0 22 720,0-1-630,16 21-180,-1 1 90,21 25-360,-12 10-899,15 22-1,-15-4 1260,-2-11 0,1 0 0,5 8 0,8 13 0</inkml:trace>
+  <inkml:trace contextRef="#ctx0" brushRef="#br0" timeOffset="111686">27628 3767 10231,'-30'-8'0,"5"0"0,-27 5 0,12 1 0,-11 2-180,13 0 0,-12 18-179,34-1-451,-4 16 720,18-9 90,22-10 0,13-6 90,26-8 90,-10 0 360,7-13-181,-25 9 271,7-21-180,-25 13-360,5-1-90,-17-4 0,5 30-540,-19-2 180,10 25-179,-11-9-361,14 2-89,0-9-361,0-2 1350,23-1 0,-17-8 0,17-3 0</inkml:trace>
+  <inkml:trace contextRef="#ctx0" brushRef="#br0" timeOffset="112003">27965 3659 8522,'0'38'450,"0"-5"-90,0-2-90,0-4-1,0 3-89,0 2-90,0 3 0,21 3 0,-16 2-555,30 1 555,-31 4 90,17-3 0,1 1-180,-15 12 45,12-4 0,-1-1 45,-16-6-90,7 22 0,-9-31 0,0 4 0,-26-19-180,20-1-90,-45-5-1619,16-1 900,-10-6 989,-10-3 0,27-20 0,-6-3 0</inkml:trace>
+  <inkml:trace contextRef="#ctx0" brushRef="#br0" timeOffset="112518">27487 3708 8252,'-9'-1'360,"1"-1"-180,4 0-180,1 0 0,1 1 1619,-1 1-1439,2 17 0,17 8 180,1 27-270,2-4 0,9 7-90,-17-20 0,-2 1 89,10 20-89,-4-7 0,-1 2-227,0 11 272,-4-12 0,0 1-135,2 8 135,-9-5 0,-2-1-45,-1-1 0,-8-9 0,-5-4 90,-10-8-630,-25 8-90,12-22-689,-1-1 330,8-11-526,2-2 1515,-1-3 0,3-17 0,1-4 0</inkml:trace>
+  <inkml:trace contextRef="#ctx0" brushRef="#br0" timeOffset="113269">27787 3735 9602,'-5'-3'1349,"1"1"-1259,3 23 0,1-3 0,0 22 0,18-6-90,-13 4 0,13 6 0,-8-12 0,0 2 0,9 19 0,-1-10 0,0 0 0,-2 5-913,7 9 913,-20-23 0,17-5 0,-18-6 0,15 1-270,-14-11-720,4-1 541,-6-25 269,-1-22 180,-16-2 0,13-14 0,-13 0 180,16 11-225,0 6 0,0 0 45,0-4 180,15-13-1,-11 27 1184,10 2-1273,3 16 0,-2 4 0,5 25-90,0-18 90,-7 53-90,4-37 0,-2 38 90,-7-42-90,-2 17 270,-2-30-270,-3-4 0,2-4-90,0-47 90,0 29-90,5-42 90,-1 36-90,5-13 180,-5 27 0,3-8-180,-1 21 90,0-5 0,2 6 0,5 16-180,-3 7-720,13 24 451,-10-7-721,11 15 361,-9-23-423,4 6 1232,-4-16 0,-1-4 0,1-3 0</inkml:trace>
+  <inkml:trace contextRef="#ctx0" brushRef="#br0" timeOffset="113629">28477 3982 9062,'-15'-5'270,"1"0"-180,-4 24-90,8 7-90,10 10 90,0 11-90,0-17-270,16 14 180,-13-20 180,30 8 0,-18-21 0,13 1 0,-8-12 0,-9-20 90,2 15 270,-7-34-90,0 13-1,3-7-89,-9-9-90,3 21 360,-3-5-450,0 33 0,0 8 0,19 23-270,-15 3-180,32-17-269,-32 8-540,24-20 1259,-14 3 0,10-1 0,-1-8 0</inkml:trace>
+  <inkml:trace contextRef="#ctx0" brushRef="#br0" timeOffset="114019">28772 4073 9602,'2'8'1529,"0"2"-1170,4 11-359,-2-7 0,5 9 0,-4-8 0,1-1-539,0 1-1260,3 7 629,-2-6 1170,3 11 0,-4-14 0,2 3 0</inkml:trace>
+  <inkml:trace contextRef="#ctx0" brushRef="#br0" timeOffset="114218">28730 3596 10411,'0'-4'-2698,"0"0"2698,16 21 0,-12 3 0,13 18 0</inkml:trace>
+  <inkml:trace contextRef="#ctx0" brushRef="#br0" timeOffset="114541">28968 4162 9691,'6'10'1260,"0"-1"-811,4-4-179,0-3 0,12-20-270,-7 13 90,4-24 0,-2-6-90,1 9 0,-1-14 0,-3-2 0,-5 2 135,-5 3 0,0-1-135,-3-7 225,-12 5 0,-1 1-343,6-7 163,-14 17 0,0 2 45,15-7-90,-29 6-90,30 5 360,-24 2-180,25 36-90,-9 14 0,12 23-90,20 6-45,-10-22 0,0-1-548,14 22-172,-8-8 1,-1-1-495,7 8-91,-2-10 1,0-2 1266,12 7 1,-16-21 0,-1 0 0,7 9-1</inkml:trace>
+  <inkml:trace contextRef="#ctx0" brushRef="#br0" timeOffset="114663">29563 4366 11311,'12'0'-90,"-3"0"0,-4 0 0,-2 0 0</inkml:trace>
+  <inkml:trace contextRef="#ctx0" brushRef="#br0" timeOffset="121851">24267 4944 6723,'-31'0'1889,"1"0"-1889,2 10 0,6-7 0,1 15 0,4-16 0,-3 14 0,-1-8 90,-5 8-90,-1-4 90,-21 9-90,8-5-1606,2 1 0,-1-1 1606,-11 1 0,15-4 0,0 0-762,-18 4 762,-4 0 0,-2-1 0,-4 1 0,30-9 0,0 0 0,0 0 0,-2 1 0,-16 5 0,-1-1 45,12-3 0,-1 1-75,-4 2 0,-4 1 0,4-1 30,3-2 0,-1 1 0,-5 3 0,-4 0 0,3 0-45,3-1 0,1-1 45,-16 5 0,-2 1 30,18-6 0,0 0 0,1-1-75,-8 1 0,-2 1 45,-6 1 0,-6 1 0,5-1 45,5-3 0,0 0-75,-6 1 0,-6 1 0,6-2-886,4 0 1,3-2 915,8-1 0,-2 0 0,-1-1 0,2 0 0,0 0 0,2-1-172,-6 1 1,-2 1 171,-3-1 0,-4 0 0,5-1 0,6 0 0,1-1 0,-2-1 0,-5 1 0,6 0 562,5-1 1,2-1-563,-13 2 0,2-1 0,17-2 0,1 0 0,2 0 0,-1 0 0,2-1 0,-2 0-45,-10 1 0,-1-1 45,11 0 0,0-1 0,-22 2 0,1 0-90,-11-1 0,12 2 0,1 0 0,-12 2 0,24 0 0,1-1-90,-17 4-90,4 1 90,2 1-719,-9 3-1,20-2 1024,-4-1 1,25-5 0,3-2 0</inkml:trace>
+  <inkml:trace contextRef="#ctx0" brushRef="#br0" timeOffset="122269">20397 5408 7892,'2'-6'90,"1"-1"0,-3 5 0,0-1 270,0 0-90,-19 2-90,-2-1 0,-27 20 359,-10 7-449,30-9 0,-1 3-437,-18 7 0,0 0 437,15-8 0,0 0-90,-5 3 0,-5 2 0,4-2 44,3-1 1,0-1-135,-23 12 1,2 0 134,26-13 0,1-1-45,-7 3 0,2 2 0,-15 16 0,17-10-74,-2 16 74,23-20-360,4 15 0,38-20-360,-5 7-1128,33-11 1128,-5-2-629,10-3 1349,-26-5 0,1-1 0,1-1 0,1 1 0,2-1 0,1 1 0</inkml:trace>
+  <inkml:trace contextRef="#ctx0" brushRef="#br0" timeOffset="125318">16115 5748 8072,'7'-24'810,"-6"0"-360,12 0-91,-12 1 91,8 2-90,-6-4-270,2 8 0,-1-2 180,-2 11 269,-1 2-269,0 4-270,3 0 0,0 20 0,6 11 0,-2 11 0,0-6 0,0-1-180,3 15-180,-1-6 1,1 2-1618,1 9 1662,-3-18 1,0 0-46,-1 0 0,0-2-90,5 20 0,-3-12 1,-1 0 89,0 2 180,2 8-180,-8-25-359,0-5 719,-2-6 0,0-6 0,-1-3 0</inkml:trace>
+  <inkml:trace contextRef="#ctx0" brushRef="#br0" timeOffset="125441">16220 6195 7803,'-16'-35'449,"13"1"-359,-26 1-180,25 2 90,-18 3 0,20 2 0,-7-2 0,9 9-360,0-4 1,21 15-181,-16-3-270,38 6 810,-23 2 0,22 0 0,-8 1 0</inkml:trace>
+  <inkml:trace contextRef="#ctx0" brushRef="#br0" timeOffset="125801">16693 5858 8792,'-18'36'1169,"13"-5"-899,-13-2-270,-1 12 0,3-6 0,-5 26-90,10-23-517,11 10 517,0-19 218,0-2-218,0-3 90,0 3-450,19-10-269,2 0 629,19-13 90,-20-23 0,17 13 0,-24-41-90,18 26 180,-15-25 430,-6 11-250,6-16 0,-14 16-180,8-18 0,-10 31 498,0-5-588,-13 19-90,9 18 90,-9 16 0,13 10-719,0 19 269,0-21-270,19 13-89,-14-18-271,31-2 1080,-20-4 0,18-11 0,-6-4 0</inkml:trace>
+  <inkml:trace contextRef="#ctx0" brushRef="#br0" timeOffset="126051">17213 5977 8432,'-39'0'990,"6"18"-900,3 1-90,17 19 0,3-6 90,10-3-90,20-12 0,5-8 0,19-9 89,-20-15 1,8 12-180,-29-30-89,9 10-181,-12-14-180,-19 14-90,14-2-179,-36 22-540,21-7 1349,-19 10 0,8 0 0,0 0 0</inkml:trace>
+  <inkml:trace contextRef="#ctx0" brushRef="#br0" timeOffset="126468">16633 6877 9781,'12'-35'-607,"0"4"0,2 11 0,-5 7 0</inkml:trace>
+  <inkml:trace contextRef="#ctx0" brushRef="#br0" timeOffset="126768">17523 5530 10771,'4'-17'180,"-2"2"180,0 4 809,-1-1-1169,-1 61-360,20-23-225,-18 20 1,1 4-1893,34-1 1577,-32 16-179,27-19-129,-21 0 1208,14-1 0,-5-3 0,0-1 0</inkml:trace>
+  <inkml:trace contextRef="#ctx0" brushRef="#br0" timeOffset="127002">17930 5682 9871,'-35'-1'1080,"-4"16"-1080,4-12 90,-15 41-180,20-24-1640,-8 25 1460,15-16-270,4 1 120,5-2-299,7 0 40,4-4-310,3-2 989,23-4 0,-17-3 0,18-4 0</inkml:trace>
+  <inkml:trace contextRef="#ctx0" brushRef="#br0" timeOffset="127759">17322 5974 8702,'42'-16'-270,"13"-4"-539,-4 0 179,-20 1 0,0 2 253,22 1 0,1-16 1,4 9-1</inkml:trace>
+  <inkml:trace contextRef="#ctx0" brushRef="#br0" timeOffset="128252">18255 5734 8342,'-41'0'1080,"-3"19"-1080,8-14 0,0 28 0,10-29 90,13 26-90,-11-26 0,21 26 90,-11-14-90,14 11 89,25-6-178,2-10 89,28-4 89,-15-22-89,-1 12 0,-14-11 0,1-4-1079,-14 0 629,1-11-1169,-29 13 1619,-11 7 0,6 9 0,-2 0 0</inkml:trace>
+  <inkml:trace contextRef="#ctx0" brushRef="#br0" timeOffset="128519">18295 5370 11670,'0'25'180,"0"7"-180,16-7 0,-13 7 0,26-3-90,-26 2 0,25 3-989,-9 19 449,0-12-674,3 1 0,0 0-225,-7-1 1529,4-9 0,0-1 0,-4-4 0,-1 0 0</inkml:trace>
+  <inkml:trace contextRef="#ctx0" brushRef="#br0" timeOffset="128735">18658 5566 9781,'-16'-5'1170,"-1"1"-1170,-18 3 0,11 17 0,0-12 0,8 27-90,1-28-180,4 30-809,5-7 449,2 7-270,4-1 181,0-12-540,18 0 1259,-14-3 0,33-3 0,-13-1 0</inkml:trace>
+  <inkml:trace contextRef="#ctx0" brushRef="#br0" timeOffset="129053">18737 5760 9152,'17'17'719,"3"-3"-629,16-14-90,-1-16-90,-5 12 90,-11-24-90,-8 15 90,-11-9 90,-17 11-90,-2 3 270,-16 8-360,6 0 90,13 19 0,5-1 0,11 18-449,0-8-181,22-11-90,-17 4 1,37-18-181,-23 6 900,19-2 0,-7-5 0,1 4 0</inkml:trace>
+  <inkml:trace contextRef="#ctx0" brushRef="#br0" timeOffset="129323">19153 5739 8702,'-17'15'1259,"3"5"-1259,14 12 0,0-1-90,15-6 90,-11-6-90,24-8 90,-16-6 270,2-25 180,-6-1-360,-8-19-270,0 8-899,0 38-361,0 5 1440,0 37 0,0-4 0,0 5 0</inkml:trace>
+  <inkml:trace contextRef="#ctx0" brushRef="#br0" timeOffset="134363">15917 6208 9242,'0'-5'449,"0"1"-359,-13 4-90,1-1 90,-13 1-180,6 0 180,-2 0 90,1 0-180,-3 0 0,-6 0 180,-4 0 0,-8 0-180,-5 15-497,-8-11 497,-7 22 45,27-24 0,-2-1-45,-23 14 0,-2 1-564,13-10 0,-3 0 594,-9 5 0,-6 3 0,5-1-969,1-2 1,0-1 938,9-2 0,-3 1 0,0 0 0,-2 1 0,-1 1 0,3-1 0,-9 2 0,-3 0 22,13-3 0,-5 2 1,0-1-1,5 0-532,7-2 1,3 0 0,-1 0 539,-13 2 0,-3 0 0,3-1-30,-5 1 0,2 0 180,-2 0 0,-2-1-608,4 0 1,-4 0 0,2-1 427,14-1 0,1 0 0,-1-1 30,-12 2 0,-3-1 0,0 0-290,3-1 1,0 0 0,3-1 304,-7-1 0,0-1-212,-1 0 1,-4 0-1,7-1 167,13-1 0,3-1 0,-12 0 0,4 0 662,-3 0-662,10-16-270,11 12 1080,1-25-1259,14 25-631,-1-9 1080,15 5 0,2 6 0,4-7 0</inkml:trace>
+  <inkml:trace contextRef="#ctx0" brushRef="#br0" timeOffset="134753">12980 6122 8612,'0'-10'1079,"-21"1"-809,16 4 90,-54 1-90,30 3 45,-17 7 0,-4 6-1670,18 3 1,0 1 1444,-14 4 0,-2 3-45,-6 14 0,2 2 0,12-13 0,-1 1-729,-2 4 0,-2 5 0,5-3 684,5-3 0,2 0 0,-7 10 0,3 0-148,15-13 0,3 0 148,-9 24 0,9-2-360,10 14-180,24-18-225,2-10 1,5-3-315,27 0 1079,-3-9 0,3-2 0,-14-9 0,1-3 0,13 3 0,0-1 0</inkml:trace>
+  <inkml:trace contextRef="#ctx0" brushRef="#br0" timeOffset="165886">12230 3008 8162,'-3'-26'1260,"1"2"-721,1 1-89,0 3-90,1 1-180,0 3-180,0 3 0,0 5 0,0 3 0,0 16 90,0 8-90,0 11 0,0 19 0,14-13 0,-10 27 0,10-26 0,-14 7 0,8-12 0,-6-11 90,6 2-180,-8-14 270,0-2-360,0-22-180,18-12-360,2-30 361,2 7-1404,13-6 1223,-20 17-89,17 2 89,-9 4-899,8 0 1439,-6 17 0,2-1 0,-8 13 0</inkml:trace>
+  <inkml:trace contextRef="#ctx0" brushRef="#br0" timeOffset="166174">12650 3233 7623,'16'9'539,"10"-1"-359,-14-3-180,16-1 0,-12-18 90,5 10-180,-8-22 180,2 23 90,0-21 0,-3 7 0,-4-14 0,-5 6 0,-3-3-90,0 13 90,-19-3-270,14 7-270,-27 4-360,29 21 1,-10 8-361,32 24 1080,9-6 0,11-16 0,2-7 0</inkml:trace>
+  <inkml:trace contextRef="#ctx0" brushRef="#br0" timeOffset="166541">13250 2980 7892,'-50'0'810,"10"16"-720,1-11-90,13 24 0,2-26 90,11 22-90,-9-21 0,20 22-90,-10-11 0,12 12-180,0-8-180,24 0 360,1-11 1,5 0 89,10-6 0,-14-1 0,14-21 179,-7 1 271,-17-17-90,-7 6-270,-9 5 180,-16 5-180,13 28-180,-23 13 90,22 12 0,5 5-360,-11 14-270,9-7 1,2-1-271,-1 0 685,0 13 0,16-18 0,4-1 0</inkml:trace>
+  <inkml:trace contextRef="#ctx0" brushRef="#br0" timeOffset="166987">13438 3259 7623,'2'-31'719,"1"7"-359,0-23-270,1 19-90,-1-6 0,-2 12 0,1 6 90,-2 2 0,1 4 90,-1 5-90,0 2-90,2 2 0,1 1 90,4 20-90,-1 3 0,5 13 0,-4-2 0,2-6 0,0 1 0,5 10 0,-3-10-90,10 12 0,-8-21 0,9 3 90,-10-16-90,3 0 90,-1-7 0,-3-15 0,5-6 0,-8 2 90,2-16 90,-7 11-90,0-14-90,-2 5 0,-1 12 0,0 25-720,0 11 180,0 23-89,16-18-91,-12 19 720,13-24 0,0 15 0,4-10 0</inkml:trace>
+  <inkml:trace contextRef="#ctx0" brushRef="#br0" timeOffset="167276">13892 3321 7803,'7'-6'359,"0"5"-179,5-17-180,-3 10 180,8-17 0,-7 10 90,5-11-90,-10 10-180,1-6 360,-6 3-181,0 5-179,-17-8 0,13 13 0,-13-2 0,2 7 0,-2 2 0,-1 21-719,-5 2 269,21 23 0,-7-13-89,9 1 539,21-5 0,4-4 0,19 3 0</inkml:trace>
+  <inkml:trace contextRef="#ctx0" brushRef="#br0" timeOffset="167537">14167 3094 8702,'-33'-4'180,"12"17"-180,11 5 0,10 17 0,15-2 90,-11-2-90,11-5-90,-15-7 90,0-8 0,-15-5 0,-4-4 0</inkml:trace>
+  <inkml:trace contextRef="#ctx0" brushRef="#br0" timeOffset="167736">14315 2812 8702,'1'23'720,"0"11"-451,3-11-269,-3 6 0,2 4 0,-1-6 0,1-1 0,0 3 0,4-2-89,-3 1-361,5-1-450,6 7 361,-4-10-271,13 10 270,-14-19 540,6 0 0,-8-11 0,0-1 0</inkml:trace>
+  <inkml:trace contextRef="#ctx0" brushRef="#br0" timeOffset="167885">14297 3055 8702,'-9'-15'540,"7"-1"-270,-7-3-180,9 3-180,26-8 90,-19 10-585,38 0 0,9 4-224,-16 1-46,21 2 1,1 2 717,-8 4 1,14 0 0,-23 1 0</inkml:trace>
+  <inkml:trace contextRef="#ctx0" brushRef="#br0" timeOffset="167986">14850 3026 8792,'0'10'-2249,"-13"1"2249,9-7 0,-9 3 0,13-3 0</inkml:trace>
+  <inkml:trace contextRef="#ctx0" brushRef="#br0" timeOffset="170203">15173 3817 7173,'13'12'2069,"11"9"-2069,6-17 0,10 8 0,-10-3 90,5-6-90,-1 15 0,2-16 0,-1 16 0,14-4 0,-14 4 0,21 5 0,-28-8 0,5 3 0,-17-4 90,-4-1-90,-4 2 0,-4 8-90,-3-4 180,-20 18-90,-6-14-90,-26 20 180,10-16-90,-2 9-90,-3 1 90,14-8-90,3-4 0,1-1-360,-2 2-539,-16 15 179,22-19 810,-3 3 0,14-8 0,2-1 0</inkml:trace>
+  <inkml:trace contextRef="#ctx0" brushRef="#br0" timeOffset="172473">19777 3194 8252,'-5'-19'630,"-1"2"179,-2-6-629,1 6 0,-3-8-270,5 14 180,0-3-180,2 7 90,2 2 270,0 1-360,1 19 180,-1 7-180,15 12 90,-10 2 180,10-6-270,-14 2 90,11 0 0,-8-2 90,8-3-180,-11-2 270,0-5 0,0-1-90,0-6 450,0-2-720,0-3-90,0-22 0,0-3-90,-11-16-90,8 1-179,-8 4-630,11-14 629,17 11 630,2-19 0,2 25 0,-7-5 0</inkml:trace>
+  <inkml:trace contextRef="#ctx0" brushRef="#br0" timeOffset="172802">20087 3286 7982,'6'1'-90,"0"-1"180,0 0-90,1 0 0,6-18 0,-2 13 90,10-28 0,-10 14 90,5 1 0,-8-11 0,-4 25-180,1-25 90,-4 20-90,0-12 180,-1 8-180,-17 3 90,13 1 0,-27 5-90,8 1 0,4 20 0,-19 5 0,17 0 0,-12 27 0,14-31-90,9 33-270,10-28-989,23 11 719,8-17 630,14-1 0,4-5 0,-10-4 0</inkml:trace>
+  <inkml:trace contextRef="#ctx0" brushRef="#br0" timeOffset="173513">20603 2980 7982,'-15'-23'720,"11"9"-630,-23-10-90,24 15 0,-16-2 90,7 8-90,-4 3 0,0 20 90,4-15-90,2 37 0,-1-10 0,6 8 0,0 13 0,5-25-90,0 5 90,22-16 0,-1 1 90,22-10-90,-5-1 0,-7-24 0,-2 13 0,-12-24 0,-1-4 0,4 8-45,-3-13 0,-3-2 45,-7 3 0,1-27 90,-7 24 270,0-21-360,-1 26 0,-15-15 0,11 29 539,-12-2-539,16 35 90,0 14-180,0 11 180,0 9-90,0-6-90,0 4 180,0 20-180,18-17-45,-9-10 1,1-1-46,11 2-950,9 6 861,-17-20-414,16-4 503,-7-4-89,1-4-1,1-5 180,-1-4 0,10-2 90,-10-2 0,12-16 90,-19-1 180,1-2-91,-11-8 748,-1 24-387,-3-21-195,-1 14-705,-1 14-1169,0 5 1529,0 22 0,0-5 0,0 0 0</inkml:trace>
+  <inkml:trace contextRef="#ctx0" brushRef="#br0" timeOffset="173678">21042 2890 7803,'-11'-2'0,"2"1"0,9 0 0</inkml:trace>
+  <inkml:trace contextRef="#ctx0" brushRef="#br0" timeOffset="173970">21258 3015 7443,'0'19'449,"0"-3"-359,0 0-90,0 2 180,0-4-180,0 4 0,0-5 0,0 0 180,0-3 270,12 3-90,-9-6-270,9 1 0,-7-5-270,-4-16-810,5-7 541,-6-20-91,0 8-90,0-3 630,0 11 0,0 0 0,0 2 0</inkml:trace>
+  <inkml:trace contextRef="#ctx0" brushRef="#br0" timeOffset="174269">21530 3150 7263,'13'9'90,"0"-4"-90,7-2 0,-4-3 0,11-17 0,-12 13 0,7-30 0,-12 29 0,-1-23 270,-6 16-90,-3-9 359,-20 10-359,-2 5-90,-12 6-90,14 18 0,1 1 0,17 19-540,-7-4 91,26-1-91,-12-7-90,30-11 630,-30 0 0,34-12 0,-12 5 0</inkml:trace>
+  <inkml:trace contextRef="#ctx0" brushRef="#br0" timeOffset="174469">21888 3045 8432,'-37'-7'1349,"4"0"-1259,17 26-180,6 1-179,10 19-271,0-11 0,17-8-89,-13 0-91,39-17-359,-21 16 927,26-17 0,-9 4 0,3-6 1</inkml:trace>
+  <inkml:trace contextRef="#ctx0" brushRef="#br0" timeOffset="174709">22235 2601 8702,'-19'-9'1259,"-8"3"-989,14 3-270,-9 3 90,10 19-90,5 8 0,7 10 90,0 2-180,0-6 0,17 16-180,4-11-1207,1 10 1117,13-18 0,-30 0-1191,33 7 1101,-18-12 90,3 4 360,5-10 0,-20-7 0,10 1 0</inkml:trace>
+  <inkml:trace contextRef="#ctx0" brushRef="#br0" timeOffset="174825">22180 2907 8522,'-18'-20'180,"4"-1"-180,14 0 0,0 0 90,0 0-630,26 1-179,-2 1-451,26 2 837,-7 2 1,6 2-1,1 4 1</inkml:trace>
+  <inkml:trace contextRef="#ctx0" brushRef="#br0" timeOffset="176655">24210 3245 7803,'0'10'2068,"0"14"-1978,0 14 0,0 13-90,0-4-1252,0 8 1162,0 7-572,0 4 706,0-31 1,0 0-45,-1 1 0,2-1 0,8 1 0,1 0 0,-8 1 0,0-1 0,6 1 0,3-1-90,0 0 1,-2 1-46,-8 0 0,3-1-90,13 0 0,1 2-315,-8 13 1,-2 0 134,1-13 0,1-1-45,5 10 1,-2-1 449,-3 9 0,11-8 0,-7-3 0</inkml:trace>
+  <inkml:trace contextRef="#ctx0" brushRef="#br0" timeOffset="177459">24100 3431 7892,'-8'-26'0,"2"1"0,4-1 0,1-1 270,19-10-90,-13 9-135,22 5 0,7 1 45,0-5-2216,16 4 1,6 2 2125,-21 7 0,1 1 45,14-5 0,2 2 0,-10 5 0,0 0-45,3 1 0,1 0 0,1 0 0,3 1 30,0 0 0,4 1 0,-1 0-30,9-2 0,4 2 0,-10 1 0,7-1 0,1 1 0,-6 0-548,-4 2 1,-4 0-1,3 0 570,-2 0 1,4 0-1,0 0 1,-4 0-23,3-1 0,-2 1 0,0 0 30,2 1 0,-1-1 0,1 0 0,1-1 0,-1 0 0,1 0 0,-1 1 0,1-1 0,-1 0-30,0 1 0,1-1 0,-1 0 0,-1 0 0,-1 0 0,3-1 67,1 1 1,4-1-1,0 0 1,-3 0-68,2 0 0,-2 1 0,5-1 54,-5 0 0,7 1 0,1-1 0,-2 0 0,-6 1 5,5 0 1,-5 1 0,5 0-24,-6 1 0,7-1 0,1 0 0,-2 1 0,-6 0-6,3 0 0,-4 2 0,1-1-53,-3 1 1,3-1 0,-1 1-1,-4 1 53,-3 0 0,-3-1 0,-1 2 15,21 0 0,-2-1-45,-5 1 0,2-1 30,-11 0 0,2 1 0,-3 1-75,6 6 0,0 1 45,-1-2 0,4-1 0,-6 1-75,-8 2 1,-1 2 134,10 6 0,4 3 0,-5-3-60,-11-6 0,-2 0 169,9 9 1,4 5 0,-7-3-215,-10-6 0,-4-1 90,11 5 0,-1 1 288,11 8-333,-2 1 0,-16-9 0,0 2 90,16 12-45,-5 3 0,-1 3-135,-1 3 135,-7 1 0,-2-1-45,-4 3-214,-8-6 0,-1 1 124,4 8 135,-9-16 0,0 0-60,6 14 15,1 1 0,1-1 90,0 0-180,1-3 1758,-2 0-1578,3 13-180,-7-14 90,-8-10 0,-1 1 0,-4 1 0,0 11 333,-5-19-423,0 2 180,0-3-90,-19-1 0,15-1-90,-15-3 3268,2 8-3268,13-8-180,-30 11 180,18-14-89,-13 4 463,4-7-463,3-1 179,-5 0-270,-20 4 270,6-6-135,-1-1 0,-1-1-381,-15 0 336,4-2 0,-1 0-452,20-4 1,1 0 586,-12 0 0,-1 1-90,0-2 0,1-1 135,11 0 0,-1-1 0,-22 1 0,-1-1-90,25 0 0,0-1-135,-24 0 0,0 0 90,22 0 0,0 0-315,-27 0 1,0 0 449,23 0 0,2 0 0,-14 0 0,0 0 0,14 0 0,0 0 0</inkml:trace>
+  <inkml:trace contextRef="#ctx0" brushRef="#br0" timeOffset="177743">26322 4666 7173,'-56'9'60,"1"0"0,-2-1 0,1 1-860,0 1 0,-3 0 800,5-2 0,-5-1 0,4 0 45,-7 2 0,-1-1 22,14-2 1,-5-1-1,0 0 1,6 0 22,-7 0 0,1 0-30,-2-1 0,-5 0 0,7-1-531,8 0 0,3-1 471,-13 0 0,3 0 90,-13 0-90,6-2 0,5 1-90,-9-1 90,19 0 279,-16 0-639,32 0-899,-9 0 1259,20 0 0,0 0 0,8 0 0</inkml:trace>
+  <inkml:trace contextRef="#ctx0" brushRef="#br0" timeOffset="183377">25953 4660 8432,'18'0'360,"-2"0"-360,-5 0 360,12-7-450,-3 5 180,12-5 0,3 0-90,8 4 90,7-2 0,1-1-180,8 1 90,-2-1 0,2 1-551,-21 1 1,-2 1 550,16-2 0,-1 0 0,-14 1 0,0 1 0,2-1 0,0 0 0,0 1 0,0-1 0,3 0 0,-1 0 0,0 0 0,0 0 45,2 0 0,2-1-90,19-1 0,1 0 90,-15 2 0,3-1-45,4 1 0,6-2 0,-6 1 0,-4 1 0,-2 1-818,-7-1 0,3 1 0,-3 0 818,3 0 0,-2 0 0,-2 0 0,1 0-325,-1 0 0,0 1 370,-3-1 0,0 0-45,0 1 0,-1 0 0,-3-1 0,1 0 0,12-1 0,-1 0 0,-12 1 0,0 0 0,19-3 0,0-1 0,5 0 0,-22 3 0,-2-1-422,13-2 422,-4 2 457,-2-2-1447,14 0 540,-17 2-1169,22-2 1619,-30 6 0,4-3 0,-13 4 0</inkml:trace>
+  <inkml:trace contextRef="#ctx0" brushRef="#br0" timeOffset="184889">25630 5727 10141,'-16'-1'630,"1"0"-270,0 1 89,2-1-179,0 1-180,1 0 0,2 0 0,-1 16-90,1-12-90,-3 35 90,0-19-270,0 22-269,3-7-91,4 2 180,2 0-269,3-2-1,1-2-179,30-5 899,15 2 0,18-16 0,-28-7 0,-1 0 0</inkml:trace>
+  <inkml:trace contextRef="#ctx0" brushRef="#br0" timeOffset="185087">26297 5829 8792,'-67'0'1169,"13"0"-989,1 21-875,13-16 605,0 33 90,3-34 0,2 30 0,9-20 0,1 21-450,13-14-194,2 3 14,35-6-179,14-9 89,13 0-267,6-9 987,-12 0 0,0-18 0,2-5 0</inkml:trace>
+  <inkml:trace contextRef="#ctx0" brushRef="#br0" timeOffset="185659">26382 5882 8792,'-22'16'360,"-8"3"-360,27 18 0,-11-3 180,14-3-270,20-7 0,-2-12 0,21-25 0,-3-16 90,-16-12 0,11-3 0,-19-12 0,4 10 135,-10 6 0,-4-1 45,-2-8-1,-11 9 1,-1 0 360,6-3-752,-15 16 1,0 1 750,17-5-592,-33 5 143,32 5-90,-28 2 90,19 10-90,-8 1 0,10 27 0,7 11 0,5 12 0,0 6 0,21-8 0,-16 3-45,13-12 0,3 0-225,8 16 0,-4-10 0,2-2-179,16 1-1,-14-10 0,-1-2-5,6-2 95,10 1-270,-3-16 450,-11-3 90,19-25 1,-22 15-1070,-6-24 1,-3-5 1248,1 9 90,-2-38 27,-11 26 62,-5-1-89,-1 1 180,0 2 0,-17 1 180,12 4 179,-33-8-449,32 14-270,-28-5 90,31 19 270,-23 3-270,23 21-90,-10 13 0,13 9-90,0 24 180,0-18-450,6-5 0,4-1-546,9 7 277,1 10-91,13-21 2839,-28-1-2929,30-4 810,-9 4 0,8-10 0,2 3 0</inkml:trace>
+  <inkml:trace contextRef="#ctx0" brushRef="#br0" timeOffset="186131">27150 5377 9242,'-14'-6'1979,"10"-1"-1979,-10 25 90,14 10-180,20 13 180,-16 4-90,31-7 0,-31 1 0,10-8 0,2 0 0,-1 16-1428,3 13 1428,3-21 0,-18-2 337,18-2-427,-11 6-90,6-11-269,-2 6-91,-8-21-629,0-2 1079,-5-30 1090,-1-11-1000,0-32 0,0 8 0,-2 14 0,4 2-943,17-7 1033,-14-10 331,27 15 209,-14 14-361,11 4 1,1 14-270,-3 27 90,-7-16 90,-4 38-180,-6-26 0,-4 19 0,1 3 0,-5-10 0,0 18 0,-2-23 832,0 5-1192,0-14 417,-19-2 1,14-7-1,-14-1 1</inkml:trace>
+  <inkml:trace contextRef="#ctx0" brushRef="#br0" timeOffset="186504">27833 5632 8792,'0'28'270,"0"-5"-270,-14 3 0,10 1 0,-11-6 0,15 12-180,0-15-90,0 5 270,0-14 90,17 0-180,4-7 180,12-17 180,-5-5-90,-13-19 449,-1 2 1,-12 3-630,5 29 0,-7 14-360,0 28-89,15-6-91,-11-1-90,26-10-629,-8 3 449,7-8 810,1-1 0,-6-9 0,0-5 0</inkml:trace>
+  <inkml:trace contextRef="#ctx0" brushRef="#br0" timeOffset="186693">28307 5665 9512,'-18'-9'1079,"2"2"-899,-4 20-270,9 7 90,3-2 0,6 20 0,-5-22-360,7 18 0,0-9-89,0-3-631,19 5 1,2-8 1079,21 2 0,2-14 0,2-2 0</inkml:trace>
+  <inkml:trace contextRef="#ctx0" brushRef="#br0" timeOffset="186923">28515 5278 9602,'-10'-10'2068,"7"3"-2068,-7 25 90,10 11-90,0 13 0,0 2 0,13 8 0,-10-10-135,3-7 0,2-1-584,4 4-1,-10 10-1079,18-11 900,-9-10 899,12 10 0,-2-20 0,1 2 0</inkml:trace>
+  <inkml:trace contextRef="#ctx0" brushRef="#br0" timeOffset="187155">28892 5511 11131,'-17'-4'1079,"-5"0"-989,-13 19-90,-1 6-90,9 9 90,9 1 0,-2-5 0,13 1 0,-5 2 0,7-1-540,5 11 181,0-12-991,17 16 181,7-23-180,-3 6 1349,24-12 0,-24-2 0,21 0 0</inkml:trace>
+  <inkml:trace contextRef="#ctx0" brushRef="#br0" timeOffset="193971">15697 5412 7173,'-3'19'90,"1"-3"-90,2-2 0,0-4 0,0 4 90,0-4 90,15 4-180,-11-1 90,12 4-90,-16 1 90,11 6-90,-8 2 0,8 6 0,-2 3 90,0 24-90,5-9-332,-9-16 0,0 0 332,4 19 90,0 3-90,1 3 0,-2-12 0,0 2 0,-2-12 0,1 1 0,0 6 0,1 3 0,0-3 0,0-5 0,0 1 0,0 3 0,2 3 0,-1-4-45,-2-5 0,1-2-45,2 10 0,1-1-225,-2-7 1,-1-3-316,7 16 630,0 7 0,-6-27 0,-1-3 0</inkml:trace>
+  <inkml:trace contextRef="#ctx0" brushRef="#br0" timeOffset="195207">15653 5511 7173,'21'-2'180,"33"-2"-90,-29 0-45,15-1 0,3-1-513,7-2 558,-1-2 0,2 0-1302,-16 4 0,-2-1 1212,12-2 0,2-1 0,6-3 0,-1-1 55,-11 4 1,3-1-26,4-2 0,6-2 0,-4 1-409,-2 1 0,0-1 409,9-2 0,4-1 0,-3 1-1084,-3 2 1,-1 0 1053,-6 1 0,2 0 0,1 1 0,1 0 0,1 1 0,-2 1 305,8-2 1,2 1-306,-12 2 0,4 0 0,-1 0 0,-4 1 0,10 0 0,-1 1 0,4 0 0,5-1 0,-6 1-257,-7 2 1,-3 1 256,17-2 0,-2 0 0,-22 3 0,-2 0 0,1 1 0,-1 0 0,-2-1 0,1 1 0,-2 0 0,1 0 0,-1 0 0,-1-1 0,-1 1 0,1 0 45,13 0 0,1-1-45,-13 1 0,1 0 0,26 0 0,0 0 0,-27 1 0,-2 0 0,12 0 0,-1 0 0,14 1-148,-4 0 148,-3 0 90,10 0 0,-20 0 2141,16 14-2231,-33-11 180,7 23-270,-19-14 937,0 3-847,-6 6 1476,-2-13-1476,1 12 1415,-1-6-1505,3 1 266,1 0-176,10 7 0,-3-4 0,18 16 0,-12-13 90,9 7-180,4 4 180,-8-7-180,20 19 90,-21-16 90,11 21 0,-19-18 90,-1 11-180,-8 6 90,-7-11-180,1 28 180,-5-28-90,0 26 0,0-29-324,0 10 324,0-17 0,0 0 0,-13-2-7,10 11 7,-10-10 0,13 17 0,0-19 0,0 16 0,0-19 0,0 5 0,0-11 0,0 0 0,0-2 324,0 4-234,0-5-83,0 7-7,0-10 0,0 3 0,0-6 0,0 0 0,0-1 0,0 1 0,0 0 0,-16 4 0,12 0 0,-29 6 0,9-3 0,-21 7 0,4-5 0,-1 3 0,-13 3 0,11-4-541,0-1 0,-2-1 541,-13 5 0,2-2 0,-2 0 0,21-7 0,1 1 0,-12 2 0,-3 1-45,-3 0 0,1 0 45,12-4 0,-1 1 30,-4-1 0,-4 2 0,3-1-30,5-2 0,0 1-30,-4 0 0,-4 0 0,5-1 75,4 0 0,0 0-75,-4-1 0,-4 0 0,4 0 30,6-1 0,0 0-30,-13 0 0,-6 1 0,6-1 75,10-2 0,1 0-75,-9 1 0,-5 0 0,6-1 75,12-1 0,2-1-45,-11 1 0,0 0-90,-18 2 180,0 0-180,0 0 135,32-3 0,-1 0-45,0-1 0,1 1-45,-2 0 0,0-1 45,-16 3 0,0 1 0,11-3 0,0 1 0,-3 1 0,-4 1 0,4-1 0,4 0 0,1-1 0,-12 3 0,1-1 0,-13 4 0,1-1 0,6-1-45,16-3 0,0 0 135,-17 3-90,10-3 0,1-1 0,-3 3 0,10-5 0,2 0 0,-2 2-90,-5-3-180,19 0-269,6-1 179,4-1 360,4 1 0,5-1 0,2 0 0</inkml:trace>
+  <inkml:trace contextRef="#ctx0" brushRef="#br0" timeOffset="204092">16390 7979 8342,'4'0'0,"1"0"-180,-3 0-1169,0 14 1349,-2 2 0,0 1 0,0-4 0</inkml:trace>
+  <inkml:trace contextRef="#ctx0" brushRef="#br0" timeOffset="204542">16428 8172 8702,'38'-17'180,"0"0"0,-2-17-90,-4 6 90,-13 3 0,0 2 89,-17 6-269,8 0 270,-9-5-180,1 6 180,-25-8-180,17 15 360,-37-1-360,15 9-90,-20 16 0,10-11 180,5 28-90,11-6-180,12 9 180,-1 18-90,11-19-360,26 25-90,-19-26-306,18-11 0,5-2 37,-7 5-181,29-4 1,-12-5 899,-7-10 0,2-1 0,16 1 0,-15-5 0,0 0 0</inkml:trace>
+  <inkml:trace contextRef="#ctx0" brushRef="#br0" timeOffset="205094">16937 7947 7892,'-11'15'270,"3"1"-270,26 19 0,-13-10 0,12 3 0,3-8 0,-2 9 0,4-7 0,5 4-90,-16-6-90,5-8-809,-2 2 989,-13-26 0,5-6 0,-6-23 270,0-2-90,0 5 270,0-2-91,14 17-269,-3 4 0,13 29-90,-8 8 0,-3 4 0,-5 8 0,-3-26 0,-2 26 0,-2-26 0,2 24 90,-2-20-630,1 6 540,-2-22 0,1-12 0,-1-16 0,0-1 0,14 15 450,-10-7-360,21 26 0,-12-9 0,15 27-180,-8-11 90,6 26-360,-11-8 360,22 14 0,-16-2 0,14-3 0</inkml:trace>
+  <inkml:trace contextRef="#ctx0" brushRef="#br0" timeOffset="205458">17657 7947 8972,'-26'19'630,"-12"-15"-451,34 29-179,-28-29 180,18 26-270,-4-10 90,8 14 0,10-7 0,0-5-539,0-3 179,0-8-180,22 0 180,2-7 270,21-4 90,-22-15 0,12 12 0,-31-28 0,25 26 0,-26-30 630,16 14-450,-17-15-180,4 10 90,-6 27-180,0 8 90,0 21-90,15-15-630,-11 12-89,25-14-450,-15 9 1259,14-11 0,-14-5 0,-2-6 0</inkml:trace>
+  <inkml:trace contextRef="#ctx0" brushRef="#br0" timeOffset="205589">17893 8027 8072,'0'7'180,"0"3"-360,0 26-449,14-19 629,-10 18 0,23-16 0,-10 16 0</inkml:trace>
+  <inkml:trace contextRef="#ctx0" brushRef="#br0" timeOffset="206038">18277 8144 8702,'1'-54'180,"-1"8"-180,0-2-304,0 7 304,0-1 90,0-2 90,0 0 180,-15-18-180,11 18 135,-11 10 0,0 0-136,12 1-179,-21-11 0,15 25 519,-2 1-69,0 12-460,9 20 100,-2 13-270,21 29-360,-13-3-270,12-13 1,3 0-1070,10 11 1024,-11-17 1,2-2 854,23 13 0,-9-1 0,1-1 0</inkml:trace>
+  <inkml:trace contextRef="#ctx0" brushRef="#br0" timeOffset="206954">16840 9113 9691,'-43'-2'900,"9"1"-900,-2 1 0,10 13 0,1-10 0,5 22-90,1-22 90,3 23-270,7-14-90,20 4 180,10-8 180,22-8-89,-21-15 178,17 12 1,-22-25-90,4 13 900,-1-11-720,-17 5-180,5 30 0,-8 14 0,0 33 0,0-9 0,7-9 0,0 0 0,-3 0 0,12-4 0,-1-1-90,-11-8-360,24 13-180,-25-20-809,8 8 450,-11-16 989,0 0 0,0-8 0,0 0 0</inkml:trace>
+  <inkml:trace contextRef="#ctx0" brushRef="#br0" timeOffset="207388">17273 8970 9602,'-30'17'989,"-15"2"-989,18 2 90,1 10-90,-13-27-90,35 28 90,-23-28 0,24 26-180,-7-15-180,28 8 180,7-8 90,22-7 0,1-6 180,-19-22-90,11 15 0,-23-29 540,4 14 90,-4-12-360,-15 3-91,2 7-89,-17 11 0,9 26-90,-9 14 0,13 13 0,0 0 0,0-9 0,0 14 0,0-13 90,17 15-180,-13-24 180,13 8-180,-17-19-449,0 4 89,0-11 0,0 0-2338,-21-2 2788,-5-4 0,-1 2 0,6-3 0</inkml:trace>
+  <inkml:trace contextRef="#ctx0" brushRef="#br0" timeOffset="207687">17782 8949 9242,'4'21'449,"0"12"-359,-1-11-90,-1 8 0,1 1-539,1 2-91,0-9-809,3 11 449,-2-19 990,2 3 0,-3-12 0,2-1 0</inkml:trace>
+  <inkml:trace contextRef="#ctx0" brushRef="#br0" timeOffset="207839">17745 8854 8522,'-12'-6'-180,"-2"2"0,13 2 0,-4 2 1</inkml:trace>
+  <inkml:trace contextRef="#ctx0" brushRef="#br0" timeOffset="208204">18190 8847 10141,'-41'33'900,"7"1"-900,12-9 0,11 1 0,1-9 0,8 15-90,-8-14 180,10 13-450,17-23 180,7 1 90,13-27 90,0-9 0,-18-10 0,7-3 0,-23 8 360,15-17 90,-17 12 179,5-22-539,-6 30-90,0-9 630,0 22-540,0 20-90,0 19-540,0 32-269,17-4-541,-9-12 1,2 0-1434,10 11 2783,-5-18 0,0 1 0,-3 12 0,15 0 0</inkml:trace>
+  <inkml:trace contextRef="#ctx0" brushRef="#br0" timeOffset="208904">16927 10245 9512,'-47'0'809,"21"23"-809,-12-17 90,34 38 0,-26-27-180,26 20 90,-9-10 0,13 0 0,0-2-270,18-3-90,-14 0-449,53-12 449,-32 0-492,34-10 673,-23 0 179,1-18 0,-3 14 0,-1-33 0,-5 32 89,-5-35 631,-4 15 270,-5-10-541,-7 2-359,-3 14 0,-21 6-90,13 20 582,-13 10-1032,17 19-89,0-7-1,0 1-90,0-9-179,16-10 809,-12 9 0,30-11 0,-11 11 0</inkml:trace>
+  <inkml:trace contextRef="#ctx0" brushRef="#br0" timeOffset="209204">17350 10317 10501,'1'26'0,"14"-10"0,-11 9-270,24-9-270,-15 12 271,3-7-1,2-9-90,-12-7 360,6-5 0,-7-13 0,-1 9 0,-2-21 90,1 22 270,1-20 0,2 20-271,1-17-89,5 18 0,-3-7 0,9 28-179,-5-14-271,5 28 0,-3-30-180,0 24-269,0-24 899,1 22 0,-1-22 0,0 8 0</inkml:trace>
+  <inkml:trace contextRef="#ctx0" brushRef="#br0" timeOffset="209568">17602 9939 9152,'-11'16'1619,"22"-13"-1349,-6 33-270,35-19 0,-13 34 90,-2-16-90,-2-3 0,0 0-1870,1 6 1960,3 9 87,6-8-177,-19-13-180,7 5-89,-9-18-435,-8-3 704,-4-22 0,0-7 0,0-19 0,0 6 1352,0-6-1262,0 15 324,19 5-414,-2 8-629,14 46 179,-9-27-1349,-5 44 1799,-8-33 0,-4 13 0,-5-2 0</inkml:trace>
+  <inkml:trace contextRef="#ctx0" brushRef="#br0" timeOffset="209774">17080 9823 9332,'26'-20'359,"-20"1"1,41 1-270,-42 3-90,38 4 0,-37 2 90,37 5-540,-27 2-989,21 32 540,-24-3 899,-5 15 0,-3 5 0,-5 18 0,0-19 0,0 1 0</inkml:trace>
+  <inkml:trace contextRef="#ctx0" brushRef="#br0" timeOffset="210169">17365 11607 11580,'0'-8'-90,"0"3"90,0-3 0,0 4-359,0-2-91,15 1-360,-11-1 1,26 2-91,-16-2-1438,32 2 2338,-14-2 0,16 2 0,-12 2 0</inkml:trace>
+  <inkml:trace contextRef="#ctx0" brushRef="#br0" timeOffset="210290">18012 11512 9062,'6'0'-630,"-1"0"-269,0 0 899,6 0 0,0 0 0,6 0 0</inkml:trace>
+  <inkml:trace contextRef="#ctx0" brushRef="#br0" timeOffset="210441">18787 11295 10231,'24'-2'450,"-3"1"-360,-5 0-540,-8 1-449,-1 0-181,-2 0-179,1 12 1259,3-9 0,1 9 0,0-12 0</inkml:trace>
+  <inkml:trace contextRef="#ctx0" brushRef="#br0" timeOffset="210590">19180 11329 11850,'8'0'360,"0"0"-360,-3 0 0,-2 0 0,-2 0 0</inkml:trace>
+  <inkml:trace contextRef="#ctx0" brushRef="#br0" timeOffset="212938">16013 7797 8972,'-1'-3'1709,"0"-1"-540,0 2-1169,1 21 180,0-3-270,0 24 180,0-3-90,0 11-649,0 9 649,0 8-45,7-32 0,2 2-45,-1 16 1,1 0-91,0-14 0,1 1-360,4 22 0,1 0-269,6 1-91,-3-14 1,1-2-1,9-4 105,-4 8 1,-11-28 0,-2-3 0</inkml:trace>
+  <inkml:trace contextRef="#ctx0" brushRef="#br0" timeOffset="213855">15930 7824 7443,'-3'-15'360,"1"0"-271,2 0 91,0-1 90,0 2-90,21-3 180,6-4-270,15 4-45,-11 2 0,0 1 45,14 0-787,-13 4 1,0 0 696,19 1 0,5-3 0,3 4 0,4-1 90,2 3-90,-31 3 0,2 1 0,19-3 0,2 0 45,-13 2 0,3 0-75,6-1 0,7-1 0,-5 0-15,-2 0 0,-1 0-473,-6 1 0,3 0 0,-3 0 473,5-2 0,-2 0 90,1 0 0,0 1-90,-2-2 0,1 1 45,-2 0 0,0 0 0,-2 0 0,-1-1 0,-2 1 0,0 0 0,13-1 0,-2-1-144,-14 3 1,-1 0 143,18-1 0,-2 2 0,0 0 90,-12 3 0,-1 0 0,-6 1 144,19 13-234,-34 3 0,9 16 0,-13-15 90,2 18-90,-7-21 0,-2 20-90,-1-10 180,1 12-90,-2-9 0,5 15 0,-4-19 0,4 12 0,-6-17 1083,1 4-1083,-3-9 1698,-1-2-1788,-1 1 485,-2 2-395,0-3 4,0 4-4,0-7-90,0 1 180,-14-3-180,11 0 90,-11-2 0,3 2 0,9-1 0,-19 7 0,6-4 0,-14 12 0,5-8 0,-2 6 0,8-6 0,-1 2 0,1 0-90,-5 5 0,4-3 90,-8 11 0,12-11 0,-8 12-90,9-11 180,-1 3-90,3-7 0,1-1 0,-1 2 0,-9 2 0,4-1 0,-17 8-90,12-8 90,-10 5 90,8-6-90,-2 1 0,0 1 0,-1 0-90,-3-1 180,0 2-90,-16 7-90,10-5-1561,4-3 0,0-1 1561,-7 3 90,-14 4-131,15-8 131,-4 0 0,-1 0 0,-4 0 0,-4 0 90,-4 0-90,11-3 0,-2 0-244,11-2 0,-2 0 244,-6 1 0,-4 0 0,3 0-398,2-1 1,1 0 442,-15 3 0,1 1-90,15-4 0,2-1 45,-2 2 0,1-1 0,0-1 0,0 1 0,-14 2 0,0 0 0,14-3 0,0-1-90,-21 5 0,3-2 2286,-1-3-2871,18-1 1,4-1 674,6-3 0,3 0 0,19-2 0</inkml:trace>
+  <inkml:trace contextRef="#ctx0" brushRef="#br0" timeOffset="217271">31212 2055 11041,'3'-16'270,"-1"-5"179,0 13-269,-16-1-90,2 3-90,-15 6-90,7 8 90,4-6-90,2 5 180,3-1-90,-3 1 0,-1 6 0,-3 2 0,-2 2-90,-2 6 90,0 2 0,0 3-180,-3 15 180,9-12 0,2 7 0,10-14-180,4-5 180,0-4-90,20-5 1,8-5 89,22-2 89,-9-21-178,11-5 178,-23-12-178,6 0-181,-9-12 180,-14 9 0,-1 1 0,-1-2 0,-9-10-658,3 15 0,-1-1 748,-3-17 0,-17-3 0,13-3 0,-13 29 0,0-1-1035,12-31 1125,-10 32 0,-2 0-292,7-11 0,3 0 382,-12-15-180,6 15 0,3 2 0,7 3-126,-13-1 126,14 22 1601,-4 5-1511,6 25 1163,16 14-1253,-12 35 0,26-7 167,-28-25 0,-1 1-167,23 18 0,-22 1-450,19 2 90,-18-1-359,19-1-181,-12-1-314,3-16 0,1 0 1214,4 18 0,-8-19 0,0-1 0,3 11 0</inkml:trace>
+  <inkml:trace contextRef="#ctx0" brushRef="#br0" timeOffset="217730">31480 1688 10591,'1'-29'1169,"0"10"-539,2-6-360,0 17-90,4 1-180,-2 21 0,5-9 0,-2 37 90,4-18-90,0 27 0,-1-17 0,1 1-263,6 21 263,-2-6 0,0 0 0,3 9-135,-4-13 0,1-1 45,2 3-914,5 7 824,-8-24 201,-2-6-111,-3-6-449,0-5 269,-4-7 504,0-3-324,-3-4 1012,0-15-922,2 11 0,6-47 0,-2 25 45,1-9 0,0-2 45,4-3 89,5-10 181,0 13 90,-7 19-90,8-8-270,-10 24 0,2-5 0,-3 7-90,0 19 179,-1-15-179,5 32 90,-4-10-90,-1 21 0,-4-7-180,-4 0-809,-19-1 179,-10-8-1124,-1-6 1,-3 0 1933,-23 4 0,23-9 0,-1-1 0,-18 7 0</inkml:trace>
+  <inkml:trace contextRef="#ctx0" brushRef="#br0" timeOffset="218971">20228 8428 8702,'6'0'810,"0"-19"-541,-1 14-179,2-41 180,1 24 0,0-28 0,0 7-180,-3 9 0,-1-2 180,1-21 44,-2 8 1,-1 0-45,0-8-135,0 12 0,-4 2-384,-17-2 339,15-5-180,-15 25 90,19 9 0,-11 5 90,8 23-180,-8 24 180,11 12-135,-1-4 0,2 2-1074,17 17 984,-17-19 0,2 0-135,13-13 1,0 0-361,-12 30 90,27-4-225,-20-19 1,-2-1 45,12 19-226,-6-13 1,-1-1 944,-4 4 0,4 8 0,-7-20 0</inkml:trace>
+  <inkml:trace contextRef="#ctx0" brushRef="#br0" timeOffset="219072">20262 8566 7982,'-10'-20'-90,"3"4"-449,24-34-91,-13 15 473,34-12 0,-33 9 0,16 0 0</inkml:trace>
+  <inkml:trace contextRef="#ctx0" brushRef="#br0" timeOffset="219254">20658 7923 9062,'0'37'360,"0"1"-360,0-7 0,0 1 0,18-8-90,-13 2-270,24-1-180,-26 0-179,25-3-91,-16-1 810,5-3 0,6-3 0,-4 0 0</inkml:trace>
+  <inkml:trace contextRef="#ctx0" brushRef="#br0" timeOffset="219424">20615 7685 8702,'-4'-3'-720,"3"1"-1464,-3 16 2184,20-10 0,-12 27 0,13-10 0</inkml:trace>
+  <inkml:trace contextRef="#ctx0" brushRef="#br0" timeOffset="219738">20967 7997 8792,'12'25'989,"1"1"-809,0-1 0,0-1-180,-2-1 90,-2-2-90,4 5 90,-5-7 0,4 8-90,-8-15-540,2 1 450,-5-29 0,2-10 180,-3-15-180,0-21 90,0 23 0,0-26 1080,0 35-990,0-7-90,13 26 0,2 20 0,15 19 0,-15 10-450,16 6-1349,-6 7 630,8-10 886,3 9 1,-9-19 0,3-2-1</inkml:trace>
+  <inkml:trace contextRef="#ctx0" brushRef="#br0" timeOffset="220455">21617 7828 7892,'-5'0'630,"1"0"-450,1 13 180,-1-10-180,0 23 90,-3-9-180,1 10-90,-6 9 89,4-10 1,-3 20-90,6-18 0,1 9 0,3-5 0,1-11 0,19 8-90,2-17-269,21-2 269,0-7-90,-7-21 180,-2 14 0,-11-35-90,3 4 0,-8-11 135,-7 12 0,-1-1-45,-3-12 0,-3 6 0,-2 0-403,-1-9 673,-20-14 270,-2 8-271,-3 17-179,-12-15-180,16 31 810,-12-3-630,14 41-90,10 5 0,9 19 0,19 9 0,-14-18-420,28 9 420,-29-13 0,25 0 0,-25-1-629,28 10-1,-14-7-1169,13 17 450,-8-18 1349,-6 7 0,-6-12 0,-2-2 0</inkml:trace>
+  <inkml:trace contextRef="#ctx0" brushRef="#br0" timeOffset="221110">22277 8192 11490,'0'-11'0,"0"3"0</inkml:trace>
+  <inkml:trace contextRef="#ctx0" brushRef="#br0" timeOffset="221738">22743 7467 11131,'-17'12'1799,"3"1"-1799,14 9 0,0 1 0,0 1 0,0 4 0,0 6 0,16 3 0,-12 2 0,27 19 0,-27-16-1741,8-7 0,3-1 1741,1 2 0,6 8-180,1-17 0,-6-5 0,1-2-360,6-2 360,-4-7 90,9-2 90,-13-8 3392,9-22-3392,-14 16-90,3-38 90,-6 24 0,-2-24-89,-3 9 89,-1-20 0,-2 12 269,-8 7 1,-1 1 0,5-4-180,-30-19-90,30 31 0,-13-4 270,6 17-270,8 23 90,-8 7-180,30 17 180,-14 15-270,31-14-540,-19 28 181,3-24-541,-7-6 1,-1 1-1170,2 5 450,6 9 1799,-1-18 0,-7-1 0,-1-3 0</inkml:trace>
+  <inkml:trace contextRef="#ctx0" brushRef="#br0" timeOffset="222894">23857 7523 9781,'-52'0'1799,"11"0"-1529,-2 0-180,0 0-90,13 13 90,-13-9-90,23 21 0,4-11 0,10 8 0,6-1-90,23-2 180,-18 3-180,38 11 90,-16-7-90,21 16-90,-20-19 180,10 4-90,-24-7-90,6-6-269,-11 6 359,-9-10-270,-17 5 0,13-7 90,-31 1 1,31-6-361,-32 0 450,20-3 90,-5-14 180,33-2-180,18-13 90,13 13 90,1-9-90,-10 15 0,1-13 0,11 1 0,-13 4 180,16-9-90,-29 10 180,6-2-90,-16 5 89,-4 0 91,-2 0-90,-4 1 0,0-1-270,0 2 0,-20-3 0,15 7 180,-32-2-270,21 8 180,-4 15-90,8 7-90,12 20-270,17 5 90,-13-7-989,29 4 629,-8-27 1,-3 12-271,19-25 900,-26 13 0,18-14 0,-10 2 0</inkml:trace>
+  <inkml:trace contextRef="#ctx0" brushRef="#br0" timeOffset="223190">24298 7620 10681,'0'33'0,"20"7"0,-16-11 90,28 5-180,-30-11 90,21 0-90,-21-1 0,9-2 90,0-3 90,-8-4-360,8-4 90,-5-2 90,-5-25 180,8-14 90,-8-16-462,6-7 372,-2 7-90,4-5 90,3 0-180,2-1 45,-2 21 0,1 1-225,7-16-567,-3 18 1,1 3-243,4 4 1079,17 5 0,-14 15 0,8 3 0</inkml:trace>
+  <inkml:trace contextRef="#ctx0" brushRef="#br0" timeOffset="224124">18750 8410 8792,'0'43'989,"0"-2"-719,19-6 90,-15 2 90,33 2-1107,-17 1 927,20-1-868,1-1 688,9-4-45,-20-18 0,2-1-432,2-1 1,2-1 431,3-1 0,4 0-15,0-2 0,4 0 0,-2-1 15,9 2 0,4-1-68,-10-3 1,6 1-1,1-2 1,-5 0 67,15 2 0,2-2-590,-12-1 0,7-1 0,1 0 0,-6 0 545,-6-1 0,-4-1 0,2 0 0,15 1 0,2-1 0,2 0 0,-14-1 0,1 0 0,0-1 0,-2 1 0,4-1 0,-3 0 0,6 0 0,-3 1 0,6-1 0,2 0 0,-2 0 0,-5 1-30,5-1 0,-5 0 0,6 0 30,-4 1 0,6-1 0,3 0 0,-3 1 0,-5-1-581,5 0 1,-5 0 0,3 1 580,-2-1 0,3 0 0,0 0 0,-5 0 0,1 0 0,-4 1 0,1-2-349,2-5 1,1-3-1,0 3 349,0 5 0,0 1 0,6-4-133,-11-5 0,5-4 1,2-1-1,0 0 0,-4 3 178,3 3 0,-3 2 0,1 0 0,7-2-45,-9-2 1,7-2 0,2-1 0,2-1 0,0 0 0,-4 1 0,-4 1 53,0 1 0,-6 1 0,-1 0 0,3 0 0,5-1-54,-4 0 0,6-1 0,2-1 0,3 0 0,0 0 0,-2 0 0,-3 0 0,-4 2 36,8-3 0,-6 2 0,-1 0 0,0 0 0,4-1-36,-7 2 0,2-1 0,2 0 0,0 0 0,-1 0 0,-1 0 0,-4 1 0,6-1 0,-2 0 0,-3 1 0,0 0 0,1 0 0,0 0 0,0 0 0,0 0 0,0 0 0,0 0 18,-1 1 0,-1-1 0,1 1 0,1-1 0,3 0-6,-6 1 1,3 0 0,2-1 0,0 1 0,0-1 0,-2 1 0,-2 0-13,7-1 0,-4 1 0,-1 0 0,2-1 0,5 0 0,-8 1 0,4 0 0,4 0 0,0-1 0,1 0 0,-3 1 0,-2 0 0,-6 1 0,3 0 0,-5 0 0,-2 1 0,1 0 0,5-1-39,-1 1 1,5-1-1,2-1 1,1 1-1,-1 0 1,-4 1-1,-5 1-29,7-1 1,-6 1 0,-2 0-1,2 0 32,-2 0 0,2 1 0,1-1 0,-3 1 0,-4 0-17,5 1 1,-4 1-1,-1 0-352,17-2 1,-2 1-46,-9 1 0,-2 1-90,4 1 1,-5 0 488,13 0 51,-3 2 0,-47 0 0,-8 0 0</inkml:trace>
+  <inkml:trace contextRef="#ctx0" brushRef="#br0" timeOffset="224523">28170 7462 11580,'-17'-5'-180,"2"0"180,3 1 270,3-2 90,5 2-270,23 1 0,17 2 0,15 14-45,-8-13 0,0 3-216,-13 11 1,1 2 305,25-6 0,1 0-454,-23 4 1,-2 2 408,9-1 0,-1-1 90,8 12-90,-9 2-90,-6 5 90,-10 25-90,-11-10 0,-19 0 0,-3 3 0,5 12-180,-22-18 0,-4 0-767,17-12 0,-2-1 587,-13 0 0,-4 1-135,10-3 1,-1 2-1316,-6 9 1,0 0 954,9-13 1,1 0 854,1 7 0,1-2 0,-4 4 0,8-2 0</inkml:trace>
+  <inkml:trace contextRef="#ctx0" brushRef="#br0" timeOffset="225344">29633 7302 11760,'0'48'540,"11"-1"-360,-8-6-2626,19 8 2446,-12 9 0,-1-26 0,2 2 0,2 19 0,0 1 0,-2-12 0,0 1 0,4 14 0,0-1 0,-3-16 0,-1-2-180,0 0 0,1 1 191,-2-2 1,1 2-282,2 13 0,0 0-45,-4-13 0,0 0-315,3 22 1,-1-1-91,-2 5-135,-4-19 1,0-1 854,-2-1 0,0 3 0,-2-24 0</inkml:trace>
+  <inkml:trace contextRef="#ctx0" brushRef="#br0" timeOffset="225942">29532 7072 8972,'-3'-15'270,"1"-3"90,20 4 269,18-6-449,14 9-715,-2 2 0,2 1 580,-11 3 0,1 1 0,15-2 0,6 0-15,-9 2 0,2 1 0,-1 1 15,11-1 0,4 0 22,-9 2 1,6-1-1,1 1 1,-5 0-8,-8 0 0,-4 0 0,5 2-60,-3 1 0,4 1 0,3 1 0,-2 0 0,-6-2-569,5-1 0,-5-1 1,2 3 590,-3 4 0,3 3 1,-1 0-1,-3-1-22,19-2 0,-4 2 0,0 9 0,-1 1 90,-4-4 0,1 0 30,-8 1 0,2 2 0,-4-1-75,6 2 0,-3 2-45,-8-4 0,1 2 0,-5 0 0,-1 1 0,-5 0 0,-1 0 0,-1 2-93,-4-1 1,-1 3 137,6 9 0,-1 2-45,-8-8 0,-1 2 0,13 20 0,-2 1 0,-14-20 0,0 1 0,7 12 0,4 4 0,-3-4-156,-6-8 1,2-1 125,5 9 0,4 3 0,-3-5 75,-7-11 0,0-1-45,17 19 0,0-1 0,-15-21 0,0-1-57,6 7 1,1 0 56,12 8 0,-2-3 1952,0-2-1907,-15-12 0,0 0-45,11 9 0,5 8 226,-22-14-226,-8-2-90,-6 1 0,-4 13 90,-32-7-617,3 11 617,-29-8-90,4 1 45,22-17 0,-2 1 45,-22 10 0,-3-2 0,11-5 0,-4-1-90,-9 3 0,-7 1 0,4-2-361,-1-4 1,1-1 330,5-1 0,-2 0 0,2-3-15,-10 1 0,2-3 45,19-4 0,-1 0 1,1 0-31,-1-1 0,1 0 0,-4-1-218,0 0 1,-4 0 0,0 0 0,3-1-23,-2 1 0,1-1 0,-3 0 360,-7 1 0,-6-1 0,0 0 0,7-1 0,11-1 0,4-1 0,-2 0 0,-12 1 0,0-1 0,0 0 0</inkml:trace>
+  <inkml:trace contextRef="#ctx0" brushRef="#br0" timeOffset="230288">15877 7762 7803,'0'-3'719,"0"-1"450,0 2-989,13 19-180,-10 10 0,11 11 90,-14 8-90,9-7 0,-6-6 0,2 1 0,9 19 0,-6-8 0,-1 0 0,4 11-305,-4-21 0,0-1 305,6 14 90,-1 1-90,1-2 0,0 1 0,-2-2 0,2-1 0,-2-1 0,2-3 0,-3-1-163,3 11 163,-4-15-90,3 15 90,-7-27 0,1 1 0,-3-12 0,1-5 90,2-1 420,7-5-420,-1 0 83,18-2-173,-7 0 0,30-17 0,-14-1 0,17-2 0,-18-1 0,-1 1-339,27 4 369,-25 1 0,5-3 0,-2 3-401,-1 3 0,2 2 311,6-2 0,5 0 0,-4 1-75,-3 2 0,1 1-180,-1 1 0,7-1 1,0 1-1,-6 1-45,3-1 0,1 2-240,10-2 1,6 1 0,-8 0 299,-19 2 1,-4 0 0,13 0 0,-2-1 0,11-1 0</inkml:trace>
+  <inkml:trace contextRef="#ctx0" brushRef="#br0" timeOffset="230860">18258 7402 7713,'18'0'629,"-3"0"91,-3 14-450,-4-10 0,0 19-270,-4-21 179,0 23-89,1-10 90,1 30-90,-1-10-45,-1 0 0,0 2 45,2 13-135,3 9 0,1 2 45,-4-28 0,1 1-762,3 9 1,1 5-1,0-6 852,8 22-135,-1-12 0,1 0-45,4 5-495,-4-10 1,0-2-1037,3 4 1261,-8-18 1,-1 1 301,9 20 1,-8-13 0,1 9-1</inkml:trace>
+  <inkml:trace contextRef="#ctx0" brushRef="#br0" timeOffset="231304">17577 8735 8072,'31'-18'720,"2"-2"-630,-3 4 0,1 0 0,20-11-90,-1 2 0,1 1-591,-18 9 0,1 0 591,26-9 0,1 0-534,-24 11 0,-1 1 534,12-3 0,-1 1-180,17-1-450,-4 4 270,-2 5-405,-21 4 1,-1 0 764,17 2 0,10 0 0,-24 0 0</inkml:trace>
+  <inkml:trace contextRef="#ctx0" brushRef="#br0" timeOffset="244859">15875 8338 7803,'-4'6'359,"-1"2"-179,1-4 0,-1 2-180,-1-4 90,0 0 0,-1-1 270,-5 1-270,2-1 90,-4 0 90,-3-1-270,4 0 179,-13 0 1,9 0-90,-13-17-90,12 13 0,-16-30 0,15 11 0,-9-12 0,2-15 0,3 14 0,5 1 0,-1-1 0,-3-11-703,7 15 1,0 0 792,-6-13-90,-2 0 90,1 1-401,6 14 1,0 0 310,-8-14 0,5 10 0,0 0 0,-1-3 0,-7-20 0,14 27 0,-2-6 0,10 14 0,0 2 0,4 3 0,-2-7 1307,3 8-1218,21-17-89,-16 12 0,23 1 0,4-1 0,-7-6-45,13 2 1,2 1-634,3-6 678,-16 11 0,2-1-891,24-14 891,-14 10-45,-10 7 0,0 1-135,2 1-372,3 0 282,-15 9-90,-5 2-180,-1 3 150,-5 0 390,-3 20 0,-3 3 0,-2 18 0</inkml:trace>
+  <inkml:trace contextRef="#ctx0" brushRef="#br0" timeOffset="245213">15500 7107 7982,'0'-8'90,"0"0"270,0-1-90,0-7-90,0 3 90,15-11-90,3 7 0,20-14-180,-7 8 90,20-17-90,-16 14 179,12-6-89,1 4 0,-12 10 270,15-3-270,-25 15 180,2 1-270,-16 5 0,-3 15 90,-5 13-90,-1 8-90,-3 11-315,-8-15 0,-4 0-314,-13 23-1180,1-6 0,0 1 1899,-3 11 0,5-22 0,0 0 0,-3 14 0</inkml:trace>
+  <inkml:trace contextRef="#ctx0" brushRef="#br0" timeOffset="249656">12648 5679 8072,'0'-4'540,"0"0"-360,0 2-90,0 0 1169,0 0-1079,8 1-90,0-1 0,0 21-90,5-14 0,-7 28 0,6-29 0,-3 30 0,-2-19 0,5 25 0,-4-17 0,4 11 0,-8-18 180,2 2-270,-4-10 0,0-2 180,0-19-810,-2-5 361,0-23-181,0 11-989,0-12 719,0 18 810,0-7 0,0 12 0,0 1 0</inkml:trace>
+  <inkml:trace contextRef="#ctx0" brushRef="#br0" timeOffset="249993">12975 5904 7533,'26'2'0,"-7"-1"270,18 1-270,-17-22 89,16 15 1,-17-31 90,4 31 0,-12-23-90,-3 26 270,-3-20-90,-3 9-90,-1-7 0,-22 3-180,0 9 90,-14 3-90,7 24 0,8 4 0,9 20-90,3-10-270,8-1-450,0-4 271,19-14-1,-15 14-180,34-26 720,-33 15 0,36-15 0,-14 3 0</inkml:trace>
+  <inkml:trace contextRef="#ctx0" brushRef="#br0" timeOffset="250445">13340 5760 7803,'-16'-3'359,"2"0"-269,-4 17-180,8 3 180,10 16-180,0-1 180,19-13-270,-14 4-179,31-21 269,-18 7 90,13-29 0,-15-6 0,-6-12 90,-10-13-180,0 17 180,0-10-90,0 12 0,0 2 0,0-1 90,0 0-1,-17 0 1,13 2 180,-12 2 0,4 2-270,9 3 0,-16-3 180,17 10 1259,-5 0-1349,7 26 0,0 13-90,19 26 90,-14-3-90,10-13 0,3 0-1070,1 9 1070,-1 12 0,15-17-428,-20-2 248,16-2-719,3 9 449,-7-10-629,18 11 629,-19-22-719,17 4 1169,-20-17 0,6 0 0,-11-8 0</inkml:trace>
+  <inkml:trace contextRef="#ctx0" brushRef="#br0" timeOffset="250583">13775 5851 7982,'0'29'0,"0"0"0</inkml:trace>
+  <inkml:trace contextRef="#ctx0" brushRef="#br0" timeOffset="250745">13662 5731 6813,'-2'29'0</inkml:trace>
+  <inkml:trace contextRef="#ctx0" brushRef="#br0" timeOffset="251041">13785 5721 7713,'7'17'449,"0"-3"-269,1 0-90,2-11 0,-1 20 90,1-21-90,5 18-90,-3-8 0,6 9 90,-8-9 360,1 3-91,-5-12-359,-1 6 0,-3-25-719,0-3 269,-2-21-180,-14 8 1,10 1 629,-10 1 0,14 10 0,0-6 0</inkml:trace>
+  <inkml:trace contextRef="#ctx0" brushRef="#br0" timeOffset="251339">14112 5759 7443,'12'0'360,"-1"0"-360,0 0 179,-1 0-179,-4 0 270,0-14-90,-5 0 90,-16-2-180,0 5-90,-4 26 0,-2-12 0,19 25-90,-13-8 0,14 15-270,-5-7-179,6-3-811,0-11 1350,21 1 0,-15-8 0,15 1 0</inkml:trace>
+  <inkml:trace contextRef="#ctx0" brushRef="#br0" timeOffset="251523">14297 5700 8342,'-29'15'1080,"11"2"-1170,8 10-270,25-11-809,2 2-271,16-15 1440,1 6 0,-5-9 0,0 0 0</inkml:trace>
+  <inkml:trace contextRef="#ctx0" brushRef="#br0" timeOffset="251739">14398 5362 8612,'-11'-3'1709,"2"19"-1709,9 5 90,19 21-90,-15-9 0,28 1-90,-28-9-270,25 0 1,-26 0-271,30-1 90,-20 0-989,23 7 1529,-15-7 0,5 3 0,-9-9 0</inkml:trace>
+  <inkml:trace contextRef="#ctx0" brushRef="#br0" timeOffset="251875">14393 5609 8612,'0'-21'90,"0"1"-450,22 2-269,-17 6 629,52-3 0,-34 11 0,30 1 0</inkml:trace>
+  <inkml:trace contextRef="#ctx0" brushRef="#br0" timeOffset="252007">15077 5643 9242,'4'0'-518,"0"0"1,-1 0 0,1 0 0</inkml:trace>
+  <inkml:trace contextRef="#ctx0" brushRef="#br0" timeOffset="256543">8083 6478 7803,'0'-11'0,"0"2"0</inkml:trace>
+  <inkml:trace contextRef="#ctx0" brushRef="#br0" timeOffset="257272">8083 6403 9781,'0'35'630,"0"-5"-540,0 2-90,0-3 0,0 20 0,14-11 0,-10 23 90,23-28-180,-24 5 90,19-18 0,-20-4 0,18-5 90,-7-1-90,5-6-90,3-1 90,-9-18 0,6-8 0,-7-9 0,-1-3-90,-5 4 90,-3-2 90,0 0-90,-2-17-90,0 14 90,0-16-90,0 27 180,-16 1 180,12 13-270,-11 27 90,35 7-180,-15 16-720,12-7 1,4-1 89,-1 4-315,-2-2 1,2-2 1034,6-3 0,0 6 0,-8-12 0</inkml:trace>
+  <inkml:trace contextRef="#ctx0" brushRef="#br0" timeOffset="257635">8535 6480 8072,'0'0'0</inkml:trace>
+  <inkml:trace contextRef="#ctx0" brushRef="#br0" timeOffset="258440">8532 6483 9332,'19'13'449,"9"4"-359,-15 20-90,2-6 90,1 3 90,-14-9-90,9-1 90,-10 7-90,4-9 360,-5 7-270,0-18-90,0 1-180,0-28 90,0-8 0,-13-27 0,10 9-630,-10-19 90,13 24-678,0-8 408,0 16-89,0 7 89,0 3 810,0 6 0,17 5 0,3 4 0</inkml:trace>
+  <inkml:trace contextRef="#ctx0" brushRef="#br0" timeOffset="258757">8902 6763 8252,'10'-18'180,"0"-14"0,4 0-90,-2-8 0,1-7 90,4-6 0,-8 11 45,0 7 0,-2-1 44,0-6 1,-4 7 0,-1 1 0,0-4 0,-2-8-180,0 10-90,-17 14 359,12-5-448,-23 19 178,25 52-89,-8-12 45,8 4 0,6 3-315,9-7 1,1-1-451,-7 18-45,24-12 1,4-1-135,-7 1 899,13-11 0,4-4 0,5-7 0,-16-7 0,1 0 0</inkml:trace>
+  <inkml:trace contextRef="#ctx0" brushRef="#br0" timeOffset="259459">9660 5816 11041,'0'48'539,"0"-5"-539,0 10-2371,0-5 2371,0 11 0,0 7-45,0-31 0,0 1-180,0 3 0,0 1-135,0-1 1,0 1 44,0 1 0,0 1-45,0-2 1,0 0-136,0-2 0,0 1 495,0 12 0,0 0 0,0-14 0,0-1 0,0 9 0,0 1 0</inkml:trace>
+  <inkml:trace contextRef="#ctx0" brushRef="#br0" timeOffset="259956">9927 6043 8702,'0'-8'1979,"0"18"-1979,0 26 0,17 4-1823,-12 16 1912,13-16-358,-6 2-271,-10 2-45,10-11 1,0 0-46,-9 17-45,6-8 1,1-1-319,-1 4 993,3 10 0,-3-23 0,-4-4 0</inkml:trace>
+  <inkml:trace contextRef="#ctx0" brushRef="#br0" timeOffset="260122">9953 6468 8432,'0'-13'-450,"0"4"-1169,20 5 1619,0 3 0,3 1 0,-7 0 0</inkml:trace>
+  <inkml:trace contextRef="#ctx0" brushRef="#br0" timeOffset="260397">10318 6447 9422,'-21'13'989,"-6"5"-989,24 17 0,-16-7 90,17 2 0,-7 1-180,9-9 90,0 6-90,0-7 0,0-6-360,20 0 91,2-10 179,23-2 0,-13-25 90,1 17 90,-12-38-180,-2 25-90,-2-18-360,-2-4 181,-7 11-901,-2-17 1350,-6 23 0,-16-3 0,-5 12 0</inkml:trace>
+  <inkml:trace contextRef="#ctx0" brushRef="#br0" timeOffset="260656">10563 6075 10141,'0'33'1529,"0"5"-1529,0-7 0,0 5 0,0-6 90,21 3-899,-3 18 269,6-8-360,-11-9 1,-1 1-374,5 6-76,-1 8 1349,15-18 0,-19-2 0,14-3 0</inkml:trace>
+  <inkml:trace contextRef="#ctx0" brushRef="#br0" timeOffset="260841">10840 6335 8882,'-15'34'180,"-5"-16"-180,18 16-360,-6-18-629,8 26 449,0-15 540,16 12 0,-12-19 0,13 3 0</inkml:trace>
+  <inkml:trace contextRef="#ctx0" brushRef="#br0" timeOffset="261161">10925 6539 9332,'38'0'270,"0"0"-270,0-13 89,-9 10-89,1-10-89,-11-2 89,-2 12-90,-1-21-90,0 9 180,-8-9 0,0 5 0,-8 2-90,0 3 180,-18 5-180,13-2 539,-29 8-359,19 16 0,-4 4-90,8 19-719,11-2 359,18 0-270,-14-7-179,14-7-1,1-7 810,-15-3 0,28-4 0,-15-2 0</inkml:trace>
+  <inkml:trace contextRef="#ctx0" brushRef="#br0" timeOffset="261455">11270 6480 8702,'8'0'450,"-1"0"-360,0 0-90,-1 13 90,2-9-90,3 18 0,-2-20 180,6 8-90,-8-2 89,1-6 1,-4 6-180,-1-8 180,1 0-90,0-19 450,3-5-270,-3-10 179,4-13-449,-4 18 0,4-7 90,-4 14 0,-1 3-90,1 9-90,-1 1-719,2 28-1,1 12-1079,3 31 720,-2-4 824,2 7 0,-4-15 0,0-1 0</inkml:trace>
+  <inkml:trace contextRef="#ctx0" brushRef="#br0" timeOffset="261927">7758 7519 9152,'18'-8'1079,"-13"-1"-359,32-3-450,-4 2-2617,13-5 2437,11 3 90,-1 0-135,-23 5 0,4-1-15,4 0 0,6 0 0,-1-1-30,11-2 0,6-1-702,-6 1 0,7 0 0,2-1 1,-5 1 701,-4 0 0,-3 1 0,6-1 18,-1-1 0,8 0 0,2-1 0,-1 1 0,-6 0-291,-7 2 1,-5 0 0,0 1 0,3-1 236,1-1 0,1 0 0,2 0 0,0 0 0,0 0-355,3-1 0,1 0 1,1 0-1,-3 0 0,-1 1 278,1-1 1,-4 1 0,2 0 0,4-1-81,-9 1 1,5 0 0,3-1 0,0 0 0,0 0 0,-4 1 0,-4 1 79,8-2 1,-5 2-1,-1 0 1,5-1-38,-2 0 0,5 0 0,2-1 0,-1 0 0,-2 1 0,-7 1 70,12-2 0,-6 2 0,1-1 135,-5 1 0,1 0 0,0 1 0,-4 0-129,0 0 1,-2 0 0,-4 1 73,1 1 0,-2-1 0,12-1 0,-7 1 0,-16 3 0,-1-1 0</inkml:trace>
+  <inkml:trace contextRef="#ctx0" brushRef="#br0" timeOffset="266006">9797 5918 7353,'7'0'360,"0"12"-181,-2-9-89,0 9 0,1-12 0,2 0-90,2 0 0,3 0 0,5 0 90,3 0-90,6 0 0,8-16 0,4 12-1272,10-26 1272,4 27 0,-23-11 0,0 0 90,36 11-45,-31-12 0,1-2-45,1 11 0,3 0 0,20-11 0,1-1 0,-13 6 0,0 1-45,16-2 0,0-1 90,-18 3 0,-1 0-90,-2 2 0,3 0 90,14-5 0,1 1-45,-17 4 0,1 0 0,-1 1 0,3-1 0,-5 1 90,-7 2 0,-1 1-45,6-1 0,-1 1-312,22 1 447,-19 2-90,18 1 90,-30 1-90,18 16-90,-21-12 90,8 29-180,-9-29 180,0 35-90,1-21 0,11 36 90,-10-19-90,-4-3 0,-2 0 0,3 9 0,-5-5 0,-2 0 836,0 9-746,2 14-90,-9-18 0,-5 2-90,-1 0 180,-4 15-90,-1-13-45,0-9 0,0 0-135,0 4-539,-14 25 269,10-30 0,-23 8-89,24-17 144,-9-2 395,0-2 0,10-4 0,-10 0 0</inkml:trace>
+  <inkml:trace contextRef="#ctx0" brushRef="#br0" timeOffset="267127">9645 6128 7713,'0'22'449,"0"-2"-179,0 6-90,0-5 180,0 15-270,0-7 90,10 26-90,-7-20 269,15 28-269,-15-24-830,11 13 920,-10-13-90,6 0-90,-3 2 0,2-1 0,0-1 0,2-1 90,6 12-1,-1-15-178,9 19 89,-10-27 0,4 5 89,-8-14-89,-1-3 0,-2-3 0,0-2 0,-2-2 0,-1-2 741,2 0-651,-2-3-180,3 0 180,-3-2-90,2-1 0,2 0 0,1 0 0,14 0 0,-7 0 0,23-14 0,-14 11 0,15-24-90,-10 24 270,3-18-270,4 19 180,22-20-90,-7 14-694,-4-6 1,3-1 693,-18 7 0,1 1-60,7-4 0,5 0 1,-4 0 14,0-1 0,-1 1 0,15-3 0,3-1-135,3-1 0,-2 0 90,-15 4 0,2 0 0,3 0 0,5-1 0,-6 2 45,-6 1 0,0 0 15,0 1 0,4 0 0,-5 2 30,-5 0 0,-2 2 0,18-3 0,-1 2 0,4 1 0,-24 2 0,0 1-746,24 0 476,-14 1 90,22 0-90,-29 1-180,20 0 91,-25 0-1,6 0-450,-13 0 810,-2 0 0,-3 0 0,0 0 0</inkml:trace>
+  <inkml:trace contextRef="#ctx0" brushRef="#br0" timeOffset="270123">7983 9022 9422,'0'5'1079,"0"-1"-269,0 0-810,0-17 0,0-6 0,0-12 0,14-3 0,-10 4 0,10-3 0,-3-1 0,-8 0 0,8-1 89,-2 1 1,-7 1 90,7 2-180,-9 0 90,0-14-90,0 18 0,0-11 90,0 28-90,-14 1-90,10 33 90,-10 13 90,14 15-180,0-15 0,0 1-269,0 10-136,8-8 0,5-2-45,12 4 0,0-11 1,3-3-91,12 0 1,5 2-990,7-15 1619,-14-8 0,15-1 0,-18-6 0</inkml:trace>
+  <inkml:trace contextRef="#ctx0" brushRef="#br0" timeOffset="270777">8522 8829 8972,'-41'-8'1349,"6"2"-1259,15 22-180,-1-12 180,19 26-90,-8-13-180,10 11-270,17-2 91,-13-7-1,29-9 270,-18-5 0,15-5 90,-17-16 0,2 11 180,-14-28 360,5 18-451,8 12-448,6 12-361,11 20 270,3-11 1,-10-1-1,-1-15-270,0 6 540,-6-8 180,4-14 450,-5-4 0,-5 0 179,1-11-449,-6 14 180,-2-2 899,-3-3-1079,0 37-180,16-7 0,-2 25-90,19-7 90,-7-6 90,-4-9-180,-1-7 90,-7-6 0,-4 0 0,-4-18 0,-5-2 90,-2-19-90,0 3 540,-14 6-450,28 28-90,-7 19 90,16 20-90,15 5 0,-14 9 90,2-11-90,-8-7 0,-1 1-90,-3 2-90,9 21-270,-11-30 1,-7 5-91,-5-16-180,0-3-179,-24-2 899,-6-4 0,-13-3 0,3-2 0</inkml:trace>
+  <inkml:trace contextRef="#ctx0" brushRef="#br0" timeOffset="270975">8305 8605 9152,'-4'-19'539,"2"1"-269,1 3-270,1 1 90,0-4-180,17 6 180,-12-4-90,28 9-180,-29 0-269,32 3-451,-9-1 91,10 3 809,12 1 0,-20 1 0,8 0 0</inkml:trace>
+  <inkml:trace contextRef="#ctx0" brushRef="#br0" timeOffset="271147">8715 8245 8792,'6'21'0,"-2"13"-90,1-29-1349,4 52 1439,-1-34 0,6 32 0,-2-25 0</inkml:trace>
+  <inkml:trace contextRef="#ctx0" brushRef="#br0" timeOffset="271389">9458 8234 10861,'3'24'494,"2"11"1,1-1-495,3-6 0,3 15 0,1 1-360,2-4-225,-1-5 1,2 0-315,2 3-1,-2-5 1,0-1-361,3 3 1260,5 8 0,-11-17 0,-2-2 0</inkml:trace>
+  <inkml:trace contextRef="#ctx0" brushRef="#br0" timeOffset="271539">9435 8692 8882,'0'-13'0,"0"0"0,17 0-270,-13 0-180,34 0-1349,-5-5 1799,9 5 0,6-2 0,-12 6 0</inkml:trace>
+  <inkml:trace contextRef="#ctx0" brushRef="#br0" timeOffset="271790">9892 8489 9152,'-15'29'629,"-5"1"-629,18-3 0,-6-1 90,8-8-90,16 6 0,-12-8-180,29 3-179,-11-13-1,18-1 90,2-19-90,-5-6-90,-10-29 91,-12 15-541,-8-22 900,-7 29 0,-23-9 0,-6 12 0</inkml:trace>
+  <inkml:trace contextRef="#ctx0" brushRef="#br0" timeOffset="272023">10148 8036 9422,'10'0'1619,"-3"18"-720,7 4-629,-4 10-90,10 14-180,-6-14-90,11 28 180,-10-20-360,6 10-1079,0 1 449,-2-15-179,-3-6 0,1-1-361,5-1 1440,8 8 0,-9-18 0,2-2 0</inkml:trace>
+  <inkml:trace contextRef="#ctx0" brushRef="#br0" timeOffset="272211">10485 8253 10321,'-38'0'1259,"9"17"-1259,0 6-90,14 21 0,4-7-269,6-1-181,5-8-180,0-2-179,20-1-91,-15-3 1,34-2 989,-35-3 0,39-4 0,-14-2 0</inkml:trace>
+  <inkml:trace contextRef="#ctx0" brushRef="#br0" timeOffset="272526">10680 8453 9871,'22'16'360,"5"-4"-630,12-12 90,-4-14 1,-9 11 89,-1-24-90,5 10 180,-12-11 0,-1 3 270,-30 5 89,-8 10 1,-20 4-180,1 21-180,6 4 0,13 18 0,10 1-360,11 0-269,20-9-811,3-5 721,2-6 719,15-6 0,-13-3 0,22-6 0</inkml:trace>
+  <inkml:trace contextRef="#ctx0" brushRef="#br0" timeOffset="272807">11012 8450 10141,'0'22'-90,"12"-4"90,-10-22-90,15 6 90,-16-32 0,6 26 0,-3-30 90,2 29 270,3-30-90,-4 18-90,7-4-90,-5 9-90,11 12 0,-5 0-180,6 0-810,-2 23-179,3-17-720,3 38 1889,2-26 0,2 19 0,0-8 0</inkml:trace>
+  <inkml:trace contextRef="#ctx0" brushRef="#br0" timeOffset="273507">11360 8552 9332,'0'-7'1079,"0"1"-809,0 0 90,0-2 539,-12 3-989,23-1-90,16-14-359,15-8 224,-13 10 0,3-3-720,5-9 1,-1 0-10,-6 10 0,-1 0 1044,12-7 0,-1 0 0,-11 8 0,-1 1 0,0 0 0,0 0 0</inkml:trace>
+  <inkml:trace contextRef="#ctx0" brushRef="#br0" timeOffset="274632">12037 8113 11490,'3'-7'270,"5"-10"-180,0 0-90,13-24 90,-6 9-90,1 2 0,0-2 0,1-10 90,7-11 0,-8-2-90,-5 16 0,0-25 0,-9 29 0,0-16 90,-2 24 0,-17-10-90,13 19 0,-25-1 0,25 10 90,-21 5-90,22 22 0,-9 14 90,12 14-90,0 4 0,0 16 0,23-14 45,-10-5 0,0-1-362,15 6 182,-1-10 0,-1-1-986,-6 2 1031,2-18 0,2-1-304,8 9 124,-10-13-360,13-1 451,-19-13-91,8-19 270,-14 10 203,1-31-203,-6 29 0,-3-39 0,-1 26 90,-1-33 90,0 23 859,0-6-1039,0 11 410,-14 6-320,11 20-90,10 11 0,-1 27-90,29-4 90,-14-12 0,17 5 0,-8-21-270,0 6 90,-6-9 90,-6-6 90,7-19-90,-13 14 90,1-31 180,-10 17-90,-2-14-90,-1 7 360,0 6-360,0 27 0,0 5 0,17 24-180,2-3-180,18-4 0,0-12 90,-6-8 91,-5-9-91,-1 0 270,-10-15 0,4 12 0,-11-27 0,-3 9 90,-1-14 0,-3 3 539,-1 8-539,0 27-90,0 9 0,16 24 90,4-3-270,17-1 0,0-8 90,-2-11 0,-3-6 180,-8-28-90,-8-1 90,-9-22 90,-5 12-90,-2-4 270,0 13-540,0 26-270,20 11-269,-16 22-1350,30 6 2069,-17-17 0,1 6 0,-4-11 0</inkml:trace>
+  <inkml:trace contextRef="#ctx0" brushRef="#br0" timeOffset="274878">12442 7753 10411,'0'-18'900,"23"0"-811,-18 2 181,39-5-270,-16 9-270,22-3-269,-2 12-271,-21 21-89,7-13-361,-31 43-538,19-23 1798,-20 28 0,9-9 0,-7 3 0</inkml:trace>
+  <inkml:trace contextRef="#ctx0" brushRef="#br0" timeOffset="275029">12975 8069 12480,'-17'-9'-248,"13"-3"1,-13 11 0,17-4-1</inkml:trace>
+  <inkml:trace contextRef="#ctx0" brushRef="#br0" timeOffset="278775">9393 9518 8612,'9'34'180,"0"3"-90,1 6 0,0 2-1678,1 4 1588,-1 2 0,1 3-180,1-1-360,-1-1-179,0-3-631,-1-4 1350,0-2 0,-1-6 0,-2-1 0</inkml:trace>
+  <inkml:trace contextRef="#ctx0" brushRef="#br0" timeOffset="279126">9277 9988 9691,'-6'-1'2699,"1"1"-2519,3 14 0,0 9-180,2 10 90,20 5-90,2 13 90,3-9-135,-1-5 0,0 1-526,-4 5 571,3-15 0,1-1 90,3 6-180,2-3 90,-1-4 90,13 0-180,-11-12 156,22-1-66,-21-26-270,19-19 0,-21-11-45,-7-9 1,-3-4-136,-5-8-1539,-4-2 1,-3 2 999,-7 5 672,-9 13 0,0 3 0,4 4 0,-13-7 0</inkml:trace>
+  <inkml:trace contextRef="#ctx0" brushRef="#br0" timeOffset="279823">8525 11248 9781,'21'43'720,"-17"-6"-630,35 5 0,-35-4-1591,34 3 1501,-33 0 45,13-10 0,3 0-45,-1 13 180,10 11-180,-12-24 270,-1-5 411,-14-4-591,12-2 81,-14-9-441,3-23 0,-21-20-90,13-15-135,-12 11 1,0-2-226,12-12-90,-8 9 1,-1 1-540,11-4 1230,-9-7 0,11 24 0,0 4 0</inkml:trace>
+  <inkml:trace contextRef="#ctx0" brushRef="#br0" timeOffset="280123">9177 11657 9152,'7'3'0,"1"0"0,3-19 0,-3 12 0,3-34 0,-4 6 90,-2-25 180,-1 11-535,-4 3 355,0 16 152,0 5-242,-17 3 270,13 3 270,-28 9-450,15 21-90,-1 17-90,5 9 90,13 5 472,0-12-562,0 3-360,16-3-629,9 9 179,-4-16-314,9-8 0,0-5 1214,-5-4 0,34-2 0,-24-7 0</inkml:trace>
+  <inkml:trace contextRef="#ctx0" brushRef="#br0" timeOffset="280541">9577 11277 9242,'-40'0'1439,"18"19"-1079,-14-14-270,22 34-90,-15-23 90,18 19-90,-8 7 0,17-11 0,-9 22 0,11-26-180,19 14-450,3-23-90,22-1 451,0-12-91,2-28 180,-11 17 90,-14-25 0,-4-5 90,-4 9 0,-1-12 0,-2-2-90,-7-1 180,5-13 90,-8 17 90,0 1 0,0 0 629,-20-9-719,16 13-180,-34-8 0,33 23 1349,-24 2-1259,26 26 0,-8 12 0,27 27-90,3-3 0,-1-12 0,1 0-90,0 10-551,0-16 0,0 0 461,-3 12-179,20-3-91,-11 1-899,13 9 539,-10-13 0,-4-10 1,0-2-270,3-3 1079,7 1 0,-13-15 0,0-3 0</inkml:trace>
+  <inkml:trace contextRef="#ctx0" brushRef="#br0" timeOffset="280690">10062 11453 9332,'0'-11'449,"2"3"-269,0 8-180,1 0 0,3 16 90,-2-11-180,9 25-449,-4-9-91,4-3-270,-1 17-269,-1-31 1169,2 27 0,-3-28 0,2 10 0</inkml:trace>
+  <inkml:trace contextRef="#ctx0" brushRef="#br0" timeOffset="280857">10070 11295 9242,'7'15'-570,"-10"-11"0,19 11 1</inkml:trace>
+  <inkml:trace contextRef="#ctx0" brushRef="#br0" timeOffset="281108">10228 11325 9422,'11'0'899,"-2"0"-629,8 15-270,-3 1 90,10 21-90,-7-9 0,5 4 0,-7-5 0,-1-1 90,1 1-180,3 9 270,-5-11-90,4 9-90,-10-20-270,0-3 0,-5-33-360,0 3 181,-2-24-811,-20-11 721,16 12 539,-13 3 0,2 1 0,12-4 0,-10-11 0</inkml:trace>
+  <inkml:trace contextRef="#ctx0" brushRef="#br0" timeOffset="281411">10705 11469 8162,'22'5'90,"0"-3"180,10 3-180,-8-23 270,15-9-180,-18-9 359,5-12-359,-17 20 90,-1-6-90,-8 13-90,0-1 450,-20 12-180,-1-2-360,-20 12 0,21 17 89,-12 10 1,16 9-180,-3 4 90,7-9 0,12 2-89,0-3-721,0 10 270,21-14-809,10 5 719,-4-16-89,26-6-91,-32-4 810,25-5 0,-13 0 0,1 0 0</inkml:trace>
+  <inkml:trace contextRef="#ctx0" brushRef="#br0" timeOffset="281573">11093 11383 10501,'0'38'90,"0"4"-90,0-9-90,16 0 0,-12-12-270,33-11-359,-18 10-1260,35-17 450,-17 10 1529,13-13 0,-13-14 0,1-4 0</inkml:trace>
+  <inkml:trace contextRef="#ctx0" brushRef="#br0" timeOffset="281792">11510 10887 10591,'-18'-5'1619,"-8"2"-1439,14 1 0,-3 24 0,-1 4-180,15 14 90,-6 13-180,23-18-970,-12 14 970,31-17-270,-30 3-635,34 8 276,-15-11-1,1 7-719,8-10 989,-19-8 450,8 2 0,-10-13 0,-6-1 0</inkml:trace>
+  <inkml:trace contextRef="#ctx0" brushRef="#br0" timeOffset="281910">11348 11231 9871,'-11'-18'270,"8"0"-180,-8 0-90,11-2-989,46-11-1,-15 7 815,14 4 1,4 1-1,5 0 1,-18 8 0,0-1-1</inkml:trace>
+  <inkml:trace contextRef="#ctx0" brushRef="#br0" timeOffset="282726">8753 13532 10411,'-23'-27'1529,"-12"-1"-1259,21 9-180,-14 6-90,10 24 0,4 22 0,8 10-90,3 9-720,20 8 91,-12-17-226,26-9 1,8-5-394,-1-8 1338,16-8 0,5-5 0,8-8 0,-22 0 0,0 0 0</inkml:trace>
+  <inkml:trace contextRef="#ctx0" brushRef="#br0" timeOffset="282974">9238 12868 10411,'-24'19'1799,"3"10"-1709,9 11 0,1 8 90,11-3-180,-3 7-2059,3 8 2059,0 4 0,11-30 0,1-1 0,-9 2 0,0 1 0,17 13 0,2 1-225,-11-12 0,1 0-135,8 23 1,0-3-46,-9-25 0,1-2-360,5 17 1,0-3-13,-1 1-392,9 6 1169,-12-26 0,0-6 0,-5-4 0</inkml:trace>
+  <inkml:trace contextRef="#ctx0" brushRef="#br0" timeOffset="283362">9675 13118 9781,'4'-3'1440,"-1"1"-1350,-1 27-1,-1-3-89,-1 25 0,0-7-1535,0 8 1535,0 4-450,-17 7 0,15-16 1,0 0-181,-15 21 0,15-13 1,4-2-1,-2 1-89,0 9 769,0-20 0,0-17 1,0 2-1</inkml:trace>
+  <inkml:trace contextRef="#ctx0" brushRef="#br0" timeOffset="283586">9832 13577 9781,'8'0'1530,"2"0"-1441,-6 0 91,3 0 90,-1 0-180,0 0 0,2 17-90,4 2 90,-3 2-90,6 17-180,-7-24 180,1 21-360,-4-16 91,-1 0-271,0-1-360,2 4 541,-4-5-361,4 4 270,-3-12 450,-1 1 0,-1-9 0,-1 1 0</inkml:trace>
+  <inkml:trace contextRef="#ctx0" brushRef="#br0" timeOffset="284228">9777 13524 9961,'-5'0'1799,"1"0"-1619,2 15-180,1 12 0,1 7 0,0 8 90,19 11-90,-14-10-45,12-8 0,1-2 45,-4 4 90,14 10-90,-15-26 0,-4 0-450,-2-14 91,-5-21 89,4-10 0,-6-12 90,0-24 180,0 18 0,0-8 0,0-1 0,0-4 0,-5 3 0,0 3 90,2 8 899,-7-14-539,10 34-180,0 2-90,17 15-180,-13 24 90,33-15-90,-33 42 0,30-6 0,-17 13-450,-2-15 0,1-1-179,7 7-1186,-2 12 916,-4-24-1,0-4-179,2-7 1079,12-1 0,-8-11 0,10-1 0</inkml:trace>
+  <inkml:trace contextRef="#ctx0" brushRef="#br0" timeOffset="284575">10295 13520 10411,'-29'16'1439,"12"9"-1439,-3 10 0,17 4 0,-5-6 90,8 1-180,0 0 90,0-2-90,0-4-539,21 7 179,-16-14-629,33 3 719,-15-16 0,18-5 270,-9-19 180,3-9-90,-24-10 90,8-1 450,-17-5-181,5 11 91,-7-17-450,-17 24 900,13-6-990,-12 36 0,16 6-90,15 31-360,-11-11-269,25 2-721,-10-5 451,10-8 1079,-1-3 0,-5-4 0,0-4 0</inkml:trace>
+  <inkml:trace contextRef="#ctx0" brushRef="#br0" timeOffset="284876">10678 13648 9512,'0'2'1529,"0"11"-1529,15 5 0,-11 15 0,23-29 0,-25 25-270,21-25 0,-21 22 90,18-23-360,-18 16-269,13-17 809,-14-13-90,5-11 90,-6-19 360,0 3-90,0 8-270,19 13 0,0 28-180,3 11-810,27 19 271,-26-19 719,10-2 0,3-2 0,4-1 0,14 17 0</inkml:trace>
+  <inkml:trace contextRef="#ctx0" brushRef="#br0" timeOffset="285224">11368 13556 9512,'-27'-3'269,"-8"2"-269,21-2 90,0 18-180,3 2-179,11 18 89,19-18-630,4 13 450,1-18 90,14 3 181,-14-6 448,13-9 541,-8-22 359,-15-1-899,-7-24-180,-7 14-180,0 1 360,-16 9-360,12 28 0,-11 17 0,37 21 0,-10-6 0,1 1-90,14 13-366,-8-17 0,-3 0 96,-13 12-269,13-3-91,-6-3-989,-7 8 84,7-16 1625,-27 2 0,13-19 0,-13-5 0</inkml:trace>
+  <inkml:trace contextRef="#ctx0" brushRef="#br0" timeOffset="285408">10035 13076 10681,'25'24'-360,"1"0"0,16 2-539,2 19-1273,-4-26 553,3 20 1619,4-14 0,0-3 0,1-2 0</inkml:trace>
+  <inkml:trace contextRef="#ctx0" brushRef="#br0" timeOffset="286090">7970 12777 10411,'37'0'270,"2"0"90,1-12-1199,8 9 884,-17-8 0,2 0-629,5 9 0,2 2 629,7-11 0,2-1-473,7 7 1,2 0 427,6-7 0,2 0-505,-19 5 1,1 1 0,5-1 504,5-1 0,6-1 0,0 0 0,-2 0-330,-11 1 0,-3 2 0,1-2 0,6 0 360,0 0 0,6-1 0,3-1 0,0 0 0,-3 1 0,-5 0-292,3 1 0,-5 0 0,-1 0 0,3-1 262,0 1 0,3-1 0,1-1 0,-2 1 0,-3 1-162,-3 1 0,-2 0 0,-1 0 0,-1 1 162,17-3 0,0 0 0,0 1-78,-4 0 1,1 0 0,2 1-81,-3 0 1,3-1 0,0 1 0,-3 0 7,0 1 0,-3-1 0,4 1-102,-10 0 0,5 1 0,1-1 0,-2 0 1,-7 1 11,-1 0 0,-5 1 0,2 0 0,18-2 0,5 0 0,-9 1 240,-14 0 0,-3 1 0,8 0 0,-5 0 0,-1 0 0,-8 0 0</inkml:trace>
+  <inkml:trace contextRef="#ctx0" brushRef="#br0" timeOffset="287374">7958 12914 11580,'-2'45'540,"-1"3"-360,23-2-1601,-15 12 1466,13-24 0,-1 1-352,-14 3 1,-2 2 261,14 2 0,-1 2-398,-12 1 0,0 1 443,14 0 0,0 1 0,-14 1 0,0 0 0,13-2 0,1 1-45,-9-1 0,-2 1 90,6-2 0,0-1-135,-3 0 0,0-1 45,-1-2 0,0-1-45,0-2 0,-1 0 0,0-4 0,0-1-859,5 27 859,-3-9 191,1 0-191,-2-21-205,-1 1 295,-4-42-90,-1-30 90,-1-6 0,10 4 0,1 0 1318,-5-3-1318,27 6 0,8 2 279,-1-4-279,1 16 0,6 2 0,4 5 0,1 2 0,-10 6 0,3 2 30,7 1 0,7 2 0,-5 1-206,-1 1 0,1 4 146,8 5 0,7 4 0,-6-2-489,-4-6 1,1 3 495,-11 7 1,6 7-1,0 0 1,-5-3-667,13-2 1,-2 1 688,-8 5 0,2 4 0,0-1 60,0-2 0,1-1 0,-3 0-60,-11-4 0,-2 0 0,4 1-23,8 2 1,5 2 0,0-1-1,-5-2 23,-6-2 0,-4-2 0,2 0 0,12 4 0,3 1 0,-4-3 0,7 0 0,-3-3 0,0 0 0,0 0 0,0-3 0,-1 0 45,0-2 0,-1-1-90,-2 0 0,-1-2 45,-2-2 0,2 0 30,-7-1 0,2 0 0,-2 0-30,6 0 0,0-2-30,2-4 0,5-3 0,-6 3 75,-7 3 0,-3-1-45,13-13 0,-3-1-231,-18 16 0,-4-2 231,-1-12 0,-1-1 158,23 12-158,-9-27 0,-7 27-89,-7-25 439,-3 12-890,-10-5 731,-5-8-1180,-8 14 981,-3-7 8,-1 7 0,0-1 0,0 1 0</inkml:trace>
+  <inkml:trace contextRef="#ctx0" brushRef="#br0" timeOffset="287746">11893 12151 10411,'0'-16'1709,"0"4"-1619,0 31 90,0 2-90,0 33-674,0-4 674,0 13 0,0-29 0,0 3-45,10 20 0,0 2-429,-8-13 1,0 1 383,8 7 0,4 4 0,-1-4-1274,0-4 0,-1 0 1274,-1-7 0,-1 1 0,2 1-30,3 1 0,1-1 0,-2-1-376,-1 7 0,0 1-44,1 4 0,2 5 1,-2-6-46,-1-7 0,0-2-375,0 4 1,1 3 0,-1-6 711,-2-7 0,-1-3 0,3 11 1,-1-3-1,2 12 0</inkml:trace>
+  <inkml:trace contextRef="#ctx0" brushRef="#br0" timeOffset="288357">9703 11790 9602,'-7'-16'1619,"-1"2"-1170,2-4-449,0 7 720,2 0-720,3 26-90,0 17-90,9-1 0,0 4-180,-4 26-576,13-27 1,0 0 305,-13 15 90,25-1-305,-26-5 215,20-3 180,-20-4-180,14-6-449,-15 5 1079,5-13 0,-7 2 0,0-11 0</inkml:trace>
+  <inkml:trace contextRef="#ctx0" brushRef="#br0" timeOffset="288608">9630 12106 9422,'19'21'2248,"3"4"-2158,6 12-90,14-2 0,-37-8 0,37 1 90,-26-1-90,17 0 0,-3 6 0,-6-9 0,9 6 90,-16-16 180,1-1-270,-9-8 0,-3-2 0,-1-2 0,0-17-360,-2 11-1079,1-54 0,-3 29 1439,0-15 0,-1-3 0,0-5 0,0 17 0,0 1 0</inkml:trace>
+  <inkml:trace contextRef="#ctx0" brushRef="#br0" timeOffset="290273">7968 13629 10141,'-35'0'1259,"-5"0"-1079,8 0 0,-5 0 180,3 0-270,-5 0 180,-7 0-135,5-7 0,-4 1-935,9 4 0,-2 0 845,-16-9 0,-2-1-882,9 10 0,1 1 881,-5-8 1,-2 1-45,-4 6 0,-1 2 45,-3-4 0,-2 1 0,-3 3 0,0 0-45,21 0 0,-1 0 0,-2 0 0,-1 0 0,-4-1 0,0 0 0,3 3-30,-2 3 0,3 2 0,-5 0 30,-6-1 0,-6-1 0,0 0 0,8 1 0,12 1 0,4 1 0,-2 0-150,-22 3 0,-3 1 1,7-2-31,13-2 0,3-1-90,-10 2 0,3 0-1317,17 1 1,4-2 1136,-11-6-1880,0 10 2330,31-7 0,5 4 0,7-2 0</inkml:trace>
+  <inkml:trace contextRef="#ctx0" brushRef="#br0" timeOffset="290641">5975 13360 9242,'0'-7'1079,"-19"-2"-359,14-1-271,-27-2-179,29-1 0,-28-1 0,5-8-90,-12 7 90,-23-8-90,17 15-1949,-22 0 1859,12 7-90,-6 1 0,28 10 0,0 3 0,-2-4 0,0 2 0,-1 11 0,0 2 0,-1-5 0,-1 3-30,2 2 0,-2 4 0,1-1 75,-5 5 0,0 4-105,-4 5 0,-2 5 0,5-2-589,4-3 1,4 0 588,5-6 0,-1 1 0,4 1-120,0 13 0,5-2 90,6-14 0,6 0-360,11 15 1,9-4-361,24-6-135,18-18 1,8-5 224,-13-9 1,1-5 719,-3-6 0,4-3 0,-1-1 0,13-1 0,-1-3 0,-17-2 0,-1 0 0,1 0 0</inkml:trace>
+  <inkml:trace contextRef="#ctx0" brushRef="#br0" timeOffset="291346">4527 12580 9871,'0'-13'450,"0"1"-180,0 2 450,0 2-181,0 4-539,0 23 0,0 11 0,16 33 0,3-10-1237,1 4 1147,9-17 90,-25 0-5,25-5 5,-25-3 0,22-5 0,-24-6 90,18-5-180,-18-4 90,5-21 0,-7-30 0,0-5-225,-7 1 0,0 0-225,3-6-315,-3 6 1,0 1 921,7-5-157,0 8 0,0 2 0,0 6 0,0-9 0</inkml:trace>
+  <inkml:trace contextRef="#ctx0" brushRef="#br0" timeOffset="291641">5065 12830 8882,'15'0'540,"-3"0"-181,6-21-179,-6-4 0,2-1 180,-5-15-180,-2 24 0,-4-16 270,-1 1-271,-2 9 1,-20-9-180,-4 20 180,-23-5-90,2 16-90,8 12 0,6-7 0,19 31-180,-5-5-90,14 10-539,-6 12 89,34-22-899,12 5 630,12-13-1944,4-11 2933,-12-1 0,1-10 0,1 0 0</inkml:trace>
+  <inkml:trace contextRef="#ctx0" brushRef="#br0" timeOffset="291916">5372 12527 8882,'-38'-2'989,"16"16"-989,-1 2 0,20 17 0,15-3 0,13 3 90,0-9-90,21-3-90,-40-8 90,41-3 360,-41 0 630,32 0-990,-26-2 90,6 1-90,-11-3 0,-30 1 0,18-2-90,-43 2-1080,14 1 361,-11-1-1710,-9 2 2519,36-4 0,-18-1 0,19-3 0</inkml:trace>
+  <inkml:trace contextRef="#ctx0" brushRef="#br0" timeOffset="292378">5558 12498 9332,'9'0'989,"-2"18"-629,2-14 0,-1 32-90,3-31-91,0 34-269,2-20 180,1 19-90,9 6 0,-6-8 45,-2-6 0,1-1-45,1 7 0,4 8 0,-8-15 0,-2-2 0,-2-3 0,0 1 0,-3-9-809,0 0 539,-27-12-360,0-37 271,-22 10 89,24-11 0,2-4 180,-13-3-1049,4-16 1139,7 10-90,3 0 90,3-2-279,6 1 549,-3 1-180,9 3 539,-4-7-359,5 15 145,20-6-145,-15 26 179,36 4-269,-20 9 0,16 26 1006,-9 3-1186,-13 25 0,-5-13-629,-10 10 179,0-20-809,0 11 629,0-16 46,-16 0 584,12-10 0,-11-4 0,15-2 0</inkml:trace>
+  <inkml:trace contextRef="#ctx0" brushRef="#br0" timeOffset="292668">5913 12333 10141,'0'12'1979,"0"6"-1979,0 15-90,0 2 90,0-6 0,0 1 0,0 0 0,0-3-90,0-3 0,0-4-270,16-2 1,7-9 269,21-2 0,-7-7 90,11-22 90,-23-6-786,-2-11 696,-5 1-52,-16 10 52,7 2 0,-9-9-90,-24 12-630,-6-5 90,0 12-1079,-30 9 1709,40 0 0,-36 7 0,25 0 0</inkml:trace>
+  <inkml:trace contextRef="#ctx0" brushRef="#br0" timeOffset="293061">6110 12337 9422,'13'0'899,"1"0"-629,3 17-90,10 5-90,-5 9 90,16 10-180,-17-16-90,13 19 180,-18-20-90,1 5 0,-8-12 90,-2-4-180,-2-2-900,-2-3 720,-20-21 180,12-7-89,-29-13 179,30-1 0,-12 4-90,5-1 180,8-18 0,-8 12 539,11-19-179,0 29-180,0-2 0,0 16-1,18 7-179,6 17-90,13 22-269,1 2-181,-20 11-270,10-18 181,-18-1-91,12-1 0,-6-2-89,0-3 179,-1-4 540,9-1 0,-7-9 0,6-1 0</inkml:trace>
+  <inkml:trace contextRef="#ctx0" brushRef="#br0" timeOffset="293424">6597 12352 9152,'13'5'1349,"5"-9"-1349,-1 33 90,15-25-180,-18 20 90,14-21 90,-8 14-180,-1-16 90,2 7 0,-1-8 0,1 0 0,-3 0 0,1 0 0,3-17 90,-6-1-90,3-19 0,-12 2 0,-3-1 90,-23 8 0,-1 0 0,-2 15 90,-8-2 90,12 9-181,-11 3-89,13 18 0,-4-12 0,13 44 0,-3-26-89,6 42-181,4-32-720,18 21 451,3-26-271,0 4-989,17-7 1799,-11-13 0,11 9 0,-3-11 0</inkml:trace>
+  <inkml:trace contextRef="#ctx0" brushRef="#br0" timeOffset="293610">7075 12225 6903,'-8'0'0</inkml:trace>
+  <inkml:trace contextRef="#ctx0" brushRef="#br0" timeOffset="294024">6940 12229 8792,'-4'0'720,"-3"0"-271,2 0 91,-8 0-360,1 0-90,-10 14-90,8 0 90,-4 3-90,8 9 0,1-12 90,4 16-90,1 3 0,4-5-90,25 17 180,-19-20-90,42 6-90,-43-12 180,39-1-90,-39-3-90,37-1 180,-37-2 0,29-2 180,-23 4-1,6-6-89,-9 5-180,-8-9 0,0 2-90,0-3 90,0 1 0,-21-1-180,16 1-539,-37-3-91,37 2-1259,-55-2 630,37-1 1439,-32 0 0,27 0 0,0 0 0</inkml:trace>
+  <inkml:trace contextRef="#ctx0" brushRef="#br0" timeOffset="294323">7198 12393 9062,'30'-2'1259,"-1"-1"-989,-2 0 0,-2-2 0,7-7-180,-9 1 0,6-4 179,-7-5-269,-8 5 0,1-14 0,-10 13 90,-2-11-180,-20 14 180,12-1 0,-29 7 90,8 5 0,-20 17-180,1 11 0,17 8 0,1 4 90,25 3-90,-7-8 0,28 7-90,-15-16-180,48-3-719,-23-5-181,12-11 1,5-2-540,14 2 1363,-19-4 1,1-2 0,19 1 0,-1 0 0</inkml:trace>
+  <inkml:trace contextRef="#ctx0" brushRef="#br0" timeOffset="294432">7900 12382 11760,'0'17'0,"0"-2"0</inkml:trace>
+</inkml:ink>
+</file>
+
+<file path=ppt/ink/ink11.xml><?xml version="1.0" encoding="utf-8"?>
+<inkml:ink xmlns:inkml="http://www.w3.org/2003/InkML">
+  <inkml:definitions>
+    <inkml:context xml:id="ctx0">
+      <inkml:inkSource xml:id="inkSrc0">
+        <inkml:traceFormat>
+          <inkml:channel name="X" type="integer" min="-2.14748E9" max="2.14748E9" units="cm"/>
+          <inkml:channel name="Y" type="integer" min="-2.14748E9" max="2.14748E9" units="cm"/>
+          <inkml:channel name="F" type="integer" max="32767" units="dev"/>
+        </inkml:traceFormat>
+        <inkml:channelProperties>
+          <inkml:channelProperty channel="X" name="resolution" value="1000" units="1/cm"/>
+          <inkml:channelProperty channel="Y" name="resolution" value="1000" units="1/cm"/>
+          <inkml:channelProperty channel="F" name="resolution" value="0" units="1/dev"/>
+        </inkml:channelProperties>
+      </inkml:inkSource>
+      <inkml:timestamp xml:id="ts0" timeString="2021-10-13T01:36:08.560"/>
+    </inkml:context>
+    <inkml:brush xml:id="br0">
+      <inkml:brushProperty name="width" value="0.09071" units="cm"/>
+      <inkml:brushProperty name="height" value="0.09071" units="cm"/>
+      <inkml:brushProperty name="color" value="#FF0000"/>
+    </inkml:brush>
+  </inkml:definitions>
+  <inkml:trace contextRef="#ctx0" brushRef="#br0">2402 457 12300,'-33'0'3688,"7"0"-3508,9 21 0,9 5-90,8 12-90,0 3 90,0-6-90,0 6-476,0 3 566,0 3-270,0 1-269,0 1-271,0 0-180,-12-1 1,10 2 89,-10-2-1528,12 18 719,-9-16-976,7 9 2595,-13-21 0,14-5 0,-4-1 0</inkml:trace>
+  <inkml:trace contextRef="#ctx0" brushRef="#br0" timeOffset="183">2023 1092 10681,'-4'-20'1529,"0"1"-1259,4-6-270,0 8 90,0-6 0,23 8-270,-17 3-180,34 2-180,-23 6-359,18 2-91,-2 2-179,4 0 90,3 0-915,5 0 1994,1 14 0,2-10 0,0 9 0</inkml:trace>
+  <inkml:trace contextRef="#ctx0" brushRef="#br0" timeOffset="484">2887 1050 12660,'-39'16'450,"5"8"-540,17 10 180,-1 1-90,15-6 0,-5-3 0,8 0 0,0-2 0,0 5 0,0-10 0,22 4 0,3-16 0,23-1 0,-12-6 89,-3-21-89,-8-5-89,-13-12-91,1-8 0,-13 17-900,-25-25-988,-2 29-811,-22-13 2879,8 25 0,17 3 0,10 5 0</inkml:trace>
+  <inkml:trace contextRef="#ctx0" brushRef="#br0" timeOffset="738">3262 701 11311,'0'-11'3058,"1"24"-3058,-1 11 0,0 18 90,15 5-90,-11 20 0,11-13-405,-9-5 0,-1 1-1120,-2 8 1165,2-19 0,1 0-539,2 11-631,-6-2-269,10-3-539,-9-5 2338,3-4 0,0-7 0,0-3 0</inkml:trace>
+  <inkml:trace contextRef="#ctx0" brushRef="#br0" timeOffset="953">3580 1029 11490,'-40'-4'1979,"16"17"-1889,-6-8-90,26 28-90,-18-17 90,20 16-90,-14-4-449,14 2 89,-11 0-450,12 1-179,-3-1-1709,4 9 989,0-12 1799,17 5 0,-12-16 0,13-3 0</inkml:trace>
+  <inkml:trace contextRef="#ctx0" brushRef="#br0" timeOffset="1272">3733 1278 12030,'36'0'-270,"5"0"180,-6 0 90,4 0-90,-12 0 90,0-14-90,-4 11 180,-3-11-90,-5-1 90,-7 1-90,-4-16 360,-4 5-180,-21 10 270,-1 0-180,-20 14-270,5 17 0,6 11 0,13 13 0,8-3-90,10 6-450,0-10 0,0 9-179,17-14-631,-12-4-89,31-4 1439,-8-2 0,9-5 0,1 0 0</inkml:trace>
+  <inkml:trace contextRef="#ctx0" brushRef="#br0" timeOffset="1599">4235 1263 9961,'-20'17'2339,"3"-1"-2339,17 21 0,17-6-90,-12-3 180,12-3-180,-17-9 90,14-3 0,-11-2-180,21 0 180,-15-7 0,8-17 0,-7 9 0,4-48 180,-6 31-90,10-39 360,-10 33 89,7-7-449,-8 23-90,3 1 0,-2 10 0,2 19 0,1-14-719,13 49-1,-4-31-539,1 10 0,1 1-540,8-2 1710,15 8 1,-9-18 0,3-3 0</inkml:trace>
+  <inkml:trace contextRef="#ctx0" brushRef="#br0" timeOffset="1851">5598 653 12750,'0'-9'2248,"-17"1"-1978,-3 5 90,-1 18-90,-25 17-180,26 11-45,-9-1 0,-2 1-861,13-13 1,3 1 860,-7 14 0,3 1-90,6-12 0,2-1 45,2 3 0,2-1-90,0-1 0,2 0-180,2 0 1,1 0-451,-1 31-359,3-4-226,18-20 1,5-2-1394,9 18 2698,1-22 0,5-3 0,-9-11 0,-1-2 0,3-1 0,0 0 0</inkml:trace>
+  <inkml:trace contextRef="#ctx0" brushRef="#br0" timeOffset="4001">6327 1544 10951,'0'6'899,"15"-23"-899,7-13 90,-2-15-2203,21-7 2113,-21 8 90,21-6-90,-10-1 180,-9 11 0,-1-1-90,-5 10 0,-1 0 45,5-11 0,-2 1-45,2-15 180,-3 1-135,-9 20 0,-1 0 655,2-14-790,-3-17 0,-5 40 643,-1-1-553,-16 47-180,12 1 90,-11 30-397,3-3 397,9 8 282,-9 5-282,11-28 0,2 1-90,-1 13 0,0 1-135,0-12 0,0 0-315,0 21 1,0-1-181,0 5-899,20-7 0,1-2 449,-10-5 1170,20-12 0,3-4 0,-14-9 0,21-3 0</inkml:trace>
+  <inkml:trace contextRef="#ctx0" brushRef="#br0" timeOffset="4283">7107 1417 11311,'-40'-10'1439,"1"3"-1349,7 7 0,14 16-90,-5-12 0,21 27 90,-8-9-90,10 14-90,20 0 90,-16-9-270,34-5 270,-10-14-90,18-2 90,-8-6-90,-6 0-270,-12-15 270,-2-3-270,-8-15 1,-2 1-91,-32 14-540,18-4-1168,-42 20 359,15-6 1799,-10 8 0,14 0 0,17 0 0</inkml:trace>
+  <inkml:trace contextRef="#ctx0" brushRef="#br0" timeOffset="4550">7795 1372 11041,'-27'-4'1709,"-14"1"-1529,14 3-270,-10 0 180,0 18-90,0 7 0,12 10-630,-7 11-180,21-16-359,3 7-270,8-13 90,18-2 1349,-13-3 0,38-4 0,-12-1 0</inkml:trace>
+  <inkml:trace contextRef="#ctx0" brushRef="#br0" timeOffset="5102">8015 1436 10771,'-39'0'1619,"15"14"-1439,-3-11 0,24 26-180,-22-4 0,22 5 0,-15 5-90,16-13 90,-5 3-90,7-4-450,0 0 90,0-2 1,18-4-901,2-2 991,2-3-541,7-5 630,-10-1 0,8-4 270,-9-20 0,8 15 90,-16-33 180,13 34 90,-9-35 90,-3 23 269,1-26-449,-7 27 1079,0-14-989,11 42-180,2-20-180,18 23 0,-7-16-90,2 0 90,-4 0 90,17-16-90,-8-14 0,-6 3 0,-1-4 0,3-24 90,-9 14 0,-2-1-1289,-3-11 1199,-9 19 0,-3-3 135,-3 0 0,-2 0-59,-1-21 193,-9 8 1,-1 0 0,5-5-225,-15 11 0,0 1-45,15 1 90,-29-10 90,30 33-90,-19 3-90,20 35 1452,-7 2-1452,8 12 0,4 4 0,-2 18-1031,0 2 1,0 3 985,-1-22 0,2 0 0,8 13 0,0 2-450,-8-1 1,3-3 134,14-11 0,1-1 0,-17 11 1,0-2-1399,33 10 139,-22-4-360,17-6 1979,-6-4 0,3-6 0,1-4 0</inkml:trace>
+  <inkml:trace contextRef="#ctx0" brushRef="#br0" timeOffset="5436">9277 1169 11850,'-17'-11'540,"13"0"-630,-12 4 90,5 0 0,8 2 0,-8 22 0,11 8 0,15 15-90,-11-1 180,26-6-308,-26 2 128,29-1 180,-28 1-180,29 0 90,-29-2 180,24 10-180,-20-14-90,5 13 180,-8-24-990,-26 6-1258,-2-17 808,-21 1 1350,8-23 0,14-6 0,7-16 0</inkml:trace>
+  <inkml:trace contextRef="#ctx0" brushRef="#br0" timeOffset="5686">9910 1075 12030,'1'-9'1349,"0"2"-899,-1 2-450,0 26 0,-15-5 0,11 43-90,-11-16-1475,3 17 1115,10-10-269,-10-1 179,12-2-1439,0 17 810,0-19 1108,8-10 0,1-2 0,-5 0 0,13 7 0</inkml:trace>
+  <inkml:trace contextRef="#ctx0" brushRef="#br0" timeOffset="5833">9647 1407 8252,'0'-10'-539,"24"5"-361,9-7 91,14 8 809,0-5 0,-9 5 0,1 2 0</inkml:trace>
+  <inkml:trace contextRef="#ctx0" brushRef="#br0" timeOffset="6137">10360 1450 10051,'-16'7'990,"13"4"-900,-13-7-90,-4 4 90,0 3-90,-4-1 0,-4 13 0,16-7-90,-3 22 90,6-18-180,9 17 90,23-25 0,3 4 180,27-12-90,-16-1 0,3-18 0,-13 12 90,-1-28-90,-5 27-90,-9-34 180,3 8-90,-13-12-180,6-9 0,-25 23-360,12-7-89,-31 18-271,31 1-1618,-35 6 2518,15 4 0,-1 3 0,6 3 0</inkml:trace>
+  <inkml:trace contextRef="#ctx0" brushRef="#br0" timeOffset="6483">10693 1424 11850,'0'37'180,"16"-8"-180,-12 0 0,11-7 90,-4 8-180,-8-6 90,8 9 270,-3-16-180,-5 3-90,5-14-180,-8-15 90,0-12-180,0-10-269,0-18 179,0 15-4112,0-29 3933,18 26-271,-13-9 1,28 17-271,-29 6 1080,28 3 0,-17 6 0,16 1 0</inkml:trace>
+  <inkml:trace contextRef="#ctx0" brushRef="#br0" timeOffset="6868">11403 1405 10771,'-22'-29'1529,"-1"12"-1529,-25 6 0,15 11 90,10 15-90,-5-11-90,24 32 90,-23-18 90,24 19-90,-7-9-90,10-1-270,20 9 180,-14-11-45,23-7 1,1-2 44,-21 0-90,50-3 270,-35-7-90,16-24 180,-11 14 90,-1-46 90,-15 31-91,-1-27 451,-4 10-450,-7 11 0,2-5 90,-3 13-270,0 25-450,0 9-270,0 27-89,0-9-720,18 10 269,1-20 1260,27 4 0,-10-11 0,7-2 0</inkml:trace>
+  <inkml:trace contextRef="#ctx0" brushRef="#br0" timeOffset="7575">12102 1366 10501,'-38'-4'989,"3"1"-809,13 21-90,-2 1 0,22 19-180,-7-4-180,32-14 91,-18 6 179,38-23-90,-39 15 90,33-16-90,-15 5 90,14-7 90,-7-15 89,-8-4 91,-12-21 180,-3 8-360,-6-2 90,0 11 0,0 2 90,0 0 0,-16 11-181,12 25-89,-11 4 0,15 25 90,0-8-180,0 5-266,16 5 356,-12 1 0,12 2 0,1-1 0,-15-15 0,1 1-180,26 14 45,-27-12 0,-2-1-225,12 0-180,-12 5-179,0-20-1,0-5-359,-20-6 269,-5-4-89,-20-18 449,9-16 0,21-7 1,7-4 539,15-20 539,7 9 1,5 2-90,24 2-271,-8 11 1,1 3-303,8 2 168,-14 13 0,-1 4 44,9 4 1,-3 2 0,-4 7 360,6-2-360,-12 3 270,9 0-360,-16 0 179,7 0-179,-10 0 481,4 0-571,-5-18 89,-2 14 1,1-29 270,-1 10 0,-3-6 90,-3-9-180,-3 18-180,-3-7 179,-23 18-269,2 0 0,-6 25 0,-7 13 90,16 10-135,7-7 0,0 1 45,-3 13-431,14 12 341,0-17-180,28-5 1,-4-3-1,29-6-720,-5-5-359,8-7-225,-8-10 0,2-2 1384,-9 0 1,1-2 0,13-9 0,0-3 0,-15-1-1,0 0 1</inkml:trace>
+  <inkml:trace contextRef="#ctx0" brushRef="#br0" timeOffset="7867">13002 550 11760,'50'-3'1260,"-8"2"-991,-3 1 271,14 14-450,-9 10-1379,-14-8 1,-1 2 1378,15 21 0,-3-1 90,2 6-45,-18-6 0,-1 3-12,-7-9 0,-2 3-168,4 27 0,-4 2 45,-8-23 0,-5-1-295,-6 15 1,-6-1 114,1-14 0,-5-1-135,-9 1 0,-4-1-135,2 1 1,-5 0-481,-5-2 1,-5 2-1,0-2-396,7-8 1,0-1-1,-2 0 1326,-12 10 0,-4 1 0,2-4 0,9-8 0,2-3 0,-1 0 0,-2 1 0,1-1 0,0 1 0</inkml:trace>
+  <inkml:trace contextRef="#ctx0" brushRef="#br0" timeOffset="10768">3875 5193 10681,'0'46'630,"-16"0"-541,12 1-1068,-34 1 979,32 9-402,-13-28 0,-1 1 402,16 36 0,-12-33 0,1 1 0,12-1 0,2 1 0,-12 31 0,12-21 0,2-1 0,-1 20 0,0-15 0,0-1 0,0 1 90,14 7 453,-10-29-543,10-7-90,-14-6 180,0-32 450,0 1-540,0-29-45,0 13 0,0-2 45,0-27-561,0 18 1,0-1 605,0 9 0,0 1 0,0-2 0,0 1-145,-1 0 0,2-2 145,10-13 0,1-1-45,-10 16 0,2 0 135,24-19 0,3 4 45,-9 3 44,16 16 1,3 6 135,-2 9-315,-3 17 0,-1 4-45,-1 2 90,-8 24 0,-2 7-90,1-4 0,-7 16 0,-5 3-1106,-2 4 1106,-6-17 0,-1 0 90,-3 15 397,-1 0-487,-28-2-225,10-16 1,-2-1-1,-6-8 0,-3-1-630,-10 14 1,1-2-675,-11 3 674,18-17 1,0-3 854,-8 1 0,5-7 0,2-4 0</inkml:trace>
+  <inkml:trace contextRef="#ctx0" brushRef="#br0" timeOffset="11036">4983 4961 12030,'0'13'2069,"-17"-12"-1979,13 45 0,-31-17-90,31 30-527,-16-31 1,-3 1 526,4 18 0,0 2-324,-4-11 0,-2 2 114,3 5 0,-1 4 0,3-4-500,3-3 0,0-1 485,-4 11 0,1 2-630,4-4 1,3-2 89,3-12 1,1 1 764,-3 20 0,2-2 0,1 1 0,6-21 0,-1-1 0</inkml:trace>
+  <inkml:trace contextRef="#ctx0" brushRef="#br0" timeOffset="11376">5257 5576 12570,'-43'14'180,"1"-10"-180,21 24 0,-11-24 0,28 24 0,-22-17-90,23 12 0,-6 5 0,9-5 0,19 19 90,5-14 90,25 17-180,-24-20 180,20 8-90,-26-6 90,5-7-90,-11 11 0,-13-14-90,-20 9 0,-15-11-900,-5-2 1,-3-3-270,-20-2 1259,19 0 0,3-6 0,6-20 0,-2-3 0</inkml:trace>
+  <inkml:trace contextRef="#ctx0" brushRef="#br0" timeOffset="11750">5782 5720 11670,'-47'11'720,"-3"1"-630,6 16-180,16-6 90,-6 4 0,30-4-90,-11 1-270,15 11-90,0-7 91,0 5-91,21-13-180,-16-2 91,43-6-91,-9-3 540,13-5 45,-15-11 0,-1-1 135,7 4 180,-8-12 0,-2-3 269,0-7-900,3-9 901,-20 2-83,-9 10-7,-1 4-180,-6 0-180,0 1-180,-14 9 90,10 16-51,-10 16-579,14 19-1169,0 4 900,0-9 955,19-2 0,12-11 0,21-1 0</inkml:trace>
+  <inkml:trace contextRef="#ctx0" brushRef="#br0" timeOffset="11934">6512 5734 10681,'0'-14'1169,"-21"6"-989,1 2-180,-5 29 0,-1-17 0,23 40 0,-9-25-899,12 38 179,0-22-989,26 23 810,-20-31-1582,48 4 2481,-27-22 0,25-5 0,-9-6 0</inkml:trace>
+  <inkml:trace contextRef="#ctx0" brushRef="#br0" timeOffset="12333">7020 5226 10231,'-21'-8'2609,"-7"3"-2070,25 23-359,-8 15-180,11 12-1203,0 9 1203,0-9 0,0 6 90,0 1-90,7-12 0,0 0 0,-3 20 0,10-11 0,3-1 0,-3 3 0,4 13-90,1-29-180,-17-2 428,15-7-428,-15-6 1,11-6-1,-8-4 90,9-6 90,-3-1-90,10-39 180,-4 13 875,6-33-875,0 17 0,-1 0 90,3-1-90,-3 4 270,1 3 0,-4 8 266,3 3-536,-9 13 0,0 24 90,-9 18-180,-2 14-491,-2 5 221,-19-8-360,14 21-179,-30-17-720,33-10 0,0-3 1619,-26-1 0,25 2 0,-10-20 0</inkml:trace>
+  <inkml:trace contextRef="#ctx0" brushRef="#br0" timeOffset="12522">6760 4589 11760,'-36'0'450,"-14"28"-450,6-6-1120,9 14 0,1 4 625,13-13 1,1 1-541,-4 12 1,3 1-405,8-7 0,2 0 1439,4 0 0,1 1 0,1 1 0,2 1 0,1-1 0,1 1 0</inkml:trace>
+  <inkml:trace contextRef="#ctx0" brushRef="#br0" timeOffset="13024">8558 5594 10861,'17'-16'1709,"-12"2"-1709,12 23 0,-17 17 0,0 11 90,0 28-90,0-22-90,9 1 0,2-1-90,-5 0-45,10-6 0,5-4 225,3-11-180,19 2 90,-5-18 180,11-1-180,-19-29 90,8 18 90,-20-23 0,-2-5 90,8 10 0,-7-10 0,-3-1-90,1 4-90,-2-9 0,-9 26-360,-3 15-989,0 19 539,-1 21-179,19-18-1620,10 17 2609,12-24 0,4 4 0,-7-8 0</inkml:trace>
+  <inkml:trace contextRef="#ctx0" brushRef="#br0" timeOffset="13550">9580 5595 10231,'0'-16'450,"-17"2"-180,13 2-270,-33 6 0,19 1 0,-4 23 0,-1 10 0,21 12 90,-7 24-90,9-21 0,9-3 0,1-1-90,-6 8-674,14-16 0,0 0 584,-14 8 90,30-2-265,-29-4 355,29-4-135,-30-4 45,24-4-1259,-25-3 1259,8-30 1078,-30 14-1078,15-42 90,-28 24-90,29-17 847,-11 10-757,4-1 0,7-9 0,-7 9 0,37-16 0,14 21 0,-3 2 0,3 1 0,-9 7 0,3 1 0,24-9 0,0 0 244,2-1 25,-5 2 1,-2 0-90,-11-1 360,16-11-180,-35 12-90,1-7-1,-16 8 91,-5-1 0,-3-10-270,-1 13-90,-19-10 209,-1 19-119,-15 21-90,16 11-90,7 12 0,12 13-90,0-19-629,21 23 269,4-25-914,0 6 735,19-17 89,-26-3-90,24-5-179,-12-2-203,1-6 1102,1-2 0,-4-3 0,1 0 0</inkml:trace>
+  <inkml:trace contextRef="#ctx0" brushRef="#br0" timeOffset="13818">10532 5616 10051,'0'-19'450,"-19"1"-90,15 5 629,-15 2-989,19 31 0,0 7 0,0 17 0,13 14 0,-10-21 0,8 1 0,2 0 0,-2-3 270,10 25 90,-12-42-360,6 3 0,-10-15 0,14-3 0,-4-27 90,7 18-180,-3-26 0,1-6 90,12 6-45,3-13 0,1-3-683,-13 23 1,0 1 457,8-9 1,0 2-721,11-7-449,-1 4-450,-3 6 1889,-2 7 0,-6 10 0,-1 5 0</inkml:trace>
+  <inkml:trace contextRef="#ctx0" brushRef="#br0" timeOffset="16034">3325 5123 11131,'8'0'809,"-4"14"-539,-1 15-90,-3 10-90,-22 14-1164,16 1 1074,-13-22 0,0 1 45,17 3 0,1 3-749,-15 23 1,-1 3 748,7-14 0,2 1-534,1-6 1,0 2 0,1-2 488,-2 6 0,3-1 0,4 1 0,2 0 0,-1 1 0,0-1-180,0-1 0,0 2-150,0-6 0,0 1 1,0-1-31,0 6 0,0 0-750,0-1 1,0 4 0,0-6 344,0-8 1,0-3 764,0 9 0,0-4 0,0 6 0,0-7 0</inkml:trace>
+  <inkml:trace contextRef="#ctx0" brushRef="#br0" timeOffset="16818">3275 5159 10501,'11'-26'1259,"14"-11"-1169,0 7 90,5 4 0,4 1-1962,20-7 1872,-13 12 0,2 0-408,-4 6 1,1 2 407,5-2 0,3 1-90,3 0 0,6 1 0,3 1 0,7 0 0,-2 2-477,-12 1 0,-1 1 1,6 0 476,0 1 0,7 0 0,3 0 0,-1 1 0,-5 0-537,-6 2 0,-4 0 0,-1 0 0,4 1 537,0-1 0,3 0 0,1 1 0,1-1 0,1 2 18,4-1 0,1 1 0,1 1 0,-1-1 0,-2 1-18,1-1 0,-3 1 0,2-1 0,6 1 0,-17 0 0,4-1 0,3 1 0,2-1 0,0 1 0,-1 0 0,-3 1 0,-4 0-238,6 2 1,-5 1-1,-1 0 1,1 1-1,6-1 204,-5-1 0,6 0 1,2-1-1,2 1 0,1-1 1,-3 1-1,-2 0 0,-5 0-115,6 1 0,-6 0 1,-2 1-1,3 0 1,5 1 148,-5-1 0,5 1 0,4 1 0,1 0 0,0 0 0,-2-1 0,-3 0 0,-4-1-54,6 0 1,-5-2 0,-2 0 0,0 1 0,4 1 53,1 1 0,2 2 0,2 1 0,0 0 0,0 0 0,-1-1-15,0 0 0,1 0 0,0 0 0,-1-1 0,-2 1 0,-1-1 15,-3 1 0,-3-1 0,0 1 0,1-1 0,6 2 11,-7-1 0,4 0 1,4 1-1,1 0 0,-1 0 1,0 0-1,-5 0 0,-4-1-11,4 1 0,-5 0 0,-3-1 0,2 1 0,5 0 0,1 2 0,6 0 0,2 0 0,1 1 0,-1 0 0,-4 0 0,-5-1-23,7 1 1,-5-1 0,-2 1-1,6 1-3,-12-2 0,4 1 1,2 1-1,0 0 1,0 0-1,-4 0 0,-5-2 3,7 3 1,-6-1 0,-1 0-1,2 0 131,10 3 0,2 1 0,0 0 0,-4 2-108,-10-1 0,-2 1 0,-2 0 0,-3-1 0,-1 0 0,-2-1 0,0 3 0,11 10 0,1 5 0,-9-2 0,-15-5 0,-5 0 0,1 10 0,-7 0 0,-10 12 0,-28 0 0,-3-2 1030,-22-2-1030,0-4 0,-3-3 0,13-14 0,-1-1-90,-17 11-225,12-11 1,1-1-136,-2 0-270,-4 2 960,21-11-330,6-6 1856,9-1-1407,21-6 434,8 0-433,-19-1-360,-24 0 90,-28 0-90,6 6 0,-3 3 1356,15-3 0,-3 1-1326,-8 3 0,-7 0 0,3-1-889,-4-2 0,1-1 859,4 1 0,-2 1 0,1-1 0,-12-3 0,0 0-659,18 2 1,0 1-1,-2-1 659,-1-2 0,0 0 0,-5 0 22,-5 0 1,-5 0 0,-1 0-1,3 0-22,-5 0 0,2 0 0,-8 0 15,15-1 0,-6 0 0,-3 0 0,-1 1 0,2-1 0,6-1-433,-4 1 1,5 0 0,-1 0 0,-6-1 429,8 1 1,-5-1 0,-4 1 0,-1-1 0,0 1 0,4-1 0,4 1-177,1-1 1,3 0-1,2 0 1,0 0-1,-3 0 194,-2 0 0,-2 0 0,-2 0 0,0 1 0,0-1 0,0 0 30,-1 0 0,-1 1 0,0-1 0,1 1 0,1-1 0,2 1-158,0-1 1,3 0-1,1 1 1,-2-1-1,-4 0 109,5 1 0,-4-1 0,-2 1 1,-3 0-1,1 0 0,1-1 1,3 1-1,5 0-24,-5-1 1,4 1 0,2-1 0,-1 1 0,-2 0 12,-1 0 0,-3 0 0,-2 0 0,1 0 0,3 0 0,2 0 5,-6 0 0,4 1 0,1-1 0,-1 0-5,1 1 0,1-1 0,-1 1 0,1-1 92,3 1 0,1-1 0,-1 1 0,-3 0-92,2 0 0,-4 0 0,-1 1 0,2-1 0,3 1 0,3-1 0,3 0 0,-1 0 0,-3 1-72,-5 0 0,-6 0 0,0 1 0,2 0 0,8-1-228,2 0 0,6-1 1,-3 2-121,-15 0 0,-4 2 1,11-1-121,17-2 0,6 0 194,-3 1 1,8-1 431,14-1 0,44-1 0,11-2 1</inkml:trace>
+  <inkml:trace contextRef="#ctx0" brushRef="#br0" timeOffset="17884">12375 6103 10321,'57'-18'1529,"-6"14"-1439,-21-13 0,1-3-1551,31 4 1551,-25-1 0,3-1-418,2 3 1,5 0 327,3 1 0,6-1 0,-2 0-504,-9 3 0,-1 1 0,3-1 534,14-3 0,4 1 0,1 0-53,-10 3 1,3 0 0,-2 1-1,-1 1 53,5-1 0,-2 2 0,7-1-30,-13 2 0,6 0 0,2 0 0,2 0 0,-3 1 0,-4 0-496,4 0 1,-5 2 0,1 0 0,3 0 477,2-1 0,4 1 0,0 0 0,0 0 0,-3 1-265,2 0 1,-3 1 0,-1 0-1,1-1 283,3 1 0,0 0 0,1 1 0,1-1-126,-13 0 0,-1 1 0,1 0 0,3 0 0,2-1 126,-2 1 0,4 0 0,1 0 0,2 0 0,0-1 0,-1 1 0,-4 0-40,0 1 0,-4-1 0,-1 0 1,1 0-1,2 1 0,5-1 40,-2 1 0,5-1 0,3 0 0,2 1 0,1-1 0,0 1 0,-3-1 0,-3 1 0,-4 0 15,2-1 0,-4 1 0,-3 0 0,0 0 0,3 0 0,5 0-25,-4 0 0,6 0 0,2 0 0,3 0 0,-1 0 0,1 0 0,-3 0 0,-3 0 0,-5 0 10,3 0 0,-4 0 0,-3 0 0,-1 0 0,1 0 0,3 0 12,2 0 1,3 0 0,1 0 0,1 0 0,-2 0 0,-2 0 0,-3 0-22,3 0 0,-3 0 0,-2 0 1,-1 0-1,1 0 9,-1 0 0,0 0 0,0 0 0,-1 0 0,0 0-23,11 0 1,0 0-1,-1 0 1,0 0-68,-2 0 0,0 0 0,0 0 0,-1 0 22,-3 0 1,1 0 0,-2 0-1,1 0-22,-5 0 0,0 0 0,0 0 1,1 0-181,10 0 0,2 0 0,0 0 0,-5 0 0,-1 0 0,-4 0 1,3 0 21,-1 0 1,3 0 0,-2 0-1,-8 0-97,1 0 0,-6 0 345,6 0 0,-6 0 0,-10 0 0,-18 0 0,-8 0 0</inkml:trace>
+  <inkml:trace contextRef="#ctx0" brushRef="#br0" timeOffset="18234">19980 5135 11670,'-39'-16'1080,"4"2"-1080,5 1 270,5 3 179,8 0 91,7 3-540,37 2 0,36 18 0,-22-11 0,2 0-737,12 14 0,1 0 782,-5-14 0,1 0-823,5 15 0,1 3 733,5-11 0,0 0 45,-20 3 0,0 2 0,0-1 0,0-1 0,1-1 0,-1 0 0,18 5 0,1 3 30,-10-1 0,1 3 0,-3-1-75,3 1 0,-2 4 75,-5 1 0,2 3 0,-9 0-88,-12-4 1,-8 3 147,-2 18 0,-12 1-180,-28 11-205,-1-18 0,-7-1-35,-2-10 0,-5-1 0,1-1-31,-9 6 1,-3 1-315,7-6 1,-5 2-1,0 1 1,4-3-439,-13 7 1,3-1 1112,7-5 0,-1 1 0,3-1 0,1 1 0,4 0 0,1-1 0,1 1 0</inkml:trace>
+  <inkml:trace contextRef="#ctx0" brushRef="#br0" timeOffset="19468">14928 4425 11490,'16'15'540,"-12"11"-540,11-2 0,-1 7 0,-11 5 90,10 7 0,-13-10-90,8 10 90,-6-5-90,5-12 450,-7 8-270,0-21-180,0 1-180,0-69 90,0 22-315,6-21 0,6-3-1070,15 0 1025,-9 19 0,3 0-135,0 11 1,0 2-765,12-23-1,1 4 1350,-4 9 0,0 4 0,-1 6 0</inkml:trace>
+  <inkml:trace contextRef="#ctx0" brushRef="#br0" timeOffset="19920">15700 4509 8882,'0'-40'1979,"0"-7"-1889,-14 10 180,10-2-180,-10 13-90,14 4 89,-11 2-89,8 1 90,-17 9-90,8 2 0,-6 8 0,-6 37 0,7-13 0,3 21 0,2 3-90,3-4-135,0 0 1,7-1-136,26-8-629,8 15 449,16-35 270,-15-3 0,1-3 180,10-7 0,16 3 180,-4-24-90,-15-7 90,-12 2 0,-3-2 270,0-14 90,-6-12-91,-13 22-89,-7-6-180,0 17 90,0 2 90,-17 9 90,12-2-270,-30 9 0,30 16-90,-27-11 0,28 47 0,-10-30-270,14 42-270,0-30-90,16 9-809,7-6 630,-2-11 809,37 1 0,-35-12 0,31-3 0</inkml:trace>
+  <inkml:trace contextRef="#ctx0" brushRef="#br0" timeOffset="20758">15550 4508 9242,'0'5'989,"25"0"-809,2-3 0,17 0-90,-4-2 180,-5 0 269,24-16-269,-13-2-2135,15-2 2045,-21-10-90,-3 26 452,-7-27-632,-1 13 180,-12-9 0,-3-5-90,-11 11 244,-25-14-244,17 15 45,-26 4 0,-6 3-45,10 3 45,-13 2 0,-1 7-45,5 20 90,-22 11-90,30 10-805,3 5 805,10-9 0,14 2 984,-5 1-1613,26 16-91,16-15-135,-3-9 1,4-2 404,-5-14 1,1-1-451,16 6 1,0-2 772,10-3 1,-20-7 0,-2-2 0,14-1 0</inkml:trace>
+  <inkml:trace contextRef="#ctx0" brushRef="#br0" timeOffset="21167">16568 4292 9422,'0'-6'899,"0"0"-179,-20 4-361,-3 1-359,-21 23 90,2 6-180,18 14 180,-11-2-90,31-7 0,-10-1 0,14 2-179,0 10-91,0-14-180,19 12 90,6-25 180,21-2 180,2-11 0,-2-21 0,-20-8 0,6-24 90,-21 5 360,5-16-90,-9 21-675,-7-8 495,0 18-221,0 4 41,0 5 809,0 6-899,0 33 180,-14 20-90,11 19-696,-5-25 0,2 1 696,6 22 0,0 5-180,0 3-457,0 1 7,0-2-269,0-2-271,-2-21 1,4 0-540,15 16 1709,-15-21 0,1-2 0,15 4 0,-18-3 0</inkml:trace>
+  <inkml:trace contextRef="#ctx0" brushRef="#br0" timeOffset="21651">16888 4641 9242,'4'-5'899,"0"2"-539,4 2-270,-1-1-90,13-2 0,-5-3 90,23-8-90,-11 0 0,6-5 0,1-2 0,2-4 180,-4 0 0,-2-2 179,-6 1 181,3-15-360,-17 20-270,-1-2 180,-8 12 90,0 5-180,-1 26 0,-17 12 90,12 15-1831,-10-12 0,0 1 1831,13 11-180,-10 13-11,12-20 191,0-6-90,20-5-180,1 1 0,19-16 90,-3 1 180,0-32-90,-6-12 2311,-4-12-2401,-9-5 270,-2 8-360,-2 0 360,-1-14-180,-6 15 225,-1-14-45,-5 31-270,-1 21-90,0 25-450,0 33 91,0-8-631,-1-15 1,2-1 180,14 5 989,4 18 0,0-29 0,-4 3 0</inkml:trace>
+  <inkml:trace contextRef="#ctx0" brushRef="#br0" timeOffset="21940">17713 4606 9512,'17'-11'1349,"4"2"-1349,21 9 0,-3 0 0,-14-16 0,8 12 90,-29-24 180,18 25-91,-20-22 1,5 13-180,-7-17 0,0 10 0,-21-5 0,-2 16 0,-23 0 0,24 23 0,-16-12 0,33 35 0,-26-19-359,28 21-1171,-10 6 721,13-11-1350,20 19 2159,13-27 0,11-3 0,6-16 0</inkml:trace>
+  <inkml:trace contextRef="#ctx0" brushRef="#br0" timeOffset="22204">18362 4305 9422,'-20'-7'989,"15"1"-449,-51 3-450,47 16 0,-36 8-90,43 21 0,-8-5 0,10 4 0,0-9 0,16 0 90,-12 0-90,13 1 0,-2 12 90,-11-10-180,12 16 180,-16-25-270,0 4 0,0-13-360,0-5-899,-22-4-360,0-4 720,-20-3 1079,22-26 0,4 6 0,16-23 0</inkml:trace>
+  <inkml:trace contextRef="#ctx0" brushRef="#br0" timeOffset="22384">18522 4021 10141,'14'17'2339,"-2"9"-2339,-12 15 0,0 3 90,0-7-180,0 2-270,0 21-90,0-15-539,0 14-1350,16-7 1080,-12-15 1259,31 7 0,-31-20 0,16-2 0</inkml:trace>
+  <inkml:trace contextRef="#ctx0" brushRef="#br0" timeOffset="22518">18433 4404 11580,'-15'-20'270,"2"-5"-360,13 7-449,19-6-721,22 12 1260,-2 4 0,3 2 0,-1 3 0,0 1 0,6 0 0,0-1 0</inkml:trace>
+  <inkml:trace contextRef="#ctx0" brushRef="#br0" timeOffset="23467">24112 4606 10771,'-20'-10'1619,"-17"21"-1349,4 10-1383,-16 24 1203,10 7 0,18-21 0,0 3-90,-9 22 0,-1 4-875,9-13 0,1 0 905,3-6 0,-1 2 0,3 1-30,-4 19 0,4-1-45,5-16 0,1 0 15,3 1 0,0 3 0,3-5 214,1-8 1,2-1-275,0 16 0,1-4 90,0-4-540,19 6 540,-1-36-90,20-34 90,-11-7 0,-7-15 0,-2-7 0,-5 17 0,0-2-712,5-15 0,-1-2 712,-4 9 0,0 0 0,-1-3 0,0-2 0,0-1 0,1-3 150,-2 4 0,1-4 0,0 3-60,2-8 0,1 0-416,0-2 0,2-3 1,-1 6 280,-2 10 0,0 3 539,7-16 1,0 4-353,0 13 38,2 4 90,-11 29-180,0 6-90,-2 33 0,4 22 0,-9-19 0,-1 4-53,1 22 1,0 2-173,-3-20 1,-1 1-1,0 15 0,-1 1 385,0-17 0,0-1-475,0 0 0,0 0-541,0-2 1,0 0 360,0-2 0,0 0-386,0-3 0,0-1-199,0 29 324,0-25 0,0-2 756,0 15 0,0 5 0,0-26 0</inkml:trace>
+  <inkml:trace contextRef="#ctx0" brushRef="#br0" timeOffset="23601">23743 5450 10141,'-25'-33'810,"8"1"-810,6-14-90,29 11 90,5-9-270,12 22 0,4 4-180,-9 3 1,2 1-901,29-8 1,4 1 1063,-22 10 1,1 1-1,14-2 1,1 1-1,-17 5 1,1 0 0</inkml:trace>
+  <inkml:trace contextRef="#ctx0" brushRef="#br0" timeOffset="24085">25248 4798 10231,'-12'-4'2159,"9"0"-2069,-10 20 0,5-13 0,6 41-90,-6-18 0,4 27-279,3-3 279,-4-9 0,-1 1 45,3-9 0,1 1-45,-4 24 0,0 1-441,2-25 0,0 0 441,1 10 0,1-2 0,-4 13-90,5-3 0,-2-7 0,2 10 90,0-20-900,0 8 630,-1-27 10,0-3-189,-2-27 1150,1 11-1240,-3-60 269,1 27-1347,-1-17 0,1-6 1617,2 24 0,0-2 30,0-8 0,-1-6 0,2 4-398,0 1 1,1-1 486,0-5 1,0-6 0,1 5 60,-1 5 0,2 1-135,6-13 0,5 1 315,0 6 0,4 5-270,3 13 0,3 1 179,8-14 1,3 4-90,12 4 45,-6 16 0,0 6 45,9 5-262,-14 16 1,-1 3-9,-1-2 0,1 42 0,-23-1 0,-4 14-450,-14-14 0,-5-1-180,-20 11-437,13-19 0,-2-1-12,-25 11-90,15-5 1498,0-5-329,17-5 0,-16-6 0,9-3 0</inkml:trace>
+  <inkml:trace contextRef="#ctx0" brushRef="#br0" timeOffset="24306">25957 4392 10501,'11'-10'899,"-1"2"-899,-3 2 0,3 1 90,-5 4-90,4-2-90,7 3-359,-4 0-361,20 17 540,-12-13-1079,20 26 719,-19-9-89,7 6-181,-14 2 900,-1-7 0,-3-2 0,0 1 0</inkml:trace>
+  <inkml:trace contextRef="#ctx0" brushRef="#br0" timeOffset="24528">25993 4508 8342,'24'9'810,"11"-7"-900,-19 8 90,10-10 0,-12 0 0,-7 0 0</inkml:trace>
+  <inkml:trace contextRef="#ctx0" brushRef="#br0" timeOffset="24872">25832 4498 9152,'-10'0'1709,"2"0"-1259,0 0-271,3 0-89,21 0 0,31-27-90,4 20 0,-4-13 0,0-2 0,9 9-45,-6 0 0,0 1-1339,11 1 1024,-24 6 1,0 2-451,12 3 90,-7 0-179,-3 0-1,-5 0 833,-4 0 0,-4 14 1,-1 3-1</inkml:trace>
+  <inkml:trace contextRef="#ctx0" brushRef="#br0" timeOffset="25151">26043 4503 10861,'15'30'1169,"-11"-6"-1259,11 3 180,-15-4-90,0 5 0,0 3 0,0 7 90,0 3-180,0 5 0,1-10 0,-2 2-270,-13 19-225,12-7 1,0 1-535,-12 8 84,13-10 1,2 0-1069,-1 6 2103,0-21 0,0-1 0,0 12 0,0-4 0</inkml:trace>
+  <inkml:trace contextRef="#ctx0" brushRef="#br0" timeOffset="25368">25758 5714 9152,'28'-34'989,"-4"15"-989,27-17-1204,-6 18 1204,7-18 90,6 8-693,-26 14 1,1 0 242,3 0 1,0 0-1,1 1 0,0 0-90,2-1 1,-1 2-181,1 0 0,0 1 630,-2 0 0,1 1 0,-1 1 0,-1 1 0,0 0 0,0 0 0</inkml:trace>
+  <inkml:trace contextRef="#ctx0" brushRef="#br0" timeOffset="29252">22910 6982 10051,'14'6'3059,"-3"15"-2970,-32 22-89,15 10-429,-38-4 204,26-7 0,0 2-356,-5-9 1,-3 1-200,2 6 1,-1 5 0,1-4-583,0-1 0,1-2 462,-8 16 1,2 0 899,7-16 0,2-1 0,1 1 0,0 1 0,0-1 0,1 0 0</inkml:trace>
+  <inkml:trace contextRef="#ctx0" brushRef="#br0" timeOffset="30372">23120 7897 10321,'25'-49'1079,"-19"7"-1034,21 18 0,4 2-1347,0-21 1346,-1 21 1,3 0-135,-6-1 1,2-3 119,6-7 0,3-3 0,-2 2-30,-1 0 0,0-1 59,5-8 1,3-5 0,-6 4-15,-12 11 0,-4 0 225,10-23 0,-4 0-90,-14 24 0,-2 1-516,0-9 1,-3 2 515,-3-9-180,-5 8 510,0 6-510,-19 4 0,-5 15 45,3 35 0,0 11-45,-19 10-537,27 6 1,4 3 536,-5-19 0,2-1 0,10 35 350,-4-32 1,2 1-396,12 13 0,3 1 90,-9-11 0,1 0-135,15 23 0,4-1-521,-6-26 0,-2-1 431,-2 9 1,3-2-46,11-14 0,-1-2-225,-6 21-270,23-6 451,-12-6-1,0-8 0,-1-5-90,10-9 270,-9-5 0,15-28 90,-20 16 90,3-46 90,-12 29 90,-5-25 0,-4 11 629,-4-13-359,-2 13 1656,-1-16-2196,-17 29 0,13-2 429,-12 15-429,3 5 972,10 21-972,-9 7-270,12 22-270,16-10-89,-12 1-361,12-12-179,-1-1-90,-11-3 1259,23 4 0,-12-13 0,13 2 0</inkml:trace>
+  <inkml:trace contextRef="#ctx0" brushRef="#br0" timeOffset="30651">24210 7192 10771,'-3'-4'-810,"1"2"-449,1 17-90,17-12 1349,-11 26 0,29-26 0,-11 10 0</inkml:trace>
+  <inkml:trace contextRef="#ctx0" brushRef="#br0" timeOffset="30938">24642 7361 10591,'-35'-8'989,"0"6"-989,0-6-90,15 28 180,-1-14-90,19 37 0,-5-23 0,7 37-90,25-20-1036,-19 13 1036,45-16 180,-44 0-268,17-11 1,4-2 267,-2 10 0,5 6 0,0-12 0,-28-10-809,8 3-1260,-35-14-810,-1-14 2789,-22-12 0,24 3 0,5 2 0</inkml:trace>
+  <inkml:trace contextRef="#ctx0" brushRef="#br0" timeOffset="31184">25080 7137 13110,'0'38'89,"0"-6"-89,0 0-89,0 13 89,17-9-315,-15-3 0,0 0-225,26 6 0,-26-5 1,-2-1-361,19 3 91,-17 10-91,6-19 91,-8-1-1,0-3 810,0-2 0,0-5 0,0-2 0</inkml:trace>
+  <inkml:trace contextRef="#ctx0" brushRef="#br0" timeOffset="31290">24935 7648 9961,'-14'-36'90,"3"2"-90,11 11-90,0-10-629,27 10-271,-20-5-269,52 12 1115,-33 2 1,31 2 0,-13 0-1</inkml:trace>
+  <inkml:trace contextRef="#ctx0" brushRef="#br0" timeOffset="31617">25958 7473 10951,'-7'-3'180,"2"1"-180,3 0 0,1 1-90,1-1-1619,19 1 269,8 1-179,11 0 1619,4 0 0,-7 0 0,3 0 0</inkml:trace>
+  <inkml:trace contextRef="#ctx0" brushRef="#br0" timeOffset="31988">26407 7342 10231,'-14'20'900,"3"4"-900,11 15 0,0-2 0,0-7 0,22 2-360,-17-1-90,37 10 270,-17-11 0,19 8 0,-8-25-89,6 0 269,-16-13-90,7-18 90,0-11 0,-9-10 45,-5 8 0,0 0 134,-2-10 181,-5 6 0,-1-1 90,-4-2 89,0-23-449,-6 34 0,-1-5 360,0 18-450,0 25-90,0 12-180,0 14-179,0 4-361,0-9-359,0 1 179,0 0 990,0 12 0,13-13 0,4 8 0</inkml:trace>
+  <inkml:trace contextRef="#ctx0" brushRef="#br0" timeOffset="32551">27168 7233 10681,'-19'-7'1079,"-10"3"-989,16 17-90,-3 9 0,0 23-90,14-10 90,-4 6 0,6-1 0,0-8 0,19 18 0,-14-24-90,26 5 180,-28-10-450,9-8-89,-12 3-361,0-11 271,-26 0 179,-4-4 90,-16-1 90,6-17 180,11 13-90,-2-27 90,16 15 0,-2-17 90,17 9-90,24 0 0,0 8 0,25 2-1105,-3 0 1195,8 2 0,4 3-90,3 2 45,-18 5 0,0 0 45,20-1-315,-13 1 0,0 1 405,0 0 0,10-1-180,-29-2 180,-4 1 90,-7-4 179,-4-5-269,-10 1 1209,-1-10-1209,-5 6 0,-23-10-180,0 11 0,-4-3 0,-5 8 705,28 4-615,-26 1 0,16 2-90,-3 17 90,6 7-90,11 21-270,0-7-269,22-1-1,-17-8-180,42-3-220,-27 0 311,23-3-271,-10-2-359,-1-4 1259,1-2 0,-2-8 0,1 0 0</inkml:trace>
+  <inkml:trace contextRef="#ctx0" brushRef="#br0" timeOffset="32825">27903 7309 10051,'0'-17'1080,"-12"5"-990,9 27-90,-10 9-90,13 12 180,0-1 0,0-9-180,0 3 180,16-4-90,-12 11 179,13-12 451,-9 3-630,-6-11 0,13-26-90,-10 12-135,10-34 0,2-13-44,5 10-728,6-16 1,1-2 96,8 4-269,-4 9 0,2 2 1169,8-2 0,-15 15 0,1 2 0,10-3 0</inkml:trace>
+  <inkml:trace contextRef="#ctx0" brushRef="#br0" timeOffset="34016">29365 6697 10861,'-13'-25'1709,"10"1"-1259,-25 0-181,24 3-89,-24 2 270,18 2-180,-13 8 0,6 3-180,-5 4-90,-4 21 0,-6 0 45,2 11 0,0 4-387,6-8 1,-1 2 281,-4 6 0,-2 5 0,2-1-255,1 0 1,2 2-46,-2 5 0,-1 4 0,4-2-628,4-3 0,3-1 403,-5 14 1,4-2-271,10-16 1,4-2 44,1-1 1,1 0 809,0-2 0,5-1 0,12-2 0,5-1 0,2-2 0,0 0 0</inkml:trace>
+  <inkml:trace contextRef="#ctx0" brushRef="#br0" timeOffset="34295">29423 7188 9242,'-6'-1'1259,"-2"1"-1169,6-1-180,-2 1 180,1 0-90,1 10-90,0-8 90,-1 7 0,2-9 0,1 0 0</inkml:trace>
+  <inkml:trace contextRef="#ctx0" brushRef="#br0" timeOffset="35419">29463 7214 8882,'-24'0'1619,"1"16"-1439,7-12-180,0 24 0,1-25 0,-1 25 0,0-16-90,-2 15 180,4-8-270,1 1-360,6-1-989,3 9 810,1-8 719,22 10 0,11-16 0,20 4 0</inkml:trace>
+  <inkml:trace contextRef="#ctx0" brushRef="#br0" timeOffset="35674">29925 7212 9152,'-42'-1'1349,"0"0"-1169,-3 14-180,15-10 90,-2 25-180,22-10 90,2 14 0,5-8-180,3-2-180,0-8 0,16-1-809,-12 4 629,28-7 540,-15 2 0,17-8 0,-5-1 0</inkml:trace>
+  <inkml:trace contextRef="#ctx0" brushRef="#br0" timeOffset="36238">30012 7226 9871,'0'30'720,"0"-4"-630,0-3-90,0-7 0,14 2 0,-11-5 0,11 2 0,-4-1-180,-8 7-270,15-7 1,-15 3-91,6-6 270,-4-5-180,-1 1-179,6-5 449,-4-1 90,5-15 0,-3 11 180,5-27-90,-2 27 270,0-31-1,0 20-89,0-16 0,1 11 0,-1 9 810,2-9-721,-4 11 631,5-4-630,-6 7 90,5 20-271,-5-11 91,3 27-180,-4-27 0,0 31 0,1-30 0,0 34 0,0-26 0,-2 17 0,4-9 90,-5-10-180,4 6-179,-5-15 269,3 5 0,-1-7 0,1 0 0,4-20 0,-3-1 0,2-3 0,-2-10 0,0 30 0,-2-29 0,0 30 179,-2-22-89,0 22 90,1-7-90,-1 10-90,5 0 0,-3 15 0,6 6-360,-5-3-179,2 20-271,-3-23-359,-2 19-90,0-13-450,0-1 1709,-1-2 0,-1-8 0,0-3 0</inkml:trace>
+  <inkml:trace contextRef="#ctx0" brushRef="#br0" timeOffset="36468">29778 6986 10231,'0'-15'1169,"0"0"-1079,0 2-90,20 0 0,-15 2 0,32 1 0,-32 3-90,31 3-449,-11 2-1170,20 2 629,-9 17 1080,7 2 0,-19 2 0,7-7 0</inkml:trace>
+  <inkml:trace contextRef="#ctx0" brushRef="#br0" timeOffset="36635">30140 6849 9242,'39'0'539,"-5"0"-539,1 0 0,-3 0-1978,19 15 89,-9-12 1680,14 29 1,-16-17 0,-1 16 0</inkml:trace>
+  <inkml:trace contextRef="#ctx0" brushRef="#br0" timeOffset="37256">30837 7245 12570,'38'15'-360,"0"4"-270,-2 19-179,-7-7-91,0 3-89,-9-10 989,18 16 0,-13-18 0,12 11 0</inkml:trace>
+  <inkml:trace contextRef="#ctx0" brushRef="#br0" timeOffset="37451">31158 7158 10051,'-11'-5'1080,"-4"2"-1080,-11 2 0,4 21 90,4-15-180,5 38-180,-4-7-450,4 10-180,3-12 1,1-2-270,3 10 1000,-1 10 1,6-18-1,1-1 1</inkml:trace>
+  <inkml:trace contextRef="#ctx0" brushRef="#br0" timeOffset="37802">31662 6848 13020,'0'43'359,"0"-5"-359,-11-1 0,9-4-90,-9 19-359,11-8-226,0-8 0,0 1-314,0 6-91,0-9 1,0 0 0,0 3-363,16 8 1442,-12-19 0,11-4 0,-15-3 0</inkml:trace>
+  <inkml:trace contextRef="#ctx0" brushRef="#br0" timeOffset="37951">31497 7342 10501,'-27'-35'810,"11"9"-900,7 5 90,9 6-180,0 3-990,18-5 451,-14 4-181,38-1-89,-18 3-360,22 2 1349,-5 0 0,2-1 0,2 0 0</inkml:trace>
+  <inkml:trace contextRef="#ctx0" brushRef="#br0" timeOffset="38685">31982 6918 9781,'-19'-4'1619,"4"1"-899,6 1-630,6 19-90,-6 8 90,9 10-90,0 2 0,0-5 90,0 3-90,0 2-90,0 1 90,0 0 0,0 1 0,0-2-180,0 13-180,0-15-629,13 14 809,-10-27-180,11 1-899,-8-13 989,1-5 180,4-2 90,-2-21 0,-2 13 0,7-44 180,-4 28 270,10-40-90,-10 30-181,5-16-179,-7 26 1530,-1-3-1530,-3 16 89,-1 46-89,-1-15 0,0 35 0,1-19 0,1-10-89,0 15-91,2-22-90,3 4-90,-2-14 0,4-5 0,3-2 270,-1-21 90,12-6 0,-9 1 90,5-21 0,-6 24 90,-3-20 90,-1 11 0,-1-6-180,-4 10 899,1-3-809,-5 16-90,1 4 0,-1 20-90,-2 6 90,0 20-180,0-8 90,2 3 0,0-11-180,5 5-90,-1-7-269,10 6 269,-6-18-360,6 5-269,0-14 449,-3 4 180,11-20 270,-11 11 90,6-28 0,-8 28 0,-1-32 270,-2 31 449,1-32-719,-3 17 810,1-10-271,-3 12-629,-2 22 0,-1 15 0,-1 16 0,0-6-90,0 9-539,0-15-900,15 10 629,-11-14-539,24 2 1439,-24-11 0,25-2 0,-11-3 0</inkml:trace>
+  <inkml:trace contextRef="#ctx0" brushRef="#br0" timeOffset="38885">32795 7270 10591,'0'-6'899,"-17"2"-539,13 0-360,-24 3 0,26 18-899,-9 3-361,11 20 451,0-3-91,20-7-449,-15-3 1349,32-11 0,-32-8 0,12-2 0</inkml:trace>
+  <inkml:trace contextRef="#ctx0" brushRef="#br0" timeOffset="39108">32357 7049 11760,'27'13'0,"18"-9"-539,-15 24-361,9-25-1345,-1 27 986,-15-18-346,-2 15 1605,-9-4 0,7 2 0,-5 2 0</inkml:trace>
+  <inkml:trace contextRef="#ctx0" brushRef="#br0" timeOffset="39244">32318 7790 10861,'0'3'0,"0"0"0</inkml:trace>
+  <inkml:trace contextRef="#ctx0" brushRef="#br0" timeOffset="39859">29218 8494 11131,'-23'39'719,"-7"-17"-719,27 14 0,-9-19 0,12 19 0,-10 6 0,8-9-270,-8 9 90,10-14-179,18-4 269,-13-2 90,29-3-270,-29-3-90,33-3 180,-9-5 90,11-4 90,12-3 90,-23-19 0,16-7 90,-22-10 180,2 0 539,-11-2-629,-7 10-90,0-6 0,-6 13-180,1 29-540,-2 3-89,0 32-181,19-12 91,-14 1-1440,30-5 2159,-9-9 0,10-2 0,3-10 0</inkml:trace>
+  <inkml:trace contextRef="#ctx0" brushRef="#br0" timeOffset="40370">29975 8601 10141,'-35'0'720,"16"14"-720,3 2 0,16 19 0,0-8 0,21 2-90,2 2 0,2-9 90,9 6 0,-30-10 0,26-2-90,-26-3 180,17-2-90,-19-2-180,6-2-270,-8-3-179,-24-2 179,2-17 270,-21-1 180,23-16 0,4 4 0,33 0 0,14 4 0,11 11 0,8-1-941,-9 13 1031,1-9 0,-1 8-178,16-7 357,-16 4-89,9-4 349,-13-2-259,-15 0 270,0-11-91,-17 8 91,-2-9-180,-3 10 643,-19-2-1093,14 6 475,-14 2-385,0 2 12,2 2-12,-4 18-90,1-11-90,18 27-90,-6-6-629,8 16 89,20-6 271,-16-4-901,32-12-449,-14 2 1889,19-11 0,-10 0 0,0-10 0</inkml:trace>
+  <inkml:trace contextRef="#ctx0" brushRef="#br0" timeOffset="40652">30598 8632 10771,'-19'-24'809,"14"6"-719,-14 28-90,19 6 0,14 26 0,-10-12 0,10 1 0,-2-11 450,-9-1 0,17 1-360,-18-5 0,6-23-90,-8-13-90,0-19-90,-17 0-90,13 6 0,-12 0-90,16-2-1079,0-14 630,0 15-1170,0-19 450,21 30 1529,-16-5 0,33 16 0,-17 2 0</inkml:trace>
+  <inkml:trace contextRef="#ctx0" brushRef="#br0" timeOffset="40918">31000 8260 10771,'15'0'1529,"4"0"-1079,2 0-90,5 0-91,1 0-89,2 0 0,0 14-90,16 5 0,-15 9 0,10 2 0,-15 13-90,-8-7 45,-9-1 0,-3 1 45,-1 12-405,-16-5 0,-3 0-623,9 12-52,-33-8 1,-6 0-1424,26-18 1,-1-1 2412,-25 10 0,-4-2 0,15-9 0,2-2 0,-4 1 0,0 0 0</inkml:trace>
+  <inkml:trace contextRef="#ctx0" brushRef="#br0" timeOffset="56521">12972 2564 8972,'0'-16'1259,"0"-2"-899,0 1-90,0-1 0,6 1 179,-5-1 1,9-3-90,-5 6-180,3-3 90,-1 8-90,-3 0-1,1 3 541,-3 2-720,1 23 0,-3-1 0,0 23 0,0-6 0,0 7 0,0 8 45,0-10 0,0 0-135,0 23-983,0-9 1,0-1 892,0 5 135,0-20 1,0-2-277,0 8 231,0-6 0,0-4 0,0-4 90,0-8-90,0-3-990,0-4 990,0-53 90,0 19 0,0-20 0,0-2 0,0 4-89,0-24 89,0 30 1952,14-11-1862,-10 24 180,23 3-117,-11 10-63,15 6-180,-8 18 0,10 1-90,-12 2-269,5 11-1800,-1-11 900,-5 8 1349,12 5 0,-13-17 0,4 5 0</inkml:trace>
+  <inkml:trace contextRef="#ctx0" brushRef="#br0" timeOffset="56857">13462 2959 9871,'15'17'900,"-11"-18"-900,29-2 0,-28-25 0,32 24 0,-32-27 0,30 17 0,-32-15 90,23 6 90,-24 1 0,8-2-90,-10 2-90,0 1 179,0-6-179,-19 9 270,0-3-90,-18 14-180,4 2 90,14 29-180,-7 5 180,16 14-270,-2 14-180,5-21-1169,7 26 450,21-26 89,-15 5 990,36-7 0,-10-15 0,22 4 0</inkml:trace>
+  <inkml:trace contextRef="#ctx0" brushRef="#br0" timeOffset="57218">13900 2854 9602,'-17'17'449,"-3"-12"-449,18 25 0,-6-12-180,8 11 0,0 1 1,18-15-271,-13 2 270,31-16 180,-20 5 90,15-25 90,-9-3 270,-4-22-271,-9 10 181,-1 0-90,-7 11 180,2 3 89,-3-1-628,0 30 89,0 5-180,0 31-360,18-12-180,-14 0-1169,27-13 990,-7 2 899,6-12 0,7 1 0,-9-11 0</inkml:trace>
+  <inkml:trace contextRef="#ctx0" brushRef="#br0" timeOffset="57452">14498 2384 9422,'-17'-23'1529,"13"2"-1169,-13 5-360,17 3 1259,-11 3-1259,8 23 0,-8 14 0,11 16 0,0 10 45,-3-18 0,0 1-135,2 23-90,-3-7 0,2 0-360,2 9-771,0-12 0,0-2-218,0 4 0,19 9 1529,-14-26 0,30-5 0,-16-2 0</inkml:trace>
+  <inkml:trace contextRef="#ctx0" brushRef="#br0" timeOffset="58185">14323 2657 9871,'0'-5'1350,"-14"1"-1171,-3 3-179,-11 19 0,-7 30 0,19-7 0,-4 19-1259,37-7 270,-12-19-136,10-3 1,5-3 1124,8-5 0,9 4 0,3-13 0</inkml:trace>
+  <inkml:trace contextRef="#ctx0" brushRef="#br0" timeOffset="58583">14613 2907 9602,'32'0'269,"-13"-16"-269,5 12 180,-11-39-90,7 36 90,-8-35 540,0 19-630,-11-2 90,5-5-180,-6 19 0,-17-1 0,13 5 179,-12 4-89,4 0-180,9 17 180,-9 7-180,12 20 180,0-7-449,0 3-181,0-12-899,20 7 629,1-10-1079,19 8 1889,-9-15 0,-3-3 0,-8-8 0</inkml:trace>
+  <inkml:trace contextRef="#ctx0" brushRef="#br0" timeOffset="58891">14963 2741 10141,'0'34'540,"13"3"-450,-10-12 0,10 3-90,-2-8 0,-8-1 0,8-1 90,-5-2 180,-4-2-1,5-2 91,-1-1-180,-5-4-180,5-19-90,-6-8 180,0-13-90,0 0 0,0 4-450,0-14 91,0 8-901,0-17 451,0 24-181,16-2-89,-13 15 1079,24 7 0,-24 2 0,8 4 0</inkml:trace>
+  <inkml:trace contextRef="#ctx0" brushRef="#br0" timeOffset="59172">15485 2690 8612,'-14'-18'360,"10"4"-360,-10 3 0,14 7 0,0 1 0</inkml:trace>
+  <inkml:trace contextRef="#ctx0" brushRef="#br0" timeOffset="59769">15493 3111 11400,'0'6'1170,"0"-1"-1080,0-2-90,0 0 0,11-2 0,2-1 0</inkml:trace>
+  <inkml:trace contextRef="#ctx0" brushRef="#br0" timeOffset="60685">16753 2192 12120,'0'35'450,"0"-3"-450,0 0 90,0 1-90,0 2 0,0 7-470,0 1 470,0 4 0,0 0 0,0 1-90,0-1 180,0-2-180,0-4 90,0-3 154,0-5-244,0 5 0,0-14-102,0 2-77,0-16-541,0-4 720,0-25 418,0-8-328,0-14-90,0-14 90,19 22 90,-15-11-180,35 10 450,-12 18-271,10-13 91,7 27 0,-12-8 0,-3 26-180,-4 7 0,-16 21 0,-2 3 0,-7-8 0,-16 5 0,13-22-180,-27 5-269,26-13-1350,-24-3-630,8-3 2429,-12-4 0,12-1 0,6-3 0</inkml:trace>
+  <inkml:trace contextRef="#ctx0" brushRef="#br0" timeOffset="61037">17227 2715 8522,'14'11'990,"4"-2"-900,9-9-90,-11-12 449,6 8 1,-10-20-270,9 11 90,-7-11-270,-6 3 0,-5 6 0,-3 5 90,0 4 0,-20 2 90,15 1-180,-30 1 0,31 16 0,-21 5 0,22 18-360,-7 4-90,10-7-1259,19 7 1079,-15-19-719,30 6 1349,-30-13 0,32-1 0,-11-3 0</inkml:trace>
+  <inkml:trace contextRef="#ctx0" brushRef="#br0" timeOffset="61523">17775 2562 9871,'-36'0'810,"-3"0"-720,11 16-90,0-12 0,10 26 0,3-27-90,7 27 90,2-10-180,6 9-270,0 1 270,21-14-89,-15 1 269,34-8 0,-18-5 89,16 0-89,-4-4 90,-16-14 0,2 10 270,-13-27 0,2 12-270,-4-13-270,-5 7 180,0 28-270,0 6-90,0 25-809,14 1 449,-11-7-89,22-10-270,-23 0 1079,19-16 0,-18 14 0,7-8 0</inkml:trace>
+  <inkml:trace contextRef="#ctx0" brushRef="#br0" timeOffset="61818">17982 2608 9242,'0'9'1799,"0"3"-1709,0 20-90,0-6-90,14 2 180,-11-7-90,11 2-90,-14-2 90,0 0 90,8-3 0,-5-1 179,5-5 1,-8-1-180,0-5-90,0-20-180,3-9 0,1-14-269,3-2-91,-1 7-180,1-1-179,2-2-1080,5-10 1979,0 13 0,3-5 0,-2 17 0</inkml:trace>
+  <inkml:trace contextRef="#ctx0" brushRef="#br0" timeOffset="62384">18330 2749 8252,'4'0'1889,"-2"0"-1889,16 0 90,-9-11-90,-3 9 90,-1-9-90,-1 11 0,0 0 90,-1-7 90,1 5-180,-3-10 0,1 4 0,-2-2 0,18-2 0,-13 2 0,13-1 0,0 0 90,-1-7 180,4 5-180,3-9 180,-14 8 269,3-9-359,-6 8-180,-7-2 90,0 7-90,0 1 0,0 2 0,0-1 0,-17 4 0,-5 18-90,-10 7 180,4 24-270,15-10-180,5 2 1,8-12-1081,0 9 631,0-11 89,17 7 1,-13-14-271,12 0 990,4-6 0,-15-1 0,15-4 0</inkml:trace>
+  <inkml:trace contextRef="#ctx0" brushRef="#br0" timeOffset="62685">18645 2594 10591,'0'30'90,"17"2"-180,-13 1 270,13-6-270,-5 0 90,-9-11 0,9 1 0,-5-4 180,-6 1 359,6-3-269,-7-2-180,4-2 0,-1-6-180,3-17 180,-1 11-180,3-32 0,5 1-180,2-9-180,-2 11 1,1 0-91,4-7-1115,7-11 665,-8 22-359,-1 4 1349,0 5 0,-1 5 0,-1 4 0</inkml:trace>
+  <inkml:trace contextRef="#ctx0" brushRef="#br0" timeOffset="65501">20423 2204 10951,'-17'15'2159,"3"3"-2159,14 14 0,0-1 0,15-2 0,-11 3-540,22 21 90,-23-12-270,7-5 1,0 0-544,-7 6 274,14 9 67,-15-18-68,11-5 990,-11-3 0,9-6 0,-6-2 0</inkml:trace>
+  <inkml:trace contextRef="#ctx0" brushRef="#br0" timeOffset="65652">20348 2569 8882,'-10'-23'180,"2"5"-180,8 7 0,0 4-90,0 3-1079,26 1 449,10 1-539,14 0 1187,4 1 1,-13 0 0,4 1 0</inkml:trace>
+  <inkml:trace contextRef="#ctx0" brushRef="#br0" timeOffset="65923">20980 2444 9062,'-44'0'1529,"-1"0"-1259,5 17-270,2 0 0,10 21 90,13-12-90,8 2 0,7-9 0,0-1 0,20-1 0,-15-2 0,39-2 0,-11-6 0,12-4 90,-1-3 0,0-14-90,-14 10 0,5-27 0,-17 6 0,-9-21-180,-2 8-900,-24-11 181,-7 21-1,2-6 900,-18 9 0,17 9 0,-20-4 0</inkml:trace>
+  <inkml:trace contextRef="#ctx0" brushRef="#br0" timeOffset="66185">21437 2062 12390,'0'33'180,"0"-5"-270,0 6 270,0-3-270,14 5 90,-11 3-450,11 4 180,-14 1-449,9 3-1350,-1 17 1079,3-15 990,-2-10 0,1-1 0,-1 1 0,10 10 0</inkml:trace>
+  <inkml:trace contextRef="#ctx0" brushRef="#br0" timeOffset="66385">21703 2295 9242,'-18'-4'1259,"-1"1"-1259,-17 3 0,7 16 0,12 7-90,-2-2-270,17 19-359,-4-22-1,6 20-1529,17 1 2249,-13-9 0,34 6 0,-12-14 0</inkml:trace>
+  <inkml:trace contextRef="#ctx0" brushRef="#br0" timeOffset="66689">21858 2545 9871,'16'-5'90,"3"-5"0,1 6-90,13-11 0,-13 6 90,2-4 180,6-1-270,-25 1-90,16-7 180,-17 7 0,5-3 90,-7 5-180,-18 1 180,-1 0-90,-17 5-90,6-1 0,11 22 0,-2 7 0,19 21-360,-7-6 0,9 2-449,20-13-721,2 10 721,2-12 809,15 8 0,-11-21 0,23-2 0</inkml:trace>
+  <inkml:trace contextRef="#ctx0" brushRef="#br0" timeOffset="67021">22243 2425 10411,'0'38'90,"0"-6"-90,0-3 0,0-6 90,14 11-90,-10-11 180,18 12 270,-20-18-450,6 0-90,-8-30 180,0-8-180,0-13 270,0-15-180,0 21 0,16-19 0,-12 22 0,25 4 0,-15 12-90,3 24-90,4-11-1170,-4 42 181,4-26 1169,6 40 0,-9-29 0,5 11 0</inkml:trace>
+  <inkml:trace contextRef="#ctx0" brushRef="#br0" timeOffset="67193">22868 2608 7443,'0'0'0</inkml:trace>
+  <inkml:trace contextRef="#ctx0" brushRef="#br0" timeOffset="117942">3353 11263 7173,'-4'26'-720,"0"-4"720,23-9 0,-15-6 0,15-4 0</inkml:trace>
+  <inkml:trace contextRef="#ctx0" brushRef="#br0" timeOffset="118103">3960 10873 9781,'0'-24'1530,"0"2"-1081,-20-1-449,-5 9-90,-18-3 90,19 11 0,-7 1 0,27 22 0,-9 4 0</inkml:trace>
+  <inkml:trace contextRef="#ctx0" brushRef="#br0" timeOffset="119004">3657 10961 10411,'0'-7'1079,"-17"1"-899,12 2 180,-26 2-90,8 2-270,-20 20 90,-6 8-90,9 12 0,17-12 0,3 0-702,5 8 702,-8 12 90,22-15-581,-6-3 491,7 0-51,24 3 51,-18-11 0,54 0-90,-36-15-500,32-4 590,-22-22 0,0 14 90,-1-39-90,-1 23 0,-3-23 0,-3 10 89,4-17 271,-10 11-45,-8 8 0,0 0-45,-2-4 0,-2-7 445,-5 19-805,-3 7 580,0 2-130,0 7-217,0 22-53,0 9-90,0 13 0,0 1-90,17-9 180,-13 2-180,24-2 180,-11 7-180,7-12 306,9 5-306,-11-15-270,19-6 270,-15-2 0,10-24 0,3-7 90,-11-11 0,-5 11 0,-2 1 90,-1-8 180,2-21-180,-16 25 0,-3-6 0,-3 17 540,0 2-630,-14 9 0,10 20 0,-11 13 0,15 11 0,0 2 90,0-11-900,21 13 180,0-12-1259,20 12 91,-20-21-91,16-4 1889,-19-6 0,17-9 0,-7 3 0</inkml:trace>
+  <inkml:trace contextRef="#ctx0" brushRef="#br0" timeOffset="119436">4653 10800 9152,'-17'0'1529,"4"0"-1259,3 0 359,4 16 181,2-12-540,1 29 269,0-12-359,2 10 180,0 13-270,1-14-90,0 11 0,0-10 0,0 2-180,0-3-1259,13 16 360,-10-14-2339,18 16 3418,-19-23 0,15 3 0,-8-13 0</inkml:trace>
+  <inkml:trace contextRef="#ctx0" brushRef="#br0" timeOffset="119686">5125 10479 11400,'0'-5'3059,"0"21"-3059,0 10 90,0 14-90,0 4-270,0-7-180,16 4-359,-13 1-575,13 1 305,-6-1-540,-7 0-180,16-4 1799,-17-2 0,19-3 0,-6-1 0</inkml:trace>
+  <inkml:trace contextRef="#ctx0" brushRef="#br0" timeOffset="120026">4937 10958 11400,'-2'-26'1080,"25"11"-900,-17-9-180,39 21 0,-40-23 0,42 18-90,-27-9-1080,43 7-89,-23 3-270,-5 5 0,1 0 1433,8 0 0,11 2 0,-14 0 1</inkml:trace>
+  <inkml:trace contextRef="#ctx0" brushRef="#br0" timeOffset="120307">5757 10907 11940,'-31'0'1349,"13"14"-1079,-7-11 0,22 30-270,-18-5 90,18 10-180,-6 1 180,9-10-90,0-2 0,22 5 0,10-12-90,14-2 45,-11-14 0,-1-3-45,15-1 0,-6-5 0,0-5 90,7-20-708,-18 12 0,-2-2 618,3-29-90,-8 11-134,-11-4 134,-7 2-180,-7 1-90,-23 2-1528,-17-8 448,-14 16 1530,11 12 0,0 3 0,-15 5 0,21 7 0,0-1 0</inkml:trace>
+  <inkml:trace contextRef="#ctx0" brushRef="#br0" timeOffset="123436">8108 10652 12480,'0'39'360,"0"-6"-270,0 0 0,0-4 0,0 2 89,0 1-179,0 0 90,0-4-90,0-1 270,0-5-90,0-3 0,0-4 0,0-4 0,0-4-180,0-21-90,0-13 0,0-29-270,0 8 0,0 13 1,0 1-271,0-6-270,0-8-719,15 19-360,-11 7 1979,11 3 0,2 6 0,6 1 0</inkml:trace>
+  <inkml:trace contextRef="#ctx0" brushRef="#br0" timeOffset="123770">8460 11028 9871,'24'-34'720,"5"-3"-630,14 10 180,-17-1 0,9 7 89,-19 1-89,9 1 270,1-5-270,-16 8 0,8-4-360,-12 11 180,-26 2-90,1 20-90,-19 7-360,8 23-90,13-8-1439,5 17 630,12-22 1349,20 19 0,-14-24 0,14 7 0</inkml:trace>
+  <inkml:trace contextRef="#ctx0" brushRef="#br0" timeOffset="124153">9243 10775 11400,'-48'0'990,"10"0"-990,-2 18 0,14-14 0,0 33 0,12-21 0,-9 32-180,20-18-180,-10 12-269,33-6 179,-14-11-90,40 9 540,-14-24-90,26 4 360,-14-13-665,-6 2 934,-15-19-179,1-8 180,-3-22-180,-7 5 269,-5-16-359,-9 23 90,0-15-360,0 26 270,0 0-180,0 36-90,0 33-360,0 3-225,0-3 1,0 0-836,0 6 700,0-16 1,0 0-990,0 14-360,0 0 2069,0-4 0,0 1 0,0-3 0</inkml:trace>
+  <inkml:trace contextRef="#ctx0" brushRef="#br0" timeOffset="124605">9505 11123 10411,'2'-16'1259,"0"-1"-1079,1-1 0,3-3 0,1-1-90,6-5 0,1 1 90,4-2-90,0-1 180,10-11-1,-8 9 1,13-14-270,-18 23 180,4-7 180,-12 21-270,0-1 0,-6 24-180,2-12 90,-2 31 90,2-16-180,5 35 90,-3-18-360,13 27 180,-5-28-359,19 13 449,-10-26-90,10-4 0,3-11 180,-8-6 90,17-24 0,-20 18-585,4-44 495,-14 28 0,-2-25 360,-7 12 0,0 1-270,0-8-45,-2 6 0,-2 1 134,-1 12-89,0-1-629,0 81-91,0-27-315,8 20 1,0 2-945,-4-11 1889,14-8 0,3-1 0,-3 2 0,20 8 0</inkml:trace>
+  <inkml:trace contextRef="#ctx0" brushRef="#br0" timeOffset="124953">10580 10888 10411,'6'12'900,"7"-9"-900,40 9 0,-11-12 0,0 0 0,-12 0 0,-5 0 89,-1-13 181,-3-3 180,-9-13 270,-2-1-540,-10 0-180,-20 3 90,-5 7-1,-14 10-89,2 23 0,8 12 0,12 10 0,-1 4 90,17-9-899,-6 18 179,7-12-1888,24 20 809,7-28 1451,16 4 1,1-16 0,-8-3 0</inkml:trace>
+  <inkml:trace contextRef="#ctx0" brushRef="#br0" timeOffset="125244">11455 10659 11131,'-38'-1'1799,"2"1"-1709,5 20 0,14 3-90,6 12-90,11-2 180,0-7-180,0 4 90,23 13 90,-18-8-90,35 10 89,-22-1-89,2-13 0,4 15 0,-21-24 0,7 6-179,-10-16-181,-26 1 0,20-9-270,-47-1-89,32-3-1170,-37-14 989,26 10-1511,-12-45 2411,30 22 0,1-33 0,13 17 0</inkml:trace>
+  <inkml:trace contextRef="#ctx0" brushRef="#br0" timeOffset="125420">11730 10421 11760,'15'-1'3059,"-6"15"-2880,-3 7-179,-6 22 0,0-4 0,0 5 0,0-8 0,0 2-1079,0 17 180,0-11-1,19 12-1798,-1-3 719,4-14 1906,7 8 0,-25-17 0,11-3 0</inkml:trace>
+  <inkml:trace contextRef="#ctx0" brushRef="#br0" timeOffset="125604">11787 10638 11580,'-21'-18'810,"-1"3"-810,4 7 0,0-1 0,6 7-1799,3-2-630,27 19 900,18-11 1529,12 30 0,10-29 0,-12 13 0</inkml:trace>
+  <inkml:trace contextRef="#ctx0" brushRef="#br0" timeOffset="126136">7537 11771 11490,'46'22'2249,"-3"-5"-1709,17-5-3773,0 0 3503,-22-9 0,2-1-181,8 1 1,4 1-45,9-2 0,5-1-764,-17-1 0,3 0 0,0 0 719,8 0 0,2 1 0,2-2-23,-13-2 1,0 0-1,3-2 1,5 1-157,-1 0 1,5 0 0,3 0 0,2 0-1,-2 0 1,-3 0 196,3 0 0,-5 0 0,1 1 0,3-1 0,6-1-150,-17 0 1,4 0 0,4-1 0,2 0 0,1 0 0,0 0-1,0-1 1,-2 2 0,-3 0 0,-4 0 101,12 1 0,-4 1 0,-2 1 0,-1-1 0,1 0 0,4 0-68,-6-1 1,1-1 0,2 1-1,2-1 1,-1-1 0,0 1-1,0 1 1,-1 0-83,-2 0 0,0 0 0,0 1 0,-1-1 0,0 1 0,-1 0 1,-1 0-1,-2 1-15,4 0 0,-2 0 0,-1 0 0,-1 1 0,2-1 0,1 0-37,1 0 1,2 0 0,2-1 0,0 0 0,-1 0 0,-3 1-1,-4 0-285,12 0 0,-4 0 0,-3 0 0,0 1 517,-3 1 0,0 0 0,-1 0 0,-2 0 0,13 0 0,-3 0 0,0 0 0,-3 0 0,-1 0 0,0 0 0</inkml:trace>
+  <inkml:trace contextRef="#ctx0" brushRef="#br0" timeOffset="127708">13673 10040 11850,'-17'43'2429,"-2"17"-2069,-2-8-1116,3-16 1,1 0 845,-1 26-90,1-26 0,-3 2 0,-3 22 0,1 2 0,5-14 0,-1 2-300,0 7 0,-1 5 0,3-5-401,0-3 1,3 1 220,0 6 0,0 5 1,2-4-106,2-5 0,2 0-614,1 6 0,1 5 0,1-4 961,2-6 0,0-1 0,2-9 0,0 2 0,0-3 0,0 3 1,0-1-1</inkml:trace>
+  <inkml:trace contextRef="#ctx0" brushRef="#br0" timeOffset="128074">14637 10476 11400,'0'-9'2519,"0"3"-2249,0 19-90,-16-10-180,12 43 0,-11 6 0,15 14-360,0-12 0,0 0-255,0-20 0,0 2-240,0 24 1,0 1-743,0-24 1,0-2 831,0 10 0,0 0 765,0-4 0,0-2 0,0 17 0,0-22 0,0 0 0</inkml:trace>
+  <inkml:trace contextRef="#ctx0" brushRef="#br0" timeOffset="128220">14262 11093 10051,'-22'-37'180,"5"1"-90,8 5-90,5 1 0,27-6-180,-17 12-630,31 5 1,9 4-270,-3 2 815,5 5 1,3 1 0,-16 5 0,-2 0-1,4 0 1,-1 1 0</inkml:trace>
+  <inkml:trace contextRef="#ctx0" brushRef="#br0" timeOffset="128556">15103 10923 11221,'-19'10'1169,"14"-1"-1079,-14-3 90,6 1-180,9 8 90,-9-1-90,13 9-90,0 7 180,18-4-180,5 20 0,-1-18-180,4-5 0,1 0-90,-5 1 90,28 4-179,-7-7 359,-11-9 0,20 0 90,-24-9 180,12-24 90,-20 16 179,1-37 1,-11 24-180,-3-6 270,-4-10-540,0 15 359,-3-13-449,0 33 90,0 17-449,0 18-271,0 1-1439,0 5 630,0-9 1529,14 14 0,-10-30 0,11 1 0</inkml:trace>
+  <inkml:trace contextRef="#ctx0" brushRef="#br0" timeOffset="128770">15115 10737 10231,'-4'-11'1709,"1"2"-1259,3 2-270,21 3-90,9 2-270,11 1-450,14 1-359,-21 17-540,6-13-360,-15 36 1889,-12-18 0,5 22 0,-8-5 0</inkml:trace>
+  <inkml:trace contextRef="#ctx0" brushRef="#br0" timeOffset="128921">15172 11857 10771,'0'15'360,"0"-3"-720,0-2-2429,22-6 549,12-1 2240,17-20 0,6 13 0,-6-13 0</inkml:trace>
+  <inkml:trace contextRef="#ctx0" brushRef="#br0" timeOffset="129372">16405 11119 11221,'-21'-6'1529,"-2"2"-1349,-17 16-180,8 11 0,15 9-45,10 4 0,4 1 45,3 6-90,11 0 0,2-1-90,-7-3-90,15-10 0,5-3 180,5-2-135,3-10 0,3-7 225,13-18-45,-14-4 1,-3-5 133,-2-23-2215,-8 2 1,-3-2 2125,1-16 0,-9 17 0,-2 0 674,-2-23-584,-5 31 0,-1 0 45,-1 0 0,0-2 224,-1-17 1,0 0-180,1 14 0,-2 0 180,-9-26 0,0 1-270,8 30 0,-1 1-90,-14-14 0,0 4 0,14 4 359,-10 1 1,5 26-360,5 27 0,-5 5 0,8 24 0,0-9 0,0 1-90,0 26-1080,0-3 0,0 2 945,0-22 0,0-1 0,0 12 1,0 0 893,0-15 1,0-2-1300,0 32-180,0-5-224,0-21 0,0-1-46,0 14 1144,-7-16 1,-2-2 0,5-5 0,-12 3 0</inkml:trace>
+  <inkml:trace contextRef="#ctx0" brushRef="#br0" timeOffset="129503">16363 11151 9871,'-2'-36'270,"-1"3"-360,20-11 0,-12 13-135,19 9 1,4 1-316,-3 4-180,11 6 1,3 4-541,4 3 1084,15 2 0,-15 2 1,-1 0-1</inkml:trace>
+  <inkml:trace contextRef="#ctx0" brushRef="#br0" timeOffset="129773">17067 11055 11580,'-41'0'900,"6"0"-900,14 20 90,-1-15-90,19 38 0,-7-25 0,10 38-90,0-20 0,0 14 90,25-17-784,-19-1 694,47-3-180,-12 1 180,11-11 135,-16-10 0,-1-2-225,2-3 180,19-21-180,-32 13-90,-2-39-449,-16 5 359,-6-13-270,-10 16 0,-1 0-269,5-5 899,-13 7 0,-4 2 0,-3-2 0,-20-7 0</inkml:trace>
+  <inkml:trace contextRef="#ctx0" brushRef="#br0" timeOffset="130153">17408 11186 10411,'0'8'1259,"0"1"-1169,0 1 0,0 1-90,0 1 0,0 10 0,0-4 90,0 8-90,14-6 0,-10-1-90,10 1-90,-14 3 0,0-7-989,0 2 989,10-32 270,3-11-90,6-16 270,3-4-90,-4 10 90,2-3-90,-2 2-90,7-9 269,-10 16 541,10-2-900,-16 22-90,3 4 270,-8 20-270,0-11 90,2 48-360,0-27-270,1 11 1,2 1-451,4 3-584,10-2 0,4-2 1664,4-3 0,-3-11 0,2-5 0,6-9 0</inkml:trace>
+  <inkml:trace contextRef="#ctx0" brushRef="#br0" timeOffset="130453">18055 11158 10051,'-21'-11'810,"3"3"-900,-5 22 270,0-10-270,21 27-450,-8-8 180,36 18 1,5-2 403,-2-21 1,2-4 45,29 3-316,-14-7 766,-4-10 629,-20 0-179,3-19-810,-9 0-91,0-4-178,-11-2 89,-2 46 0,-3-2-360,0 26-810,-14 18 361,10-23-1224,-10 15 684,0-19-180,11-2 1600,-26-3 0,16-2 1,-14-3-1</inkml:trace>
+  <inkml:trace contextRef="#ctx0" brushRef="#br0" timeOffset="130654">16903 10761 10951,'22'-28'1169,"8"-4"-1471,12 8 392,0 0-90,-11 10-270,0 3-90,0 6-180,0 2-809,-2 3-990,-3 0 2339,-5 25 0,-11-5 0,-2 23 0</inkml:trace>
+  <inkml:trace contextRef="#ctx0" brushRef="#br0" timeOffset="130788">16883 12281 8612,'0'10'-480,"0"-3"0,0-5 1</inkml:trace>
+  <inkml:trace contextRef="#ctx0" brushRef="#br0" timeOffset="131358">20195 11014 11490,'0'-24'900,"-19"-4"-540,-7 14-90,-26-2-360,7 13-1095,-5 17 1275,13-10-180,2 38 180,3-19-135,18 10 0,3 3 45,-12 11-225,16-6 0,5 0-225,14 6 90,1-11 1,6-3-1,25 0 0,6 1 360,-9-23 0,-3-5 221,1-6-221,-4 0 0,-3-16 180,-4 12 359,-6-48-179,-2 30-45,-12-10 0,-3-2-45,3 3-90,-4-18-180,-4 22-360,-14 7-720,10 30 807,9 17-2605,17 27 2878,0-13 0,18 1 0,-11-14 0</inkml:trace>
+  <inkml:trace contextRef="#ctx0" brushRef="#br0" timeOffset="131759">20743 11158 10231,'-39'-11'2249,"-2"3"-2249,2 24 0,3 12 0,13 8 0,1 6-90,20-9 180,-6 2-90,8-1-180,0-2 0,20-2 0,-16-3-90,36-6 0,-14-5 181,12-9-91,-1-2 180,-9-23 0,-1-1-90,1-19 90,-3 1 45,-7 5 0,-1-2-45,5-20-595,-6 4 1,-2-2 774,-4-12 135,-5 8 0,-1 0-135,-3 21 0,-1 2-1,0-11 1,0 0 90,2 3 0,-4 2-270,-15-17 0,15 16 0,-1 4 270,-15 5 180,7 2-360,8 39-180,-8 6 90,11 21 90,0 1-135,0-4 0,0 3-315,0 21-315,8-3 1,1 0-1350,-4 11 1304,12-23 0,0-1-1079,-13 14 1799,28-3 0,-18-4 0,14-2 0</inkml:trace>
+  <inkml:trace contextRef="#ctx0" brushRef="#br0" timeOffset="132170">21430 10960 11131,'-18'-13'1529,"14"4"-1079,-35 4-271,10 4-89,-22 16-90,10 11 0,4 10 0,7 22-180,16-17 180,3-6 0,1 0 90,9 6-359,15 18 269,16-30-180,28 2 90,-8-22 180,7-3-90,0-32-90,-12 5 135,-11-11 0,-3-4-707,3-10 662,-13 13 0,-3-1 0,2-20 90,-5-3 90,-7-2 90,-3-4-90,-5 1 270,0-2-226,1 23 1,-2 0-225,-16-16-45,15 17 0,-1 4 405,-14 7-270,3 2-90,10 50 90,-11-1-180,15 32 180,0-7-360,0-5 0,0 2-372,0-10 1,0 2-484,-2 27 1,4 1-303,6-24 0,1-3-102,-8 14 0,2-1 1529,12-16 0,-1-2 0,-11 35 0,9-4 0</inkml:trace>
+  <inkml:trace contextRef="#ctx0" brushRef="#br0" timeOffset="132460">22870 10855 12300,'-42'-12'1259,"-11"1"-1169,15 5 180,-17 3-270,27 23 0,-5-15-90,13 44 0,3-25 90,1 27-809,5 8 179,5-13-360,13-8 1,3-1-360,-6 3-292,41 7-68,-23-21 1709,25-7 0,-8-5 0,3-3 0</inkml:trace>
+  <inkml:trace contextRef="#ctx0" brushRef="#br0" timeOffset="132970">23172 10989 10861,'-19'-6'1709,"15"-5"-1439,-36 10-90,18-5-180,-4 21-90,-3-11 0,25 29 90,-19-6 90,21 9-540,-8 13 270,10-22-360,23 14 1,0-22 269,22 3 90,-9-15 270,-3-1-90,-16-24 180,2-4 0,-17-20 269,10 10-359,-8-8 270,1 16-360,-2 18 0,-3 18-90,15 28 180,5-4-180,16 11-270,-3-21-482,-2 6 482,-3-21 180,-1 6-180,2-14 270,-1 7 0,1-10 180,-2 0-90,7-17 0,-10-8 720,9-23-181,-19 8-179,0-1 0,-9 13-90,-2 2-90,0 4 270,-3 1-450,0 33-90,0 9-180,0 22-270,0 0-269,0-11-2070,0 12 1080,20-14 1799,-16 6 0,28-25 0,-16-3 0</inkml:trace>
+  <inkml:trace contextRef="#ctx0" brushRef="#br0" timeOffset="133121">23882 10800 10141,'-14'-6'-809,"10"0"89,-10 4 720,14-1 0,0 2 0,0 0 0</inkml:trace>
+  <inkml:trace contextRef="#ctx0" brushRef="#br0" timeOffset="133304">23892 10001 12120,'-23'-30'900,"-11"3"-721,16 14-89,-9 5-180,-7 47-449,14-8-2012,0 16 0,1 6 1022,8-20 0,1 0 1529,-5 15 0,0 1 0,7-11 0,1 0 0,0 0 0,0 1 0</inkml:trace>
+  <inkml:trace contextRef="#ctx0" brushRef="#br0" timeOffset="133670">25858 10394 11400,'-3'48'1889,"0"-8"-1709,3 6-683,0-8 503,-21 7 0,16 2 0,-13-9 0,-3 0-90,-2 21-630,2-8 1,0 1-270,-2 9-406,5-10 1,5 0-315,10 5 1456,-7-22 1,-1 0 0,9 7-1,-7-3 1</inkml:trace>
+  <inkml:trace contextRef="#ctx0" brushRef="#br0" timeOffset="133839">25293 10956 10501,'0'-25'90,"26"1"-90,-1 5 0,26 0-1495,-1 3 1315,7 4-270,-8 4 1,2 2 134,-12 2 0,2 2-75,4-1 0,5 1 1,-4 1 29,-5 0 0,0 1 360,26-1 0,-1 2 0,-28 5 0,-2 1 0,10 2 0,-1-1 0</inkml:trace>
+  <inkml:trace contextRef="#ctx0" brushRef="#br0" timeOffset="134087">26402 10866 10951,'-62'0'1169,"11"0"-989,6 14-90,12-11 0,2 25 0,3-25-90,13 28 0,-8-17 0,20 28 0,-10-17 0,31 19 0,19-20-1505,10 6 1415,16-14 90,-10-2-90,4-5 180,-18-6 0,0-1-90,18 2-208,-17-2 0,-4-4 208,-10-16 0,8-4-90,-32-21-810,-21-2 91,-17 8-406,4 13 1,-2 2-225,-17-3 1439,17-5 0,1 10 0,11 3 0</inkml:trace>
+  <inkml:trace contextRef="#ctx0" brushRef="#br0" timeOffset="134328">27150 10354 10861,'0'15'3598,"0"13"-3508,0 14 0,0 9-90,0-8 0,0-6 0,0 2-615,0 21 570,-10-6 0,0 1-584,5 10-541,-12-2 1,0 0-180,13 0-405,-3-8 0,0-3 1754,7-11 0,0 8 0,0-22 0</inkml:trace>
+  <inkml:trace contextRef="#ctx0" brushRef="#br0" timeOffset="134526">27267 10855 11490,'-16'17'-90,"3"2"-359,8 2-271,4 14-179,-4-18-1,5 15-1618,0 2 2518,19-12 0,-14 7 0,14-12 0</inkml:trace>
+  <inkml:trace contextRef="#ctx0" brushRef="#br0" timeOffset="134954">27543 11044 9332,'7'6'449,"2"-1"-449,3-5 0,0 0 90,4 0-180,-1 0 90,6-14 0,-3 11-269,2-11 179,1-3 180,1 12-270,0-26 90,-2 28 90,0-25 180,-8 11-180,-3-12 0,-6 7 539,-24 1-179,16 12 180,-38 0-450,10 7 0,-12 2 180,-11 17-270,23 5 0,-4 22 0,24-8 0,4 2-360,9 3-90,23-11-629,7 19 449,14-24 90,-15-7 1,-1-1-181,9-2-179,11 0 899,-16-12 0,-2-1 0,0-2 0</inkml:trace>
+  <inkml:trace contextRef="#ctx0" brushRef="#br0" timeOffset="135270">27953 11009 9422,'0'-15'1529,"0"33"-1529,0 5 0,0 21 0,0-10 0,17-8 90,-12 2-180,12-1 90,-3-2 180,1 5-180,2-12-90,11 1 90,-18-14 0,15-2 0,1-27 0,-4 18 90,1-20 0,-1-5 0,7 10 89,-2-9 1,-1 0 0,4 2 90,8-6 0,-18 23 180,-2-8-180,-5 17-91,-1-9-269,-5 11-179,0 23-181,-6 9-180,0 15-1195,-1 3-1053,0-5 2878,0 2 0,0 2 0,0 1 0</inkml:trace>
+  <inkml:trace contextRef="#ctx0" brushRef="#br0" timeOffset="136470">29017 10946 12840,'51'18'0,"-7"12"0,6-27-495,-16 9 0,0 2-674,21 0-181,-5-1 1,0 1-1671,9 5 3020,-20-9 0,0-1 0,9 2 0,0 1 0</inkml:trace>
+  <inkml:trace contextRef="#ctx0" brushRef="#br0" timeOffset="136803">29222 10989 10051,'-10'-7'540,"-3"5"180,12-11-541,14 8 91,19-5-180,11 3-90,9 3-1136,-11 3 1136,8 1 0,-2 0-270,3 0 91,-3 0-271,-3 0 81,8 15 279,-17-11 90,3 22 90,-25-16-90,-27 3 0,-7 2 838,-5-9-568,-5 5-180,27-5 307,-25-1-307,26-1-180,-11 3 180,5 2 0,-1 12-180,-5-2-180,-5 23-450,5-12-405,0 0 1,-1 0-315,-5 11 1150,-8 15 1,7-15 0,0 1 0</inkml:trace>
+  <inkml:trace contextRef="#ctx0" brushRef="#br0" timeOffset="137395">30467 10462 10861,'-17'-17'180,"12"1"0,-25 5 1079,27 1-1169,-20 5-90,21 22 0,-7 3 90,9 25-90,-2-10 0,-1 2 0,2 29-1569,-2-4 1,1 3 1568,1-24 0,2 1 0,-1 5 0,0 4 0,0-5 0,0-4 0,0-2 0,0 14 0,0-1 187,0 13-97,0-4-180,0-7 90,0 11-90,-15-24-810,11 10 451,-11-34-901,1-3 721,1-32 359,-3-13 180,6-13 135,7 10 0,6-1 45,20-12 45,-9 8 0,1 0 1449,13-4-1224,-2 18 0,-4 1 180,-16 0 575,38 11-935,-22 5 0,14 7-180,-8 20 0,-13 10 0,1 27-90,-11-9 180,4 1-809,-2-2-1,-3-14-809,7 11 809,-3-25-1079,8-4 1799,-3-10 0,4-5 0,-2 0 0</inkml:trace>
+  <inkml:trace contextRef="#ctx0" brushRef="#br0" timeOffset="137710">30788 11249 9781,'0'-16'1170,"17"6"-1170,-12 17-90,26-5-270,-10 10 270,15-12 90,-3 0 0,-6 0 90,-12-14 90,-8-5 0,-23-10-90,13 1 180,-27 8 89,9 9-89,-13 6-270,-3 5 0,17 21 0,-7-15 0,24 39-90,-14-11-359,15 12-901,-5 18 541,7-26-1440,18 23 2249,5-29 0,-1 6 0,-3-16 0</inkml:trace>
+  <inkml:trace contextRef="#ctx0" brushRef="#br0" timeOffset="137926">31123 11204 10051,'0'11'1349,"0"7"-1349,0 13 0,0 2-449,-15 6-271,11-7-629,-12 22 539,16-23-1348,0 13 2158,0-21 0,18-1 0,4-11 0</inkml:trace>
+  <inkml:trace contextRef="#ctx0" brushRef="#br0" timeOffset="138641">31423 11232 10321,'0'-7'990,"-17"-1"-990,12 1 269,-27-4-179,29 5 180,-37 0-180,22 4 0,-22 2-90,15 0 0,-2 18 90,0-14-180,-11 48 180,11-31-90,-3 30 0,14-20 0,4 0 0,5 15-90,3-14 90,2 8-180,2-10 0,0-10 180,21 3 0,-16-15-90,47-2 90,-44-24-90,44-8 90,-38-13-45,5 10 0,2 1 45,-2-13 45,-4 3 0,-1-1-45,1-10 315,-3-5 0,-2-2-45,1-1-90,-5 4 0,-1 3-90,-3 9 179,-1-12-179,-1 33 360,0 1-450,0 31-90,0 14 0,0 32-90,0-5-225,0-11 1,0 0-136,0 11-315,0-7 1,0-1-643,0 6 148,16 13 1349,0-11 0,3-15 0,-7 9 0</inkml:trace>
+  <inkml:trace contextRef="#ctx0" brushRef="#br0" timeOffset="139587">31488 11197 8972,'-11'-11'1439,"8"-8"-989,-8 5-90,4-7 89,5 7-359,-10 0-90,8 2 90,-5 1 90,-1 2 0,-10 0-90,2 5 0,-24 0-90,14 21 0,-6 0 0,0 3 90,-2 19-135,5-6 0,2 0 45,8 4 90,3 27-180,12-26-270,28 22 270,-17-28-45,28-7 0,1-3 135,-23-6-270,52 3 270,-40-19-89,0-17-1,10 13 90,-29-32 0,21 32-90,-22-37 90,15 22 0,-16-20 180,8-5-1,-9 12 1,2-19-180,-3 26 0,0-5-180,0 16 810,0 5-630,0 23-270,0 9-449,18 27 89,0-8-1000,3 3 640,6-10 91,-23-3-270,25 1 1158,-25-2 0,25-3 0,-12-1 1</inkml:trace>
+  <inkml:trace contextRef="#ctx0" brushRef="#br0" timeOffset="140137">32012 11329 10861,'0'-5'360,"0"0"179,0-2-449,0 0 0,-13-3-90,10 2 0,-10 1 0,2 1-90,-6 1 180,-8 2-90,-3 2 0,4 1-90,-2 0 90,1 19 0,-6 6-90,12-1-180,0 29 180,13-34 90,4 26-269,24-17 269,5-10-90,25-2 90,4-30 90,-9 9-180,-1-36 90,-2 7 90,-11-9 0,-10 10 0,-1 0-1120,1-8 1120,-1-14 90,-11 16-262,-6 0 172,-2-1 270,-2-19 0,-1 13-91,1 7 1,-2 1 0,-14-5-90,11-11-270,-11 16 90,15 13 810,-11-1-810,8 35 90,-8 19-180,11 35 90,0 0-724,0-12 1,0 1 543,0-18 0,0-1 0,0 12 0,0 2-1031,0 0 1,0-2 940,0-11 1,0 0-676,0 21 1,0-1-46,0 2 476,9-21 0,0-1-1195,-4 15 1709,26-17 0,-27 3 0,10-19 0</inkml:trace>
+  <inkml:trace contextRef="#ctx0" brushRef="#br0" timeOffset="140421">32248 11564 11041,'5'-20'359,"2"-8"-269,-2 15 90,10-10-180,-1 8 0,15-1-90,-7 7 180,6-2-90,4 1 180,-8 2-90,14-7-90,-20 5 180,4-4 180,-12-2-180,-4 1 0,-2-12-90,-4 8-90,-17-6 0,-1 3 0,-2 7 0,-6-2-90,12 12 0,-9 0-180,10 27-90,5 7-180,8 13 181,0 1-991,0 3 721,0-10-1,20 7-629,1-7 719,3-11 540,5 1 0,-12-12 0,14-3 0</inkml:trace>
+  <inkml:trace contextRef="#ctx0" brushRef="#br0" timeOffset="140703">32638 11389 10141,'2'-33'1259,"-1"9"-1259,0-9 450,-1 16-270,2 4-180,1 7 90,3 27-180,0-16 270,1 38-270,1-7 90,-2 11 0,0-12 0,-1-2 0,0 9 0,4 22-90,-5-31 90,1 6 0,-2-16 0,0-12 0,2-24 0,-1-21 0,2 1 0,1-3 0,5-23-790,-4 25 1,2 1 519,9-17-270,-1 0-89,4 1-271,-6 18 1,0 2-181,8-12 1080,6-3 0,-13 24 0,-1 4 0</inkml:trace>
+  <inkml:trace contextRef="#ctx0" brushRef="#br0" timeOffset="141741">29033 12945 10681,'-27'21'360,"-15"8"-360,12 12-2282,-10 1 2282,2-6 0,13 1 386,12 3-386,-8-1-180,18-2-180,-8-2-270,33 2 540,-17-13-45,26-11 0,6-4 135,-7-3-90,4-2 1,2-5 89,6-19 0,-1 15 0,0-39 89,9 7 181,-16-10 225,-10 14 0,-3 0 134,-3-3 1,1-18-540,-13 30 708,-2-5-708,-4 36-90,0 13 0,0 13 0,0 1 0,0 1-90,0 4-90,9-2 0,1-3-180,-6-7 1180,33 4-1090,-20-23 549,17-2-279,2-54 90,-12 22 134,-8-14 1,-4-2 45,-2 6 90,-1-17-360,-6 27 540,0-4-540,-3 41-90,0 8 90,0 18-90,0 2-270,0-9-180,15 3-269,-11-2-361,26-1 361,-27-4-181,31-3 990,-6-4 0,11-4 0,3-3 0</inkml:trace>
+  <inkml:trace contextRef="#ctx0" brushRef="#br0" timeOffset="142037">29897 13109 10411,'-18'-10'1259,"13"18"-1259,-12 10-90,17 20 90,0-1-90,0-1 0,16-15 90,-12-1 0,27-18 0,-17 7-89,4-27 538,-1-6-359,-16-20 0,10 19 0,-9-13-809,2 24-721,-4 10-898,0 28 561,0 10 1777,0 11 0,18-20 0,4 0 0</inkml:trace>
+  <inkml:trace contextRef="#ctx0" brushRef="#br0" timeOffset="142271">29548 12576 11400,'50'-6'360,"-5"2"-180,-6 3-90,-3 16-360,-1 6-359,-15 10-1710,-10 15 900,-10-12 1439,-22 12 0,17-11 0,-18 1 0</inkml:trace>
+  <inkml:trace contextRef="#ctx0" brushRef="#br0" timeOffset="142620">30515 12977 10411,'9'0'1709,"2"0"-1439,-4 0 0,4 18-270,-4-14 180,2 29-270,-4-8 90,1 11 0,-4 3 0,-1-3 90,-1 1-180,0 20 90,0-14 0,0 22 90,0-34 0,0 6-270,0-25 180,0-20-90,0-19-90,0-14-90,0 6 0,0-1-90,0-16-180,7 4 1,1 0-1139,-4-8 1318,9 21 0,1 0-1528,3-20 1888,7 21 0,-1-3 0,-6 22 0</inkml:trace>
+  <inkml:trace contextRef="#ctx0" brushRef="#br0" timeOffset="142893">30877 13257 9871,'6'13'810,"-1"-4"-630,1-5-90,3-4-90,9 0 180,-1-18 89,16-6-179,-10 0-180,5-17 90,-9 24 180,-3-19 0,-4 11 90,-2 2 0,-6 1-90,-2 3-90,-2-2-180,-20 10 90,0 0 0,-20 30 0,6 9-540,14 26 0,6-8-1348,14 18 1078,0-28-1529,26 21 2339,-20-30 0,44-2 0,-19-17 0</inkml:trace>
+  <inkml:trace contextRef="#ctx0" brushRef="#br0" timeOffset="143273">31330 13072 10771,'-17'-5'809,"13"-4"-629,-27 8-90,28 18-180,-18-12 90,18 35 0,-5-24 0,8 18 90,0-10-270,0 0 90,0-2-90,22-1 180,-17-3 0,17-3 0,-3-6 0,-2 2 0,19-10 180,-10-19-180,-2-11 180,-12-13 0,-1 3 270,-10-3-90,3 11 269,-4-18-449,-16 26-90,12-5 0,-11 15-90,-1 6 0,3 22 0,-4 19 90,0 13-135,15-6 0,2 0-45,-7 17-585,6 6 1,2 2 159,-1-32 0,0-1-700,0 30 1,0-3-225,0-12 1439,-1-12 0,2-2 0,11-3 0,3 6 0</inkml:trace>
+  <inkml:trace contextRef="#ctx0" brushRef="#br0" timeOffset="143741">31442 13517 11580,'6'-14'810,"-2"1"-540,3 1-270,-3-2 180,4-1 0,0-2-180,4-2 90,-1-3-90,2-2-90,8-15 90,-2 8 90,13-24-90,-13 20 359,12-18-269,-18 24 0,5-4-180,-11 15 90,-2 3-90,-2 6 450,-3 2-360,0 21-90,0 12 180,0 12-90,0 8-90,0-6 180,0 23-180,0-16-90,8-10 0,1 0 180,-4-1-90,23 11 0,-25-28-89,22-3 89,-13-12 90,12-25 90,-9 16-180,-3-39 90,-1 23 0,-1-39 90,-1 19-45,-5 6 0,0 1-45,1-6 179,2-23-89,-3 38 0,4-3-90,-5 24 0,8 26 0,-4-16 0,5 40-719,3-10 89,-2 11-315,-2-13 1,1-1-315,3 4-180,5 12 1439,2-12 0,-1-13 0,6 5 0</inkml:trace>
+  <inkml:trace contextRef="#ctx0" brushRef="#br0" timeOffset="144070">32195 13332 11580,'0'-15'990,"0"2"-990,22 8 0,-16 16-180,34-7 90,-18 10-90,14-14 0,-6 0 90,-14-14 180,-8-1 270,-8-17-270,-18 4-90,2 10 0,-5-1 0,-6 18 0,14 9 0,-5 13-90,3-2-90,14 20-180,-5-21-629,6 30 89,20-19 271,-15 8-1080,32-7 1709,-11-9 0,21 2 0,5-10 0</inkml:trace>
+  <inkml:trace contextRef="#ctx0" brushRef="#br0" timeOffset="144554">32680 13184 10501,'0'-18'989,"-17"2"-989,13-1 450,-13 6-360,17 16-180,0 12 180,18 25-90,-13-6 90,24 17-90,-14-19 0,-1 10 90,7-3 0,-19-12 0,12 16 90,-13-24-90,5 3-90,-6-13-90,0-3-270,0-3-270,-18-2 91,-1-2-181,-2-15 90,-10 10 181,27-25-1,-29 7 270,19-10 0,-4-2 180,7 5 0,11 0 0,0-2 0,28-19 0,-20 12 135,25 2 0,5 1 45,-11-5 449,18-2 1,2 2-180,-8 0-90,-4 6 0,-2 2-181,-10 9 1530,9-3-1259,-19 19-450,-1 17 0,-6 13 0,-4 13 0,2 0 0,-1 13 0,-2-11-270,1-2 1,0-1-181,0 7 90,1 12-989,2-9 449,-2-13-809,2 12 720,-3-23-360,0-1 1349,-2-13 0,0-3 0,0-4 0</inkml:trace>
+  <inkml:trace contextRef="#ctx0" brushRef="#br0" timeOffset="144687">32863 13131 11041,'17'-24'449,"-13"6"-494,28 4 0,9 3-44,-2-3-554,5 6 1,3 1-1202,-2 2 0,-2 1 1506,-10 2 0,1 0 0,9 0 0,0 0 0,12 2 0</inkml:trace>
 </inkml:ink>
 </file>
 
@@ -1267,103 +1725,103 @@
   <inkml:trace contextRef="#ctx0" brushRef="#br0" timeOffset="207724">7628 12099 9781,'-3'-15'0,"0"1"-90,0 5 90,2 4 0,16 20 0,5 8 0</inkml:trace>
   <inkml:trace contextRef="#ctx0" brushRef="#br0" timeOffset="208089">8025 12579 10231,'17'6'270,"-6"-2"-180,5-17-90,-10 10 180,8-45 0,-6 25-135,1-19 0,-1-4 135,-2-2-135,-1-2 0,-1 0 134,-3-3-811,1 6 0,-4-1 812,-19-9-45,20 19 0,-3 1 45,-31-14-793,32 3 883,-27 3-538,14-5 268,-2 15 540,-4-1-450,16 25 1088,-5 29-1088,6 4-90,5 26 0,0-7 0,0 8 0,9-9 0,2 1 280,-3-9 1,2 2-641,9 23 0,2 1-13,-7-23 0,0-2 103,2 11 0,0-1-360,9 12-359,2-3-450,1-6-214,-7-18 0,1-2 1653,10 9 0,11 3 0,-14-18 0</inkml:trace>
   <inkml:trace contextRef="#ctx0" brushRef="#br0" timeOffset="208373">8485 12478 10411,'0'-12'90,"0"1"-180,18-1 180,-14 4-90,33-3 0,-33 3-90,35-1 90,-34-1 0,34 0-180,-26-2 180,8 2 0,-1-3 0,-17 2-90,15-2 450,-17-5 90,5 4 269,-27-10-539,-4 11 180,-1-2-270,-13 7-90,34 2 270,-29 2-270,31 20-360,-10 6-270,35 0-1079,-1 16 1709,10-30 0,3-1 0,17 32 0,-16-25 0,1 1 0</inkml:trace>
-  <inkml:trace contextRef="#ctx0" brushRef="#br0" timeOffset="227476">7790 9056 11311,'-48'43'539,"23"-10"-539,-17 2 90,37-10 0,-25 0-90,27 0 0,-9-3 0,12-2-360,0-4-269,28-3-451,-5-6-179,27 0-460,-9-6 1719,3 2 0,4-3 0,1 0 0</inkml:trace>
-  <inkml:trace contextRef="#ctx0" brushRef="#br0" timeOffset="227995">8228 9170 8432,'0'-35'360,"0"6"-270,0-4 270,0 7-180,0-3 89,0 0 91,14-2 0,-11 1 540,10-11-631,-13 10 1,0-11-180,0 22 90,0-2 180,-13 16-360,10 18-90,-11 32 180,14-1-90,0 0 0,0 0 0,0 6 0,-2 0 0,4 0-90,18-1-30,-18-13 0,1-2-150,29-3 90,-29-4-449,22 7 269,-8-12-630,17 4 541,-7-17 359,10-2 90,-15-6 90,8-20-90,-8-2 90,-3-3 689,-3-10-59,-9 15-450,-3-13 89,-4 8-359,0 24-1079,0 9-1080,17 20 720,-13-2 1439,28-11 0,-29 6 0,13-9 0</inkml:trace>
-  <inkml:trace contextRef="#ctx0" brushRef="#br0" timeOffset="228173">8762 8993 9871,'-18'-3'-3148,"4"16"3148,14 2 0,0 3 0,0-7 0</inkml:trace>
-  <inkml:trace contextRef="#ctx0" brushRef="#br0" timeOffset="228477">8923 9212 10141,'10'6'810,"5"-2"-810,-2-4 0,19-16 0,-11 13 0,12-13 90,-1 0-90,-6 2 270,8-14-91,-18 15-89,1-6 0,-13 8 180,-2-4-270,-2 3 90,-16 7 0,12 0-180,-28 4 180,10-1-90,-16 19 0,5 1-180,14 17-719,8-2 269,11 0-989,21 0 809,4-10 810,27-1 0,-12-13 0,2 1 0</inkml:trace>
-  <inkml:trace contextRef="#ctx0" brushRef="#br0" timeOffset="228806">9403 9163 10501,'0'7'810,"17"-10"-810,-1 36 0,19-17 0,-9 15 0,-1-8 0,-8-11 0,-9-19 0,-3-14 89,-5-17 1,0 0 180,0 5-180,14 13-629,6 29-1440,10 14 719,0 19-269,-7-20 1529,-2 11 0,0-30 0,-2 12 0</inkml:trace>
-  <inkml:trace contextRef="#ctx0" brushRef="#br0" timeOffset="229142">9967 8888 10411,'0'-9'1709,"0"18"-1619,0 8-90,16 25 0,-12-6-90,23 4-180,-24-12-809,19 15 539,-11-12-359,8 19 449,-9-24-180,-4 10 540,-6-20 90,0 2 0,0-12 450,-24-2 270,1-3-361,-24-20 271,8-4-360,7-23-90,13 12 0,10-3-180,9 14 0,0-1 90,26 3-180,-20 2-450,28 7 0,7 4-899,-10-2 1439,17 2 0,3 2 0,0 6 0,-16-2 0,0 0 0</inkml:trace>
-  <inkml:trace contextRef="#ctx0" brushRef="#br0" timeOffset="229306">10695 9191 10681,'-19'-11'0,"3"-3"0</inkml:trace>
-  <inkml:trace contextRef="#ctx0" brushRef="#br0" timeOffset="229872">7732 9541 10591,'0'-5'1169,"15"0"-1079,-11 3 0,31-2 0,-1-2 0,15-1-45,-4 1 0,2-1-590,-13 2 0,4 0 545,10 0 0,7 0 0,-2 1-1383,4-1 0,0 1 1353,-5 1 0,4 0 0,2 0 52,-9 1 1,2 0-1,0 1 1,-1-1-388,3 1 1,-2-1-1,5 1 365,-3 0 0,5-1 0,2 1 0,-2-1 0,-5 1-407,3-1 1,-4 1 0,4 0 208,-5 0 0,5 0 0,1 0 0,-2 0 0,-6 0-262,2 0 1,-4 0 0,1 0 219,12-1 0,2 1 1,-5-1-31,0 1 0,-4-1-45,-3 0 0,-2-1 816,-2 2 0,-1 0-1494,7-2 1,-1 0 992,-16 2 0,-1-1 0,5-1 0,-3 0 0,2 0 0</inkml:trace>
-  <inkml:trace contextRef="#ctx0" brushRef="#br0" timeOffset="231227">8640 10507 9961,'41'-20'720,"-6"2"-630,4-1-1702,-4 2 1612,7-1 0,6-4-45,-7 5 0,2 0 45,-9 4 0,1-1-675,25-9 1,0 0 134,-24 9 1,0 1 539,22-7 0,-2 0 0,4 0 0,-23 8 0,0 0 0</inkml:trace>
-  <inkml:trace contextRef="#ctx0" brushRef="#br0" timeOffset="232189">10263 9752 10951,'-19'-7'1259,"3"2"-1079,16 2 0,0-1-270,-8 3 180,6 20-90,-10 13 0,10 13 0,-2-8 0,0 1 0,2 13 0,-2 6 0,-1 1 0,1 1 0,0-5 0,1-3 0,0-10-180,0 14 180,1-33-540,1 2 360,1-37 90,17-25 90,-13-9 0,10 7 0,0-1 0,-12-8-696,3 15 1,1 1 695,4-14 0,-7 0 0,7 1 0,3-15 0,-8 17 270,14-13-91,-12 32 1,2 2 0,-3 17-90,1 4-90,-1 2 1482,1 17-1572,2-13 180,1 37-90,7 2 0,-3 12 0,-2-13 0,0-1-792,3 11 702,-6-19 0,-1 0-360,3 9-270,-2-5 1,-2-4-1,-1-3-89,-2-6 89,-2-2-989,1 0 1709,-3-10 0,0 2 0,0-9 0</inkml:trace>
-  <inkml:trace contextRef="#ctx0" brushRef="#br0" timeOffset="232327">10260 10136 8972,'0'-17'540,"0"1"-450,0 3-270,23 5-990,0 5 541,28 2-361,-15 1 990,3 0 0,-9 0 0,0 0 0</inkml:trace>
-  <inkml:trace contextRef="#ctx0" brushRef="#br0" timeOffset="232758">10782 10005 11670,'0'43'90,"0"-8"-90,0 1 90,0-7-90,0 2 0,0 0 0,14 0 0,-11 1 0,11 9 0,-3-10 0,-8 16 0,15-26-90,-16 7-90,4-18 180,-6-21 0,-17 8 0,12-36 0,-33 5-90,33-11-800,-29-4 710,30 10 270,-24-2-90,25 0-405,-17-18 405,18 15 0,-1 9 0,-1 1 0,4-2-90,24-15 90,6 29 90,14-3-90,8 15 0,-18 5 90,6 2-90,-7 19 0,-8 5 0,-7 21-630,-8 4 90,-32-7-1349,-6 11 990,0-22 899,-18 13 0,20-23 0,-24 3 0</inkml:trace>
-  <inkml:trace contextRef="#ctx0" brushRef="#br0" timeOffset="233222">11273 9854 11311,'5'23'179,"0"13"-179,-1-22 0,0 17 0,4 8 90,-2-9-90,5 24 0,-5-24-90,0 19 180,-4-24-180,0 4 360,-2-14-360,0-3 90,0-3 0,0-4-90,-17-3 90,12-18 0,-26-7 0,27-13 0,-21 1 0,22-13 0,-15 10 0,16 4 0,1 0-90,-7-5 180,8-21-180,20 29 180,-15-4-90,35 12 0,-15 11 0,19 1 90,-2 10-90,-19 22 0,4-15 90,-25 33-90,9-11-180,-11 10-719,0 15 89,-23-18-1169,-6 22 450,-12-24 1285,0 7 1,11-18-1,0-2 1</inkml:trace>
-  <inkml:trace contextRef="#ctx0" brushRef="#br0" timeOffset="234062">12023 9658 12300,'14'27'-270,"-10"6"-270,26-6-269,-27 3-270,24-6-181,-17 0-89,3-1 1349,7 0 0,-10-3 0,11-1 0</inkml:trace>
-  <inkml:trace contextRef="#ctx0" brushRef="#br0" timeOffset="234432">12287 9376 8702,'-16'-6'0,"-4"1"-90,18 1 90,-9 2 0,10 1 0,-3 1 0</inkml:trace>
-  <inkml:trace contextRef="#ctx0" brushRef="#br0" timeOffset="234856">11983 9369 11670,'0'-4'-60,"14"1"0,4 3 0</inkml:trace>
-  <inkml:trace contextRef="#ctx0" brushRef="#br0" timeOffset="235389">12643 9742 8972,'-19'-14'270,"-9"10"269,25-22-179,-24 13 180,13-7-360,-13 4-180,9 9 0,6-1 90,0 7-90,8-2 180,-8 1-180,6 2 0,0-2 90,3 16-90,2 2-90,0 18 180,1 0-180,0 1 90,0-4 0,16-10 90,-4-9-180,6-27 90,-5-13 90,-8-28-90,1 11 90,0-21-1,-3 25-676,-1-14 857,-1 18-90,1-1-90,0 6-1,0 1-178,-1 4 89,-1 5 359,1 2-179,-1 9-90,3 3-90,1 7 858,3 24-858,1-18 0,2 44 0,2-27-540,3 27-360,1-9-449,1 4-675,-3-10 1,0 1 1748,10 19 0,-9-20 0,1 0 0,9 12 0</inkml:trace>
-  <inkml:trace contextRef="#ctx0" brushRef="#br0" timeOffset="235640">13167 9727 11580,'0'-7'0,"17"1"0,-13 0 0,28 1-2428,0-1 1079,0 2 1349,9 1 0,-18 3 0,-1 0 0</inkml:trace>
-  <inkml:trace contextRef="#ctx0" brushRef="#br0" timeOffset="235791">13325 10038 10321,'23'-13'-473,"13"9"1,-8-24 0,18 11 0</inkml:trace>
-  <inkml:trace contextRef="#ctx0" brushRef="#br0" timeOffset="236194">14595 9447 11940,'-20'0'90,"1"0"-180,6-16 270,5-7-270,5-18 180,3 7 0,17-13 0,-12 20-90,13-10 0,-18 13 90,12 0 90,-10-1 180,10-7-180,-12 8-1,0-11-269,0 20 180,-15-4-90,11 34 0,-12 8-90,16 18-629,0 18 359,0-18-540,0-4 1,0 1-577,0 7 397,16 15-270,-12-19 1349,11 0 0,-15 1 0,0-1 0</inkml:trace>
-  <inkml:trace contextRef="#ctx0" brushRef="#br0" timeOffset="236339">14592 9873 12120,'44'0'180,"-6"-16"-450,3 12-360,-7-12-809,1 1-540,3 11 1979,0-20 0,4 21 0,-1-7 0</inkml:trace>
-  <inkml:trace contextRef="#ctx0" brushRef="#br0" timeOffset="237075">8682 10690 10501,'0'-6'1349,"0"1"-1079,0 0-90,0-1-90,0 1-90,0 0 809,0 2-719,20 1 0,7 21-90,13-14 0,2 38-45,-14-24 0,0 0 90,-5 5 0,1 2-225,19 13 1,1 1-248,-15-15 1,-1 0-174,5 4 1,2 3-1,-2-4-958,-1-1 0,-2-2 208,12 8 1,0-1 1349,-12-10 0,-2-1 0,2 0 0,-1-1 0,0 0 0,0 0 0</inkml:trace>
-  <inkml:trace contextRef="#ctx0" brushRef="#br0" timeOffset="237945">10475 10978 11131,'-11'-6'359,"1"0"181,3 4-540,3 17 0,1 27 90,3-1-90,0-1 0,0-1 0,0 4-355,0 16 355,0-21-89,0-3-91,0-2-90,0-6 177,0-3-87,0-6-899,0-2 809,0-27 270,0-10 0,19-18 0,-14-7 90,14 8-180,-5-5 447,-10 2-132,10 11 0,1 0 45,-11-14-135,8 11 0,1 1-45,-1-1 180,1-1 179,4 18-359,-14 5 90,11 6 0,-6 1-180,4 4 0,4 21 0,-4-16 0,9 47 0,-10-33-360,6 28-719,-5-8 449,-2-8-629,2 15 719,-8-22-89,0 9 179,-4-17-270,-20 7 900,-2-15 1439,-23 1-1079,3-8-270,7-1-90,3-15-90,12 12 269,3-11 1,8-2-180,-4 12 270,11-23-360,-5 13-90,7-11-90,25 11-1079,6-9 269,15 16-1094,-2-12 218,-7 11 1776,-1 0 0,2 4 0,0 1 0</inkml:trace>
-  <inkml:trace contextRef="#ctx0" brushRef="#br0" timeOffset="238405">11128 11144 10501,'0'10'450,"0"-1"-360,0-1 0,0 2-90,0 12 90,0-3-180,17 12 90,-13 9 0,26-6 0,-17 30 90,4-26-180,-8-4 0,-1 0-652,0 4 562,2 7-180,0-11 90,-9-14-180,2 1 361,-3-30 178,0-31-178,0-1 178,-14-20-89,11 0 0,-11 12 90,7 7 0,2 0 0,2-7 0,-3 11 0,0 0-90,6-3 90,0-5 562,0 20-562,0 6 0,19 6 360,-14 1-270,31 8 90,-20 1-181,13 21-178,-9 3 89,-9 17 89,-5-8-358,-6 0-1171,-19-1 451,-4-7-1889,-20 10 2878,19-17 0,-12-1 0,16-9 0</inkml:trace>
-  <inkml:trace contextRef="#ctx0" brushRef="#br0" timeOffset="238840">11598 11006 10411,'0'32'900,"0"-5"-900,0 7 0,0-12 0,0 5 0,0-7 89,0 1-178,0 0 89,14 0 0,-10-1 0,10-2 0,-14-1 0,0 2 0,0-8-90,0 2-450,0-9 360,0-18 180,-14-8-90,10-13 90,-10-17 0,5 17-831,6-17 921,-6 15-90,9-2 0,0 3 0,18-11 90,-13 16 449,30-9-449,-31 25 180,24 3 0,-16 9 561,11 25-921,-12 5 90,-2 24 180,-9-10-360,0 14-269,-17-22-361,13 8-449,-28-15-1,29-1-628,-30-2 1888,29-3 0,-26-5 0,14-1 0</inkml:trace>
-  <inkml:trace contextRef="#ctx0" brushRef="#br0" timeOffset="239422">12343 10757 9602,'-44'0'0,"-1"0"0,11 15 0,3 2-90,15 16 90,6-1 0,27-5 0,-12-2-90,29-7 180,-9 6-180,-2-6 449,14 10-89,-20-13 90,3 2-180,-8-7-180,-12-2 0,0 1 0,0 1 0,0-3-90,-18 2-360,-2-6-89,-15 1 179,16-20 270,6-5 180,38 1-180,-19-9 90,25 20 0,5 4 90,-11-9-776,36-6 686,-28 18 0,0-13 0,-2 14 0,-2-12 0,-3 9 0,-6-6 90,4 1 90,-14 1-90,6-6 90,-15 5 685,2-3-595,-3 3 0,-20 1 90,14 0-90,-32 3-180,18 1 90,-14 1-180,16 19 89,6 4-358,12 22-181,21-11-360,-16 2-809,35-1 540,-14-8 1079,11 5 0,0-13 0,-10 0 0</inkml:trace>
-  <inkml:trace contextRef="#ctx0" brushRef="#br0" timeOffset="239726">13015 10814 10231,'0'31'360,"14"5"-360,-10-10 0,10 4 0,-14-9 90,0 2-180,7-1 90,-5 0 0,5-2 0,-1-1 90,-4-2-180,7-2 0,-3 2-360,3-7-449,5-1 539,-4-6-540,10-2 361,-7-21-181,7 15 720,1-31 0,-3 17 0,4-16 0</inkml:trace>
-  <inkml:trace contextRef="#ctx0" brushRef="#br0" timeOffset="240323">13235 10765 11311,'-13'-7'899,"10"1"-809,-9 1 0,12 2 0,-11-2-90,0 4 90,-9 0-180,3 1 180,2 14-90,1-10 0,-5 25-90,6-3-360,-3 22-90,10-5-1259,3 15 450,3-26 1349,21 18 0,3-27 0,21 6 0</inkml:trace>
-  <inkml:trace contextRef="#ctx0" brushRef="#br0" timeOffset="240791">13400 10679 10321,'-1'29'270,"14"5"-270,-9-8 0,10 4 90,-2-8-90,-9 1 0,9-1 0,-1 1 90,-8-1 0,14 0 0,-15-1 449,10 3-359,-11-8-90,8 2-180,-8-11-719,3-21 179,-4-8-809,0-25 629,0 10 810,0-15 0,17 22 0,6-8 0</inkml:trace>
-  <inkml:trace contextRef="#ctx0" brushRef="#br0" timeOffset="241108">13830 10942 9871,'7'7'180,"1"0"-90,1-7 90,3 0-180,-3-17 0,6-2 180,-6 0-180,3-13 0,-6 12 90,-1-17 0,-4 10 0,-1-1 0,-20 18 0,14-9 90,-34 13 0,25-3-1,-15 5-179,18 19 0,4 4-90,8 31-359,0-16-1080,21 22 359,-15-30 1170,34 11 0,-12-21 0,20 3 0</inkml:trace>
-  <inkml:trace contextRef="#ctx0" brushRef="#br0" timeOffset="241510">14155 10791 10321,'-19'14'270,"5"6"-270,14 11-90,16-11 180,-12 3-90,27-20-270,-27 14-270,28-15 361,-10 5-91,9-7 270,-2 0 0,-2-23 90,-7 18-90,8-49 180,-15 33 89,0-40 1,-10 25 0,-1-9 90,-2 10 90,0 0-91,-18-1 271,13-12-450,-26 15-90,28-13 180,-10 26 90,13 1-360,0 32 0,0 10 0,16 30-270,-12-10-90,9-9 0,2-2-180,1 9-1206,0 12 756,8-17-179,-21-1 0,18-2-270,-18-2 1439,7-5 0,-10-1 0,0-5 0</inkml:trace>
-  <inkml:trace contextRef="#ctx0" brushRef="#br0" timeOffset="241640">14237 10802 10951,'0'-29'0,"0"1"-540,25-12-90,-19 10-404,24 7 0,5 2-940,-11-1 1974,33 0 0,-25 14 0,-1 1 0</inkml:trace>
-  <inkml:trace contextRef="#ctx0" brushRef="#br0" timeOffset="243392">15172 10739 11311,'9'-5'179,"-2"0"-179,-7 4-90,0-2 90,5 2 90,1 0-90,5 1 0,2 0 0,14-2 0,-3 0-1259,28-4 0,-18 2 1259,30-3 0,-27 2 0,12-1 0</inkml:trace>
-  <inkml:trace contextRef="#ctx0" brushRef="#br0" timeOffset="243606">15162 10926 11221,'30'-14'-450,"19"10"-540,-28-10-269,25-3-630,-9 12 1766,6-24 0,0 26 0,3-9 0</inkml:trace>
-  <inkml:trace contextRef="#ctx0" brushRef="#br0" timeOffset="244139">16300 10318 10681,'28'-1'1349,"1"1"-1349,-6 0 0,-1 14 0,-7-10 0,1 21 0,1-22-899,9 31-181,-7-20-1528,13 31 2608,-14-20 0,5 6 0,-8-8 0</inkml:trace>
-  <inkml:trace contextRef="#ctx0" brushRef="#br0" timeOffset="244324">16628 10245 10771,'-29'-11'809,"-3"4"-629,-28 4-270,18 23 90,4-7 0,2 3-359,4 24-586,11-12 1,3 2-226,6 8 1170,2 27 0,30-28 0,5 9 0</inkml:trace>
-  <inkml:trace contextRef="#ctx0" brushRef="#br0" timeOffset="244757">17087 10340 11490,'-23'16'0,"6"1"0,38 3-90,-15 11 90,31-27-359,-33 26 179,33-17 0,-17 2 90,19-5 180,-8-10-90,-7-14 360,-10-5-90,-7-16 449,-7-3-629,0 2-90,0 6 0,-14 13 90,10 4-90,-10 32 0,14 5 0,0 17 0,18 2-90,-14 9 180,26-12-135,-27-7 0,-3 1-135,12 1-270,-12 21-89,0-29-271,0 6-179,0-16-1,-18-2-539,13-5 1529,-29-4 0,29-3 0,-12-3 0</inkml:trace>
-  <inkml:trace contextRef="#ctx0" brushRef="#br0" timeOffset="245039">17585 10013 10141,'12'-1'810,"1"1"-810,-1 0 449,3 16-179,-6-12-270,4 27 90,1-9-90,-5 7 0,10 16 90,-10-17-180,6 21 90,-8-19 0,6 25-90,-6-28-359,9 19-181,-8-28-629,17 6 719,-6-15 0,11 0-269,-4-8-451,3-1 1260,0 0 0,3 0 0,-1 0 0</inkml:trace>
-  <inkml:trace contextRef="#ctx0" brushRef="#br0" timeOffset="245306">17783 10335 9781,'47'0'-1169,"-10"-15"180,3 11-810,-11-11 1799,-1-1 0,1 12 0,-2-12 0</inkml:trace>
-  <inkml:trace contextRef="#ctx0" brushRef="#br0" timeOffset="245816">15838 9928 10681,'11'-11'899,"1"2"-719,-4 3-90,1 1 0,-2 1 180,1 1-270,-4 1 90,1 1-450,-4 20-1349,-1 3-630,0 21 2339,0-3 0,0-2 0,0-2 0</inkml:trace>
-  <inkml:trace contextRef="#ctx0" brushRef="#br0" timeOffset="245958">15903 9868 10231,'8'-8'-809,"-6"21"-631,12-9 1440,-7 41 0,6-22 0,-2 24 0</inkml:trace>
-  <inkml:trace contextRef="#ctx0" brushRef="#br0" timeOffset="246339">18253 9577 12570,'14'-4'0,"-3"1"0,10 2-540,-11 21-989,-4 4 270,-6 22 179,0-10-89,0-1 1169,0-11 0,0-3 0,0-4 0</inkml:trace>
-  <inkml:trace contextRef="#ctx0" brushRef="#br0" timeOffset="246474">18428 9671 11850,'26'-10'-539,"-6"8"-2520,-8 12 3059,-8 15 0,-4 13 0,0 0 0</inkml:trace>
-  <inkml:trace contextRef="#ctx0" brushRef="#br0" timeOffset="248064">9358 12530 8792,'-5'-5'720,"0"1"-361,4-3 1,-2 2 0,1 1 0,1 1 89,-1 0 811,2 1-1170,16 15 0,6 1-180,14 4 180,2 8-540,0-22-360,7 28-2640,-9-21 0,2-1 3450,-6 4 0,-1 2 0,10-2 0,1-2 0,17 6 0</inkml:trace>
-  <inkml:trace contextRef="#ctx0" brushRef="#br0" timeOffset="248956">10550 12428 11311,'0'39'89,"19"-5"-89,-15 4 0,15-3 0,-19 2-314,12 3 224,-10 1 90,10 0 0,-12 0-630,8 13 360,-6-16 270,5 14-180,-7-29-226,0 0 406,0-32 67,0-15-67,0-31 0,0 5 180,0-1 0,0-1 90,0-3-91,0-1 1,0 2 0,0 5-225,0 13 0,0 0 315,0 3 180,0-2-360,0 20 384,0 7-384,16 4-90,0 3 0,3 20 90,16 8-90,-22 11-1921,7-9 0,0 0 1112,-2 10-271,4 14-487,-8-14-52,-2-2 1619,-1 0 0,-1-2 0,-1-2 0</inkml:trace>
-  <inkml:trace contextRef="#ctx0" brushRef="#br0" timeOffset="249123">10675 12731 9512,'0'-13'269,"19"-4"-269,-14 5 0,32-2-989,-12 4 89,9 2-809,2 3 1709,-9 1 0,1 3 0,1 0 0</inkml:trace>
-  <inkml:trace contextRef="#ctx0" brushRef="#br0" timeOffset="249572">11285 12644 9871,'0'39'900,"0"-10"-810,0 5-90,0-12 0,0 4 0,0-1 0,0 2 0,0 1 0,0-1 0,14 1 0,-10 0 90,10 1-180,-3 9 90,-8-10 90,17 4-90,-18-14-90,7-4-180,-9-2-180,0-3 450,0-27-90,0-9 180,-17-17-90,12-1-90,-12-13 180,5 12-90,10 5 0,1 0 90,-12-8 0,12 10 0,2 1 0,-1-2 450,21-14-270,-16 30-91,16 1 91,-1 14 0,-2 6-90,17 2-180,-19 19 90,7 4-180,-16 1 90,5 32 0,-7-36-1079,-22 40 179,12-37-1439,-32 10 630,32-17 1709,-26 0 0,28-10 0,-9-4 0</inkml:trace>
-  <inkml:trace contextRef="#ctx0" brushRef="#br0" timeOffset="250024">11753 12474 10321,'5'19'990,"-1"0"-901,-4 22-89,0-13 0,0 2 90,0-8-90,0 0 0,0 11-90,0-9 90,0 9 0,0-12 90,0 1-90,0-2-90,0 6 180,11-8-180,-8 5-179,8-14 179,-11-1 90,0-21-90,-19-8 0,15-10 90,-15-4 90,3 4-180,13-22 180,-23 12-135,23 4 0,3-1 45,-10-6 0,9 9 0,2 0 0,-1-2 0,17-9 90,3 16 0,0 10 90,12 0-1,-11 15 1,14 2-90,-14 25-90,3-17 0,-21 38 0,12-26 90,-14 19-180,5 5-90,-6-9-1349,-20 21 270,-2-23 1259,-19 17 0,20-24 0,3 7 0</inkml:trace>
-  <inkml:trace contextRef="#ctx0" brushRef="#br0" timeOffset="250626">12410 12363 11221,'0'13'899,"0"-2"-809,0 0-180,0 0 0,0 1 180,14 10-90,-10-3-540,10 7-179,-3-7-451,-8 1 91,16 0 1079,-8 5 0,-1-6 0,-1 4 0</inkml:trace>
-  <inkml:trace contextRef="#ctx0" brushRef="#br0" timeOffset="250772">12358 12140 7982,'0'-14'-405,"0"4"0,0 3 1,0 3-1</inkml:trace>
-  <inkml:trace contextRef="#ctx0" brushRef="#br0" timeOffset="251190">12888 12264 10861,'-45'0'899,"0"0"-989,11 0 180,2 19-90,10 5 0,11 20 90,0-11-180,11-2 180,0-11-360,28 5 180,4-7-870,16 1 870,-4-12-179,-11 0 269,1-7-360,11 3 360,-12-18 0,17-8 0,-27-9 0,3-18 0,-14 16 90,-7-14 270,-1-7-91,-4 9-44,-11 8 0,0 0 45,5-5-225,-15 11 0,1 2 45,15 1 1410,-25-2-1500,27 38 0,13 27-90,11 8-1592,4 13 962,8-17-899,-29 0-512,30 4 2131,-21-4 0,16 3 0,-6-4 0</inkml:trace>
-  <inkml:trace contextRef="#ctx0" brushRef="#br0" timeOffset="251492">13803 12267 11490,'44'0'-5666,"-3"0"5666,-1 0 0,-12 0 0,-2 0 0</inkml:trace>
-  <inkml:trace contextRef="#ctx0" brushRef="#br0" timeOffset="251639">13900 12468 10861,'22'3'-2339,"7"-18"-368,14 10 2707,2-13 0,-8 3 0,2-5 0</inkml:trace>
-  <inkml:trace contextRef="#ctx0" brushRef="#br0" timeOffset="252380">14748 12240 10771,'0'5'1529,"0"-14"-1619,0-6 90,0-21 90,14-8-90,-10 2 0,10-18 90,-4 20-1175,-7-10 1085,7 14 270,-10 2 149,0 2-509,0-4 0,0 12 270,0-3-180,0 45-180,0 12 90,0 23-270,0 5-360,7-24 1,3 0-630,12 20-180,-2-11 0,2-1 1597,11 2 0,2 6 0,-9-21 1</inkml:trace>
-  <inkml:trace contextRef="#ctx0" brushRef="#br0" timeOffset="252690">15292 11923 10861,'-31'-17'719,"-10"2"-539,36 6-180,-26 2 90,13 4-90,-11 1 0,12 22 0,7 4-90,10 22 90,23-4-90,9-6 45,-3-20 0,3-4 45,19 1 0,-16-9 0,-1-2 0,6-2 0,9-20 90,-20 15-180,-7-33 90,-4 11 90,-9-9-90,-4-2 0,-5 1-90,-21 9-179,-7-11-361,0 22-1349,-32 2 990,38 10 989,-28 5 0,23 20 0,2 4 0</inkml:trace>
-  <inkml:trace contextRef="#ctx0" brushRef="#br0" timeOffset="253006">15798 11934 11760,'2'-14'720,"-1"-4"-720,0 9 90,-1 15-90,0 5 0,0 27 0,0-3 0,26-12 0,-20 8 0,45-27 0,-31 18 0,21-20 0,2 6 90,-11-8-90,16-19 0,-24 14-90,0-46 0,-16 30-720,-5-39-179,-31 27-1361,21-7 1675,-22 25 1,-3 3-1493,3-11 2167,-32 2 0,11 7 0,-2 0 0</inkml:trace>
-  <inkml:trace contextRef="#ctx0" brushRef="#br0" timeOffset="253705">9365 12675 9691,'-12'0'540,"1"0"-90,1 0-180,1 0 0,-1 0-180,0 16 89,2 3 1,1 24 0,5-7-1079,1 9 899,1-7 0,25 8 90,-19 2-90,18-21 0,2 1 0,-4 32-45,-2-29 0,3 2 135,4 18 0,-1 2-135,-6-13 0,1 2-45,1 5 0,3 5 0,-2-4-995,-2-3 1,-2-1 544,8 14 0,-2 0-180,-9-18 1,0-1-316,0 0 1,0-1 1034,-1 0 0,-1-1 0,0-2 0,0 0 0,-1-1 0,1 0 0</inkml:trace>
-  <inkml:trace contextRef="#ctx0" brushRef="#br0" timeOffset="254572">10767 14054 10321,'-18'16'360,"-9"13"-180,24 9-180,-8-6 0,-1 0 90,10 13-135,-9 4 0,-1 1 45,5 4 45,-1-6 0,-1-1-135,3-9 0,1 13 0,3-29-360,1-1 270,1-29 270,0-14-180,18-31 180,-13 3-523,25-9 523,-27 13 0,22-4 180,-23-1 0,24-1 0,-23 3 90,27 0-180,-9-12 0,8 19 359,8-11-449,-16 32 0,6 4-90,-9 13 0,-1 4 0,0 22 0,-1-17 0,0 46 90,-1-25-270,-6 10 0,-1 4-269,4 10-226,-4-5 0,-1 0-404,0 7 89,-3-10 1,-1 0-737,-1 2 1726,-1 10 0,-1-24 0,0-2 0</inkml:trace>
-  <inkml:trace contextRef="#ctx0" brushRef="#br0" timeOffset="254714">10693 14514 10321,'-3'-31'450,"0"2"-450,22 0-90,-14 4-45,22 6 0,6 1-944,-5-4-316,11 7 1,2 2 1394,5 0 0,13-1 0,-16 8 0</inkml:trace>
-  <inkml:trace contextRef="#ctx0" brushRef="#br0" timeOffset="255173">11443 14310 10141,'0'31'990,"0"-1"-900,0-4-90,0 0 179,0-3-268,0 1 178,14 17-89,-10-9 0,26 12 0,-26-11 0,22 1 0,-23 1 0,15 15 0,-16-13 0,7 20 90,-9-29-449,0 8-1,0-24 180,0-19 180,-18-20-90,13-13 135,-12 8 0,-1-1-135,14-13-643,-3 14 1,-2-1 822,0-17-90,7-1 0,-7 1-436,8 15 1,2 0 525,-1-13 45,8 11 0,1 2 44,-5 3 23,31-5-112,-30 25 180,24 3-180,-15 8 1243,0 17-1333,4-13 985,-16 30-985,5-6 90,-7 8-94,0 1-266,-22-1-179,16-11-1080,-35 13 449,17-25 1080,-12 7 0,-6-18 0,6 3 0</inkml:trace>
-  <inkml:trace contextRef="#ctx0" brushRef="#br0" timeOffset="255706">11927 14240 10681,'1'12'899,"0"4"-899,0-9 90,-1 5 0,0 1-90,0-1-90,0 7 180,0 16-90,0-2 0,13 28 0,-9-21-319,9 13 319,-3-17-90,-8 0 90,8-3 90,-4 9-90,-5-13 0,9 11 0,-9-23 0,2 0-180,-3-10 91,0-25-1,-17-26 90,13-6 0,-10 5 0,0 0-236,11-10 191,-7 4 0,0 0-381,8-11 426,-3 20 0,1 1-90,4-12 90,0 2 90,0 6 90,18-7-90,-14 19 90,31-4-90,-31 24-90,26 5 0,-14 7 223,-1 23-223,20 3 0,-23 13 0,21 9 0,-21-17 0,1 21 90,-10-23-180,0 7-270,-3-13-180,0 0-269,-20-3 757,15-2-1028,-34-3-359,34-2 1439,-41-4 0,23-2 0,-24-2 0</inkml:trace>
-  <inkml:trace contextRef="#ctx0" brushRef="#br0" timeOffset="256108">12570 13876 10591,'-13'-10'0,"-2"1"0,6 3 0,-3 2 0,7 3 0,0 15-270,4 7 0,1 20 180,16-7-180,-12 11 91,33-18 89,-17 21 90,15-25-540,-18 8-2518,1-21 3058,-37-2 0,20-6 0,-22-2 0</inkml:trace>
-  <inkml:trace contextRef="#ctx0" brushRef="#br0" timeOffset="256405">12745 14003 8342,'42'-6'90,"2"0"0,13 0 90,-13 0 90,22-4-90,-33 3-448,5-3 268,-18 1 237,-7 2 123,-2-2-196,-7-4-74,-1 4 180,-22-9-90,15 9 449,-35-7-359,11 9-90,-10-1 46,-1 7-136,5 0-90,4 1 0,9 19 0,8 0 0,13 32-180,21-20-989,4 20 270,1-29-406,3-4 1,-1-2 1304,-5 0 0,32 2 0,-24-9 0</inkml:trace>
-  <inkml:trace contextRef="#ctx0" brushRef="#br0" timeOffset="256723">13262 13822 10591,'-16'-6'720,"3"2"-720,13 21 0,18-13 0,-13 31 0,25-20 0,-27 14 0,22-5 0,-23 1 0,19 1 0,-19-1 0,15 8 89,-14-10-89,5 6 0,-8-16-89,0-2-1,-14-40-720,10-3 270,-10-22-989,14-6 450,0 21 1079,0-10 0,16 16 0,3 2 0</inkml:trace>
-  <inkml:trace contextRef="#ctx0" brushRef="#br0" timeOffset="257130">13458 13745 10951,'-9'14'989,"0"-10"-809,1 10 90,-4-4-90,3-8-180,-4 24 0,5-15 90,-4 22-90,5-13-90,-1 10 180,3 4-90,2-6-90,1 19-90,2-19-989,21 14-1,-16-21-179,37 2-90,-24-13 1439,22-5 0,-6-2 0,3-3 0</inkml:trace>
-  <inkml:trace contextRef="#ctx0" brushRef="#br0" timeOffset="257507">13712 13727 11041,'-2'34'449,"0"3"-449,16-10 0,-10 2 0,10-7 0,-1 10 0,-10-5 0,16 6 0,-17-10 0,9-3 0,-10 0 0,8-3 270,-6-2-90,4-4 0,-2-2-180,-3-26-270,0-6-405,-2-11 1,0-3-136,0-11-134,0 8 0,0 1-496,0 2 1440,0-7 0,14 19 0,3 3 0</inkml:trace>
-  <inkml:trace contextRef="#ctx0" brushRef="#br0" timeOffset="257840">14020 13970 9691,'8'0'0,"1"0"0,0 0 180,0 0 0,6-16 0,-4-3 0,4 0 0,-2-11 0,-6 12 90,1-16-180,-7 8 269,-1-3-269,-16 13 90,12-2-180,-13 8 90,-2 5-90,1 2 0,-15 3 0,17 20 0,-2-15 0,16 32 0,-5-15 0,7 8-90,16 0-359,-12-9-91,28-1-180,-28-3 1,32-2 89,-19-7-1169,32 3 669,-17-10 1130,8 5 0,-11-6 0,-1 0 0</inkml:trace>
-  <inkml:trace contextRef="#ctx0" brushRef="#br0" timeOffset="258040">14348 13768 10591,'-20'-7'90,"4"0"270,5 3-360,9 15 0,-9 9-90,28-3 0,-13 12-360,26-26 90,-26 21 0,27-21-629,-6 16 539,8-16 1,2 5-721,4-8 361,-9 0 809,9 0 0,-14-17 0,-2-5 0</inkml:trace>
-  <inkml:trace contextRef="#ctx0" brushRef="#br0" timeOffset="258160">14610 13452 8342,'-13'-29'-539,"10"1"179,-21 4-540,13-7 540,-3 15 360,0-4 0,12 17 0,-4 2 0</inkml:trace>
-  <inkml:trace contextRef="#ctx0" brushRef="#br0" timeOffset="258478">14483 13227 10141,'-8'0'810,"0"0"-450,1 0-91,1 18-179,0-14 90,0 32-90,0-19 0,0 33 0,3-16 0,1 0 0,1 0-90,0 7 0,0-2 0,1-1 0,0 7 0,0 17 0,0-3 0,14-13-135,-13-9 0,1-1-315,24 5-989,-15 23 540,3-30 899,4 23 0,-12-32 0,8 9 0</inkml:trace>
-  <inkml:trace contextRef="#ctx0" brushRef="#br0" timeOffset="258660">14332 13816 11041,'-4'-21'719,"2"-1"-719,1 1 0,1 0-90,24-12-180,-18 10-179,37-8-271,-39 14-269,39 1-361,-26 5-628,22 1 1978,-14 4 0,1 2 0,-1 1 0</inkml:trace>
-  <inkml:trace contextRef="#ctx0" brushRef="#br0" timeOffset="259160">15150 13728 12210,'0'-9'0,"0"2"-540,0 4-1708,19 2-901,7 0 3149,26 1 0,-9 0 0,4 0 0</inkml:trace>
-  <inkml:trace contextRef="#ctx0" brushRef="#br0" timeOffset="259308">15205 14052 11400,'-7'6'450,"23"-2"-1169,-19-17-810,46 9-181,-21-25 1710,27 26 0,-5-28 0,4 10 0</inkml:trace>
-  <inkml:trace contextRef="#ctx0" brushRef="#br0" timeOffset="259970">15787 13008 11311,'10'14'59,"-7"-3"1,7-11 0</inkml:trace>
-  <inkml:trace contextRef="#ctx0" brushRef="#br0" timeOffset="260205">15900 12977 10771,'-21'13'629,"-10"-10"-629,28 25 0,-22-24 90,15 31-180,-9-18-179,0 36-451,7-17-1128,-2 13 858,9-13-449,3-3 1428,1-1 0,1-4 0,0-1 1</inkml:trace>
-  <inkml:trace contextRef="#ctx0" brushRef="#br0" timeOffset="260890">16247 13553 10951,'-37'0'90,"16"19"-90,-11-14 0,28 34 0,-30-22 0,30 19 0,-21-7 0,23 0 0,-6 2-180,8 8 90,0-13-180,24 10 180,6-26 90,26 1 0,-13-11 0,-2-18 90,-4-7-90,-13-10 540,8-14-270,-22 17 269,0-21-269,-10 25-180,0-7-90,0 10 0,-17 13-90,13-6-719,-12 39-1260,16 13 540,0 8 1529,0 8 0,16-25 0,3 0 0</inkml:trace>
-  <inkml:trace contextRef="#ctx0" brushRef="#br0" timeOffset="261312">16672 13355 10681,'0'42'270,"0"-7"-270,0-1-90,0-5 180,17 1-90,-13 2 0,26-1-90,-26 0 90,21-2 0,-13 11 0,3-14-360,1 11-90,-14-23-179,4 0 539,-6-27 0,0-9 90,0-25 0,0 6 180,0-19 89,0 24 1,18-17 0,-13 27-180,27-2 450,-12 16-360,14 6 90,-2 18-181,-6 10-89,-12 20 0,-6 4-89,-8-7-451,-17 8-180,-5-20-1888,-20 15 2608,19-22 0,-14 3 0,14-11 0</inkml:trace>
-  <inkml:trace contextRef="#ctx0" brushRef="#br0" timeOffset="261560">17468 13406 12210,'-51'-3'540,"9"1"-540,1 2 0,-10 15 0,30 1-540,-25 19-90,44-1-269,-10-5-450,38-4-1,-20-8-834,50-3 2184,-31-6 0,26 4 0,-12-3 0</inkml:trace>
-  <inkml:trace contextRef="#ctx0" brushRef="#br0" timeOffset="261845">17280 12904 10231,'0'-4'990,"17"1"-990,-1 1 0,18 2-270,-11 17-90,-7-1-629,-2 5-990,-12 2 1979,4-9 0,-6 9 0,0-2 0</inkml:trace>
-  <inkml:trace contextRef="#ctx0" brushRef="#br0" timeOffset="261974">17535 12842 10321,'31'-7'-630,"-7"1"-269,-3 23-540,-9-12 1439,1 35 0,-3-19 0,1 20 0</inkml:trace>
-  <inkml:trace contextRef="#ctx0" brushRef="#br0" timeOffset="576562">8720 853 11940,'-5'-10'1349,"0"-4"900,0 13-1979,19-5-270,5 23 90,26 0-90,-8 2 0,2 11-90,-11-15-989,12 28 449,-10-14-270,-4-2 1,0 1 89,5 6-674,-5-4 0,0 0-585,4 5 1852,10 8 0,-13-17 0,-1-3 0</inkml:trace>
-  <inkml:trace contextRef="#ctx0" brushRef="#br0" timeOffset="576780">9450 729 11400,'-44'0'450,"2"18"-360,8-14-480,-2 34 390,-2-19-45,10 7 1,0 4 44,-13 9-899,14-13 0,2 1 719,-4 11-360,2-3 102,9 2-1631,2 7 450,9-11 1619,2 3 0,5-16 0,0-2 0</inkml:trace>
-  <inkml:trace contextRef="#ctx0" brushRef="#br0" timeOffset="577181">9557 973 11850,'-20'35'90,"16"5"-90,-16-7-842,6 1 752,11-8 173,-11-2-263,14-1 73,0-2-613,0-3 181,17-2-1,-13-4 116,34-6 155,-5-1 269,24-22 0,-9 13 629,7-33-89,-27 11 539,4-17-629,-16 18 480,-8-5-570,-1 19-270,-7 14-630,0 6-719,0 26-360,22-7 719,6-2 91,14-12-360,-4-6 1169,-5-8 0,-2 0 0,2 0 0</inkml:trace>
-  <inkml:trace contextRef="#ctx0" brushRef="#br0" timeOffset="577336">10205 996 11041,'-21'-9'899,"1"2"-899,-19 7 90,21 17-90,-7-13 0,22 28 0,-15-11-270,16 13-359,-5-5-361,7-5-449,25-14-180,-19 7 1619,47-15 0,-32 8 0,25-10 0</inkml:trace>
-  <inkml:trace contextRef="#ctx0" brushRef="#br0" timeOffset="577533">10417 445 10861,'-35'0'1079,"8"15"-1079,-1-11 0,10 25-180,9-26-1169,-2 46 180,6-26 1169,3 11 0,0 1 0,2 2 0,0 12 0</inkml:trace>
-  <inkml:trace contextRef="#ctx0" brushRef="#br0" timeOffset="577781">11002 741 11131,'-21'19'1169,"-5"7"-1169,23 10 0,-7 3-90,10-8-270,0 2-179,0 2-181,0 0 0,0 0-359,0 14 449,0-12-539,0 20 539,0-27 630,0 5 0,0-18 0,0-2 0</inkml:trace>
-  <inkml:trace contextRef="#ctx0" brushRef="#br0" timeOffset="578565">10798 1243 9242,'-13'-40'719,"3"8"-719,10-15 0,0 18 0,24-24-90,10 22-450,-3 3 1,2 0-407,22-4 541,-18 4 0,-1 0 269,10-4 1,-3 1 0,-1-1 495,0-1 269,-8 5 1,-3 0-112,-11 3 111,1-11-179,-15 19 90,-3-5 179,-3 7-359,0 5 25,0-2 155,-14 7-540,11 19 90,-11 5-90,14 14 0,0 0-90,0-2 180,17 19-90,-12-11 0,10-4 0,3-1-90,-2 5-90,2 11 0,5-20 0,-20-4 0,18-3 90,-19-5 0,13-5-269,-11-3-541,5-4 900,-4-2 0,0-3 0,-1-19 0,0 13 0,-1-26 0,2 27 0,0-24 90,2 15 180,-1-3 180,3 6-450,-2 10 90,5 0 0,-3 14 0,3-11-90,5 26 0,-3-8 0,13 15-180,-8-15-540,15 4 270,-10-23 91,7 8-1,-6-10 270,-1 0 0,1 0 90,7-18 90,-7-5 449,6-19 1,-17 10 719,0-3-809,-10 13-360,-2 20-90,-2 11 0,0 28-270,0-1-90,0-1-179,20-16-900,4 0 1259,20-17 90,-11 5 0,-1-21 90,-4-6 180,-7 1 719,2-17-269,-10 14-360,-7-15 359,0 11-629,-6 26 0,0 14 0,0 26-359,0-6-1440,18 13 269,-13-20-538,29 7 2068,-30-15 0,33-2 0,-10-2 0</inkml:trace>
-  <inkml:trace contextRef="#ctx0" brushRef="#br0" timeOffset="578748">12603 945 11131,'-32'0'-360,"11"13"-989,11 5-900,31 11 2249,1 1 0,3-15 0,-8-4 0</inkml:trace>
-  <inkml:trace contextRef="#ctx0" brushRef="#br0" timeOffset="578948">12013 650 9871,'33'-3'-2248,"-13"18"2248,-8 11 0,-12 12 0,0 4 0</inkml:trace>
-  <inkml:trace contextRef="#ctx0" brushRef="#br0" timeOffset="579100">12028 1633 11131,'0'10'90,"0"-1"-2879,0-2 2789,11-4 0,6-1 0,12-2 0</inkml:trace>
-  <inkml:trace contextRef="#ctx0" brushRef="#br0" timeOffset="579365">13362 648 12660,'-46'0'270,"7"15"-270,17 6 0,3 10 90,17 4-270,-5-2-270,24 23-90,-12-10-225,11-6 1,4-1-45,8 8-91,-7-10 1,1 0-451,5 4 978,3 9 0,-27-19 0,8-2 0</inkml:trace>
-  <inkml:trace contextRef="#ctx0" brushRef="#br0" timeOffset="579503">13200 1267 10681,'0'-35'0,"0"7"0,0-5 0,25 9-270,-19-3-180,49 1-2238,-31-1 2148,26 3 1,-12-2-181,-1 2 141,0 0 579,-2 1 0,-2 0 0,-1 1 0</inkml:trace>
-  <inkml:trace contextRef="#ctx0" brushRef="#br0" timeOffset="580035">13603 656 10231,'0'-8'0,"0"2"0,0 2 1799,0 0-1619,0 20-180,0 9 0,0 13 0,0 7 0,14 17 0,-10-13-873,9-4 0,-1 1 783,-9 6 0,8-18 0,0 0-189,-8 9 9,15-5-90,-17-4 91,13-5-1,-10-5-180,7-7-450,-4-4 2195,-2-7-1654,5-2 369,-5-27 170,7-6 90,-4-15-90,2 1 0,1-6 0,-2 15 539,3-17-449,-4 37-90,1-9-90,-1 21 90,1-3 0,2 5 0,1 19-180,2-14 45,2 24 0,1 4-45,8-13 0,0 13 0,1-2-180,4-17-90,22 18 90,-19-23-364,9 5 454,-15-7-152,-1-7 242,-3 0 0,2-14 0,-8-5 0,1-16 180,-12-3 0,-3 8 90,-3 1 90,-20 11-1,15 1 3,-29 3-92,19 2-116,-14 5-154,14 22 0,3 10-90,12 12-359,0-1-1350,17 5 629,3-11 1170,19 20 0,-19-25 0,-2 6 0</inkml:trace>
-  <inkml:trace contextRef="#ctx0" brushRef="#br0" timeOffset="580317">14590 1020 10861,'-21'16'719,"-7"5"-629,25 23-180,-8-9 90,11 3 0,0-11 0,0-3-180,24 0 91,-18-2-1,41-3 90,-18-3-180,11-5 180,8-5-90,-21-2 0,4-4 90,-19-20-180,4 14-90,-14-32 0,7 12-180,-9-9-719,-17-12 180,-8 18 989,-21-12 0,6 19 0,0-2 0</inkml:trace>
-  <inkml:trace contextRef="#ctx0" brushRef="#br0" timeOffset="580816">15518 825 12030,'0'-9'0,"0"24"0,17-12 0,-13 53 0,29-33 0,-24 9 0,-2 1 0,13-1-180,13 15-90,-20-25 90,19 3-89,-15-17-91,0 2 270,-2-8-270,0 3 90,-2-5 90,-2 0 90,2-18 180,-4-1-90,-2-20 540,-5 9-450,-2-5 0,0 10 360,0 1-540,0 33-810,0 10 271,15 30-361,-11-13 990,27-2 0,-5-6 0,18-1 0</inkml:trace>
-  <inkml:trace contextRef="#ctx0" brushRef="#br0" timeOffset="581336">16087 834 9691,'-13'-4'270,"10"20"-270,-10 9 90,30 12-90,-12-2-90,27-6 180,-9 12-90,-3-10 0,15 8 0,-18-4 0,3-10 0,0 10 0,-19-18-90,6 3-90,-7-12-449,-18 0-1,-3-6 270,-16-2 180,17-17 1,-9 0 268,26-18-89,15 5 90,-6 4-90,43 3 0,-27 8 90,21 2-90,8-1 90,-13 4-90,25-3 180,-30 6 180,17-4-270,-26 3-90,2-2 180,-12-4 0,-7 3 270,-2-10-91,-5 8 91,-21-6-270,16 8-90,-30 0 540,20 6-541,-2 21-89,5 5-629,28 37-1,-13-21-719,30 20 270,-7-33 1079,20 9 0,-6-22 0,-1 0 0</inkml:trace>
-  <inkml:trace contextRef="#ctx0" brushRef="#br0" timeOffset="581617">16805 930 10231,'-19'7'720,"3"8"-720,35 7 0,-15 25 0,32-29 0,-21 31 0,6-28 360,-1 4-360,-10-11 0,11-7 179,-6 0-89,-1-7 180,2-20-90,-2-9-180,13-27 90,-10 9-135,1 15 0,-1 1-234,3-6-81,11-7-2158,3 11 359,-8 11 2159,10 3 0,-13 8 0,1 5 0</inkml:trace>
+  <inkml:trace contextRef="#ctx0" brushRef="#br0" timeOffset="-202020.73">7790 9056 11311,'-48'43'539,"23"-10"-539,-17 2 90,37-10 0,-25 0-90,27 0 0,-9-3 0,12-2-360,0-4-269,28-3-451,-5-6-179,27 0-460,-9-6 1719,3 2 0,4-3 0,1 0 0</inkml:trace>
+  <inkml:trace contextRef="#ctx0" brushRef="#br0" timeOffset="-201501.73">8228 9170 8432,'0'-35'360,"0"6"-270,0-4 270,0 7-180,0-3 89,0 0 91,14-2 0,-11 1 540,10-11-631,-13 10 1,0-11-180,0 22 90,0-2 180,-13 16-360,10 18-90,-11 32 180,14-1-90,0 0 0,0 0 0,0 6 0,-2 0 0,4 0-90,18-1-30,-18-13 0,1-2-150,29-3 90,-29-4-449,22 7 269,-8-12-630,17 4 541,-7-17 359,10-2 90,-15-6 90,8-20-90,-8-2 90,-3-3 689,-3-10-59,-9 15-450,-3-13 89,-4 8-359,0 24-1079,0 9-1080,17 20 720,-13-2 1439,28-11 0,-29 6 0,13-9 0</inkml:trace>
+  <inkml:trace contextRef="#ctx0" brushRef="#br0" timeOffset="-201323.73">8762 8993 9871,'-18'-3'-3148,"4"16"3148,14 2 0,0 3 0,0-7 0</inkml:trace>
+  <inkml:trace contextRef="#ctx0" brushRef="#br0" timeOffset="-201019.73">8923 9212 10141,'10'6'810,"5"-2"-810,-2-4 0,19-16 0,-11 13 0,12-13 90,-1 0-90,-6 2 270,8-14-91,-18 15-89,1-6 0,-13 8 180,-2-4-270,-2 3 90,-16 7 0,12 0-180,-28 4 180,10-1-90,-16 19 0,5 1-180,14 17-719,8-2 269,11 0-989,21 0 809,4-10 810,27-1 0,-12-13 0,2 1 0</inkml:trace>
+  <inkml:trace contextRef="#ctx0" brushRef="#br0" timeOffset="-200690.73">9403 9163 10501,'0'7'810,"17"-10"-810,-1 36 0,19-17 0,-9 15 0,-1-8 0,-8-11 0,-9-19 0,-3-14 89,-5-17 1,0 0 180,0 5-180,14 13-629,6 29-1440,10 14 719,0 19-269,-7-20 1529,-2 11 0,0-30 0,-2 12 0</inkml:trace>
+  <inkml:trace contextRef="#ctx0" brushRef="#br0" timeOffset="-200354.73">9967 8888 10411,'0'-9'1709,"0"18"-1619,0 8-90,16 25 0,-12-6-90,23 4-180,-24-12-809,19 15 539,-11-12-359,8 19 449,-9-24-180,-4 10 540,-6-20 90,0 2 0,0-12 450,-24-2 270,1-3-361,-24-20 271,8-4-360,7-23-90,13 12 0,10-3-180,9 14 0,0-1 90,26 3-180,-20 2-450,28 7 0,7 4-899,-10-2 1439,17 2 0,3 2 0,0 6 0,-16-2 0,0 0 0</inkml:trace>
+  <inkml:trace contextRef="#ctx0" brushRef="#br0" timeOffset="-200190.73">10695 9191 10681,'-19'-11'0,"3"-3"0</inkml:trace>
+  <inkml:trace contextRef="#ctx0" brushRef="#br0" timeOffset="-199624.73">7732 9541 10591,'0'-5'1169,"15"0"-1079,-11 3 0,31-2 0,-1-2 0,15-1-45,-4 1 0,2-1-590,-13 2 0,4 0 545,10 0 0,7 0 0,-2 1-1383,4-1 0,0 1 1353,-5 1 0,4 0 0,2 0 52,-9 1 1,2 0-1,0 1 1,-1-1-388,3 1 1,-2-1-1,5 1 365,-3 0 0,5-1 0,2 1 0,-2-1 0,-5 1-407,3-1 1,-4 1 0,4 0 208,-5 0 0,5 0 0,1 0 0,-2 0 0,-6 0-262,2 0 1,-4 0 0,1 0 219,12-1 0,2 1 1,-5-1-31,0 1 0,-4-1-45,-3 0 0,-2-1 816,-2 2 0,-1 0-1494,7-2 1,-1 0 992,-16 2 0,-1-1 0,5-1 0,-3 0 0,2 0 0</inkml:trace>
+  <inkml:trace contextRef="#ctx0" brushRef="#br0" timeOffset="-198269.73">8640 10507 9961,'41'-20'720,"-6"2"-630,4-1-1702,-4 2 1612,7-1 0,6-4-45,-7 5 0,2 0 45,-9 4 0,1-1-675,25-9 1,0 0 134,-24 9 1,0 1 539,22-7 0,-2 0 0,4 0 0,-23 8 0,0 0 0</inkml:trace>
+  <inkml:trace contextRef="#ctx0" brushRef="#br0" timeOffset="-197307.73">10263 9752 10951,'-19'-7'1259,"3"2"-1079,16 2 0,0-1-270,-8 3 180,6 20-90,-10 13 0,10 13 0,-2-8 0,0 1 0,2 13 0,-2 6 0,-1 1 0,1 1 0,0-5 0,1-3 0,0-10-180,0 14 180,1-33-540,1 2 360,1-37 90,17-25 90,-13-9 0,10 7 0,0-1 0,-12-8-696,3 15 1,1 1 695,4-14 0,-7 0 0,7 1 0,3-15 0,-8 17 270,14-13-91,-12 32 1,2 2 0,-3 17-90,1 4-90,-1 2 1482,1 17-1572,2-13 180,1 37-90,7 2 0,-3 12 0,-2-13 0,0-1-792,3 11 702,-6-19 0,-1 0-360,3 9-270,-2-5 1,-2-4-1,-1-3-89,-2-6 89,-2-2-989,1 0 1709,-3-10 0,0 2 0,0-9 0</inkml:trace>
+  <inkml:trace contextRef="#ctx0" brushRef="#br0" timeOffset="-197169.73">10260 10136 8972,'0'-17'540,"0"1"-450,0 3-270,23 5-990,0 5 541,28 2-361,-15 1 990,3 0 0,-9 0 0,0 0 0</inkml:trace>
+  <inkml:trace contextRef="#ctx0" brushRef="#br0" timeOffset="-196738.73">10782 10005 11670,'0'43'90,"0"-8"-90,0 1 90,0-7-90,0 2 0,0 0 0,14 0 0,-11 1 0,11 9 0,-3-10 0,-8 16 0,15-26-90,-16 7-90,4-18 180,-6-21 0,-17 8 0,12-36 0,-33 5-90,33-11-800,-29-4 710,30 10 270,-24-2-90,25 0-405,-17-18 405,18 15 0,-1 9 0,-1 1 0,4-2-90,24-15 90,6 29 90,14-3-90,8 15 0,-18 5 90,6 2-90,-7 19 0,-8 5 0,-7 21-630,-8 4 90,-32-7-1349,-6 11 990,0-22 899,-18 13 0,20-23 0,-24 3 0</inkml:trace>
+  <inkml:trace contextRef="#ctx0" brushRef="#br0" timeOffset="-196274.73">11273 9854 11311,'5'23'179,"0"13"-179,-1-22 0,0 17 0,4 8 90,-2-9-90,5 24 0,-5-24-90,0 19 180,-4-24-180,0 4 360,-2-14-360,0-3 90,0-3 0,0-4-90,-17-3 90,12-18 0,-26-7 0,27-13 0,-21 1 0,22-13 0,-15 10 0,16 4 0,1 0-90,-7-5 180,8-21-180,20 29 180,-15-4-90,35 12 0,-15 11 0,19 1 90,-2 10-90,-19 22 0,4-15 90,-25 33-90,9-11-180,-11 10-719,0 15 89,-23-18-1169,-6 22 450,-12-24 1285,0 7 1,11-18-1,0-2 1</inkml:trace>
+  <inkml:trace contextRef="#ctx0" brushRef="#br0" timeOffset="-195434.73">12023 9658 12300,'14'27'-270,"-10"6"-270,26-6-269,-27 3-270,24-6-181,-17 0-89,3-1 1349,7 0 0,-10-3 0,11-1 0</inkml:trace>
+  <inkml:trace contextRef="#ctx0" brushRef="#br0" timeOffset="-195064.73">12287 9376 8702,'-16'-6'0,"-4"1"-90,18 1 90,-9 2 0,10 1 0,-3 1 0</inkml:trace>
+  <inkml:trace contextRef="#ctx0" brushRef="#br0" timeOffset="-194640.73">11983 9369 11670,'0'-4'-60,"14"1"0,4 3 0</inkml:trace>
+  <inkml:trace contextRef="#ctx0" brushRef="#br0" timeOffset="-194107.73">12643 9742 8972,'-19'-14'270,"-9"10"269,25-22-179,-24 13 180,13-7-360,-13 4-180,9 9 0,6-1 90,0 7-90,8-2 180,-8 1-180,6 2 0,0-2 90,3 16-90,2 2-90,0 18 180,1 0-180,0 1 90,0-4 0,16-10 90,-4-9-180,6-27 90,-5-13 90,-8-28-90,1 11 90,0-21-1,-3 25-676,-1-14 857,-1 18-90,1-1-90,0 6-1,0 1-178,-1 4 89,-1 5 359,1 2-179,-1 9-90,3 3-90,1 7 858,3 24-858,1-18 0,2 44 0,2-27-540,3 27-360,1-9-449,1 4-675,-3-10 1,0 1 1748,10 19 0,-9-20 0,1 0 0,9 12 0</inkml:trace>
+  <inkml:trace contextRef="#ctx0" brushRef="#br0" timeOffset="-193856.73">13167 9727 11580,'0'-7'0,"17"1"0,-13 0 0,28 1-2428,0-1 1079,0 2 1349,9 1 0,-18 3 0,-1 0 0</inkml:trace>
+  <inkml:trace contextRef="#ctx0" brushRef="#br0" timeOffset="-193705.73">13325 10038 10321,'23'-13'-473,"13"9"1,-8-24 0,18 11 0</inkml:trace>
+  <inkml:trace contextRef="#ctx0" brushRef="#br0" timeOffset="-193302.73">14595 9447 11940,'-20'0'90,"1"0"-180,6-16 270,5-7-270,5-18 180,3 7 0,17-13 0,-12 20-90,13-10 0,-18 13 90,12 0 90,-10-1 180,10-7-180,-12 8-1,0-11-269,0 20 180,-15-4-90,11 34 0,-12 8-90,16 18-629,0 18 359,0-18-540,0-4 1,0 1-577,0 7 397,16 15-270,-12-19 1349,11 0 0,-15 1 0,0-1 0</inkml:trace>
+  <inkml:trace contextRef="#ctx0" brushRef="#br0" timeOffset="-193157.73">14592 9873 12120,'44'0'180,"-6"-16"-450,3 12-360,-7-12-809,1 1-540,3 11 1979,0-20 0,4 21 0,-1-7 0</inkml:trace>
+  <inkml:trace contextRef="#ctx0" brushRef="#br0" timeOffset="-192421.73">8682 10690 10501,'0'-6'1349,"0"1"-1079,0 0-90,0-1-90,0 1-90,0 0 809,0 2-719,20 1 0,7 21-90,13-14 0,2 38-45,-14-24 0,0 0 90,-5 5 0,1 2-225,19 13 1,1 1-248,-15-15 1,-1 0-174,5 4 1,2 3-1,-2-4-958,-1-1 0,-2-2 208,12 8 1,0-1 1349,-12-10 0,-2-1 0,2 0 0,-1-1 0,0 0 0,0 0 0</inkml:trace>
+  <inkml:trace contextRef="#ctx0" brushRef="#br0" timeOffset="-191551.73">10475 10978 11131,'-11'-6'359,"1"0"181,3 4-540,3 17 0,1 27 90,3-1-90,0-1 0,0-1 0,0 4-355,0 16 355,0-21-89,0-3-91,0-2-90,0-6 177,0-3-87,0-6-899,0-2 809,0-27 270,0-10 0,19-18 0,-14-7 90,14 8-180,-5-5 447,-10 2-132,10 11 0,1 0 45,-11-14-135,8 11 0,1 1-45,-1-1 180,1-1 179,4 18-359,-14 5 90,11 6 0,-6 1-180,4 4 0,4 21 0,-4-16 0,9 47 0,-10-33-360,6 28-719,-5-8 449,-2-8-629,2 15 719,-8-22-89,0 9 179,-4-17-270,-20 7 900,-2-15 1439,-23 1-1079,3-8-270,7-1-90,3-15-90,12 12 269,3-11 1,8-2-180,-4 12 270,11-23-360,-5 13-90,7-11-90,25 11-1079,6-9 269,15 16-1094,-2-12 218,-7 11 1776,-1 0 0,2 4 0,0 1 0</inkml:trace>
+  <inkml:trace contextRef="#ctx0" brushRef="#br0" timeOffset="-191091.73">11128 11144 10501,'0'10'450,"0"-1"-360,0-1 0,0 2-90,0 12 90,0-3-180,17 12 90,-13 9 0,26-6 0,-17 30 90,4-26-180,-8-4 0,-1 0-652,0 4 562,2 7-180,0-11 90,-9-14-180,2 1 361,-3-30 178,0-31-178,0-1 178,-14-20-89,11 0 0,-11 12 90,7 7 0,2 0 0,2-7 0,-3 11 0,0 0-90,6-3 90,0-5 562,0 20-562,0 6 0,19 6 360,-14 1-270,31 8 90,-20 1-181,13 21-178,-9 3 89,-9 17 89,-5-8-358,-6 0-1171,-19-1 451,-4-7-1889,-20 10 2878,19-17 0,-12-1 0,16-9 0</inkml:trace>
+  <inkml:trace contextRef="#ctx0" brushRef="#br0" timeOffset="-190656.73">11598 11006 10411,'0'32'900,"0"-5"-900,0 7 0,0-12 0,0 5 0,0-7 89,0 1-178,0 0 89,14 0 0,-10-1 0,10-2 0,-14-1 0,0 2 0,0-8-90,0 2-450,0-9 360,0-18 180,-14-8-90,10-13 90,-10-17 0,5 17-831,6-17 921,-6 15-90,9-2 0,0 3 0,18-11 90,-13 16 449,30-9-449,-31 25 180,24 3 0,-16 9 561,11 25-921,-12 5 90,-2 24 180,-9-10-360,0 14-269,-17-22-361,13 8-449,-28-15-1,29-1-628,-30-2 1888,29-3 0,-26-5 0,14-1 0</inkml:trace>
+  <inkml:trace contextRef="#ctx0" brushRef="#br0" timeOffset="-190074.73">12343 10757 9602,'-44'0'0,"-1"0"0,11 15 0,3 2-90,15 16 90,6-1 0,27-5 0,-12-2-90,29-7 180,-9 6-180,-2-6 449,14 10-89,-20-13 90,3 2-180,-8-7-180,-12-2 0,0 1 0,0 1 0,0-3-90,-18 2-360,-2-6-89,-15 1 179,16-20 270,6-5 180,38 1-180,-19-9 90,25 20 0,5 4 90,-11-9-776,36-6 686,-28 18 0,0-13 0,-2 14 0,-2-12 0,-3 9 0,-6-6 90,4 1 90,-14 1-90,6-6 90,-15 5 685,2-3-595,-3 3 0,-20 1 90,14 0-90,-32 3-180,18 1 90,-14 1-180,16 19 89,6 4-358,12 22-181,21-11-360,-16 2-809,35-1 540,-14-8 1079,11 5 0,0-13 0,-10 0 0</inkml:trace>
+  <inkml:trace contextRef="#ctx0" brushRef="#br0" timeOffset="-189770.73">13015 10814 10231,'0'31'360,"14"5"-360,-10-10 0,10 4 0,-14-9 90,0 2-180,7-1 90,-5 0 0,5-2 0,-1-1 90,-4-2-180,7-2 0,-3 2-360,3-7-449,5-1 539,-4-6-540,10-2 361,-7-21-181,7 15 720,1-31 0,-3 17 0,4-16 0</inkml:trace>
+  <inkml:trace contextRef="#ctx0" brushRef="#br0" timeOffset="-189173.73">13235 10765 11311,'-13'-7'899,"10"1"-809,-9 1 0,12 2 0,-11-2-90,0 4 90,-9 0-180,3 1 180,2 14-90,1-10 0,-5 25-90,6-3-360,-3 22-90,10-5-1259,3 15 450,3-26 1349,21 18 0,3-27 0,21 6 0</inkml:trace>
+  <inkml:trace contextRef="#ctx0" brushRef="#br0" timeOffset="-188705.73">13400 10679 10321,'-1'29'270,"14"5"-270,-9-8 0,10 4 90,-2-8-90,-9 1 0,9-1 0,-1 1 90,-8-1 0,14 0 0,-15-1 449,10 3-359,-11-8-90,8 2-180,-8-11-719,3-21 179,-4-8-809,0-25 629,0 10 810,0-15 0,17 22 0,6-8 0</inkml:trace>
+  <inkml:trace contextRef="#ctx0" brushRef="#br0" timeOffset="-188388.73">13830 10942 9871,'7'7'180,"1"0"-90,1-7 90,3 0-180,-3-17 0,6-2 180,-6 0-180,3-13 0,-6 12 90,-1-17 0,-4 10 0,-1-1 0,-20 18 0,14-9 90,-34 13 0,25-3-1,-15 5-179,18 19 0,4 4-90,8 31-359,0-16-1080,21 22 359,-15-30 1170,34 11 0,-12-21 0,20 3 0</inkml:trace>
+  <inkml:trace contextRef="#ctx0" brushRef="#br0" timeOffset="-187986.73">14155 10791 10321,'-19'14'270,"5"6"-270,14 11-90,16-11 180,-12 3-90,27-20-270,-27 14-270,28-15 361,-10 5-91,9-7 270,-2 0 0,-2-23 90,-7 18-90,8-49 180,-15 33 89,0-40 1,-10 25 0,-1-9 90,-2 10 90,0 0-91,-18-1 271,13-12-450,-26 15-90,28-13 180,-10 26 90,13 1-360,0 32 0,0 10 0,16 30-270,-12-10-90,9-9 0,2-2-180,1 9-1206,0 12 756,8-17-179,-21-1 0,18-2-270,-18-2 1439,7-5 0,-10-1 0,0-5 0</inkml:trace>
+  <inkml:trace contextRef="#ctx0" brushRef="#br0" timeOffset="-187856.73">14237 10802 10951,'0'-29'0,"0"1"-540,25-12-90,-19 10-404,24 7 0,5 2-940,-11-1 1974,33 0 0,-25 14 0,-1 1 0</inkml:trace>
+  <inkml:trace contextRef="#ctx0" brushRef="#br0" timeOffset="-186104.73">15172 10739 11311,'9'-5'179,"-2"0"-179,-7 4-90,0-2 90,5 2 90,1 0-90,5 1 0,2 0 0,14-2 0,-3 0-1259,28-4 0,-18 2 1259,30-3 0,-27 2 0,12-1 0</inkml:trace>
+  <inkml:trace contextRef="#ctx0" brushRef="#br0" timeOffset="-185890.73">15162 10926 11221,'30'-14'-450,"19"10"-540,-28-10-269,25-3-630,-9 12 1766,6-24 0,0 26 0,3-9 0</inkml:trace>
+  <inkml:trace contextRef="#ctx0" brushRef="#br0" timeOffset="-185357.73">16300 10318 10681,'28'-1'1349,"1"1"-1349,-6 0 0,-1 14 0,-7-10 0,1 21 0,1-22-899,9 31-181,-7-20-1528,13 31 2608,-14-20 0,5 6 0,-8-8 0</inkml:trace>
+  <inkml:trace contextRef="#ctx0" brushRef="#br0" timeOffset="-185172.73">16628 10245 10771,'-29'-11'809,"-3"4"-629,-28 4-270,18 23 90,4-7 0,2 3-359,4 24-586,11-12 1,3 2-226,6 8 1170,2 27 0,30-28 0,5 9 0</inkml:trace>
+  <inkml:trace contextRef="#ctx0" brushRef="#br0" timeOffset="-184739.73">17087 10340 11490,'-23'16'0,"6"1"0,38 3-90,-15 11 90,31-27-359,-33 26 179,33-17 0,-17 2 90,19-5 180,-8-10-90,-7-14 360,-10-5-90,-7-16 449,-7-3-629,0 2-90,0 6 0,-14 13 90,10 4-90,-10 32 0,14 5 0,0 17 0,18 2-90,-14 9 180,26-12-135,-27-7 0,-3 1-135,12 1-270,-12 21-89,0-29-271,0 6-179,0-16-1,-18-2-539,13-5 1529,-29-4 0,29-3 0,-12-3 0</inkml:trace>
+  <inkml:trace contextRef="#ctx0" brushRef="#br0" timeOffset="-184457.73">17585 10013 10141,'12'-1'810,"1"1"-810,-1 0 449,3 16-179,-6-12-270,4 27 90,1-9-90,-5 7 0,10 16 90,-10-17-180,6 21 90,-8-19 0,6 25-90,-6-28-359,9 19-181,-8-28-629,17 6 719,-6-15 0,11 0-269,-4-8-451,3-1 1260,0 0 0,3 0 0,-1 0 0</inkml:trace>
+  <inkml:trace contextRef="#ctx0" brushRef="#br0" timeOffset="-184190.73">17783 10335 9781,'47'0'-1169,"-10"-15"180,3 11-810,-11-11 1799,-1-1 0,1 12 0,-2-12 0</inkml:trace>
+  <inkml:trace contextRef="#ctx0" brushRef="#br0" timeOffset="-183680.73">15838 9928 10681,'11'-11'899,"1"2"-719,-4 3-90,1 1 0,-2 1 180,1 1-270,-4 1 90,1 1-450,-4 20-1349,-1 3-630,0 21 2339,0-3 0,0-2 0,0-2 0</inkml:trace>
+  <inkml:trace contextRef="#ctx0" brushRef="#br0" timeOffset="-183538.73">15903 9868 10231,'8'-8'-809,"-6"21"-631,12-9 1440,-7 41 0,6-22 0,-2 24 0</inkml:trace>
+  <inkml:trace contextRef="#ctx0" brushRef="#br0" timeOffset="-183157.73">18253 9577 12570,'14'-4'0,"-3"1"0,10 2-540,-11 21-989,-4 4 270,-6 22 179,0-10-89,0-1 1169,0-11 0,0-3 0,0-4 0</inkml:trace>
+  <inkml:trace contextRef="#ctx0" brushRef="#br0" timeOffset="-183022.73">18428 9671 11850,'26'-10'-539,"-6"8"-2520,-8 12 3059,-8 15 0,-4 13 0,0 0 0</inkml:trace>
+  <inkml:trace contextRef="#ctx0" brushRef="#br0" timeOffset="-181432.73">9358 12530 8792,'-5'-5'720,"0"1"-361,4-3 1,-2 2 0,1 1 0,1 1 89,-1 0 811,2 1-1170,16 15 0,6 1-180,14 4 180,2 8-540,0-22-360,7 28-2640,-9-21 0,2-1 3450,-6 4 0,-1 2 0,10-2 0,1-2 0,17 6 0</inkml:trace>
+  <inkml:trace contextRef="#ctx0" brushRef="#br0" timeOffset="-180540.73">10550 12428 11311,'0'39'89,"19"-5"-89,-15 4 0,15-3 0,-19 2-314,12 3 224,-10 1 90,10 0 0,-12 0-630,8 13 360,-6-16 270,5 14-180,-7-29-226,0 0 406,0-32 67,0-15-67,0-31 0,0 5 180,0-1 0,0-1 90,0-3-91,0-1 1,0 2 0,0 5-225,0 13 0,0 0 315,0 3 180,0-2-360,0 20 384,0 7-384,16 4-90,0 3 0,3 20 90,16 8-90,-22 11-1921,7-9 0,0 0 1112,-2 10-271,4 14-487,-8-14-52,-2-2 1619,-1 0 0,-1-2 0,-1-2 0</inkml:trace>
+  <inkml:trace contextRef="#ctx0" brushRef="#br0" timeOffset="-180373.73">10675 12731 9512,'0'-13'269,"19"-4"-269,-14 5 0,32-2-989,-12 4 89,9 2-809,2 3 1709,-9 1 0,1 3 0,1 0 0</inkml:trace>
+  <inkml:trace contextRef="#ctx0" brushRef="#br0" timeOffset="-179924.73">11285 12644 9871,'0'39'900,"0"-10"-810,0 5-90,0-12 0,0 4 0,0-1 0,0 2 0,0 1 0,0-1 0,14 1 0,-10 0 90,10 1-180,-3 9 90,-8-10 90,17 4-90,-18-14-90,7-4-180,-9-2-180,0-3 450,0-27-90,0-9 180,-17-17-90,12-1-90,-12-13 180,5 12-90,10 5 0,1 0 90,-12-8 0,12 10 0,2 1 0,-1-2 450,21-14-270,-16 30-91,16 1 91,-1 14 0,-2 6-90,17 2-180,-19 19 90,7 4-180,-16 1 90,5 32 0,-7-36-1079,-22 40 179,12-37-1439,-32 10 630,32-17 1709,-26 0 0,28-10 0,-9-4 0</inkml:trace>
+  <inkml:trace contextRef="#ctx0" brushRef="#br0" timeOffset="-179472.73">11753 12474 10321,'5'19'990,"-1"0"-901,-4 22-89,0-13 0,0 2 90,0-8-90,0 0 0,0 11-90,0-9 90,0 9 0,0-12 90,0 1-90,0-2-90,0 6 180,11-8-180,-8 5-179,8-14 179,-11-1 90,0-21-90,-19-8 0,15-10 90,-15-4 90,3 4-180,13-22 180,-23 12-135,23 4 0,3-1 45,-10-6 0,9 9 0,2 0 0,-1-2 0,17-9 90,3 16 0,0 10 90,12 0-1,-11 15 1,14 2-90,-14 25-90,3-17 0,-21 38 0,12-26 90,-14 19-180,5 5-90,-6-9-1349,-20 21 270,-2-23 1259,-19 17 0,20-24 0,3 7 0</inkml:trace>
+  <inkml:trace contextRef="#ctx0" brushRef="#br0" timeOffset="-178870.73">12410 12363 11221,'0'13'899,"0"-2"-809,0 0-180,0 0 0,0 1 180,14 10-90,-10-3-540,10 7-179,-3-7-451,-8 1 91,16 0 1079,-8 5 0,-1-6 0,-1 4 0</inkml:trace>
+  <inkml:trace contextRef="#ctx0" brushRef="#br0" timeOffset="-178724.73">12358 12140 7982,'0'-14'-405,"0"4"0,0 3 1,0 3-1</inkml:trace>
+  <inkml:trace contextRef="#ctx0" brushRef="#br0" timeOffset="-178306.73">12888 12264 10861,'-45'0'899,"0"0"-989,11 0 180,2 19-90,10 5 0,11 20 90,0-11-180,11-2 180,0-11-360,28 5 180,4-7-870,16 1 870,-4-12-179,-11 0 269,1-7-360,11 3 360,-12-18 0,17-8 0,-27-9 0,3-18 0,-14 16 90,-7-14 270,-1-7-91,-4 9-44,-11 8 0,0 0 45,5-5-225,-15 11 0,1 2 45,15 1 1410,-25-2-1500,27 38 0,13 27-90,11 8-1592,4 13 962,8-17-899,-29 0-512,30 4 2131,-21-4 0,16 3 0,-6-4 0</inkml:trace>
+  <inkml:trace contextRef="#ctx0" brushRef="#br0" timeOffset="-178004.73">13803 12267 11490,'44'0'-5666,"-3"0"5666,-1 0 0,-12 0 0,-2 0 0</inkml:trace>
+  <inkml:trace contextRef="#ctx0" brushRef="#br0" timeOffset="-177857.73">13900 12468 10861,'22'3'-2339,"7"-18"-368,14 10 2707,2-13 0,-8 3 0,2-5 0</inkml:trace>
+  <inkml:trace contextRef="#ctx0" brushRef="#br0" timeOffset="-177116.73">14748 12240 10771,'0'5'1529,"0"-14"-1619,0-6 90,0-21 90,14-8-90,-10 2 0,10-18 90,-4 20-1175,-7-10 1085,7 14 270,-10 2 149,0 2-509,0-4 0,0 12 270,0-3-180,0 45-180,0 12 90,0 23-270,0 5-360,7-24 1,3 0-630,12 20-180,-2-11 0,2-1 1597,11 2 0,2 6 0,-9-21 1</inkml:trace>
+  <inkml:trace contextRef="#ctx0" brushRef="#br0" timeOffset="-176806.73">15292 11923 10861,'-31'-17'719,"-10"2"-539,36 6-180,-26 2 90,13 4-90,-11 1 0,12 22 0,7 4-90,10 22 90,23-4-90,9-6 45,-3-20 0,3-4 45,19 1 0,-16-9 0,-1-2 0,6-2 0,9-20 90,-20 15-180,-7-33 90,-4 11 90,-9-9-90,-4-2 0,-5 1-90,-21 9-179,-7-11-361,0 22-1349,-32 2 990,38 10 989,-28 5 0,23 20 0,2 4 0</inkml:trace>
+  <inkml:trace contextRef="#ctx0" brushRef="#br0" timeOffset="-176490.73">15798 11934 11760,'2'-14'720,"-1"-4"-720,0 9 90,-1 15-90,0 5 0,0 27 0,0-3 0,26-12 0,-20 8 0,45-27 0,-31 18 0,21-20 0,2 6 90,-11-8-90,16-19 0,-24 14-90,0-46 0,-16 30-720,-5-39-179,-31 27-1361,21-7 1675,-22 25 1,-3 3-1493,3-11 2167,-32 2 0,11 7 0,-2 0 0</inkml:trace>
+  <inkml:trace contextRef="#ctx0" brushRef="#br0" timeOffset="-175791.73">9365 12675 9691,'-12'0'540,"1"0"-90,1 0-180,1 0 0,-1 0-180,0 16 89,2 3 1,1 24 0,5-7-1079,1 9 899,1-7 0,25 8 90,-19 2-90,18-21 0,2 1 0,-4 32-45,-2-29 0,3 2 135,4 18 0,-1 2-135,-6-13 0,1 2-45,1 5 0,3 5 0,-2-4-995,-2-3 1,-2-1 544,8 14 0,-2 0-180,-9-18 1,0-1-316,0 0 1,0-1 1034,-1 0 0,-1-1 0,0-2 0,0 0 0,-1-1 0,1 0 0</inkml:trace>
+  <inkml:trace contextRef="#ctx0" brushRef="#br0" timeOffset="-174924.73">10767 14054 10321,'-18'16'360,"-9"13"-180,24 9-180,-8-6 0,-1 0 90,10 13-135,-9 4 0,-1 1 45,5 4 45,-1-6 0,-1-1-135,3-9 0,1 13 0,3-29-360,1-1 270,1-29 270,0-14-180,18-31 180,-13 3-523,25-9 523,-27 13 0,22-4 180,-23-1 0,24-1 0,-23 3 90,27 0-180,-9-12 0,8 19 359,8-11-449,-16 32 0,6 4-90,-9 13 0,-1 4 0,0 22 0,-1-17 0,0 46 90,-1-25-270,-6 10 0,-1 4-269,4 10-226,-4-5 0,-1 0-404,0 7 89,-3-10 1,-1 0-737,-1 2 1726,-1 10 0,-1-24 0,0-2 0</inkml:trace>
+  <inkml:trace contextRef="#ctx0" brushRef="#br0" timeOffset="-174782.73">10693 14514 10321,'-3'-31'450,"0"2"-450,22 0-90,-14 4-45,22 6 0,6 1-944,-5-4-316,11 7 1,2 2 1394,5 0 0,13-1 0,-16 8 0</inkml:trace>
+  <inkml:trace contextRef="#ctx0" brushRef="#br0" timeOffset="-174323.73">11443 14310 10141,'0'31'990,"0"-1"-900,0-4-90,0 0 179,0-3-268,0 1 178,14 17-89,-10-9 0,26 12 0,-26-11 0,22 1 0,-23 1 0,15 15 0,-16-13 0,7 20 90,-9-29-449,0 8-1,0-24 180,0-19 180,-18-20-90,13-13 135,-12 8 0,-1-1-135,14-13-643,-3 14 1,-2-1 822,0-17-90,7-1 0,-7 1-436,8 15 1,2 0 525,-1-13 45,8 11 0,1 2 44,-5 3 23,31-5-112,-30 25 180,24 3-180,-15 8 1243,0 17-1333,4-13 985,-16 30-985,5-6 90,-7 8-94,0 1-266,-22-1-179,16-11-1080,-35 13 449,17-25 1080,-12 7 0,-6-18 0,6 3 0</inkml:trace>
+  <inkml:trace contextRef="#ctx0" brushRef="#br0" timeOffset="-173790.73">11927 14240 10681,'1'12'899,"0"4"-899,0-9 90,-1 5 0,0 1-90,0-1-90,0 7 180,0 16-90,0-2 0,13 28 0,-9-21-319,9 13 319,-3-17-90,-8 0 90,8-3 90,-4 9-90,-5-13 0,9 11 0,-9-23 0,2 0-180,-3-10 91,0-25-1,-17-26 90,13-6 0,-10 5 0,0 0-236,11-10 191,-7 4 0,0 0-381,8-11 426,-3 20 0,1 1-90,4-12 90,0 2 90,0 6 90,18-7-90,-14 19 90,31-4-90,-31 24-90,26 5 0,-14 7 223,-1 23-223,20 3 0,-23 13 0,21 9 0,-21-17 0,1 21 90,-10-23-180,0 7-270,-3-13-180,0 0-269,-20-3 757,15-2-1028,-34-3-359,34-2 1439,-41-4 0,23-2 0,-24-2 0</inkml:trace>
+  <inkml:trace contextRef="#ctx0" brushRef="#br0" timeOffset="-173388.73">12570 13876 10591,'-13'-10'0,"-2"1"0,6 3 0,-3 2 0,7 3 0,0 15-270,4 7 0,1 20 180,16-7-180,-12 11 91,33-18 89,-17 21 90,15-25-540,-18 8-2518,1-21 3058,-37-2 0,20-6 0,-22-2 0</inkml:trace>
+  <inkml:trace contextRef="#ctx0" brushRef="#br0" timeOffset="-173091.73">12745 14003 8342,'42'-6'90,"2"0"0,13 0 90,-13 0 90,22-4-90,-33 3-448,5-3 268,-18 1 237,-7 2 123,-2-2-196,-7-4-74,-1 4 180,-22-9-90,15 9 449,-35-7-359,11 9-90,-10-1 46,-1 7-136,5 0-90,4 1 0,9 19 0,8 0 0,13 32-180,21-20-989,4 20 270,1-29-406,3-4 1,-1-2 1304,-5 0 0,32 2 0,-24-9 0</inkml:trace>
+  <inkml:trace contextRef="#ctx0" brushRef="#br0" timeOffset="-172773.73">13262 13822 10591,'-16'-6'720,"3"2"-720,13 21 0,18-13 0,-13 31 0,25-20 0,-27 14 0,22-5 0,-23 1 0,19 1 0,-19-1 0,15 8 89,-14-10-89,5 6 0,-8-16-89,0-2-1,-14-40-720,10-3 270,-10-22-989,14-6 450,0 21 1079,0-10 0,16 16 0,3 2 0</inkml:trace>
+  <inkml:trace contextRef="#ctx0" brushRef="#br0" timeOffset="-172366.73">13458 13745 10951,'-9'14'989,"0"-10"-809,1 10 90,-4-4-90,3-8-180,-4 24 0,5-15 90,-4 22-90,5-13-90,-1 10 180,3 4-90,2-6-90,1 19-90,2-19-989,21 14-1,-16-21-179,37 2-90,-24-13 1439,22-5 0,-6-2 0,3-3 0</inkml:trace>
+  <inkml:trace contextRef="#ctx0" brushRef="#br0" timeOffset="-171989.73">13712 13727 11041,'-2'34'449,"0"3"-449,16-10 0,-10 2 0,10-7 0,-1 10 0,-10-5 0,16 6 0,-17-10 0,9-3 0,-10 0 0,8-3 270,-6-2-90,4-4 0,-2-2-180,-3-26-270,0-6-405,-2-11 1,0-3-136,0-11-134,0 8 0,0 1-496,0 2 1440,0-7 0,14 19 0,3 3 0</inkml:trace>
+  <inkml:trace contextRef="#ctx0" brushRef="#br0" timeOffset="-171656.73">14020 13970 9691,'8'0'0,"1"0"0,0 0 180,0 0 0,6-16 0,-4-3 0,4 0 0,-2-11 0,-6 12 90,1-16-180,-7 8 269,-1-3-269,-16 13 90,12-2-180,-13 8 90,-2 5-90,1 2 0,-15 3 0,17 20 0,-2-15 0,16 32 0,-5-15 0,7 8-90,16 0-359,-12-9-91,28-1-180,-28-3 1,32-2 89,-19-7-1169,32 3 669,-17-10 1130,8 5 0,-11-6 0,-1 0 0</inkml:trace>
+  <inkml:trace contextRef="#ctx0" brushRef="#br0" timeOffset="-171456.73">14348 13768 10591,'-20'-7'90,"4"0"270,5 3-360,9 15 0,-9 9-90,28-3 0,-13 12-360,26-26 90,-26 21 0,27-21-629,-6 16 539,8-16 1,2 5-721,4-8 361,-9 0 809,9 0 0,-14-17 0,-2-5 0</inkml:trace>
+  <inkml:trace contextRef="#ctx0" brushRef="#br0" timeOffset="-171336.73">14610 13452 8342,'-13'-29'-539,"10"1"179,-21 4-540,13-7 540,-3 15 360,0-4 0,12 17 0,-4 2 0</inkml:trace>
+  <inkml:trace contextRef="#ctx0" brushRef="#br0" timeOffset="-171018.73">14483 13227 10141,'-8'0'810,"0"0"-450,1 0-91,1 18-179,0-14 90,0 32-90,0-19 0,0 33 0,3-16 0,1 0 0,1 0-90,0 7 0,0-2 0,1-1 0,0 7 0,0 17 0,0-3 0,14-13-135,-13-9 0,1-1-315,24 5-989,-15 23 540,3-30 899,4 23 0,-12-32 0,8 9 0</inkml:trace>
+  <inkml:trace contextRef="#ctx0" brushRef="#br0" timeOffset="-170836.73">14332 13816 11041,'-4'-21'719,"2"-1"-719,1 1 0,1 0-90,24-12-180,-18 10-179,37-8-271,-39 14-269,39 1-361,-26 5-628,22 1 1978,-14 4 0,1 2 0,-1 1 0</inkml:trace>
+  <inkml:trace contextRef="#ctx0" brushRef="#br0" timeOffset="-170336.73">15150 13728 12210,'0'-9'0,"0"2"-540,0 4-1708,19 2-901,7 0 3149,26 1 0,-9 0 0,4 0 0</inkml:trace>
+  <inkml:trace contextRef="#ctx0" brushRef="#br0" timeOffset="-170188.73">15205 14052 11400,'-7'6'450,"23"-2"-1169,-19-17-810,46 9-181,-21-25 1710,27 26 0,-5-28 0,4 10 0</inkml:trace>
+  <inkml:trace contextRef="#ctx0" brushRef="#br0" timeOffset="-169526.73">15787 13008 11311,'10'14'59,"-7"-3"1,7-11 0</inkml:trace>
+  <inkml:trace contextRef="#ctx0" brushRef="#br0" timeOffset="-169291.73">15900 12977 10771,'-21'13'629,"-10"-10"-629,28 25 0,-22-24 90,15 31-180,-9-18-179,0 36-451,7-17-1128,-2 13 858,9-13-449,3-3 1428,1-1 0,1-4 0,0-1 1</inkml:trace>
+  <inkml:trace contextRef="#ctx0" brushRef="#br0" timeOffset="-168606.73">16247 13553 10951,'-37'0'90,"16"19"-90,-11-14 0,28 34 0,-30-22 0,30 19 0,-21-7 0,23 0 0,-6 2-180,8 8 90,0-13-180,24 10 180,6-26 90,26 1 0,-13-11 0,-2-18 90,-4-7-90,-13-10 540,8-14-270,-22 17 269,0-21-269,-10 25-180,0-7-90,0 10 0,-17 13-90,13-6-719,-12 39-1260,16 13 540,0 8 1529,0 8 0,16-25 0,3 0 0</inkml:trace>
+  <inkml:trace contextRef="#ctx0" brushRef="#br0" timeOffset="-168184.73">16672 13355 10681,'0'42'270,"0"-7"-270,0-1-90,0-5 180,17 1-90,-13 2 0,26-1-90,-26 0 90,21-2 0,-13 11 0,3-14-360,1 11-90,-14-23-179,4 0 539,-6-27 0,0-9 90,0-25 0,0 6 180,0-19 89,0 24 1,18-17 0,-13 27-180,27-2 450,-12 16-360,14 6 90,-2 18-181,-6 10-89,-12 20 0,-6 4-89,-8-7-451,-17 8-180,-5-20-1888,-20 15 2608,19-22 0,-14 3 0,14-11 0</inkml:trace>
+  <inkml:trace contextRef="#ctx0" brushRef="#br0" timeOffset="-167936.73">17468 13406 12210,'-51'-3'540,"9"1"-540,1 2 0,-10 15 0,30 1-540,-25 19-90,44-1-269,-10-5-450,38-4-1,-20-8-834,50-3 2184,-31-6 0,26 4 0,-12-3 0</inkml:trace>
+  <inkml:trace contextRef="#ctx0" brushRef="#br0" timeOffset="-167651.73">17280 12904 10231,'0'-4'990,"17"1"-990,-1 1 0,18 2-270,-11 17-90,-7-1-629,-2 5-990,-12 2 1979,4-9 0,-6 9 0,0-2 0</inkml:trace>
+  <inkml:trace contextRef="#ctx0" brushRef="#br0" timeOffset="-167522.73">17535 12842 10321,'31'-7'-630,"-7"1"-269,-3 23-540,-9-12 1439,1 35 0,-3-19 0,1 20 0</inkml:trace>
+  <inkml:trace contextRef="#ctx0" brushRef="#br0" timeOffset="147065.27">8720 853 11940,'-5'-10'1349,"0"-4"900,0 13-1979,19-5-270,5 23 90,26 0-90,-8 2 0,2 11-90,-11-15-989,12 28 449,-10-14-270,-4-2 1,0 1 89,5 6-674,-5-4 0,0 0-585,4 5 1852,10 8 0,-13-17 0,-1-3 0</inkml:trace>
+  <inkml:trace contextRef="#ctx0" brushRef="#br0" timeOffset="147283.27">9450 729 11400,'-44'0'450,"2"18"-360,8-14-480,-2 34 390,-2-19-45,10 7 1,0 4 44,-13 9-899,14-13 0,2 1 719,-4 11-360,2-3 102,9 2-1631,2 7 450,9-11 1619,2 3 0,5-16 0,0-2 0</inkml:trace>
+  <inkml:trace contextRef="#ctx0" brushRef="#br0" timeOffset="147684.27">9557 973 11850,'-20'35'90,"16"5"-90,-16-7-842,6 1 752,11-8 173,-11-2-263,14-1 73,0-2-613,0-3 181,17-2-1,-13-4 116,34-6 155,-5-1 269,24-22 0,-9 13 629,7-33-89,-27 11 539,4-17-629,-16 18 480,-8-5-570,-1 19-270,-7 14-630,0 6-719,0 26-360,22-7 719,6-2 91,14-12-360,-4-6 1169,-5-8 0,-2 0 0,2 0 0</inkml:trace>
+  <inkml:trace contextRef="#ctx0" brushRef="#br0" timeOffset="147839.27">10205 996 11041,'-21'-9'899,"1"2"-899,-19 7 90,21 17-90,-7-13 0,22 28 0,-15-11-270,16 13-359,-5-5-361,7-5-449,25-14-180,-19 7 1619,47-15 0,-32 8 0,25-10 0</inkml:trace>
+  <inkml:trace contextRef="#ctx0" brushRef="#br0" timeOffset="148036.27">10417 445 10861,'-35'0'1079,"8"15"-1079,-1-11 0,10 25-180,9-26-1169,-2 46 180,6-26 1169,3 11 0,0 1 0,2 2 0,0 12 0</inkml:trace>
+  <inkml:trace contextRef="#ctx0" brushRef="#br0" timeOffset="148284.27">11002 741 11131,'-21'19'1169,"-5"7"-1169,23 10 0,-7 3-90,10-8-270,0 2-179,0 2-181,0 0 0,0 0-359,0 14 449,0-12-539,0 20 539,0-27 630,0 5 0,0-18 0,0-2 0</inkml:trace>
+  <inkml:trace contextRef="#ctx0" brushRef="#br0" timeOffset="149068.27">10798 1243 9242,'-13'-40'719,"3"8"-719,10-15 0,0 18 0,24-24-90,10 22-450,-3 3 1,2 0-407,22-4 541,-18 4 0,-1 0 269,10-4 1,-3 1 0,-1-1 495,0-1 269,-8 5 1,-3 0-112,-11 3 111,1-11-179,-15 19 90,-3-5 179,-3 7-359,0 5 25,0-2 155,-14 7-540,11 19 90,-11 5-90,14 14 0,0 0-90,0-2 180,17 19-90,-12-11 0,10-4 0,3-1-90,-2 5-90,2 11 0,5-20 0,-20-4 0,18-3 90,-19-5 0,13-5-269,-11-3-541,5-4 900,-4-2 0,0-3 0,-1-19 0,0 13 0,-1-26 0,2 27 0,0-24 90,2 15 180,-1-3 180,3 6-450,-2 10 90,5 0 0,-3 14 0,3-11-90,5 26 0,-3-8 0,13 15-180,-8-15-540,15 4 270,-10-23 91,7 8-1,-6-10 270,-1 0 0,1 0 90,7-18 90,-7-5 449,6-19 1,-17 10 719,0-3-809,-10 13-360,-2 20-90,-2 11 0,0 28-270,0-1-90,0-1-179,20-16-900,4 0 1259,20-17 90,-11 5 0,-1-21 90,-4-6 180,-7 1 719,2-17-269,-10 14-360,-7-15 359,0 11-629,-6 26 0,0 14 0,0 26-359,0-6-1440,18 13 269,-13-20-538,29 7 2068,-30-15 0,33-2 0,-10-2 0</inkml:trace>
+  <inkml:trace contextRef="#ctx0" brushRef="#br0" timeOffset="149251.27">12603 945 11131,'-32'0'-360,"11"13"-989,11 5-900,31 11 2249,1 1 0,3-15 0,-8-4 0</inkml:trace>
+  <inkml:trace contextRef="#ctx0" brushRef="#br0" timeOffset="149451.27">12013 650 9871,'33'-3'-2248,"-13"18"2248,-8 11 0,-12 12 0,0 4 0</inkml:trace>
+  <inkml:trace contextRef="#ctx0" brushRef="#br0" timeOffset="149603.27">12028 1633 11131,'0'10'90,"0"-1"-2879,0-2 2789,11-4 0,6-1 0,12-2 0</inkml:trace>
+  <inkml:trace contextRef="#ctx0" brushRef="#br0" timeOffset="149868.27">13362 648 12660,'-46'0'270,"7"15"-270,17 6 0,3 10 90,17 4-270,-5-2-270,24 23-90,-12-10-225,11-6 1,4-1-45,8 8-91,-7-10 1,1 0-451,5 4 978,3 9 0,-27-19 0,8-2 0</inkml:trace>
+  <inkml:trace contextRef="#ctx0" brushRef="#br0" timeOffset="150006.27">13200 1267 10681,'0'-35'0,"0"7"0,0-5 0,25 9-270,-19-3-180,49 1-2238,-31-1 2148,26 3 1,-12-2-181,-1 2 141,0 0 579,-2 1 0,-2 0 0,-1 1 0</inkml:trace>
+  <inkml:trace contextRef="#ctx0" brushRef="#br0" timeOffset="150538.27">13603 656 10231,'0'-8'0,"0"2"0,0 2 1799,0 0-1619,0 20-180,0 9 0,0 13 0,0 7 0,14 17 0,-10-13-873,9-4 0,-1 1 783,-9 6 0,8-18 0,0 0-189,-8 9 9,15-5-90,-17-4 91,13-5-1,-10-5-180,7-7-450,-4-4 2195,-2-7-1654,5-2 369,-5-27 170,7-6 90,-4-15-90,2 1 0,1-6 0,-2 15 539,3-17-449,-4 37-90,1-9-90,-1 21 90,1-3 0,2 5 0,1 19-180,2-14 45,2 24 0,1 4-45,8-13 0,0 13 0,1-2-180,4-17-90,22 18 90,-19-23-364,9 5 454,-15-7-152,-1-7 242,-3 0 0,2-14 0,-8-5 0,1-16 180,-12-3 0,-3 8 90,-3 1 90,-20 11-1,15 1 3,-29 3-92,19 2-116,-14 5-154,14 22 0,3 10-90,12 12-359,0-1-1350,17 5 629,3-11 1170,19 20 0,-19-25 0,-2 6 0</inkml:trace>
+  <inkml:trace contextRef="#ctx0" brushRef="#br0" timeOffset="150820.27">14590 1020 10861,'-21'16'719,"-7"5"-629,25 23-180,-8-9 90,11 3 0,0-11 0,0-3-180,24 0 91,-18-2-1,41-3 90,-18-3-180,11-5 180,8-5-90,-21-2 0,4-4 90,-19-20-180,4 14-90,-14-32 0,7 12-180,-9-9-719,-17-12 180,-8 18 989,-21-12 0,6 19 0,0-2 0</inkml:trace>
+  <inkml:trace contextRef="#ctx0" brushRef="#br0" timeOffset="151319.27">15518 825 12030,'0'-9'0,"0"24"0,17-12 0,-13 53 0,29-33 0,-24 9 0,-2 1 0,13-1-180,13 15-90,-20-25 90,19 3-89,-15-17-91,0 2 270,-2-8-270,0 3 90,-2-5 90,-2 0 90,2-18 180,-4-1-90,-2-20 540,-5 9-450,-2-5 0,0 10 360,0 1-540,0 33-810,0 10 271,15 30-361,-11-13 990,27-2 0,-5-6 0,18-1 0</inkml:trace>
+  <inkml:trace contextRef="#ctx0" brushRef="#br0" timeOffset="151839.27">16087 834 9691,'-13'-4'270,"10"20"-270,-10 9 90,30 12-90,-12-2-90,27-6 180,-9 12-90,-3-10 0,15 8 0,-18-4 0,3-10 0,0 10 0,-19-18-90,6 3-90,-7-12-449,-18 0-1,-3-6 270,-16-2 180,17-17 1,-9 0 268,26-18-89,15 5 90,-6 4-90,43 3 0,-27 8 90,21 2-90,8-1 90,-13 4-90,25-3 180,-30 6 180,17-4-270,-26 3-90,2-2 180,-12-4 0,-7 3 270,-2-10-91,-5 8 91,-21-6-270,16 8-90,-30 0 540,20 6-541,-2 21-89,5 5-629,28 37-1,-13-21-719,30 20 270,-7-33 1079,20 9 0,-6-22 0,-1 0 0</inkml:trace>
+  <inkml:trace contextRef="#ctx0" brushRef="#br0" timeOffset="152120.27">16805 930 10231,'-19'7'720,"3"8"-720,35 7 0,-15 25 0,32-29 0,-21 31 0,6-28 360,-1 4-360,-10-11 0,11-7 179,-6 0-89,-1-7 180,2-20-90,-2-9-180,13-27 90,-10 9-135,1 15 0,-1 1-234,3-6-81,11-7-2158,3 11 359,-8 11 2159,10 3 0,-13 8 0,1 5 0</inkml:trace>
 </inkml:ink>
 </file>
 
@@ -1656,127 +2114,442 @@
   <inkml:trace contextRef="#ctx0" brushRef="#br0" timeOffset="212112">27483 14958 8522,'8'19'180,"1"-1"-180,-1-2 0,2-4 90,3-6 0,1-3-90,2-3 90,3 0-90,10-15 0,-8 12 90,12-27 180,-19 11 269,2-16-449,-13 6 0,-1 3 450,-28 4-270,-2 6-270,-17 2 90,7 9-90,-1 5 0,22 22 180,-20 16-270,34 6-1080,9 19-89,34-29 1259,-3-7 0,4-2 0,-3-10 0,1-3 0,5 5 0,-1 0 0</inkml:trace>
   <inkml:trace contextRef="#ctx0" brushRef="#br0" timeOffset="213550">28843 14632 9332,'2'0'2518,"0"0"-2518,35 0 0,-14 0 180,6 0-90,-8 0-90,20 13 90,-14-10 0,20 19 0,-25-5-90,8 8 0,-15-1 90,1-3 0,-7-6 0,-3-1-90,-2-2 180,-2 4-90,-1-5-90,-1 3 90,0-6-90,0 0 0,0-1 0,-23 1 0,18-1 0,-35 3 0,23 0-90,-17 1-360,-8 10 90,9-5-1259,-22 13 630,24-13-2609,-14 14 3598,24-13 0,0 5 0,11-8 0</inkml:trace>
   <inkml:trace contextRef="#ctx0" brushRef="#br0" timeOffset="214646">29598 14895 10141,'40'0'90,"2"0"-90,4-10-450,-10 8-449,-1-8-91,-14 10 990,-1 0 0,1 12 0,0 4 0</inkml:trace>
-  <inkml:trace contextRef="#ctx0" brushRef="#br0" timeOffset="214795">29425 15197 8792,'59'0'-2519,"-11"0"2519,5-15 0,-10 12 0,2-12 0</inkml:trace>
-  <inkml:trace contextRef="#ctx0" brushRef="#br0" timeOffset="215644">30402 14768 10681,'2'-4'630,"1"2"-451,-1 1-179,1 1 180,1 0-90,-1 20 0,3-15 0,1 50-90,-1-31 0,-1 10 0,-2 3-90,0 3 135,0-6 0,-1 0-45,0 5 0,0 10-90,-1-23 0,0-2 90,0-6-180,2-2 0,-3-8 1,6-2 179,-4-5 0,9-19-90,-5-8 90,5-11 0,4-18 0,-3 19 0,12-25 0,-10 28 180,8-10-180,-9 28 89,7-6-89,-8 20 0,6 9 90,-9 15-359,5 22-271,-6-6-989,5 17 449,-6-23-449,3 8 1529,0-15 0,1-5 0,4-1 0</inkml:trace>
-  <inkml:trace contextRef="#ctx0" brushRef="#br0" timeOffset="215950">31033 14971 10771,'0'-19'719,"-19"3"-539,14 3 0,-33 1-90,34 2 0,-35 4-90,15 2 0,-16 4-90,5 16 180,16 3-180,7 21 0,12 0 0,17-7 0,-12-3 90,29-6 0,-8-13 0,17 6 0,-2-16 90,-7-14-90,-16-9 90,-7-20-90,-11 1 0,0 10-899,-22 2-1260,3 10 2159,-17 3 0,20 1 0,4 5 0</inkml:trace>
-  <inkml:trace contextRef="#ctx0" brushRef="#br0" timeOffset="216161">31135 14932 11670,'19'18'-270,"-14"10"-449,27-24-360,-29 28-181,25-18-449,-24 17 1709,26-10 0,-26-1 0,11-1 0</inkml:trace>
-  <inkml:trace contextRef="#ctx0" brushRef="#br0" timeOffset="216532">31572 14912 11221,'-20'-10'449,"16"1"-359,-30 5-180,19 2 90,-13 2 0,14 14 0,-7-10-270,18 24-629,-25-5 539,20-4-90,-15 17-89,14-32 89,-1 28-90,2-29-449,-2 22 539,2-22 0,-3 7 450,5-10 720,-5-15 0,7 11 179,-2-27-359,4 11-450,1-16 180,1 7-180,0 2 809,15 6-449,1 4-450,16 5 0,-4 20 0,3 14-360,-11 10-629,1 1-2250,0 9 3239,-4-10 0,5 11 0,-6-15 0</inkml:trace>
-  <inkml:trace contextRef="#ctx0" brushRef="#br0" timeOffset="216728">31920 14862 10951,'-38'-2'719,"17"21"-719,-8-14 0,26 33-1169,-24-9 180,14 10 989,-10 15 0,12-21 0,6 8 0</inkml:trace>
-  <inkml:trace contextRef="#ctx0" brushRef="#br0" timeOffset="216880">32217 15088 12030,'1'-6'-1349,"-1"0"270,0 3 1079,0-4 0,0 4 0,0-3 0</inkml:trace>
-  <inkml:trace contextRef="#ctx0" brushRef="#br0" timeOffset="225484">22888 13898 8792,'25'-8'899,"-1"0"-809,-6 4-90,-1 0 180,-2 2-180,1 0 0,2 0 90,12 0 90,-5 2 0,21-1-180,-15 1 90,9 0-90,-7 0 90,2 12-180,4-9 135,-8 10 0,2-1-45,24-9-608,-2 6 1,1 3 607,-19-7 0,1 1 0,7 0 0,4 2 0,-2-2 0,-2 0 0,0-1-1105,15 4 1,1-1 1104,-15-7 0,-2 0 0,1 5 0,1 0-171,0-4 1,3 0 170,-3 0 0,3 1 0,-2 0-393,9-1 0,2 0 438,-10-1 0,4 0 0,1 0 0,-4 0-147,13-1 0,1 1 102,-11-1 0,7 0 0,0 0 0,-5 0 31,-6 0 1,-4 0 0,3 0-62,13 0 0,2 0 0,2 0 30,1 0 0,0 0 0,-3 0 0,-12 0 0,-3 0 0,4 0 0,6 0 0,7 0 0,-1 0 0,-6 0 0,-10 0 0,-4 0 0,4 0 22,4 0 1,5 0-1,0 0 1,-7 0-68,11 0 0,-4 0 45,-8 0 0,1 0 0,-4 0 45,0 0 0,-3 0-90,0 0 0,-1 0 179,-4 0 1,1 0-135,10 0 0,0 0 0,-14 0 0,1 0 0,16 0 0,-2 0 0,2 0 0,-16 0 0,-2 0-90,0 0 886,0 0-796,-15 0 1188,-8 0-1188,-1 0 2566,-5 0-2566,1 0 0,-4 0 0,0 0 0</inkml:trace>
-  <inkml:trace contextRef="#ctx0" brushRef="#br0" timeOffset="227162">22555 15510 10771,'-25'0'0,"1"0"0,8 0 0,1 0 0,-4 0 0,2 0 0,-6 0 0,4 0 90,0 0 0,-4 0 0,1 0-90,-3 0 90,-12 0-90,7 0 0,-23 0 90,19 0-180,-25 0 90,22 0 0,-12-12 0,-7 9 0,9-18 0,5 19 0,-1 2-280,-15-19 280,6 14 0,-2 1 0,21-1 0,-2-1 90,-15-1 0,-8 1 0,6 1-135,8 2 0,0 0-1055,-13-3 0,-6-1 1,6 2 1099,13 0 0,0 1 0,-5 0 0,-4-1 0,3 0-289,4-1 1,-2 1 408,-6 0 0,-6-1 0,3 1-120,0 0 0,1 0-255,7 1 0,-3 1 0,-2-1 255,-8 1 0,-2 0 0,3 0-267,11 0 0,2 1 0,-5 0 285,1 0 0,-7 0 0,-2 0 0,2 1 0,4-1 181,-5 1 1,4-1 0,-6 1-200,1 0 0,-6-1 0,-3 1 0,2 0 0,6 1-351,9-1 0,4 0 0,1 1 0,-3 0 351,-1-1 0,-4 0 0,-1 1 0,2-1 0,2 1-210,-15-1 0,4 1 1,-1 0 186,14 0 1,1 0-1,-2 0 1,1 0 44,0-1 1,0 1-1,-1 0 1,-3 0-23,-5-1 0,-3 1 0,-3 0 0,1 0 0,3 0 0,0 0 0,3-1 0,-1 1 0,-6-1 0,10 1 0,-5-1 0,-3 1 0,-2 0 0,2-1 0,2 1 0,6-1-180,-12 0 0,6 1 0,2-1 0,-5 0 180,1 0 0,-4 0 0,-1 0 0,1 0 0,5 0-72,3-1 0,4 1 0,1 0 0,-1 0 72,-1-1 0,0 0 0,0 0 0,0 0 78,2 0 0,0 0 0,-2-1 0,-2 0-96,-3 0 0,-5-1 0,0 1 0,0-1 0,4 0 5,-1 0 1,5 1 0,-2-1 0,-5-1-1,11 2 0,-5-2 0,-3 1 1,0-1-1,0 0 0,4 0 0,4 1 13,-8-1 0,5 0 0,1 0 0,-6 0 0,1 0 0,-5-2 0,-3 1 0,0-1 0,3 1 0,6 0-23,0 0 1,6 1 0,1 0-1,-3-1 41,0 1 0,-3-1 0,-1 0 0,2 0 0,4 1-48,-14-2 0,4 1 0,0 0 60,-1 0 0,0 0 0,0 0 0,1 0 0,1 0 0,-4 0-74,15 1 1,-3 1 0,-1-1 0,0 0-1,4 1 44,-1-1 0,4 1 0,-1 0 0,-4-1-28,2 1 1,-4 0 0,-3-1-1,0 1 1,3 0 0,6 1 27,-14-2 0,7 1 0,-6 0 0,8 0 0,-5 1 0,-2 0 0,2 0 0,7 1 0,-1-1 0,6 1 0,-6-1 0,1 1 0,-7-1 0,-1 1 0,2-1 0,8 1 0,4 0 0,7 0 0,-5-1 0,-8 0 0,-7 0 0,2 0 0,9-1 0,7 1 0,4 0 365,-18-2 0,4 0-545,5 0 1421,-4-1-3130,36 3 2125,22 1-236,17 1 0,2 1 0,-7 0 0</inkml:trace>
-  <inkml:trace contextRef="#ctx0" brushRef="#br0" timeOffset="227564">11733 14490 9691,'-26'12'1080,"-14"-9"-451,9 8-269,-29 0-180,5 3-45,10-1 0,0 2-1491,-15 9 1356,17-10 0,-1-1 0,11-1 0,1-1 0,-3 1 0,0 1 0,0 0 0,-1 1 0,0 1 0,0 0 0,1 1 0,0 1 0,1 0 0,0 1-45,-8 7 0,2 1 90,12-7 0,1 1-45,-7 13 0,4 1 0,11 4-270,4 9 28,42-16-747,1-2-270,32-2 62,-29-14 0,1-1 1197,5 0 0,1 0 0,5-1 0,1-1 0,2 0 0,0 1 0</inkml:trace>
-  <inkml:trace contextRef="#ctx0" brushRef="#br0" timeOffset="229659">12562 14131 10141,'0'30'810,"-15"5"-810,11-7 0,-11 16-360,3-12-989,10 24 539,-10-20-179,12 10-540,0-14 1529,0-1 0,0-1 0,0-3 0</inkml:trace>
-  <inkml:trace contextRef="#ctx0" brushRef="#br0" timeOffset="229843">12348 14516 8882,'-3'-6'0,"3"-4"0,-3 5 90,21-7-180,6 6-1079,22-3 269,-7 6 900,1 0 0,-8 1 0,-1 2 0</inkml:trace>
-  <inkml:trace contextRef="#ctx0" brushRef="#br0" timeOffset="230194">12892 14460 9691,'-37'0'540,"3"0"-540,17 14 0,-3-11 0,17 22 0,-11-7 90,13 7-90,-5 0-90,6-7 0,0 0-180,19-3-269,3 6 269,2-9 0,27 2 180,-31-10 90,39-2 0,-33-2 0,6-17 450,-10-1 89,-9-18 1,-2 3 180,-8 1-720,-20 6-180,12 6-630,-23 12-359,25 21-900,-8 3 2069,28 19 0,-13-20 0,12-1 0</inkml:trace>
-  <inkml:trace contextRef="#ctx0" brushRef="#br0" timeOffset="230477">13338 14550 9781,'-41'-8'1260,"-1"2"-1260,1 6 0,4 12 0,5-8 90,17 19 0,5-11-180,10 10 0,21-5 90,9-3 0,21-7 0,-7-3-270,4-4 90,-16 0-90,-8-15-270,-5 11-449,-18-26-900,-13 14 1889,-14-13 0,4 15 0,0 4 0</inkml:trace>
-  <inkml:trace contextRef="#ctx0" brushRef="#br0" timeOffset="231220">12947 14941 10771,'-12'2'989,"3"-1"-989,0-1 0,3 0 0,1 0 0,1 0 0,3 0 0,0 0 0</inkml:trace>
-  <inkml:trace contextRef="#ctx0" brushRef="#br0" timeOffset="232462">14278 14529 9332,'-43'0'899,"-3"0"-899,10 12 0,1-8 0,9 20 0,3-21 0,3 24 0,2-12 90,3 1-180,7 6-180,2-13-359,6 8 179,22-9 360,0-3 0,23-5 180,-23-13-90,14 10 180,-19-24 0,13 23 90,-14-22 179,-2 24 1,-13-16-450,4 34-630,-5-8-1079,0 25 1709,16-8 0,3-1 0,16-2 0</inkml:trace>
-  <inkml:trace contextRef="#ctx0" brushRef="#br0" timeOffset="232675">14563 14556 9691,'-35'0'1260,"-2"0"-1260,4 13 0,1-10 0,16 25 0,-1-24-630,16 24-989,-4-12 360,5 11 1259,22-5 0,-17-4 0,18-5 0</inkml:trace>
-  <inkml:trace contextRef="#ctx0" brushRef="#br0" timeOffset="232909">14780 14564 9961,'-10'-3'1709,"0"0"-1709,-3 20-90,1 0 90,5 3-1349,-5 34 450,5-33-1710,3 40 2609,4-37 0,21 4 0,5-10 0</inkml:trace>
-  <inkml:trace contextRef="#ctx0" brushRef="#br0" timeOffset="233160">14912 14786 5914,'0'0'0</inkml:trace>
-  <inkml:trace contextRef="#ctx0" brushRef="#br0" timeOffset="233726">15005 14809 9422,'-11'5'899,"18"-4"-899,-3-11 0,30 6 0,-14-21 90,11 22-90,9-8-90,-12 3 90,8 6 0,-8-7-90,-1 3 0,1 5-90,6-12 90,-10 9 0,9-8 90,-21 6 90,2-2-180,-11 2 90,-2-2 0,-1 2 0,0-1 0,-20 2 0,15-1 270,-32 0-90,12 3-180,-18 1 0,9 2 0,-6 0 0,20 13 0,-6-9 90,11 24-270,7-12-180,1 14-899,7-3 180,23-7-360,-17-3 1439,39-7 0,-25-3 0,20 0 0</inkml:trace>
-  <inkml:trace contextRef="#ctx0" brushRef="#br0" timeOffset="234035">15648 14589 9691,'-20'-8'450,"4"0"-180,-2 2-270,-1 3 0,-16 2 0,6 1 0,12 14 0,0-11 90,15 30-90,-5-14 0,27 18-90,-16-4 90,35-8 0,-34-3 90,26-9-90,-28-3 0,9 1 180,-2-3-180,-7 0-90,7-4 90,-10 0 0,0-2-180,-17-2-899,-2 1 1079,-17-1 0,5-13 0,1-3 0</inkml:trace>
-  <inkml:trace contextRef="#ctx0" brushRef="#br0" timeOffset="234344">15857 14649 9602,'-32'0'0,"13"12"0,6 2 0,13 10-90,0 0 180,0-6-90,16 3 0,-12-7 0,24 5 0,-25-8 0,10 3 0,-13-8-90,0 2 0,0-4-2879,0 0 2969,-17-2 0,12 0 0,-12-2 0</inkml:trace>
-  <inkml:trace contextRef="#ctx0" brushRef="#br0" timeOffset="234710">16340 14484 9691,'5'0'1530,"0"0"-1440,-2 0 179,1 16-269,-1-12 0,3 26 0,-3-8 90,3 18-90,-3-5 0,1 3 0,-1-9 90,0 2-450,0 2-539,3 15 269,0-11-719,3 18 809,-2-26 91,-2 3-271,0-16-179,-4-4 899,1-5 0,-2-3 0,0-2 0</inkml:trace>
-  <inkml:trace contextRef="#ctx0" brushRef="#br0" timeOffset="234844">16300 14832 9152,'0'-23'360,"-7"-1"-270,6 4-90,-6 1 179,7-5-179,0 9 0,16-7 0,4 14-90,0-2-1439,31 8 270,-31 0 1259,29 2 0,-23 0 0,0 0 0</inkml:trace>
-  <inkml:trace contextRef="#ctx0" brushRef="#br0" timeOffset="235142">16692 14760 9961,'-34'0'630,"6"0"-720,3 0 180,9 0-90,6 14 0,4 1 0,6 14 90,26-3-180,2-3 90,26-6 0,-12-7 0,-3-6 90,-12-4-180,-4 0 180,-3 0-270,-3-14 90,-1 11-540,-8-28 1,-1 14 89,-7-16-180,-24 18-449,18-8 1169,-34 21 0,36-16 0,-12 9 0</inkml:trace>
-  <inkml:trace contextRef="#ctx0" brushRef="#br0" timeOffset="235377">17083 14500 11400,'0'30'180,"16"4"-180,-12-7 0,11 3-1079,1 6 269,-1-9-1078,15 21 358,-9-21 1530,0 5 0,-5-12 0,2-3 0</inkml:trace>
-  <inkml:trace contextRef="#ctx0" brushRef="#br0" timeOffset="235569">17467 14623 10051,'-21'-12'1439,"2"4"-1439,-24 2 0,9 5-90,-3 1 180,18 18-180,-6-14-269,22 26-91,-14-27-1259,16 23 630,-5-8 1079,6 7 0,17 6 0,6-7 0</inkml:trace>
-  <inkml:trace contextRef="#ctx0" brushRef="#br0" timeOffset="235877">17470 14858 9781,'11'1'360,"3"0"-270,0-1 0,3 0 0,8 0-90,-6 0 0,17-15 0,-14 11 0,5-12 0,-9 5 0,-3 8 0,-2-8 0,-3-1 0,-2 9 0,-5-18 0,-2 8-90,-1-4 180,-18-4 0,13 8 90,-13-1-180,1 6 0,13 3 0,-12 0 0,5 3 0,8 15-540,-8 2-989,11 19 720,0-4-541,16-10 1350,-12 7 0,13-24 0,-17 9 0</inkml:trace>
-  <inkml:trace contextRef="#ctx0" brushRef="#br0" timeOffset="236198">17793 14788 10141,'0'29'0,"13"-14"0,-10 9 0,10-13 0,-5 1 0,-6 4 90,11-14-180,-8 5 90,4-7 90,-1-17-90,0 13-90,1-27 180,2 27 90,1-28-180,1 28 90,1-31-90,3 23 180,-4-19 0,8 14-270,-10 4 270,7 7-270,-7 6-450,6 16-359,-5 8-451,1 10 1350,4 16 0,-2-16 0,4 11 0</inkml:trace>
-  <inkml:trace contextRef="#ctx0" brushRef="#br0" timeOffset="237028">18788 14730 10501,'6'-3'0,"-2"1"180,0 0 0,3 2-180,-4 14 0,6 4 90,-6-1-90,2 15 0,-2-19 0,-1 24 0,0-17 90,0 9-1260,-1-15 721,0-21 269,-1-8 0,0-28 180,15 1 0,1 6 0,2 2 0,9 14 0,-24 1 90,23 4 629,-10 2-629,8 7 0,-4 2-90,-6 4 90,-5 21 0,-4-16 0,-1 38 0,-1-23-90,-1 35 0,-1-19 0,-1 24 0,0-27 0,0 11-630,0-22 451,0-21 89,18-15 90,-13-26 0,26-4 0,-14 8 0,0 1 0,16 5 0,-28 10 0,30-3 90,-28 10-90,14 7 0,-13 1 0,0 5 0,-1 0 0,0 21-90,0-16-90,0 36-900,6-10 271,-2 9 809,14 11 0,-8-23 0,6 6 0</inkml:trace>
-  <inkml:trace contextRef="#ctx0" brushRef="#br0" timeOffset="237334">19615 14828 9871,'-24'-7'540,"-17"6"-450,14-11-90,-10 11 0,3-3 0,12 4 0,-3 0 0,9 16 0,3-2 90,25 15-180,12-4 180,24-11-90,7 3 0,-7-16 0,-5 5 90,-15-6-180,-4-14 90,-5 11-90,0-27-90,-11 13 90,0-14-629,-28 7 179,-3 10 540,-20 1 0,4 12 0,0-3 0</inkml:trace>
-  <inkml:trace contextRef="#ctx0" brushRef="#br0" timeOffset="237560">19962 14821 11221,'0'29'90,"0"2"-360,14-4-360,-10-1-269,11-6-91,-15 1 1,13-1-450,-9 1 1439,16-3 0,-18-3 0,6-1 0</inkml:trace>
-  <inkml:trace contextRef="#ctx0" brushRef="#br0" timeOffset="237712">20163 14898 10681,'1'-19'-540,"0"6"-1978,-15 6 2518,-6 6 0,-15 1 0,-3 0 0</inkml:trace>
-  <inkml:trace contextRef="#ctx0" brushRef="#br0" timeOffset="237930">19407 14599 9062,'21'-31'989,"14"-8"-809,9 12 0,12-7-90,-26 20-90,4 1 90,-11 11-1079,-6 17-1440,-4 7 2429,-8 20 0,-5-9 0,0 1 0</inkml:trace>
-  <inkml:trace contextRef="#ctx0" brushRef="#br0" timeOffset="238097">20430 14224 11670,'15'-14'180,"-4"2"-180,-6 5-1169,-3 2-180,-21 3-630,14 19 1979,-35-13 0,20 37 0,-19-12 0</inkml:trace>
-  <inkml:trace contextRef="#ctx0" brushRef="#br0" timeOffset="241578">12102 6963 8882,'-46'22'2159,"-7"7"-1889,8 16-931,20-22 1,1 1 840,-14 18 0,-1 9-91,19-23 1,0 2-387,0 2 1,1 3 386,-1 2 0,0 2 0,0 4 0,1 2 0,-1 5 0,1 2-306,1 5 1,0 5 260,5-14 0,0 6 0,0 0 0,2-2-655,-2 6 0,1-2 0,0 7 640,3-13 0,-1 5 0,-1 4 0,1 0 0,0-2 0,1-4-8,0 2 1,2-5-1,-1 1 1,0 8-1,0-5 1,0 6-1,0 5 1,-1 2-1,1 1 1,-1-2-1,1-4 1,1-5-307,0 1 0,1-5 1,0-3-1,0 3 1,-1 6 293,0-5 0,1 5 0,-2 3 0,1 3 0,-1 1 0,1-1 0,0-3 0,0-3 0,1-6-10,0 5 0,0-6 0,1-3 0,0 2 0,-1 5 12,-1 3 1,1 5 0,-1 3 0,0 1 0,0-1 0,1-3 0,1-6-297,-1 10 1,0-7-1,2-1 1,-1 4 283,0-1 0,0 3 0,-1 1 0,2-2 0,0-5-119,1-6 0,2-4 0,-1-1 1,1 0 88,-1 15 0,1 0 0,-1-2-30,2-3 0,-1-1 0,1 0-120,0-4 0,0-1 0,0 0-92,-1-5 1,0 0 0,3-2 1,9 17 1,2 0-781,-6-16 1,0 0-1,2-2 707,4 2 0,2-2 343,5 6 0,-3-4 0,-12 0 0,15-8 0</inkml:trace>
-  <inkml:trace contextRef="#ctx0" brushRef="#br0" timeOffset="242509">10993 10862 9062,'-28'-15'90,"-4"3"0,-1 12 180,-5-10-91,-4 7-873,-6-7 1234,-8 10-966,-7 0 606,29 7 0,-4 3 89,-22 3 1,-3 3-225,12 3 0,-1 1-780,5-4 1,-3 0 0,2-1 824,-10 5 0,2 1 0,-4 2 0,-2 2 0,19-8 0,-1 1 0,-3 3 112,-4 2 0,-5 4 1,0 1-1,2-1-135,9-4 1,2-2-1,-1 2 1,-5 4 7,-2 1 0,-6 4 0,-2 2 0,-1 1 0,3 0 0,4-3-536,-4 3 0,5-2 0,0 1 1,-2 2 475,7-5 0,-2 2 0,-1 0 0,0 2 0,1-2 0,3 0-316,-8 6 1,2 0 0,1-1 0,0 2 336,9-8 0,-1 1 0,1 1 0,-1-1 0,1 1-18,0 0 0,1 0 0,-1 0 0,0 2 0,-3 2-6,4-2 1,-2 3 0,-1 2 0,-1 0 0,1 0 0,1 0 0,1-3-136,-5 7 1,3-3-1,1 0 1,-2 2-1,-3 4 134,5-4 0,-2 3 1,-3 3-1,0 2 0,0 0 1,1-2-1,3-1 0,4-4-23,-2 3 1,3-3-1,3-2 1,-1 2-1,-2 5 12,6-6 0,-3 3 0,-1 3 0,0 1 0,1 1 0,1-2 0,3-2 0,3-4 75,-7 12 1,4-5-1,3 1 1,0 7-76,5-4 0,0 8 0,0 3 0,1 2 0,1-2 0,3-3 0,3-7 49,1 2 1,3-7 0,3 1 0,1 6-102,2-6 1,2 6-1,0 4 1,1 0 0,2-1-1,1-4 1,2-7-39,3 13 0,4-7 0,4 3 0,0-6 0,3 5 0,2 0 0,1-2 0,-1-6-90,3 1 0,0-6 0,4 2-90,5 3 0,5 4 1,1-2-1,-2-7-180,10 5 1,1-5 29,-7-8 0,3-1 0,1-3-422,-1-7 1,1-4 0,-2-2 841,7 2 0,-1-4 0,13 3 0,-1-3 0,-19-12 0,-1 1 0</inkml:trace>
-  <inkml:trace contextRef="#ctx0" brushRef="#br0" timeOffset="243046">7160 14918 10861,'-22'20'629,"4"0"-539,18-5-90,-10 0 0,7-4 0,-7 5 0,10 1 0,0 5 0,0 1 0,0 4 90,0 2-180,0 1 90,21 2 90,-15 2-90,36 1 0,-9 15 90,11-10-459,-19-16 1,-1 1 368,13 9 90,0 0 90,-3-2-1,-1 1-179,-6-2 90,-7 2 0,-9 17-90,-5-9 0,-24-2 0,-7 0 0,-9 13-180,-7-13 0,-13 4 1,5-3-181,7-5 0,0 0-822,0-2 0,-6 3 1,-1 1-1,7-4 597,-5 3 1,2-1 584,-5 4 0,-4 3 0,5-2 0,6-2 0,2-1 0,5-5 0,1 0 0,-1 1 0</inkml:trace>
-  <inkml:trace contextRef="#ctx0" brushRef="#br0" timeOffset="244329">8788 15625 10051,'-42'0'900,"4"14"-720,8-10 0,0 29-180,-1-28 89,-1 38-492,2-23 493,2 22-102,6-11 102,2 12 0,11-13-270,1 16 90,32-24-450,11 4 180,13-18-926,6-2 1106,-13-6 180,5 0 0,-1-21 0,13-5 90,-18-12 89,-13 14 1,-4 1 180,-7-6 450,3-17-450,-17 21 31,2-4-391,-4 14 90,-16 8-180,13-5 1221,-26 11-1131,26 12-180,-9 11-180,12 22-359,0-9-181,0 3-269,17-11 1169,5 9 0,11-11 0,-2 7 0</inkml:trace>
-  <inkml:trace contextRef="#ctx0" brushRef="#br0" timeOffset="244559">9435 15752 10681,'0'-18'1259,"-18"-4"-899,14 8-270,-34-3 0,18 11-90,-17 1 0,6 22 0,6 6 0,9 21-270,8-7-90,8 2-1079,25 1 270,-19-10-450,24-7 0,5-2 1619,-8 1 0,35 0 0,-25-12 0</inkml:trace>
-  <inkml:trace contextRef="#ctx0" brushRef="#br0" timeOffset="244843">9802 15649 10771,'-11'-4'989,"-4"1"-719,10 1-90,-4 2-180,1 0 0,1 0 0,-3 16 0,1-12 0,-1 26 0,3-27 90,0 30-180,2-6-90,2 7-809,2 12 269,22-20-269,-16 8-181,33-12 1,-33-3 1169,35 1 0,-22-4 0,20 0 0</inkml:trace>
-  <inkml:trace contextRef="#ctx0" brushRef="#br0" timeOffset="245349">10133 15878 9781,'17'16'630,"7"-4"-630,14-12 0,-5 0 0,-5 0 0,-5 0 90,-1 0-90,6-15 0,-7 11-90,3-34 450,-15 21-270,-1-18 90,-28 11 90,-2 7-270,-23 7 89,4 7-178,1 3 178,17 16-178,0 5-91,20 18-360,-6-8-270,9 0-269,23-10-180,-17 1 1259,42-3 0,-28-3 0,21-2 0</inkml:trace>
-  <inkml:trace contextRef="#ctx0" brushRef="#br0" timeOffset="245643">10737 15750 9871,'-18'-8'450,"-4"3"-540,-14 0 180,5 4-90,15 14 90,5 5-90,36 29 0,2-16 90,-1-6 0,0-1 360,1 0 359,11 14-629,-24-18 0,4 3-180,-9-10 90,-9-3-90,0-2 0,0-2-90,-23-2-809,-2-1-1260,-26-2-989,9-18 3148,15-3 0,10-12 0,17 3 0</inkml:trace>
-  <inkml:trace contextRef="#ctx0" brushRef="#br0" timeOffset="246060">11070 15730 10141,'-15'-11'90,"-6"9"-90,10-17 0,-6 17-629,2-6-721,8 20 1350,3 5 0,22-2 270,-14 6 1079,27-10-449,-27 4-630,9-3-270,-13-6 270,-18-3-360,14-2 180,-25 2-90,26-1 0,-8 3 0,2 0 0,7 3 0,-7 2 0,9 3 0,0 2 0,0 2-270,0 12-360,19-7-899,0 17 539,4-18-359,5 6 1349,-24-10 0,27-3 0,-10-1 0</inkml:trace>
-  <inkml:trace contextRef="#ctx0" brushRef="#br0" timeOffset="246710">11143 15892 9961,'0'-12'1260,"0"3"-991,0 1 91,0 2-270,0-2 0,-14 0 0,10 2-90,-23 1 0,15 3 0,-11 2 0,8 0 0,0 18 0,7 3 90,3 21-90,2 0-90,21-7 180,4 8-90,1-20 0,11 7 0,-30-12-90,28-1 90,-28-3 0,23-2 90,-24-1 180,17 2-270,-18-7-90,5 3-540,-30-9-89,-6 1-1,-13-1-179,2 0-1800,-4 0 2699,12-10 0,-8 7 0,17-6 0</inkml:trace>
-  <inkml:trace contextRef="#ctx0" brushRef="#br0" timeOffset="247427">11745 15713 11760,'1'-13'810,"0"0"-900,-1 3 360,0 3-270,0 23 0,0 10 0,0 13-90,0 1-90,0-8-450,0 16 91,0-12-721,0 20 721,13-27-361,-10 14 630,11-23 90,-14 2 180,0-11 0,0-4 180,0-2 180,-21-4 270,-1-16-91,-19-6-179,6-19-180,14 9-180,-2-2 0,21 11 0,-7 0 0,9 1 0,0-5 0,19 9-180,8-6-270,-2 13-269,37 2 359,-39 6 0,34 2 180,-29 0 0,1 16 1,-4-12 179,-1 24 0,-2-25 0,0 18 269,2-8 91,-8-1 1889,2 5-2069,-28-15-180,-6 5 90,-16-7-90,2 0 0,8 12 0,9 5 0,5 13 0,30-13 0,-17 8-90,38-22 180,-37 17-90,53-17 0,-36 5 0,40-8 90,-35 0-90,4 0-90,-13-14 90,-6-6-180,-5-17 0,-4 5-809,-21-12 359,-8 17-1079,-22-15 227,21 18 1381,-20-5 0,40 11 1,-15 0-1</inkml:trace>
-  <inkml:trace contextRef="#ctx0" brushRef="#br0" timeOffset="247661">12390 15643 12210,'0'46'0,"0"-8"-450,0 3-1079,15 6 450,-11-11 1079,24 24 0,-24-28 0,10 8 0</inkml:trace>
-  <inkml:trace contextRef="#ctx0" brushRef="#br0" timeOffset="247879">12595 15763 10681,'-29'-5'630,"4"2"-630,3 2 0,12 16 0,-6-11 0,15 27 0,-10-28 0,10 31-450,-2-20-270,3 16-179,0-9-181,0-1-539,24 0 1619,-18-1 0,36-3 0,-21-1 0</inkml:trace>
-  <inkml:trace contextRef="#ctx0" brushRef="#br0" timeOffset="248227">12693 15941 10141,'37'0'0,"2"0"0,-7 0-90,0 0 0,-10 0 90,-1 0 0,-2 0 0,-1 0-90,-5-12 90,-1 9 0,-7-21 180,-1 12 270,-4-6 0,-25-1-180,1 12-180,-22-8-180,24 12 449,-5-4-359,24 24-90,-7 2-359,30 22-1350,1-3 719,2-6-359,15-3 1439,-22-13 0,19 0 0,-11-3 0</inkml:trace>
-  <inkml:trace contextRef="#ctx0" brushRef="#br0" timeOffset="248549">13143 15952 11311,'0'-15'719,"14"21"-719,-10 4 0,23 7-90,-24 3 0,17-18-270,-18 11 360,9-11 0,-4 3-90,0-20 180,5-3-90,-5 0 0,10-14 0,-8 13 0,2-2 0,-4-3 90,-2 21-90,1-6 0,2 9 0,-3 0-899,5 19-180,-5-15-2609,6 47 3688,-4-32 0,2 29 0,-1-20 0</inkml:trace>
-  <inkml:trace contextRef="#ctx0" brushRef="#br0" timeOffset="249159">13862 15924 11041,'0'-7'90,"-9"2"0,7 18-90,-7 10 0,26 8 0,-13 4 0,13-8 0,-1 2 90,-1 10-180,4-10 180,0 14-90,-17-24-1080,15 8 990,-15-38 90,6-4 0,-8-19 0,0 0 0,0 6 0,0-2 90,0 1-90,15 0 90,-11 3 180,11 4-90,-15 3 90,13 10 89,-10-4-269,22 11-90,-13-4 90,6 27-90,1 2 0,-9 2 0,7 21 0,-9-24 0,3 21 0,-6-26-180,2-7 180,-3-10-89,3 0 178,-1 0-89,2-17-89,1 13 89,1-30 0,1 30 0,1-31 0,3 13 0,-3 0 179,3-6-89,-7 19-90,1-3 90,-4 6-90,1 6-90,-1 17 180,1-13-180,2 28-899,3-6 0,-1 5-1980,9 14 2969,-5-22 0,5 8 0,-3-12 0</inkml:trace>
-  <inkml:trace contextRef="#ctx0" brushRef="#br0" timeOffset="249459">14532 16056 11490,'-19'-7'630,"15"-7"-630,-29 6 0,29-2 0,-10 3 90,5 5-90,6 18-180,-6 4 0,9 19 90,20-19-180,-15 14 91,29-30-91,-30 23 180,27-16 0,-13 2-90,13-5 270,-10-8-90,-9-17 0,-7-2-360,-22-19-719,12 0 539,-27 6-809,28-5 1349,-11 18 0,15-6 0,0 8 0</inkml:trace>
-  <inkml:trace contextRef="#ctx0" brushRef="#br0" timeOffset="249645">14872 16043 11580,'4'3'270,"0"-1"-809,-4 4-361,0-2-539,0 3-360,0 0 1799,0 1 0,0 2 0,0 0 0</inkml:trace>
-  <inkml:trace contextRef="#ctx0" brushRef="#br0" timeOffset="249818">15227 15979 11311,'1'-10'-405,"-16"4"0,-11 19 0,-18 7 0</inkml:trace>
-  <inkml:trace contextRef="#ctx0" brushRef="#br0" timeOffset="250093">14393 15838 10321,'0'-19'1259,"0"2"-989,0 3 0,0 1-180,18 1 90,-13 3 0,12 1-90,-4 2-90,0 3 0,15 2 90,-2 1-90,-5 16 0,0 1-630,-10 20 0,-2-11-359,-6 5-1620,-3 1 721,0-7 1888,0 7 0,-19-12 0,-5-1 0</inkml:trace>
-  <inkml:trace contextRef="#ctx0" brushRef="#br0" timeOffset="250292">15007 15569 12030,'2'-3'180,"-1"1"-180,-20 1-360,15 15-539,-38-10-2609,8 27 3508,-11-3 0,-3 8 0,12 5 0</inkml:trace>
-  <inkml:trace contextRef="#ctx0" brushRef="#br0" timeOffset="251809">8633 17129 11131,'12'0'719,"6"0"-719,21 0-90,0-13 180,-7 10-90,0-10 0,0 1 0,-5 9 0,-3-10 0,-5 3-90,-5 8 0,-2-17 0,-7 10 90,-1-6 0,-22 4 0,13 2 0,-34 2 0,34 0 0,-43 1 90,15 2-90,-13 3 90,8 0-90,10 1 0,16 17 90,-1 3-90,13 23 0,19-9 0,-14 3-315,23-16 1,4-1-406,-5 10-315,13-5 1,3-1-1157,2 1 2191,-13-9 0,-1-2 0,13 2 0,1-2 0</inkml:trace>
-  <inkml:trace contextRef="#ctx0" brushRef="#br0" timeOffset="251999">9262 17143 9871,'-17'-11'810,"27"3"-720,-4 22-720,54 5-702,-38 2 433,30 9-270,-22-26 1169,-1 28 0,-1-28 0,0 13 0</inkml:trace>
-  <inkml:trace contextRef="#ctx0" brushRef="#br0" timeOffset="252192">9465 17078 10321,'-23'-6'1079,"-12"-1"-989,9 6-90,-18 16 0,21-11 0,3 22 0,2 5-629,0-4-1524,-4 34 624,12-20-630,3 1 2159,3 1 0,2-2 0,2 1 0</inkml:trace>
-  <inkml:trace contextRef="#ctx0" brushRef="#br0" timeOffset="252876">9907 17141 10951,'0'32'270,"16"-15"-180,-12 20-180,12-21 180,-4 19-90,-9-9 0,19 11 0,-20-8 0,14 14 89,-14-20-89,5 7 0,-7-18-89,0 1-361,0-10 270,-15-1-270,11-18 270,-26-7 0,26-12 180,-12-2 0,2-14 0,11 9 0,-5 4 0,2 0-277,6-9 277,0-12 90,0 23 0,0 3 0,16 5 180,-12 2 90,29 11 0,-18 3-360,13 9 180,-16 23-180,4 5 0,-14 22 0,5-10 0,-7 2-360,0-13-360,0 0-1259,-16 5 720,12-11 1350,-13 3 1,4-16 0,-4-3 0</inkml:trace>
-  <inkml:trace contextRef="#ctx0" brushRef="#br0" timeOffset="253076">10240 17129 9422,'8'0'989,"-2"0"-719,-1 18 90,0-14-360,0 28 0,-1-29 0,0 30 0,0-21-450,3 24-180,-2-17-1439,4 12 630,-5-12 1439,5 2 0,-5-9 0,2-1 0</inkml:trace>
-  <inkml:trace contextRef="#ctx0" brushRef="#br0" timeOffset="253369">10283 16899 12120,'0'-5'-90,"0"1"90,0 2 0,0 0 0,0 1 0</inkml:trace>
-  <inkml:trace contextRef="#ctx0" brushRef="#br0" timeOffset="253692">10500 17100 11041,'15'44'0,"-11"-9"0,10-4 0,-3 14 0,-9-17 0,9 20 90,-11-30-90,6 5 0,0-16-90,1-21 0,-3-16-630,-4-28 180,0 8-270,0 14 1,0 1-270,0-8 1079,0-10 0,0 21 0,0 2 0</inkml:trace>
-  <inkml:trace contextRef="#ctx0" brushRef="#br0" timeOffset="253982">10817 17311 9512,'17'12'359,"-4"-6"-359,11 0 0,-9-6 0,14-15 0,-12-2 90,13-16-180,-17 16 90,5-12 180,-14 13 180,-1-13-180,-27 6 0,1 11-180,-21 4 90,12 25-90,13 4 0,8 21-180,31 5-720,-15-8-449,26-14 0,6-3 1349,-4 4 0,5-10 0,3-2 0,12 4 0</inkml:trace>
-  <inkml:trace contextRef="#ctx0" brushRef="#br0" timeOffset="254731">11870 17055 10501,'0'-17'0,"0"0"180,0 6 360,0 2-271,0 4-179,14 3-180,-10 20 90,22 13 90,-13 11-90,-1-11 0,1 1 0,5 10-933,-3 14 933,-5-19 0,-2-2 0,0-5 0,2 3-90,-5-11-450,2 0-360,-5-16 720,2-23 91,-1-12 932,-1-13-843,5-18 0,-3 22 90,1 4 0,1 0-90,0-3 90,3-9 270,-3 22 0,0 4 0,1 9-270,-2 0 0,1 10-90,0-3 90,5 19-90,-3 10 89,6 23-89,-6-7 0,1 19 0,-6-27-156,-1 10 156,-2-19 0,0-3-449,0-1 449,0-30-90,0-8 90,6-15 0,3-3 0,11-8 45,-5 8 0,0 2-45,4 6 180,12-6-1,-19 16 157,24 8-336,-20 4 90,6 6-180,-1 24 90,-5 4-1169,10 30 90,-11-14-786,5 0 246,-7-13 1619,2-4 0,0-2 0,1-2 0</inkml:trace>
-  <inkml:trace contextRef="#ctx0" brushRef="#br0" timeOffset="255027">12757 17135 10771,'-18'-14'809,"13"1"-449,-35 3-90,23 5-270,-30 2 0,20 3 0,-8 0 0,15 16 0,0-12 0,3 31 90,7-10-180,2 10 90,8-2 0,0-9-90,23-3-90,7-1 180,-2 0 0,5-14 0,1-2 0,-10 6 0,35-10 0,-32 0 90,-1 0-180,-14-21 0,8 0-270,-18-20 1,9 6-1081,-35 4 181,0 13 1259,-19 1 0,22 15 0,6-5 0</inkml:trace>
-  <inkml:trace contextRef="#ctx0" brushRef="#br0" timeOffset="255244">13140 17177 11850,'6'0'540,"0"0"-540,-3 0 90,2 0-180,-2 0 90,0 19-990,1 2 271,-1 12-1170,1 7 900,-2-15-541,0 7 1530,0-12 0,1-3 0,1 0 0</inkml:trace>
-  <inkml:trace contextRef="#ctx0" brushRef="#br0" timeOffset="255385">13292 17229 11221,'2'-19'359,"0"9"-449,0-8-89,-1 8 179,1-5 0,-2 7 0,1 5 0</inkml:trace>
-  <inkml:trace contextRef="#ctx0" brushRef="#br0" timeOffset="255626">12352 16960 10771,'0'-36'899,"24"3"-899,-18 0 180,42 7 0,-14-7-180,10 13-902,-3-1 902,-13 14 308,-4 4-308,-3 3-180,-2 0-359,-10 17-451,4-13-2248,-7 46 3238,1-30 0,-3 27 0,-4-19 0</inkml:trace>
-  <inkml:trace contextRef="#ctx0" brushRef="#br0" timeOffset="255779">13070 16622 11490,'6'-16'-719,"-2"4"-91,-26 5 810,-21 48 0,-5-14 0,19 6 0,-1-1 0</inkml:trace>
-  <inkml:trace contextRef="#ctx0" brushRef="#br0" timeOffset="259011">8512 18358 9961,'0'-14'1080,"0"0"-721,0 2-89,0 0-90,0 2-90,0 0-90,0 2 90,14 2 360,-11 3-540,22 1 180,-23 18-90,19 9 0,-10 9 0,9 18 0,-7-16-756,-3 13 756,-4-14 90,-2 0-180,1-2 180,-2 5-90,1-13 0,-2 4-90,1-18 90,0-21-90,-1-15-179,0-10 89,0-8-540,3-8 1,-2 10-91,1 7 0,0 1-89,0-1 899,5-17 0,-1 29 0,3-5 0</inkml:trace>
-  <inkml:trace contextRef="#ctx0" brushRef="#br0" timeOffset="259308">8985 18646 9961,'3'9'90,"1"-2"-90,4-4 0,1-1 0,8-16 0,-3-5 0,4 1 0,4-18 0,-7 14 0,9-22-90,-14 14 180,1 1-90,-7 11 0,-2 2 0,-1 1 270,-1 2-90,-17 5-180,-1 20 90,-2 11-180,-4 0 180,21 31-180,-7-36-1709,10 42 180,18-35 1619,-14 9 0,33-14 0,-13-1 0</inkml:trace>
-  <inkml:trace contextRef="#ctx0" brushRef="#br0" timeOffset="259693">9763 18381 10951,'-25'-8'539,"-12"2"-449,33 1 90,-29 3-180,9 2 90,-6 16-90,-7 6 0,14 20-90,5-8-90,8-1-89,10-10-1261,20 4 991,8-4 179,12-4 180,2-9 90,-8-10 90,16 0 0,-11-19 450,20-3-90,-31 0-711,4-16 711,-17 21 142,-8-16-52,-3 8-181,-4 5 1,0-3 0,0 4 0,-21 2 259,16 2-439,-33 8-51,22 16-39,-5 15 0,-2 8-270,21 22-539,-10-16-271,11-3 1,2 0-630,-1 9 1492,0 11 0,0-17 0,0-1 1</inkml:trace>
-  <inkml:trace contextRef="#ctx0" brushRef="#br0" timeOffset="259893">10022 18690 9961,'8'-17'0,"0"1"0,2-2 0,0 0 0,4-10-180,-2 9-179,-1-6-991,2 8 451,-7 6 899,3-1 0,-7 8 0,0 1 0</inkml:trace>
-  <inkml:trace contextRef="#ctx0" brushRef="#br0" timeOffset="260359">9315 18902 9602,'32'-24'44,"-1"0"1,22-16 45,-23 18 0,-1 1-1156,18-14 1156,2-3-833,-2-2 833,1 2-90,-4-1 90,-3 3 180,-3 1 241,1-11-421,-13 13 362,2-20-362,-20 27 90,-3-13 0,-5 20 295,0 0-385,-20 9 754,-6 6-844,-13 1 501,4 21-591,19 12 180,5 10-90,11 25 0,0-23 0,12-2 0,0 1 90,-6 5-180,14-4 0,3-1-626,2 3 446,0 15-315,1-32 0,-2-2-224,-16 12-391,13-9 1,1-1 1199,-9 0 0,3 3 0,-7-12 0</inkml:trace>
-  <inkml:trace contextRef="#ctx0" brushRef="#br0" timeOffset="260497">9723 18894 9422,'0'-11'180,"25"-1"-270,-19-4 180,49-3-270,-29-2-630,30-4 810,-22 8 0,0-1 0,19-12 0,-17 12 0,-1-1 0</inkml:trace>
-  <inkml:trace contextRef="#ctx0" brushRef="#br0" timeOffset="260959">10380 18409 9422,'-10'13'269,"2"4"-269,8 23 0,0-10 0,15 6 0,-11-9 0,12 1 0,-16-1 90,11 0 90,-8-3 0,8-2 540,-11 4-450,0-10-180,0 4-180,-17-54 180,12 16-90,-12-38-450,7 8-90,7 9-315,-2 5 1,0 0-315,5-5 1169,0-10 0,0 19 0,0 2 0</inkml:trace>
-  <inkml:trace contextRef="#ctx0" brushRef="#br0" timeOffset="261279">10765 18646 9781,'6'8'810,"3"-1"-630,9-3-90,-1-2-90,17-19 0,-11 13-90,10-29 180,6 9-90,-10 4 0,19-23 0,-23 28 0,10-24 0,-22 21 0,0-3-90,-11 8 90,-1 0 0,-1 2 629,-23 0-539,-2 6-90,-26 1 0,6 24 0,16 1 0,-7 3 90,24 24-180,-6-31-719,10 38-1,8-30 810,48 20 0,-19-25 0,5-6 0,0-1 0</inkml:trace>
-  <inkml:trace contextRef="#ctx0" brushRef="#br0" timeOffset="261560">11412 18410 10231,'-20'-10'630,"-12"1"-630,28 5 0,-25 0 0,25 2 90,-19 1-90,20 15 0,-7 4 0,30 19 0,9 1 0,21 2 0,-21-8 0,13 2 270,-23-17-91,3 4-179,-2-11 0,-18-1 0,5-3-89,-7 1-901,-20-5-899,-4 0 630,-25-2 1259,24-15 0,-20 12 0,19-12 0</inkml:trace>
-  <inkml:trace contextRef="#ctx0" brushRef="#br0" timeOffset="261927">11728 18094 10591,'9'22'899,"0"8"-449,1-8-360,-3 5-90,6 35 90,-8-27-90,-1 3 0,0 1 0,-1 2 0,-1-4 0,1-1 0,1 7-225,1-3 0,2-1 45,0-2-359,9 22 179,-7-39-90,7 2 360,-7-15 180,5-3-90,-1-21 0,0 13 450,6-46-90,-7 29-91,1-15 1,-1-1-270,0 6 270,10-19-270,-14 39 90,7 0-90,-7 11 0,5 0-180,-3 19-629,0-14-450,3 38 1259,5-6 0,-2 13 0,3 2 0</inkml:trace>
-  <inkml:trace contextRef="#ctx0" brushRef="#br0" timeOffset="265642">15517 17549 9871,'39'-11'270,"2"0"-90,9 2-1459,5-2 1369,8 0 150,-16 5 0,8 0 0,-2 1-781,1-1 0,3 2 585,0 0 1,10 0 0,0 1 0,-6 1-701,-8 0 0,-5 2 0,4 0 656,0-1 0,4 1 0,0 0 0,-3-1 0,8 1 0,-2 0 0,0 0-620,5 0 0,1-1 1,0 2 619,-13 3 0,0 0 0,0 1 0,1-1 112,1-2 1,1-2-1,0 1 1,1 0-46,0 3 0,1 0 1,1 1-1,-1-1-307,2 0 0,0-1 0,0-1 0,0 0 240,0-1 0,1 0 0,-1-1 0,1 1-177,2 2 1,0 0 0,0 0 0,0-1 176,0-1 0,0-1 0,1 0 0,4-1 0,-6 1 0,3 0 0,3 0 0,0 0 0,-1 0 0,-3 0-22,-1 0 1,-4 0 0,0 0 0,3 0-1,4 0 12,-11 0 0,4 0 0,3 0 0,2 0 0,0 0 0,0 0 0,-1 0 0,-4 0 0,-4 0 17,16 0 1,-7 0 0,-1 0 0,0 0 0,4 0-21,-8 0 0,2 0 0,2 0 1,0 0-1,0 0 0,-3 0 0,-3 0 31,4 0 0,-2 0 0,-3 0 0,0 0 0,0 0-54,0 0 0,0 0 0,0 0 0,-1 0 0,0 0-59,10 0 0,-1 0 1,1 0-1,3 0-265,-13 0 0,4 0 1,0 0-1,1 0 0,-2 0 1,-4 0 33,10 0 1,-4 0 0,0 0 0,2 0 325,-3 0 0,2 0 0,1 0 0,-3 0 0,-5 0 0,4 0 0,-4 0 0,-2 0 0,-2 0 0,0 0 0,0 0 0</inkml:trace>
-  <inkml:trace contextRef="#ctx0" brushRef="#br0" timeOffset="266026">21752 17055 12570,'49'0'-90,"1"0"90,-6 18 0,7-14 45,-10 10 0,0 4-270,-9-6 0,0 2 270,22 8 0,-2 5 45,-22-5 0,-3 2-90,15 11 0,-5 2 0,-11 9-687,-12-15 0,-3 2 687,-11 15 0,-27 2 0,-5 3-45,0-24 0,-3-2-45,0 2 1,-1-1-136,-5 1 0,-4 1-495,-1-2 1,-4 1-1,2-2-360,-9 4 1,-1 0 929,8-5 0,-2 2 1,3-3-1,-2-1 1,2-1-1,1 0 1,1 1-1</inkml:trace>
-  <inkml:trace contextRef="#ctx0" brushRef="#br0" timeOffset="267931">8272 15366 9512,'0'-7'989,"0"2"180,-14 1-1169,11 26 90,-10 10 0,13 16-90,0 7-1292,0-6 1292,0 8 90,0 2-90,0 7 0,7-32 0,0-1 0,-5 3 0,0 0-45,5-1 0,1 2-135,0 15 0,-3 0-90,-3-13 1,0 1-541,10 25 0,2-1 495,-7-27 1,0-3-91,0 12 0,2-2-404,9 11 809,-10-5 0,6-5 0,-2-3 0</inkml:trace>
-  <inkml:trace contextRef="#ctx0" brushRef="#br0" timeOffset="269187">8410 15564 7713,'0'-17'179,"0"2"1,0-1 0,0 4 360,21-7-540,3 8 90,34-8 0,-10 7-144,13-2 54,-18 6 0,1 0 0,-8 2 0,4 1 0,7-2 0,6 0 0,-3 1-821,2 1 0,-1-1 821,-5 2 0,2-1 0,-2 0 0,9 1 0,-2 0 0,0 0 0,4-1-663,-6 1 0,7-1 0,0 0 1,-4 0 632,-6 1 0,-3 0 0,5 0 48,1-1 0,7 0 0,2 0 0,-2 0 0,-8 1-327,18-1 0,-3 1 309,-11 1 0,5 0 0,1 0 0,-6 1-516,12 0 0,-1 1 516,-9 0 0,3 0 0,-4 0 0,2 1 0,-2 0 0,-1-1 0,0 2 45,-3 5 0,0 1-45,-7-1 0,2-1 0,-3 1-45,5 1 0,0 3 45,2 2 0,4 3 0,-6-2 0,-6-6 0,-1 2-60,3 5 0,4 4 0,-4-1 15,-4-5 0,-2 0 0,13 4 0,-1-1 0,-14-4 0,-1-1 596,-1 0 1,0-1-597,1 1 0,1-1 0,-1-1 0,1 1 45,-1-1 0,1-1 0,-1 1 0,2-1 0,15 2 0,0 1 45,-13-3 0,1 1-45,5-1 0,3 1 0,-4 0-45,-4-2 0,-1 0 45,13 2 0,-1 0 0,-16-3 0,-1 0 0,0-1 0,0 1 45,-1-1 0,1 1-45,14 0 0,0 0 0,-12-1 0,2-1 0,24 2 0,0 0 0,-26-3 0,1-1 0,9 1 0,6 0 0,-6-1-45,-9 1 0,-1-1 45,29 1 0,-3-1 0,-8 3 0,-14 0 0,-1 0 0,1 2 90,18 8-180,-29-5 180,4 2 560,-14-3-650,-3-1 1717,-1 0-1717,-1-1 1793,-2 0-1793,2-1 914,3 1-914,-2 0 90,8 0 0,-10 0 90,2 0-90,-6-1 90,-2 2 0,-1-1-90,-2 3-90,-2-1 90,-1 4-1,-1 6-89,0-2 0,0 13 90,-19-10-90,15 14 0,-26-13 0,18 23 90,-11-22-180,-1 20 90,7-23-179,-10 11 89,11-14 90,-5 5 0,5-7 0,1-1 0,-2-1 0,0 0 0,-1-2 0,-2 0 0,-13 1 0,7-2-90,-25 2 90,16-6 0,-31 3 0,22-5-1126,-17 1 1036,12-2 90,-5-1-207,-4 1 252,12-1 0,-1 1-90,10-1 0,-2 1-383,-7 0 0,-4 0 1,4 1 427,1 0 0,0 0 0,-7 1 0,-5 0 0,4 0 0,5 1 0,0 0 0,-14 0 0,-3 1 0,1 2 0,3 0 45,13-3 0,-1 0-45,-3 2 0,-5 0 0,4 0-45,5-2 0,-1 1 75,-5 0 0,-5 0 0,5 0-30,3-1 0,0 0 0,-5-1 0,-5 1 0,5-1 0,2 0 0,2 0 0,7-1 0,-1 0 0,0-1-30,-1 1 0,-1-1 0,3 0 75,-9 1 0,-1-1-75,-6 0 0,-5 0 0,5-1-658,5 1 1,2-1 687,6 1 0,-2-1 0,3 1 0,-2-1 0,1 0 45,0 1 0,0 0-45,1-1 0,0 0 0,3 0 0,-1 0 44,1 1 1,1 0-45,3-1 0,-1 0 45,-14 1 0,0 1-45,13-1 0,0 1 0,-1-1 0,-4 1 0,4-1 210,5 1 1,0 0-121,-25 0 0,0-1-90,28 0 0,0 0-123,-11-1 0,1 1 123,-16 0 180,0-1-180,-1 0 135,16 0 0,-1 0-90,12 0 0,-1 0 45,-26 1 0,-1 0-135,26-1 0,0 0 90,-25 0 0,0 1-45,26-1 0,0 0 0,-8 0 0,-1 0 0,3 0 0,2 0 0,-18 0 0,13 0 0,2 0 90,-3 0 298,-15-14-1018,32 11 1069,-6-21 0,25 11 1,-1-10-1</inkml:trace>
-  <inkml:trace contextRef="#ctx0" brushRef="#br0" timeOffset="285758">23085 2536 8612,'-9'29'540,"7"0"-450,-14 2-90,15 1 90,-13-1 0,8 2 0,-5 0 179,5 17-269,3-10 45,2-5 0,0 0-45,1 9 90,8-6 0,1 1 0,-5 10-90,14-5 0,-1 0-959,-12 10 1004,12-18 0,0 1-45,-15 1 0,0-1 0,24 21 0,-24-8 0,-2 0 90,10 8-135,-9-9 0,-2 0 45,1 8 0,-8-11 0,-1-1 0,5 6 0,-11-19 0,1 0-90,10 25-539,-22-16-900,23 26 179,-20-33 1350,21 9 0,-9-19 0,11 0 0</inkml:trace>
-  <inkml:trace contextRef="#ctx0" brushRef="#br0" timeOffset="286374">23068 2864 9422,'-4'31'629,"-1"2"91,2 18-270,1-5-564,1-14 0,0 3 204,1 7 0,0 1 0,0-8 0,0 2-45,0 28 0,0 2-838,-1-26 1,2 0 792,6 13 0,2 1 45,-7-16 0,0-2-45,6-1 0,0 4 0,-3 3 0,-3 5 0,0-3 0,-1-3 0,0 1 0,2 9 0,0 5 0,0-7 0,1-15 0,-1 0 0,-2 23 0,0-1 0,5 6 0,-4-23 0,-1 0 0,0 12-90,4-3 387,-3-2-1106,1 14 179,-2-18-225,-1-9 1,0 0-675,0 0 1529,0 7 0,0-18 0,0-2 0</inkml:trace>
-  <inkml:trace contextRef="#ctx0" brushRef="#br0" timeOffset="287592">23357 2501 7803,'0'-4'89,"0"1"-89,0 0 0,0 1 0,0-1 0,0 1 0,0-1 0,17-2 0,-12 1 0,26-1 0,-9-2 90,6 1-180,16-2 90,-16 2 0,12 0 0,-11 1 0,2 1 0,3-2 0,-1 0-719,4 0 719,3 0 0,1 1 0,2 0 0</inkml:trace>
-  <inkml:trace contextRef="#ctx0" brushRef="#br0" timeOffset="289532">23127 4589 8882,'0'24'450,"0"5"-450,0-5 90,0 9 0,0-5 0,0 6-1,0 3-89,0 2 180,0 3-727,0 3 637,0 4-90,0 2 0,0 4-396,0 0 486,0 3-90,0 1 0,0 0 0,0 1 90,0-1-90,0-19 0,0 1 0,0 20 0,0-11 0,0-2 0,0 6 0,7-10 0,0-1 0,-3 6 0,9-9 0,-1 1 0,-10 7 0,8 14-90,-1 0 180,0-16-1585,-1-7 0,2-2 1405,4 4 180,-2 9 112,0-19-292,1-3 180,1-2 323,3-2-413,2 0 0,5-3 0,19 7 90,-8-8-90,-2-3 0,1-2-90,10 4-781,16 3 871,-13-6 90,2-2-180,1 1 2603,3-2-2423,1-1-90,0 0 0,-15-5 0,1 0 0,19 3 0,-9-3 0,-1-1 0,9 1 0,-22-3 0,0-1 0,13 1 0,-2-1 0,0 0 0,18-1 90,-15 1-135,-9-2 0,0-1 45,7 1 0,-8-1 0,0 0 0,6 0-45,2 0 0,1 0 135,1 0-135,-3 0 0,0 0 45,-2 0 90,13 0-180,-19 0 90,2 0-90,17 12 0,-13-9 90,16 9-90,-2-3 180,-12-7-90,-10 7 0,-1 0 0,7-3 0,9 3 0,-17 0 0,-1-6-46,13 6 46,-12-3 0,10 0 0,-16-2 0,1-1 0,0-1-89,12 2 178,-8-3-89,20 3 0,-22-3 1232,8 3-1232,-13-2 0,-2 1 501,0 2-501,8 2 0,-6 0 90,14 6-90,-17-4 79,17 6-169,-19-5-90,20 7 90,-16-7 90,10 2 0,-8-4 0,2-2 0,3-2 0,20-2 0,-9-1 0,-4 0 0,1-1 0,12 0 0,-7 1 0,2-2-810,11-12 810,-20 11 0,-1 1 0,18-13 0,0 14 0,1-8 45,-15 8 0,1-2-90,-11-5 0,2 0 0,22 3 0,0 2 45,-22-1 0,-1-1-45,22-2 0,0 1 135,9 3-90,-2-2 0,-1-1 0,0 4-180,-4 0 0,-2 0 180,-5 1-45,-10 0 0,0 0 45,3 0-201,-7 0 0,0 0 201,4 0 0,-6 0 0,0 0 0,6 0 0,12 0 90,2 0-90,-14 0-45,-4 0 0,-1 0 135,3 0-90,-4-5 0,-1 0 0,3 2 0,26-7 0,-28 10 0,0-2 0,0-1 0,-2 1 0,26-3 0,-33 5 0,13 0 0,-17 0 0,5 0 0,-11 0 0,-1 0 0,-2 0 776,-2 0-776,0 0 437,-2 0-1157,0 0 270,-2 0 450,0 0 0,-4 0 0,0 0 0</inkml:trace>
-  <inkml:trace contextRef="#ctx0" brushRef="#br0" timeOffset="290292">28782 4708 9961,'-1'-8'1439,"-1"-2"-1169,1 2 0,0-4-180,1 5 90,0 0 0,0 2-180,0 3 0,0-2 270,0 3-180,0 19-90,0 11 0,0 12 0,0-6 0,0 0 0,0 15 0,1-3 0,-2 2 0,-10 12 0,9-7 0,1 0-428,-5-20 1,1-2 427,4 12 0,2-1 0,-1 21 0,0-1 0,0 1 0,0 0 0,0-1 0,0 0 0,9-19 0,1 2 0,-8-13 0,1 2 0,14 25 0,1 0 0,-16-26 0,-1 1 0,13 25 0,-1 1 0,-11-25 0,-1-1 0,5 11 0,-1 0 90,-5 18-180,6-2 90,-5-2 0,2-20 0,0 0-90,-3 19 0,2-13 0,0-2 0,1 4 0,2 8-180,1-23-180,-4-3-179,3-4-451,-2-3-449,2-3-450,-2-1 1979,1-4 0,-1-2 0,-1-2 0</inkml:trace>
-  <inkml:trace contextRef="#ctx0" brushRef="#br0" timeOffset="312426">11208 322 10411,'4'-11'810,"-2"1"-541,0 2 541,0 3-810,0 20 0,0-12 0,0 33 0,1-19 0,1 20 0,-1-6 0,6 16 0,-3-10 0,8 22 90,-5-27-180,3 5 180,4-11-180,-5-11-270,13 1 180,-9-12 0,4-2 0,4-22 180,-6 15 0,13-44 0,-14 31 0,8-35-89,-14 30 89,1-7 0,-5 12 0,-3 8 179,0-2-89,-1 11-90,0-3 0,1 23 0,5 1-269,-1 3-541,6 8-359,-1-27-91,3 29-718,1-29 1978,3 27 0,1-27 0,3 10 0</inkml:trace>
-  <inkml:trace contextRef="#ctx0" brushRef="#br0" timeOffset="312993">11878 367 9602,'-15'13'449,"-7"-9"-449,20 25 0,-14-25 0,15 29 90,-6-20-180,7 18 180,0-7-90,0 1 0,0 2 0,16 0 90,-13 12-180,29-10 90,-29 17 90,24-21 0,-24 10 0,8-20-90,-11 2-720,0-9 91,-21-4 359,16-15-90,-30-4 180,31-16 180,-11 4 0,41 10 0,7-7 0,15 11 0,0-4 90,9-1-180,-10 7 135,-7 3 0,1 0-45,8-4 180,-11 4 0,-1-1 90,2-3-90,9-2 90,-17 0-1,-11 3 91,-3-10-360,-12 9 270,-4-4 0,-1 6 0,0 0-180,-22-1 90,2 2-180,-20 4 0,8 1 90,5 4-90,11 20 0,6 1 0,10 24-180,0-13-450,0 12 0,22-16-989,-1 18 630,4-20 989,8 7 0,-28-14 0,13-2 0</inkml:trace>
-  <inkml:trace contextRef="#ctx0" brushRef="#br0" timeOffset="313276">12560 562 9422,'0'-18'809,"0"25"-629,17 10-270,-13 28 180,30-11-90,-30-1 0,22-9-90,-23-3 630,7-1 89,0-3-629,-8-2 0,14-7-90,-15-19 90,5-13 0,-6-10-809,0-14 179,0 18-1528,0-18 628,16 24 1530,-12-6 0,28 15 0,-12 0 0</inkml:trace>
-  <inkml:trace contextRef="#ctx0" brushRef="#br0" timeOffset="313630">13457 294 12030,'-4'21'540,"2"14"-540,-1-18 90,0 21-90,0-6 0,-1 7 0,-1 2-612,0 6 433,0 2-271,2 4-540,0 4-2384,2 2 1215,0 2 2159,1 0 0,0 2 0,0-1 0</inkml:trace>
-  <inkml:trace contextRef="#ctx0" brushRef="#br0" timeOffset="314627">14053 741 10681,'-5'0'1619,"1"18"-1619,3 4 90,18 12-180,-12-2 90,12-6 0,1 0 90,-13 1-90,30-2 0,-21 0-90,15-4 0,-8-1-90,1-3 0,0-4 90,1-3-90,-1-5 90,0-2 90,0-2 0,5-20 0,-8 14 90,8-33-90,-18 13 90,0-9 180,-9 1-90,0 13 90,0 0-360,0 0 0,-14 10 90,10-5-180,-11 29-809,15 1-181,18 29-269,-14-8-360,28 4 1799,-28-12 0,27-1 0,-8-1 0</inkml:trace>
-  <inkml:trace contextRef="#ctx0" brushRef="#br0" timeOffset="314977">14752 1049 9961,'-21'-6'630,"5"20"-720,16-4-180,19 23 0,-15-3-89,28-12-91,-29 5-450,20-15 810,-15 3 180,10-21-90,-6 6 180,-2-29-90,-2 28 180,1-36 90,-1 24 0,3-20-181,-6 13 1,4 2-90,-4 0 450,0 11-450,-1 1-90,-1 10 0,-1 0 0,2 17 0,1-12-450,8 31-359,1-9-1080,15 19 270,-6-9 1619,12-5 0,-7-21 0,3-3 0</inkml:trace>
-  <inkml:trace contextRef="#ctx0" brushRef="#br0" timeOffset="315294">15315 1045 10051,'-35'-12'720,"16"-2"-630,-9 13-450,16-6 360,20 6 0,7 10 180,32-6 539,-6 7 1,-8-10-540,-14-12-180,-28 24 0,-8 14 0,-5 11-180,14-3 0,3-1-90,5 1-989,0 24 450,0-29-181,0 8 1,0-17-810,0-3 1799,0-1 0,0-5 0,0-1 0</inkml:trace>
-  <inkml:trace contextRef="#ctx0" brushRef="#br0" timeOffset="315514">14373 555 9602,'0'-15'539,"0"0"-449,18 5 270,1 2-630,12 24-1079,-15 4 269,-6 21 1080,-10 3 0,0-10 0,0 1 0</inkml:trace>
-  <inkml:trace contextRef="#ctx0" brushRef="#br0" timeOffset="315679">14882 434 9332,'-22'17'-180,"-11"9"-360,29 9-269,-12 6-451,16-8 1260,0 5 0,0 4 0,0 3 0</inkml:trace>
-  <inkml:trace contextRef="#ctx0" brushRef="#br0" timeOffset="316150">16347 964 10681,'-43'-7'90,"1"1"-90,3 6 0,-10 14 0,15-10 90,-3 26 0,20-6-180,8 8 90,4 9-180,27-18-90,10 7 180,11-19-985,3-2 985,-12-9-69,0 0 69,0 0 0,8-21 90,-12-8 0,-12 1 0,-2-2 90,3-18 90,-10-5-90,-2 13 90,-7-3 90,0 0 134,-10 11 1,-2 0-45,7-15-225,-14 11 0,1 0-225,14 2 0,-27-6 360,28 20 544,-13 28-814,16 17 0,0 18 0,0 12 0,7-20 0,3 0-90,8 23-225,0-9 1,0 1-294,0 6-112,5-12 1,-1-2-1173,-5 2 992,24 5-269,-16-23 1103,-1-9 0,2-7 0,-1-5 1</inkml:trace>
-  <inkml:trace contextRef="#ctx0" brushRef="#br0" timeOffset="316328">16742 1004 10951,'-14'-11'539,"11"24"-808,-10 9-271,13 15-180,16-17 91,-12 10-1,12-15 0,1 6 91,-12 3-1,27-20-180,-19 19 720,13-21 0,-8 6 0,0-8 0</inkml:trace>
-  <inkml:trace contextRef="#ctx0" brushRef="#br0" timeOffset="316644">16950 1101 10141,'0'-29'1259,"0"6"-1259,0 26 0,0 7-269,0 24-91,0-3 90,12-11-360,1 6 450,2-17 91,15 3 89,-20-5 0,22-7 179,-19-17 541,7-3-360,-8-1 90,0-10-181,-4 27-179,-3-24 0,0 25 0,0-17 0,-3 19-180,0 8-989,-1 10 179,-1 18-179,0-7-1892,19 9 2971,5-23 0,0 13 0,-5-12 0</inkml:trace>
-  <inkml:trace contextRef="#ctx0" brushRef="#br0" timeOffset="316936">17518 1141 10321,'-18'13'270,"20"-10"-270,17 19 0,22-20 0,-3 6 90,-4-8 270,-6 0 89,-17-17-89,6 13 360,-11-26-270,4 12-450,-6-12 0,-4 5-180,-13 10-540,9 23 90,-9 18-539,3 8-2429,8 26 3598,-15-20 0,15 17 0,-5-16 0</inkml:trace>
-  <inkml:trace contextRef="#ctx0" brushRef="#br0" timeOffset="317068">17307 1647 12480,'-13'0'0,"0"0"-450,3 0-989,2 0-1349,6-13 2788,-1 9 0,2-10 0,1 14 0</inkml:trace>
-  <inkml:trace contextRef="#ctx0" brushRef="#br0" timeOffset="323199">18835 151 11041,'0'-23'539,"0"3"-359,0 5 0,0 3 1439,0 6-1529,0 22 0,0 3 0,0 24-90,0-1-1385,0 9 1385,0 9 0,0 7 0,0-32 0,0 2 45,0 1 0,0 0-45,0 1 0,0 1 0,0 1 0,0 0-90,0 0 0,0 0-45,0-1 0,0 2-360,0 15 1,0 1 224,-1-16 0,2 0-450,3 2 1,3 4-1,-2-6 0,-4-6 1,1-2 719,12 17 0,-1-2 0,-10 0 0,8 9 0</inkml:trace>
-  <inkml:trace contextRef="#ctx0" brushRef="#br0" timeOffset="323914">19597 723 10681,'0'19'1349,"0"11"-1259,0 33-90,0-9 0,12 5 0,-9 1 0,20-15-900,-21 7 900,15-21 218,-15-7-218,12 2-90,-12-12-270,7-2 360,-6-9 0,3-3-180,3-21 270,-1-12-135,1 2 0,0-3 45,1-23 135,6-5-135,-6 16 0,-1 2-90,1 3 180,2-4-90,-3 17-147,8 4 237,-8 18-90,5 6 90,-5 21-90,1-15 0,-2 40 0,3-8 0,-2 10 0,4 14 0,-5-30 0,0 12 0,-1-30 0,-3 5-180,-1-18 714,-2 3-624,3-26 430,-1 17-340,6-52 0,-2 33 0,3-29 0,-2 20 0,0 5-90,-2 2 90,1 13 0,-2-7 90,-1 17-90,3-8 0,-3 11 0,7 23 90,-2-17-180,3 40-269,0-28-541,-1 24-179,4-12-1080,10 14 2159,-1-13 0,9 6 0,-7-15 0</inkml:trace>
-  <inkml:trace contextRef="#ctx0" brushRef="#br0" timeOffset="324177">20465 884 10321,'-36'-6'1169,"-1"2"-1169,1 22 0,4 0 0,10 16 0,10-5 0,7-2 0,26-6 0,1-9 0,19-6 0,-10-21-90,-13-5-89,1 1-631,-17-14-719,6 12 270,-8-14 1259,-18 7 0,13-1 0,-12 5 0</inkml:trace>
-  <inkml:trace contextRef="#ctx0" brushRef="#br0" timeOffset="324614">20763 439 10141,'-21'20'1709,"-10"-15"-1529,27 30-180,-10-11 0,3 9 90,8 4-180,-8 8 180,11-8-180,0 11 90,0-13 0,0-1 0,0 1-450,17 9 270,-12-12-449,25 12 269,-27-25 90,11-1-359,-2-13 629,-1-18 0,8-11 0,-5-25 179,-7 8 1,3-18-90,-5 28-90,3-8 180,-4 26 360,0-7-360,1 17 359,0-7-269,1 10-180,0 0 0,1 0 90,-1 15-90,1-12-90,1 40 0,-1-25 0,-2 37 0,-3-26 90,-2 18-180,0-23-270,0 5-89,0-15-451,-14-4-2068,10-1 2968,-21-6 0,22-16 0,-8-8 0</inkml:trace>
-  <inkml:trace contextRef="#ctx0" brushRef="#br0" timeOffset="324780">21042 718 10051,'20'26'900,"-2"13"-810,-11-15 0,1 10-90,-8 0-90,3 2-180,-3-8-1259,0 14 719,0-22-1439,0 8 2249,0-18 0,0-1 0,0-7 0</inkml:trace>
-  <inkml:trace contextRef="#ctx0" brushRef="#br0" timeOffset="324919">21062 491 9332,'0'-14'-90,"0"3"90,0 2 0,0 4-990,0 1-1168,0 17 2158,0 5 0,0 0 0,0-3 0</inkml:trace>
-  <inkml:trace contextRef="#ctx0" brushRef="#br0" timeOffset="325217">21438 952 9602,'3'-17'269,"-1"-18"-269,0 15 180,0-17 0,1 3-90,0 1 90,0-2 180,1-15-270,-1 12-904,-1-9 994,-2 17 121,0 3-121,0 1-59,0-3-121,0 9 269,-13 0-269,9 33 0,-9 27-89,13 8-226,0-6 0,0 1-1085,0 8 1040,7-18 0,2 2-450,-2 0 1,2-1 1,10 16 808,0-12 0,0 0 0,-4-1 0,23 7 0</inkml:trace>
-  <inkml:trace contextRef="#ctx0" brushRef="#br0" timeOffset="325501">21743 926 10501,'41'0'90,"2"0"-90,-23-15 90,15 11-180,-21-23 450,4 13 89,-9-13-179,-9 4 0,-20 2-270,-4 9 90,-19 5-90,10 7 0,14 16-90,8 4-360,32 0-539,1 12-270,25-18 1259,-9 3 0,2 0 0,-6-10 0,0-1 0,14 1 0,0 1 0</inkml:trace>
-  <inkml:trace contextRef="#ctx0" brushRef="#br0" timeOffset="325955">19467 1693 10411,'0'-15'1259,"25"0"-809,12-4-180,16 4-135,-11 1 0,2 0-801,20-2 755,-21 6 1,5 0 0,-3 0-1109,5 1 0,1 0 1019,-5 1 0,3 1 0,-1-1 0,13-1 0,0 0 30,-17 4 0,1 0 0,1-1-60,2 0 0,0 0 0,4 0 30,4 0 0,5 0 0,1 0 0,-2 0-467,2 0 1,-1 0-1,5 0 215,-5 1 0,7-1 0,2 0 1,-3 1-1,-6 0-138,5 0 0,-7 0 1,5 1-187,-8 0 0,5 0 1,2 0-1,-3 0 0,-7 1 412,1 0 0,-6 1 0,2-1 1,9 1-1,2 0 0,-5 0 1,-5 1-1,-1 0 0</inkml:trace>
-  <inkml:trace contextRef="#ctx0" brushRef="#br0" timeOffset="327448">20968 1661 10321,'0'-14'1079,"0"0"-809,0 5 0,-15-1-180,11 23 0,-22 19-90,23 17-178,-6-18 0,-1 4 223,8 17 0,2 2-456,-5-10 1,1 4 440,3 11 0,1 8 0,1-4-1073,-2 2 0,2-1 1043,4-6 0,1 3 0,-1-2 0,-4-12 0,-1-2 0,3 0 30,7 2 0,4 0 0,-4 1-60,-8 0 0,-3 0 0,4 1 30,9-1 0,4 1 0,-2-1-771,-5 0 1,-3 1 0,3-1 770,6-2 0,2-1 0,2 3 0,0-3 0,0 3 0,2 0 0,-1-4-261,2 1 0,0-2 0,4 2 261,4 4 0,6 5 0,1-2 0,-3-5-189,-4-10 1,-1-4 0,2 1 158,8 8 0,3 2 0,-2-4 30,3 0 0,-1-3 0,-1-1 0,0-1-90,-1-2 0,0-1-45,-3-1 0,0-1-90,-2-2 0,1-2 0,-4-1 0,1 0 237,8 2 0,-1-1-102,-12-8 0,1-1-180,10 6 0,-2-2 90,-1-4-180,0 0 1786,-17-12-2325,-7-1 565,-2-3 334,-5 1 0,-2-2 0,-2 0 0</inkml:trace>
-  <inkml:trace contextRef="#ctx0" brushRef="#br0" timeOffset="327849">22123 4028 11311,'-11'-1'179,"1"1"271,0 0-450,4 0 90,1 13-90,4 7 0,1 24 0,18-7-938,-14 9 938,34-9 0,-21 2-39,21 2 39,-15-9 0,0 1 0,15 17-409,-7-7 1,-1 1 408,4 7 45,-15-18 0,-2 0-45,0 12 0,-8-2 90,-5 0-180,-4 19-270,-30-14-1834,10-7 1,-4 0 1428,-6-16 1,-3-2-271,1 8 1,0 0 987,5-10 1,0-2-1,-25 18 1,-3-1-1</inkml:trace>
-  <inkml:trace contextRef="#ctx0" brushRef="#br0" timeOffset="328882">19740 4856 10951,'-19'-19'270,"15"2"-91,-31 2 1,31 4-180,-28 1 90,21 4-90,-13 2 0,10 3 0,1 1 0,0 16 90,4 7-90,2 10-90,5 1 90,2-6 0,0 0 0,24 10 0,1-11 0,25 4 90,-25-12-90,13-11 0,-24 1 0,6-28-270,-11-2-269,-26-3-1440,-6-9 810,1 15-271,-16-2 1440,32-3 0,-34 20 0,16-5 0</inkml:trace>
-  <inkml:trace contextRef="#ctx0" brushRef="#br0" timeOffset="329048">19618 5405 9871,'16'3'0,"1"-2"-90,1-1 90,2 0-1529,17-21 360,-6-7 722,13-12 1,-8 1 0,2 9 0</inkml:trace>
-  <inkml:trace contextRef="#ctx0" brushRef="#br0" timeOffset="329416">20238 5102 8432,'0'-34'270,"16"1"-180,-12 2 0,11-3 270,-1-4-270,-10-2-5301,10-23 5391,-14 14 180,0-16-404,0 19 494,0 4 464,0 1-644,0 6-337,0 3 67,0 6 2445,-16 6-2355,13 6 2117,-27 8-2117,26 63 0,-17-18-204,18 5 1,4 3 113,-8 10-89,7 2-181,0 2-180,0 0-270,23-4-89,-18-2-226,14-21 1,5-1-684,7 13 1718,11 5 0,7-26 0,-11-6 0</inkml:trace>
-  <inkml:trace contextRef="#ctx0" brushRef="#br0" timeOffset="329656">20812 4882 10591,'-23'-7'720,"-17"5"-541,11-5-179,-20 7 0,20 17 0,-10-13 0,24 28 0,-5-14 90,9 13-90,11-3 0,23-6 0,5-9 0,19-6 0,-3-7 0,-20-18-449,2 14-811,-24-25-449,7 15 450,-9-9 1259,-22 10 0,16 5 0,-16 8 0</inkml:trace>
-  <inkml:trace contextRef="#ctx0" brushRef="#br0" timeOffset="330104">20545 4729 10681,'0'-22'809,"0"-2"-359,19-10-180,-14 7-180,35-8 0,-35 13-180,39 4 180,-38 0-90,39 5 0,-29 2-630,24 4-179,-14 4-1170,-2 24 1169,-5 14-179,-11 16-1012,-2 6 2001,-6-4 0,0 2 0,0 4 0</inkml:trace>
-  <inkml:trace contextRef="#ctx0" brushRef="#br0" timeOffset="330249">20777 5443 10501,'22'11'630,"-4"0"-540,-18-5-4408,12-1 4318,-3-4 0,10 0 0,-6-1 0</inkml:trace>
-  <inkml:trace contextRef="#ctx0" brushRef="#br0" timeOffset="330383">21555 5114 12840,'4'-5'-360,"-2"0"-809,-1-2-1530,-1 0 2699,0-4 0,0 0 0,0-1 0</inkml:trace>
+  <inkml:trace contextRef="#ctx0" brushRef="#br0" timeOffset="-214701.73">29425 15197 8792,'59'0'-2519,"-11"0"2519,5-15 0,-10 12 0,2-12 0</inkml:trace>
+  <inkml:trace contextRef="#ctx0" brushRef="#br0" timeOffset="-213852.73">30402 14768 10681,'2'-4'630,"1"2"-451,-1 1-179,1 1 180,1 0-90,-1 20 0,3-15 0,1 50-90,-1-31 0,-1 10 0,-2 3-90,0 3 135,0-6 0,-1 0-45,0 5 0,0 10-90,-1-23 0,0-2 90,0-6-180,2-2 0,-3-8 1,6-2 179,-4-5 0,9-19-90,-5-8 90,5-11 0,4-18 0,-3 19 0,12-25 0,-10 28 180,8-10-180,-9 28 89,7-6-89,-8 20 0,6 9 90,-9 15-359,5 22-271,-6-6-989,5 17 449,-6-23-449,3 8 1529,0-15 0,1-5 0,4-1 0</inkml:trace>
+  <inkml:trace contextRef="#ctx0" brushRef="#br0" timeOffset="-213546.73">31033 14971 10771,'0'-19'719,"-19"3"-539,14 3 0,-33 1-90,34 2 0,-35 4-90,15 2 0,-16 4-90,5 16 180,16 3-180,7 21 0,12 0 0,17-7 0,-12-3 90,29-6 0,-8-13 0,17 6 0,-2-16 90,-7-14-90,-16-9 90,-7-20-90,-11 1 0,0 10-899,-22 2-1260,3 10 2159,-17 3 0,20 1 0,4 5 0</inkml:trace>
+  <inkml:trace contextRef="#ctx0" brushRef="#br0" timeOffset="-213335.73">31135 14932 11670,'19'18'-270,"-14"10"-449,27-24-360,-29 28-181,25-18-449,-24 17 1709,26-10 0,-26-1 0,11-1 0</inkml:trace>
+  <inkml:trace contextRef="#ctx0" brushRef="#br0" timeOffset="-212964.73">31572 14912 11221,'-20'-10'449,"16"1"-359,-30 5-180,19 2 90,-13 2 0,14 14 0,-7-10-270,18 24-629,-25-5 539,20-4-90,-15 17-89,14-32 89,-1 28-90,2-29-449,-2 22 539,2-22 0,-3 7 450,5-10 720,-5-15 0,7 11 179,-2-27-359,4 11-450,1-16 180,1 7-180,0 2 809,15 6-449,1 4-450,16 5 0,-4 20 0,3 14-360,-11 10-629,1 1-2250,0 9 3239,-4-10 0,5 11 0,-6-15 0</inkml:trace>
+  <inkml:trace contextRef="#ctx0" brushRef="#br0" timeOffset="-212768.73">31920 14862 10951,'-38'-2'719,"17"21"-719,-8-14 0,26 33-1169,-24-9 180,14 10 989,-10 15 0,12-21 0,6 8 0</inkml:trace>
+  <inkml:trace contextRef="#ctx0" brushRef="#br0" timeOffset="-212616.73">32217 15088 12030,'1'-6'-1349,"-1"0"270,0 3 1079,0-4 0,0 4 0,0-3 0</inkml:trace>
+  <inkml:trace contextRef="#ctx0" brushRef="#br0" timeOffset="-204012.73">22888 13898 8792,'25'-8'899,"-1"0"-809,-6 4-90,-1 0 180,-2 2-180,1 0 0,2 0 90,12 0 90,-5 2 0,21-1-180,-15 1 90,9 0-90,-7 0 90,2 12-180,4-9 135,-8 10 0,2-1-45,24-9-608,-2 6 1,1 3 607,-19-7 0,1 1 0,7 0 0,4 2 0,-2-2 0,-2 0 0,0-1-1105,15 4 1,1-1 1104,-15-7 0,-2 0 0,1 5 0,1 0-171,0-4 1,3 0 170,-3 0 0,3 1 0,-2 0-393,9-1 0,2 0 438,-10-1 0,4 0 0,1 0 0,-4 0-147,13-1 0,1 1 102,-11-1 0,7 0 0,0 0 0,-5 0 31,-6 0 1,-4 0 0,3 0-62,13 0 0,2 0 0,2 0 30,1 0 0,0 0 0,-3 0 0,-12 0 0,-3 0 0,4 0 0,6 0 0,7 0 0,-1 0 0,-6 0 0,-10 0 0,-4 0 0,4 0 22,4 0 1,5 0-1,0 0 1,-7 0-68,11 0 0,-4 0 45,-8 0 0,1 0 0,-4 0 45,0 0 0,-3 0-90,0 0 0,-1 0 179,-4 0 1,1 0-135,10 0 0,0 0 0,-14 0 0,1 0 0,16 0 0,-2 0 0,2 0 0,-16 0 0,-2 0-90,0 0 886,0 0-796,-15 0 1188,-8 0-1188,-1 0 2566,-5 0-2566,1 0 0,-4 0 0,0 0 0</inkml:trace>
+  <inkml:trace contextRef="#ctx0" brushRef="#br0" timeOffset="-202334.73">22555 15510 10771,'-25'0'0,"1"0"0,8 0 0,1 0 0,-4 0 0,2 0 0,-6 0 0,4 0 90,0 0 0,-4 0 0,1 0-90,-3 0 90,-12 0-90,7 0 0,-23 0 90,19 0-180,-25 0 90,22 0 0,-12-12 0,-7 9 0,9-18 0,5 19 0,-1 2-280,-15-19 280,6 14 0,-2 1 0,21-1 0,-2-1 90,-15-1 0,-8 1 0,6 1-135,8 2 0,0 0-1055,-13-3 0,-6-1 1,6 2 1099,13 0 0,0 1 0,-5 0 0,-4-1 0,3 0-289,4-1 1,-2 1 408,-6 0 0,-6-1 0,3 1-120,0 0 0,1 0-255,7 1 0,-3 1 0,-2-1 255,-8 1 0,-2 0 0,3 0-267,11 0 0,2 1 0,-5 0 285,1 0 0,-7 0 0,-2 0 0,2 1 0,4-1 181,-5 1 1,4-1 0,-6 1-200,1 0 0,-6-1 0,-3 1 0,2 0 0,6 1-351,9-1 0,4 0 0,1 1 0,-3 0 351,-1-1 0,-4 0 0,-1 1 0,2-1 0,2 1-210,-15-1 0,4 1 1,-1 0 186,14 0 1,1 0-1,-2 0 1,1 0 44,0-1 1,0 1-1,-1 0 1,-3 0-23,-5-1 0,-3 1 0,-3 0 0,1 0 0,3 0 0,0 0 0,3-1 0,-1 1 0,-6-1 0,10 1 0,-5-1 0,-3 1 0,-2 0 0,2-1 0,2 1 0,6-1-180,-12 0 0,6 1 0,2-1 0,-5 0 180,1 0 0,-4 0 0,-1 0 0,1 0 0,5 0-72,3-1 0,4 1 0,1 0 0,-1 0 72,-1-1 0,0 0 0,0 0 0,0 0 78,2 0 0,0 0 0,-2-1 0,-2 0-96,-3 0 0,-5-1 0,0 1 0,0-1 0,4 0 5,-1 0 1,5 1 0,-2-1 0,-5-1-1,11 2 0,-5-2 0,-3 1 1,0-1-1,0 0 0,4 0 0,4 1 13,-8-1 0,5 0 0,1 0 0,-6 0 0,1 0 0,-5-2 0,-3 1 0,0-1 0,3 1 0,6 0-23,0 0 1,6 1 0,1 0-1,-3-1 41,0 1 0,-3-1 0,-1 0 0,2 0 0,4 1-48,-14-2 0,4 1 0,0 0 60,-1 0 0,0 0 0,0 0 0,1 0 0,1 0 0,-4 0-74,15 1 1,-3 1 0,-1-1 0,0 0-1,4 1 44,-1-1 0,4 1 0,-1 0 0,-4-1-28,2 1 1,-4 0 0,-3-1-1,0 1 1,3 0 0,6 1 27,-14-2 0,7 1 0,-6 0 0,8 0 0,-5 1 0,-2 0 0,2 0 0,7 1 0,-1-1 0,6 1 0,-6-1 0,1 1 0,-7-1 0,-1 1 0,2-1 0,8 1 0,4 0 0,7 0 0,-5-1 0,-8 0 0,-7 0 0,2 0 0,9-1 0,7 1 0,4 0 365,-18-2 0,4 0-545,5 0 1421,-4-1-3130,36 3 2125,22 1-236,17 1 0,2 1 0,-7 0 0</inkml:trace>
+  <inkml:trace contextRef="#ctx0" brushRef="#br0" timeOffset="-201932.73">11733 14490 9691,'-26'12'1080,"-14"-9"-451,9 8-269,-29 0-180,5 3-45,10-1 0,0 2-1491,-15 9 1356,17-10 0,-1-1 0,11-1 0,1-1 0,-3 1 0,0 1 0,0 0 0,-1 1 0,0 1 0,0 0 0,1 1 0,0 1 0,1 0 0,0 1-45,-8 7 0,2 1 90,12-7 0,1 1-45,-7 13 0,4 1 0,11 4-270,4 9 28,42-16-747,1-2-270,32-2 62,-29-14 0,1-1 1197,5 0 0,1 0 0,5-1 0,1-1 0,2 0 0,0 1 0</inkml:trace>
+  <inkml:trace contextRef="#ctx0" brushRef="#br0" timeOffset="-199837.73">12562 14131 10141,'0'30'810,"-15"5"-810,11-7 0,-11 16-360,3-12-989,10 24 539,-10-20-179,12 10-540,0-14 1529,0-1 0,0-1 0,0-3 0</inkml:trace>
+  <inkml:trace contextRef="#ctx0" brushRef="#br0" timeOffset="-199653.73">12348 14516 8882,'-3'-6'0,"3"-4"0,-3 5 90,21-7-180,6 6-1079,22-3 269,-7 6 900,1 0 0,-8 1 0,-1 2 0</inkml:trace>
+  <inkml:trace contextRef="#ctx0" brushRef="#br0" timeOffset="-199302.73">12892 14460 9691,'-37'0'540,"3"0"-540,17 14 0,-3-11 0,17 22 0,-11-7 90,13 7-90,-5 0-90,6-7 0,0 0-180,19-3-269,3 6 269,2-9 0,27 2 180,-31-10 90,39-2 0,-33-2 0,6-17 450,-10-1 89,-9-18 1,-2 3 180,-8 1-720,-20 6-180,12 6-630,-23 12-359,25 21-900,-8 3 2069,28 19 0,-13-20 0,12-1 0</inkml:trace>
+  <inkml:trace contextRef="#ctx0" brushRef="#br0" timeOffset="-199019.73">13338 14550 9781,'-41'-8'1260,"-1"2"-1260,1 6 0,4 12 0,5-8 90,17 19 0,5-11-180,10 10 0,21-5 90,9-3 0,21-7 0,-7-3-270,4-4 90,-16 0-90,-8-15-270,-5 11-449,-18-26-900,-13 14 1889,-14-13 0,4 15 0,0 4 0</inkml:trace>
+  <inkml:trace contextRef="#ctx0" brushRef="#br0" timeOffset="-198276.73">12947 14941 10771,'-12'2'989,"3"-1"-989,0-1 0,3 0 0,1 0 0,1 0 0,3 0 0,0 0 0</inkml:trace>
+  <inkml:trace contextRef="#ctx0" brushRef="#br0" timeOffset="-197034.73">14278 14529 9332,'-43'0'899,"-3"0"-899,10 12 0,1-8 0,9 20 0,3-21 0,3 24 0,2-12 90,3 1-180,7 6-180,2-13-359,6 8 179,22-9 360,0-3 0,23-5 180,-23-13-90,14 10 180,-19-24 0,13 23 90,-14-22 179,-2 24 1,-13-16-450,4 34-630,-5-8-1079,0 25 1709,16-8 0,3-1 0,16-2 0</inkml:trace>
+  <inkml:trace contextRef="#ctx0" brushRef="#br0" timeOffset="-196821.73">14563 14556 9691,'-35'0'1260,"-2"0"-1260,4 13 0,1-10 0,16 25 0,-1-24-630,16 24-989,-4-12 360,5 11 1259,22-5 0,-17-4 0,18-5 0</inkml:trace>
+  <inkml:trace contextRef="#ctx0" brushRef="#br0" timeOffset="-196587.73">14780 14564 9961,'-10'-3'1709,"0"0"-1709,-3 20-90,1 0 90,5 3-1349,-5 34 450,5-33-1710,3 40 2609,4-37 0,21 4 0,5-10 0</inkml:trace>
+  <inkml:trace contextRef="#ctx0" brushRef="#br0" timeOffset="-196336.73">14912 14786 5914,'0'0'0</inkml:trace>
+  <inkml:trace contextRef="#ctx0" brushRef="#br0" timeOffset="-195770.73">15005 14809 9422,'-11'5'899,"18"-4"-899,-3-11 0,30 6 0,-14-21 90,11 22-90,9-8-90,-12 3 90,8 6 0,-8-7-90,-1 3 0,1 5-90,6-12 90,-10 9 0,9-8 90,-21 6 90,2-2-180,-11 2 90,-2-2 0,-1 2 0,0-1 0,-20 2 0,15-1 270,-32 0-90,12 3-180,-18 1 0,9 2 0,-6 0 0,20 13 0,-6-9 90,11 24-270,7-12-180,1 14-899,7-3 180,23-7-360,-17-3 1439,39-7 0,-25-3 0,20 0 0</inkml:trace>
+  <inkml:trace contextRef="#ctx0" brushRef="#br0" timeOffset="-195461.73">15648 14589 9691,'-20'-8'450,"4"0"-180,-2 2-270,-1 3 0,-16 2 0,6 1 0,12 14 0,0-11 90,15 30-90,-5-14 0,27 18-90,-16-4 90,35-8 0,-34-3 90,26-9-90,-28-3 0,9 1 180,-2-3-180,-7 0-90,7-4 90,-10 0 0,0-2-180,-17-2-899,-2 1 1079,-17-1 0,5-13 0,1-3 0</inkml:trace>
+  <inkml:trace contextRef="#ctx0" brushRef="#br0" timeOffset="-195152.73">15857 14649 9602,'-32'0'0,"13"12"0,6 2 0,13 10-90,0 0 180,0-6-90,16 3 0,-12-7 0,24 5 0,-25-8 0,10 3 0,-13-8-90,0 2 0,0-4-2879,0 0 2969,-17-2 0,12 0 0,-12-2 0</inkml:trace>
+  <inkml:trace contextRef="#ctx0" brushRef="#br0" timeOffset="-194786.73">16340 14484 9691,'5'0'1530,"0"0"-1440,-2 0 179,1 16-269,-1-12 0,3 26 0,-3-8 90,3 18-90,-3-5 0,1 3 0,-1-9 90,0 2-450,0 2-539,3 15 269,0-11-719,3 18 809,-2-26 91,-2 3-271,0-16-179,-4-4 899,1-5 0,-2-3 0,0-2 0</inkml:trace>
+  <inkml:trace contextRef="#ctx0" brushRef="#br0" timeOffset="-194652.73">16300 14832 9152,'0'-23'360,"-7"-1"-270,6 4-90,-6 1 179,7-5-179,0 9 0,16-7 0,4 14-90,0-2-1439,31 8 270,-31 0 1259,29 2 0,-23 0 0,0 0 0</inkml:trace>
+  <inkml:trace contextRef="#ctx0" brushRef="#br0" timeOffset="-194354.73">16692 14760 9961,'-34'0'630,"6"0"-720,3 0 180,9 0-90,6 14 0,4 1 0,6 14 90,26-3-180,2-3 90,26-6 0,-12-7 0,-3-6 90,-12-4-180,-4 0 180,-3 0-270,-3-14 90,-1 11-540,-8-28 1,-1 14 89,-7-16-180,-24 18-449,18-8 1169,-34 21 0,36-16 0,-12 9 0</inkml:trace>
+  <inkml:trace contextRef="#ctx0" brushRef="#br0" timeOffset="-194119.73">17083 14500 11400,'0'30'180,"16"4"-180,-12-7 0,11 3-1079,1 6 269,-1-9-1078,15 21 358,-9-21 1530,0 5 0,-5-12 0,2-3 0</inkml:trace>
+  <inkml:trace contextRef="#ctx0" brushRef="#br0" timeOffset="-193927.73">17467 14623 10051,'-21'-12'1439,"2"4"-1439,-24 2 0,9 5-90,-3 1 180,18 18-180,-6-14-269,22 26-91,-14-27-1259,16 23 630,-5-8 1079,6 7 0,17 6 0,6-7 0</inkml:trace>
+  <inkml:trace contextRef="#ctx0" brushRef="#br0" timeOffset="-193619.73">17470 14858 9781,'11'1'360,"3"0"-270,0-1 0,3 0 0,8 0-90,-6 0 0,17-15 0,-14 11 0,5-12 0,-9 5 0,-3 8 0,-2-8 0,-3-1 0,-2 9 0,-5-18 0,-2 8-90,-1-4 180,-18-4 0,13 8 90,-13-1-180,1 6 0,13 3 0,-12 0 0,5 3 0,8 15-540,-8 2-989,11 19 720,0-4-541,16-10 1350,-12 7 0,13-24 0,-17 9 0</inkml:trace>
+  <inkml:trace contextRef="#ctx0" brushRef="#br0" timeOffset="-193298.73">17793 14788 10141,'0'29'0,"13"-14"0,-10 9 0,10-13 0,-5 1 0,-6 4 90,11-14-180,-8 5 90,4-7 90,-1-17-90,0 13-90,1-27 180,2 27 90,1-28-180,1 28 90,1-31-90,3 23 180,-4-19 0,8 14-270,-10 4 270,7 7-270,-7 6-450,6 16-359,-5 8-451,1 10 1350,4 16 0,-2-16 0,4 11 0</inkml:trace>
+  <inkml:trace contextRef="#ctx0" brushRef="#br0" timeOffset="-192468.73">18788 14730 10501,'6'-3'0,"-2"1"180,0 0 0,3 2-180,-4 14 0,6 4 90,-6-1-90,2 15 0,-2-19 0,-1 24 0,0-17 90,0 9-1260,-1-15 721,0-21 269,-1-8 0,0-28 180,15 1 0,1 6 0,2 2 0,9 14 0,-24 1 90,23 4 629,-10 2-629,8 7 0,-4 2-90,-6 4 90,-5 21 0,-4-16 0,-1 38 0,-1-23-90,-1 35 0,-1-19 0,-1 24 0,0-27 0,0 11-630,0-22 451,0-21 89,18-15 90,-13-26 0,26-4 0,-14 8 0,0 1 0,16 5 0,-28 10 0,30-3 90,-28 10-90,14 7 0,-13 1 0,0 5 0,-1 0 0,0 21-90,0-16-90,0 36-900,6-10 271,-2 9 809,14 11 0,-8-23 0,6 6 0</inkml:trace>
+  <inkml:trace contextRef="#ctx0" brushRef="#br0" timeOffset="-192162.73">19615 14828 9871,'-24'-7'540,"-17"6"-450,14-11-90,-10 11 0,3-3 0,12 4 0,-3 0 0,9 16 0,3-2 90,25 15-180,12-4 180,24-11-90,7 3 0,-7-16 0,-5 5 90,-15-6-180,-4-14 90,-5 11-90,0-27-90,-11 13 90,0-14-629,-28 7 179,-3 10 540,-20 1 0,4 12 0,0-3 0</inkml:trace>
+  <inkml:trace contextRef="#ctx0" brushRef="#br0" timeOffset="-191936.73">19962 14821 11221,'0'29'90,"0"2"-360,14-4-360,-10-1-269,11-6-91,-15 1 1,13-1-450,-9 1 1439,16-3 0,-18-3 0,6-1 0</inkml:trace>
+  <inkml:trace contextRef="#ctx0" brushRef="#br0" timeOffset="-191784.73">20163 14898 10681,'1'-19'-540,"0"6"-1978,-15 6 2518,-6 6 0,-15 1 0,-3 0 0</inkml:trace>
+  <inkml:trace contextRef="#ctx0" brushRef="#br0" timeOffset="-191566.73">19407 14599 9062,'21'-31'989,"14"-8"-809,9 12 0,12-7-90,-26 20-90,4 1 90,-11 11-1079,-6 17-1440,-4 7 2429,-8 20 0,-5-9 0,0 1 0</inkml:trace>
+  <inkml:trace contextRef="#ctx0" brushRef="#br0" timeOffset="-191399.73">20430 14224 11670,'15'-14'180,"-4"2"-180,-6 5-1169,-3 2-180,-21 3-630,14 19 1979,-35-13 0,20 37 0,-19-12 0</inkml:trace>
+  <inkml:trace contextRef="#ctx0" brushRef="#br0" timeOffset="-187918.73">12102 6963 8882,'-46'22'2159,"-7"7"-1889,8 16-931,20-22 1,1 1 840,-14 18 0,-1 9-91,19-23 1,0 2-387,0 2 1,1 3 386,-1 2 0,0 2 0,0 4 0,1 2 0,-1 5 0,1 2-306,1 5 1,0 5 260,5-14 0,0 6 0,0 0 0,2-2-655,-2 6 0,1-2 0,0 7 640,3-13 0,-1 5 0,-1 4 0,1 0 0,0-2 0,1-4-8,0 2 1,2-5-1,-1 1 1,0 8-1,0-5 1,0 6-1,0 5 1,-1 2-1,1 1 1,-1-2-1,1-4 1,1-5-307,0 1 0,1-5 1,0-3-1,0 3 1,-1 6 293,0-5 0,1 5 0,-2 3 0,1 3 0,-1 1 0,1-1 0,0-3 0,0-3 0,1-6-10,0 5 0,0-6 0,1-3 0,0 2 0,-1 5 12,-1 3 1,1 5 0,-1 3 0,0 1 0,0-1 0,1-3 0,1-6-297,-1 10 1,0-7-1,2-1 1,-1 4 283,0-1 0,0 3 0,-1 1 0,2-2 0,0-5-119,1-6 0,2-4 0,-1-1 1,1 0 88,-1 15 0,1 0 0,-1-2-30,2-3 0,-1-1 0,1 0-120,0-4 0,0-1 0,0 0-92,-1-5 1,0 0 0,3-2 1,9 17 1,2 0-781,-6-16 1,0 0-1,2-2 707,4 2 0,2-2 343,5 6 0,-3-4 0,-12 0 0,15-8 0</inkml:trace>
+  <inkml:trace contextRef="#ctx0" brushRef="#br0" timeOffset="-186987.73">10993 10862 9062,'-28'-15'90,"-4"3"0,-1 12 180,-5-10-91,-4 7-873,-6-7 1234,-8 10-966,-7 0 606,29 7 0,-4 3 89,-22 3 1,-3 3-225,12 3 0,-1 1-780,5-4 1,-3 0 0,2-1 824,-10 5 0,2 1 0,-4 2 0,-2 2 0,19-8 0,-1 1 0,-3 3 112,-4 2 0,-5 4 1,0 1-1,2-1-135,9-4 1,2-2-1,-1 2 1,-5 4 7,-2 1 0,-6 4 0,-2 2 0,-1 1 0,3 0 0,4-3-536,-4 3 0,5-2 0,0 1 1,-2 2 475,7-5 0,-2 2 0,-1 0 0,0 2 0,1-2 0,3 0-316,-8 6 1,2 0 0,1-1 0,0 2 336,9-8 0,-1 1 0,1 1 0,-1-1 0,1 1-18,0 0 0,1 0 0,-1 0 0,0 2 0,-3 2-6,4-2 1,-2 3 0,-1 2 0,-1 0 0,1 0 0,1 0 0,1-3-136,-5 7 1,3-3-1,1 0 1,-2 2-1,-3 4 134,5-4 0,-2 3 1,-3 3-1,0 2 0,0 0 1,1-2-1,3-1 0,4-4-23,-2 3 1,3-3-1,3-2 1,-1 2-1,-2 5 12,6-6 0,-3 3 0,-1 3 0,0 1 0,1 1 0,1-2 0,3-2 0,3-4 75,-7 12 1,4-5-1,3 1 1,0 7-76,5-4 0,0 8 0,0 3 0,1 2 0,1-2 0,3-3 0,3-7 49,1 2 1,3-7 0,3 1 0,1 6-102,2-6 1,2 6-1,0 4 1,1 0 0,2-1-1,1-4 1,2-7-39,3 13 0,4-7 0,4 3 0,0-6 0,3 5 0,2 0 0,1-2 0,-1-6-90,3 1 0,0-6 0,4 2-90,5 3 0,5 4 1,1-2-1,-2-7-180,10 5 1,1-5 29,-7-8 0,3-1 0,1-3-422,-1-7 1,1-4 0,-2-2 841,7 2 0,-1-4 0,13 3 0,-1-3 0,-19-12 0,-1 1 0</inkml:trace>
+  <inkml:trace contextRef="#ctx0" brushRef="#br0" timeOffset="-186450.73">7160 14918 10861,'-22'20'629,"4"0"-539,18-5-90,-10 0 0,7-4 0,-7 5 0,10 1 0,0 5 0,0 1 0,0 4 90,0 2-180,0 1 90,21 2 90,-15 2-90,36 1 0,-9 15 90,11-10-459,-19-16 1,-1 1 368,13 9 90,0 0 90,-3-2-1,-1 1-179,-6-2 90,-7 2 0,-9 17-90,-5-9 0,-24-2 0,-7 0 0,-9 13-180,-7-13 0,-13 4 1,5-3-181,7-5 0,0 0-822,0-2 0,-6 3 1,-1 1-1,7-4 597,-5 3 1,2-1 584,-5 4 0,-4 3 0,5-2 0,6-2 0,2-1 0,5-5 0,1 0 0,-1 1 0</inkml:trace>
+  <inkml:trace contextRef="#ctx0" brushRef="#br0" timeOffset="-185167.73">8788 15625 10051,'-42'0'900,"4"14"-720,8-10 0,0 29-180,-1-28 89,-1 38-492,2-23 493,2 22-102,6-11 102,2 12 0,11-13-270,1 16 90,32-24-450,11 4 180,13-18-926,6-2 1106,-13-6 180,5 0 0,-1-21 0,13-5 90,-18-12 89,-13 14 1,-4 1 180,-7-6 450,3-17-450,-17 21 31,2-4-391,-4 14 90,-16 8-180,13-5 1221,-26 11-1131,26 12-180,-9 11-180,12 22-359,0-9-181,0 3-269,17-11 1169,5 9 0,11-11 0,-2 7 0</inkml:trace>
+  <inkml:trace contextRef="#ctx0" brushRef="#br0" timeOffset="-184937.73">9435 15752 10681,'0'-18'1259,"-18"-4"-899,14 8-270,-34-3 0,18 11-90,-17 1 0,6 22 0,6 6 0,9 21-270,8-7-90,8 2-1079,25 1 270,-19-10-450,24-7 0,5-2 1619,-8 1 0,35 0 0,-25-12 0</inkml:trace>
+  <inkml:trace contextRef="#ctx0" brushRef="#br0" timeOffset="-184653.73">9802 15649 10771,'-11'-4'989,"-4"1"-719,10 1-90,-4 2-180,1 0 0,1 0 0,-3 16 0,1-12 0,-1 26 0,3-27 90,0 30-180,2-6-90,2 7-809,2 12 269,22-20-269,-16 8-181,33-12 1,-33-3 1169,35 1 0,-22-4 0,20 0 0</inkml:trace>
+  <inkml:trace contextRef="#ctx0" brushRef="#br0" timeOffset="-184147.73">10133 15878 9781,'17'16'630,"7"-4"-630,14-12 0,-5 0 0,-5 0 0,-5 0 90,-1 0-90,6-15 0,-7 11-90,3-34 450,-15 21-270,-1-18 90,-28 11 90,-2 7-270,-23 7 89,4 7-178,1 3 178,17 16-178,0 5-91,20 18-360,-6-8-270,9 0-269,23-10-180,-17 1 1259,42-3 0,-28-3 0,21-2 0</inkml:trace>
+  <inkml:trace contextRef="#ctx0" brushRef="#br0" timeOffset="-183853.73">10737 15750 9871,'-18'-8'450,"-4"3"-540,-14 0 180,5 4-90,15 14 90,5 5-90,36 29 0,2-16 90,-1-6 0,0-1 360,1 0 359,11 14-629,-24-18 0,4 3-180,-9-10 90,-9-3-90,0-2 0,0-2-90,-23-2-809,-2-1-1260,-26-2-989,9-18 3148,15-3 0,10-12 0,17 3 0</inkml:trace>
+  <inkml:trace contextRef="#ctx0" brushRef="#br0" timeOffset="-183436.73">11070 15730 10141,'-15'-11'90,"-6"9"-90,10-17 0,-6 17-629,2-6-721,8 20 1350,3 5 0,22-2 270,-14 6 1079,27-10-449,-27 4-630,9-3-270,-13-6 270,-18-3-360,14-2 180,-25 2-90,26-1 0,-8 3 0,2 0 0,7 3 0,-7 2 0,9 3 0,0 2 0,0 2-270,0 12-360,19-7-899,0 17 539,4-18-359,5 6 1349,-24-10 0,27-3 0,-10-1 0</inkml:trace>
+  <inkml:trace contextRef="#ctx0" brushRef="#br0" timeOffset="-182786.73">11143 15892 9961,'0'-12'1260,"0"3"-991,0 1 91,0 2-270,0-2 0,-14 0 0,10 2-90,-23 1 0,15 3 0,-11 2 0,8 0 0,0 18 0,7 3 90,3 21-90,2 0-90,21-7 180,4 8-90,1-20 0,11 7 0,-30-12-90,28-1 90,-28-3 0,23-2 90,-24-1 180,17 2-270,-18-7-90,5 3-540,-30-9-89,-6 1-1,-13-1-179,2 0-1800,-4 0 2699,12-10 0,-8 7 0,17-6 0</inkml:trace>
+  <inkml:trace contextRef="#ctx0" brushRef="#br0" timeOffset="-182069.73">11745 15713 11760,'1'-13'810,"0"0"-900,-1 3 360,0 3-270,0 23 0,0 10 0,0 13-90,0 1-90,0-8-450,0 16 91,0-12-721,0 20 721,13-27-361,-10 14 630,11-23 90,-14 2 180,0-11 0,0-4 180,0-2 180,-21-4 270,-1-16-91,-19-6-179,6-19-180,14 9-180,-2-2 0,21 11 0,-7 0 0,9 1 0,0-5 0,19 9-180,8-6-270,-2 13-269,37 2 359,-39 6 0,34 2 180,-29 0 0,1 16 1,-4-12 179,-1 24 0,-2-25 0,0 18 269,2-8 91,-8-1 1889,2 5-2069,-28-15-180,-6 5 90,-16-7-90,2 0 0,8 12 0,9 5 0,5 13 0,30-13 0,-17 8-90,38-22 180,-37 17-90,53-17 0,-36 5 0,40-8 90,-35 0-90,4 0-90,-13-14 90,-6-6-180,-5-17 0,-4 5-809,-21-12 359,-8 17-1079,-22-15 227,21 18 1381,-20-5 0,40 11 1,-15 0-1</inkml:trace>
+  <inkml:trace contextRef="#ctx0" brushRef="#br0" timeOffset="-181835.73">12390 15643 12210,'0'46'0,"0"-8"-450,0 3-1079,15 6 450,-11-11 1079,24 24 0,-24-28 0,10 8 0</inkml:trace>
+  <inkml:trace contextRef="#ctx0" brushRef="#br0" timeOffset="-181617.73">12595 15763 10681,'-29'-5'630,"4"2"-630,3 2 0,12 16 0,-6-11 0,15 27 0,-10-28 0,10 31-450,-2-20-270,3 16-179,0-9-181,0-1-539,24 0 1619,-18-1 0,36-3 0,-21-1 0</inkml:trace>
+  <inkml:trace contextRef="#ctx0" brushRef="#br0" timeOffset="-181269.73">12693 15941 10141,'37'0'0,"2"0"0,-7 0-90,0 0 0,-10 0 90,-1 0 0,-2 0 0,-1 0-90,-5-12 90,-1 9 0,-7-21 180,-1 12 270,-4-6 0,-25-1-180,1 12-180,-22-8-180,24 12 449,-5-4-359,24 24-90,-7 2-359,30 22-1350,1-3 719,2-6-359,15-3 1439,-22-13 0,19 0 0,-11-3 0</inkml:trace>
+  <inkml:trace contextRef="#ctx0" brushRef="#br0" timeOffset="-180947.73">13143 15952 11311,'0'-15'719,"14"21"-719,-10 4 0,23 7-90,-24 3 0,17-18-270,-18 11 360,9-11 0,-4 3-90,0-20 180,5-3-90,-5 0 0,10-14 0,-8 13 0,2-2 0,-4-3 90,-2 21-90,1-6 0,2 9 0,-3 0-899,5 19-180,-5-15-2609,6 47 3688,-4-32 0,2 29 0,-1-20 0</inkml:trace>
+  <inkml:trace contextRef="#ctx0" brushRef="#br0" timeOffset="-180337.73">13862 15924 11041,'0'-7'90,"-9"2"0,7 18-90,-7 10 0,26 8 0,-13 4 0,13-8 0,-1 2 90,-1 10-180,4-10 180,0 14-90,-17-24-1080,15 8 990,-15-38 90,6-4 0,-8-19 0,0 0 0,0 6 0,0-2 90,0 1-90,15 0 90,-11 3 180,11 4-90,-15 3 90,13 10 89,-10-4-269,22 11-90,-13-4 90,6 27-90,1 2 0,-9 2 0,7 21 0,-9-24 0,3 21 0,-6-26-180,2-7 180,-3-10-89,3 0 178,-1 0-89,2-17-89,1 13 89,1-30 0,1 30 0,1-31 0,3 13 0,-3 0 179,3-6-89,-7 19-90,1-3 90,-4 6-90,1 6-90,-1 17 180,1-13-180,2 28-899,3-6 0,-1 5-1980,9 14 2969,-5-22 0,5 8 0,-3-12 0</inkml:trace>
+  <inkml:trace contextRef="#ctx0" brushRef="#br0" timeOffset="-180037.73">14532 16056 11490,'-19'-7'630,"15"-7"-630,-29 6 0,29-2 0,-10 3 90,5 5-90,6 18-180,-6 4 0,9 19 90,20-19-180,-15 14 91,29-30-91,-30 23 180,27-16 0,-13 2-90,13-5 270,-10-8-90,-9-17 0,-7-2-360,-22-19-719,12 0 539,-27 6-809,28-5 1349,-11 18 0,15-6 0,0 8 0</inkml:trace>
+  <inkml:trace contextRef="#ctx0" brushRef="#br0" timeOffset="-179851.73">14872 16043 11580,'4'3'270,"0"-1"-809,-4 4-361,0-2-539,0 3-360,0 0 1799,0 1 0,0 2 0,0 0 0</inkml:trace>
+  <inkml:trace contextRef="#ctx0" brushRef="#br0" timeOffset="-179678.73">15227 15979 11311,'1'-10'-405,"-16"4"0,-11 19 0,-18 7 0</inkml:trace>
+  <inkml:trace contextRef="#ctx0" brushRef="#br0" timeOffset="-179403.73">14393 15838 10321,'0'-19'1259,"0"2"-989,0 3 0,0 1-180,18 1 90,-13 3 0,12 1-90,-4 2-90,0 3 0,15 2 90,-2 1-90,-5 16 0,0 1-630,-10 20 0,-2-11-359,-6 5-1620,-3 1 721,0-7 1888,0 7 0,-19-12 0,-5-1 0</inkml:trace>
+  <inkml:trace contextRef="#ctx0" brushRef="#br0" timeOffset="-179204.73">15007 15569 12030,'2'-3'180,"-1"1"-180,-20 1-360,15 15-539,-38-10-2609,8 27 3508,-11-3 0,-3 8 0,12 5 0</inkml:trace>
+  <inkml:trace contextRef="#ctx0" brushRef="#br0" timeOffset="-177687.73">8633 17129 11131,'12'0'719,"6"0"-719,21 0-90,0-13 180,-7 10-90,0-10 0,0 1 0,-5 9 0,-3-10 0,-5 3-90,-5 8 0,-2-17 0,-7 10 90,-1-6 0,-22 4 0,13 2 0,-34 2 0,34 0 0,-43 1 90,15 2-90,-13 3 90,8 0-90,10 1 0,16 17 90,-1 3-90,13 23 0,19-9 0,-14 3-315,23-16 1,4-1-406,-5 10-315,13-5 1,3-1-1157,2 1 2191,-13-9 0,-1-2 0,13 2 0,1-2 0</inkml:trace>
+  <inkml:trace contextRef="#ctx0" brushRef="#br0" timeOffset="-177497.73">9262 17143 9871,'-17'-11'810,"27"3"-720,-4 22-720,54 5-702,-38 2 433,30 9-270,-22-26 1169,-1 28 0,-1-28 0,0 13 0</inkml:trace>
+  <inkml:trace contextRef="#ctx0" brushRef="#br0" timeOffset="-177304.73">9465 17078 10321,'-23'-6'1079,"-12"-1"-989,9 6-90,-18 16 0,21-11 0,3 22 0,2 5-629,0-4-1524,-4 34 624,12-20-630,3 1 2159,3 1 0,2-2 0,2 1 0</inkml:trace>
+  <inkml:trace contextRef="#ctx0" brushRef="#br0" timeOffset="-176620.73">9907 17141 10951,'0'32'270,"16"-15"-180,-12 20-180,12-21 180,-4 19-90,-9-9 0,19 11 0,-20-8 0,14 14 89,-14-20-89,5 7 0,-7-18-89,0 1-361,0-10 270,-15-1-270,11-18 270,-26-7 0,26-12 180,-12-2 0,2-14 0,11 9 0,-5 4 0,2 0-277,6-9 277,0-12 90,0 23 0,0 3 0,16 5 180,-12 2 90,29 11 0,-18 3-360,13 9 180,-16 23-180,4 5 0,-14 22 0,5-10 0,-7 2-360,0-13-360,0 0-1259,-16 5 720,12-11 1350,-13 3 1,4-16 0,-4-3 0</inkml:trace>
+  <inkml:trace contextRef="#ctx0" brushRef="#br0" timeOffset="-176420.73">10240 17129 9422,'8'0'989,"-2"0"-719,-1 18 90,0-14-360,0 28 0,-1-29 0,0 30 0,0-21-450,3 24-180,-2-17-1439,4 12 630,-5-12 1439,5 2 0,-5-9 0,2-1 0</inkml:trace>
+  <inkml:trace contextRef="#ctx0" brushRef="#br0" timeOffset="-176127.73">10283 16899 12120,'0'-5'-90,"0"1"90,0 2 0,0 0 0,0 1 0</inkml:trace>
+  <inkml:trace contextRef="#ctx0" brushRef="#br0" timeOffset="-175804.73">10500 17100 11041,'15'44'0,"-11"-9"0,10-4 0,-3 14 0,-9-17 0,9 20 90,-11-30-90,6 5 0,0-16-90,1-21 0,-3-16-630,-4-28 180,0 8-270,0 14 1,0 1-270,0-8 1079,0-10 0,0 21 0,0 2 0</inkml:trace>
+  <inkml:trace contextRef="#ctx0" brushRef="#br0" timeOffset="-175514.73">10817 17311 9512,'17'12'359,"-4"-6"-359,11 0 0,-9-6 0,14-15 0,-12-2 90,13-16-180,-17 16 90,5-12 180,-14 13 180,-1-13-180,-27 6 0,1 11-180,-21 4 90,12 25-90,13 4 0,8 21-180,31 5-720,-15-8-449,26-14 0,6-3 1349,-4 4 0,5-10 0,3-2 0,12 4 0</inkml:trace>
+  <inkml:trace contextRef="#ctx0" brushRef="#br0" timeOffset="-174765.73">11870 17055 10501,'0'-17'0,"0"0"180,0 6 360,0 2-271,0 4-179,14 3-180,-10 20 90,22 13 90,-13 11-90,-1-11 0,1 1 0,5 10-933,-3 14 933,-5-19 0,-2-2 0,0-5 0,2 3-90,-5-11-450,2 0-360,-5-16 720,2-23 91,-1-12 932,-1-13-843,5-18 0,-3 22 90,1 4 0,1 0-90,0-3 90,3-9 270,-3 22 0,0 4 0,1 9-270,-2 0 0,1 10-90,0-3 90,5 19-90,-3 10 89,6 23-89,-6-7 0,1 19 0,-6-27-156,-1 10 156,-2-19 0,0-3-449,0-1 449,0-30-90,0-8 90,6-15 0,3-3 0,11-8 45,-5 8 0,0 2-45,4 6 180,12-6-1,-19 16 157,24 8-336,-20 4 90,6 6-180,-1 24 90,-5 4-1169,10 30 90,-11-14-786,5 0 246,-7-13 1619,2-4 0,0-2 0,1-2 0</inkml:trace>
+  <inkml:trace contextRef="#ctx0" brushRef="#br0" timeOffset="-174469.73">12757 17135 10771,'-18'-14'809,"13"1"-449,-35 3-90,23 5-270,-30 2 0,20 3 0,-8 0 0,15 16 0,0-12 0,3 31 90,7-10-180,2 10 90,8-2 0,0-9-90,23-3-90,7-1 180,-2 0 0,5-14 0,1-2 0,-10 6 0,35-10 0,-32 0 90,-1 0-180,-14-21 0,8 0-270,-18-20 1,9 6-1081,-35 4 181,0 13 1259,-19 1 0,22 15 0,6-5 0</inkml:trace>
+  <inkml:trace contextRef="#ctx0" brushRef="#br0" timeOffset="-174252.73">13140 17177 11850,'6'0'540,"0"0"-540,-3 0 90,2 0-180,-2 0 90,0 19-990,1 2 271,-1 12-1170,1 7 900,-2-15-541,0 7 1530,0-12 0,1-3 0,1 0 0</inkml:trace>
+  <inkml:trace contextRef="#ctx0" brushRef="#br0" timeOffset="-174111.73">13292 17229 11221,'2'-19'359,"0"9"-449,0-8-89,-1 8 179,1-5 0,-2 7 0,1 5 0</inkml:trace>
+  <inkml:trace contextRef="#ctx0" brushRef="#br0" timeOffset="-173870.73">12352 16960 10771,'0'-36'899,"24"3"-899,-18 0 180,42 7 0,-14-7-180,10 13-902,-3-1 902,-13 14 308,-4 4-308,-3 3-180,-2 0-359,-10 17-451,4-13-2248,-7 46 3238,1-30 0,-3 27 0,-4-19 0</inkml:trace>
+  <inkml:trace contextRef="#ctx0" brushRef="#br0" timeOffset="-173717.73">13070 16622 11490,'6'-16'-719,"-2"4"-91,-26 5 810,-21 48 0,-5-14 0,19 6 0,-1-1 0</inkml:trace>
+  <inkml:trace contextRef="#ctx0" brushRef="#br0" timeOffset="-170485.73">8512 18358 9961,'0'-14'1080,"0"0"-721,0 2-89,0 0-90,0 2-90,0 0-90,0 2 90,14 2 360,-11 3-540,22 1 180,-23 18-90,19 9 0,-10 9 0,9 18 0,-7-16-756,-3 13 756,-4-14 90,-2 0-180,1-2 180,-2 5-90,1-13 0,-2 4-90,1-18 90,0-21-90,-1-15-179,0-10 89,0-8-540,3-8 1,-2 10-91,1 7 0,0 1-89,0-1 899,5-17 0,-1 29 0,3-5 0</inkml:trace>
+  <inkml:trace contextRef="#ctx0" brushRef="#br0" timeOffset="-170188.73">8985 18646 9961,'3'9'90,"1"-2"-90,4-4 0,1-1 0,8-16 0,-3-5 0,4 1 0,4-18 0,-7 14 0,9-22-90,-14 14 180,1 1-90,-7 11 0,-2 2 0,-1 1 270,-1 2-90,-17 5-180,-1 20 90,-2 11-180,-4 0 180,21 31-180,-7-36-1709,10 42 180,18-35 1619,-14 9 0,33-14 0,-13-1 0</inkml:trace>
+  <inkml:trace contextRef="#ctx0" brushRef="#br0" timeOffset="-169803.73">9763 18381 10951,'-25'-8'539,"-12"2"-449,33 1 90,-29 3-180,9 2 90,-6 16-90,-7 6 0,14 20-90,5-8-90,8-1-89,10-10-1261,20 4 991,8-4 179,12-4 180,2-9 90,-8-10 90,16 0 0,-11-19 450,20-3-90,-31 0-711,4-16 711,-17 21 142,-8-16-52,-3 8-181,-4 5 1,0-3 0,0 4 0,-21 2 259,16 2-439,-33 8-51,22 16-39,-5 15 0,-2 8-270,21 22-539,-10-16-271,11-3 1,2 0-630,-1 9 1492,0 11 0,0-17 0,0-1 1</inkml:trace>
+  <inkml:trace contextRef="#ctx0" brushRef="#br0" timeOffset="-169603.73">10022 18690 9961,'8'-17'0,"0"1"0,2-2 0,0 0 0,4-10-180,-2 9-179,-1-6-991,2 8 451,-7 6 899,3-1 0,-7 8 0,0 1 0</inkml:trace>
+  <inkml:trace contextRef="#ctx0" brushRef="#br0" timeOffset="-169137.73">9315 18902 9602,'32'-24'44,"-1"0"1,22-16 45,-23 18 0,-1 1-1156,18-14 1156,2-3-833,-2-2 833,1 2-90,-4-1 90,-3 3 180,-3 1 241,1-11-421,-13 13 362,2-20-362,-20 27 90,-3-13 0,-5 20 295,0 0-385,-20 9 754,-6 6-844,-13 1 501,4 21-591,19 12 180,5 10-90,11 25 0,0-23 0,12-2 0,0 1 90,-6 5-180,14-4 0,3-1-626,2 3 446,0 15-315,1-32 0,-2-2-224,-16 12-391,13-9 1,1-1 1199,-9 0 0,3 3 0,-7-12 0</inkml:trace>
+  <inkml:trace contextRef="#ctx0" brushRef="#br0" timeOffset="-168999.73">9723 18894 9422,'0'-11'180,"25"-1"-270,-19-4 180,49-3-270,-29-2-630,30-4 810,-22 8 0,0-1 0,19-12 0,-17 12 0,-1-1 0</inkml:trace>
+  <inkml:trace contextRef="#ctx0" brushRef="#br0" timeOffset="-168537.73">10380 18409 9422,'-10'13'269,"2"4"-269,8 23 0,0-10 0,15 6 0,-11-9 0,12 1 0,-16-1 90,11 0 90,-8-3 0,8-2 540,-11 4-450,0-10-180,0 4-180,-17-54 180,12 16-90,-12-38-450,7 8-90,7 9-315,-2 5 1,0 0-315,5-5 1169,0-10 0,0 19 0,0 2 0</inkml:trace>
+  <inkml:trace contextRef="#ctx0" brushRef="#br0" timeOffset="-168217.73">10765 18646 9781,'6'8'810,"3"-1"-630,9-3-90,-1-2-90,17-19 0,-11 13-90,10-29 180,6 9-90,-10 4 0,19-23 0,-23 28 0,10-24 0,-22 21 0,0-3-90,-11 8 90,-1 0 0,-1 2 629,-23 0-539,-2 6-90,-26 1 0,6 24 0,16 1 0,-7 3 90,24 24-180,-6-31-719,10 38-1,8-30 810,48 20 0,-19-25 0,5-6 0,0-1 0</inkml:trace>
+  <inkml:trace contextRef="#ctx0" brushRef="#br0" timeOffset="-167936.73">11412 18410 10231,'-20'-10'630,"-12"1"-630,28 5 0,-25 0 0,25 2 90,-19 1-90,20 15 0,-7 4 0,30 19 0,9 1 0,21 2 0,-21-8 0,13 2 270,-23-17-91,3 4-179,-2-11 0,-18-1 0,5-3-89,-7 1-901,-20-5-899,-4 0 630,-25-2 1259,24-15 0,-20 12 0,19-12 0</inkml:trace>
+  <inkml:trace contextRef="#ctx0" brushRef="#br0" timeOffset="-167569.73">11728 18094 10591,'9'22'899,"0"8"-449,1-8-360,-3 5-90,6 35 90,-8-27-90,-1 3 0,0 1 0,-1 2 0,-1-4 0,1-1 0,1 7-225,1-3 0,2-1 45,0-2-359,9 22 179,-7-39-90,7 2 360,-7-15 180,5-3-90,-1-21 0,0 13 450,6-46-90,-7 29-91,1-15 1,-1-1-270,0 6 270,10-19-270,-14 39 90,7 0-90,-7 11 0,5 0-180,-3 19-629,0-14-450,3 38 1259,5-6 0,-2 13 0,3 2 0</inkml:trace>
+  <inkml:trace contextRef="#ctx0" brushRef="#br0" timeOffset="-163854.73">15517 17549 9871,'39'-11'270,"2"0"-90,9 2-1459,5-2 1369,8 0 150,-16 5 0,8 0 0,-2 1-781,1-1 0,3 2 585,0 0 1,10 0 0,0 1 0,-6 1-701,-8 0 0,-5 2 0,4 0 656,0-1 0,4 1 0,0 0 0,-3-1 0,8 1 0,-2 0 0,0 0-620,5 0 0,1-1 1,0 2 619,-13 3 0,0 0 0,0 1 0,1-1 112,1-2 1,1-2-1,0 1 1,1 0-46,0 3 0,1 0 1,1 1-1,-1-1-307,2 0 0,0-1 0,0-1 0,0 0 240,0-1 0,1 0 0,-1-1 0,1 1-177,2 2 1,0 0 0,0 0 0,0-1 176,0-1 0,0-1 0,1 0 0,4-1 0,-6 1 0,3 0 0,3 0 0,0 0 0,-1 0 0,-3 0-22,-1 0 1,-4 0 0,0 0 0,3 0-1,4 0 12,-11 0 0,4 0 0,3 0 0,2 0 0,0 0 0,0 0 0,-1 0 0,-4 0 0,-4 0 17,16 0 1,-7 0 0,-1 0 0,0 0 0,4 0-21,-8 0 0,2 0 0,2 0 1,0 0-1,0 0 0,-3 0 0,-3 0 31,4 0 0,-2 0 0,-3 0 0,0 0 0,0 0-54,0 0 0,0 0 0,0 0 0,-1 0 0,0 0-59,10 0 0,-1 0 1,1 0-1,3 0-265,-13 0 0,4 0 1,0 0-1,1 0 0,-2 0 1,-4 0 33,10 0 1,-4 0 0,0 0 0,2 0 325,-3 0 0,2 0 0,1 0 0,-3 0 0,-5 0 0,4 0 0,-4 0 0,-2 0 0,-2 0 0,0 0 0,0 0 0</inkml:trace>
+  <inkml:trace contextRef="#ctx0" brushRef="#br0" timeOffset="-163470.73">21752 17055 12570,'49'0'-90,"1"0"90,-6 18 0,7-14 45,-10 10 0,0 4-270,-9-6 0,0 2 270,22 8 0,-2 5 45,-22-5 0,-3 2-90,15 11 0,-5 2 0,-11 9-687,-12-15 0,-3 2 687,-11 15 0,-27 2 0,-5 3-45,0-24 0,-3-2-45,0 2 1,-1-1-136,-5 1 0,-4 1-495,-1-2 1,-4 1-1,2-2-360,-9 4 1,-1 0 929,8-5 0,-2 2 1,3-3-1,-2-1 1,2-1-1,1 0 1,1 1-1</inkml:trace>
+  <inkml:trace contextRef="#ctx0" brushRef="#br0" timeOffset="-161565.73">8272 15366 9512,'0'-7'989,"0"2"180,-14 1-1169,11 26 90,-10 10 0,13 16-90,0 7-1292,0-6 1292,0 8 90,0 2-90,0 7 0,7-32 0,0-1 0,-5 3 0,0 0-45,5-1 0,1 2-135,0 15 0,-3 0-90,-3-13 1,0 1-541,10 25 0,2-1 495,-7-27 1,0-3-91,0 12 0,2-2-404,9 11 809,-10-5 0,6-5 0,-2-3 0</inkml:trace>
+  <inkml:trace contextRef="#ctx0" brushRef="#br0" timeOffset="-160309.73">8410 15564 7713,'0'-17'179,"0"2"1,0-1 0,0 4 360,21-7-540,3 8 90,34-8 0,-10 7-144,13-2 54,-18 6 0,1 0 0,-8 2 0,4 1 0,7-2 0,6 0 0,-3 1-821,2 1 0,-1-1 821,-5 2 0,2-1 0,-2 0 0,9 1 0,-2 0 0,0 0 0,4-1-663,-6 1 0,7-1 0,0 0 1,-4 0 632,-6 1 0,-3 0 0,5 0 48,1-1 0,7 0 0,2 0 0,-2 0 0,-8 1-327,18-1 0,-3 1 309,-11 1 0,5 0 0,1 0 0,-6 1-516,12 0 0,-1 1 516,-9 0 0,3 0 0,-4 0 0,2 1 0,-2 0 0,-1-1 0,0 2 45,-3 5 0,0 1-45,-7-1 0,2-1 0,-3 1-45,5 1 0,0 3 45,2 2 0,4 3 0,-6-2 0,-6-6 0,-1 2-60,3 5 0,4 4 0,-4-1 15,-4-5 0,-2 0 0,13 4 0,-1-1 0,-14-4 0,-1-1 596,-1 0 1,0-1-597,1 1 0,1-1 0,-1-1 0,1 1 45,-1-1 0,1-1 0,-1 1 0,2-1 0,15 2 0,0 1 45,-13-3 0,1 1-45,5-1 0,3 1 0,-4 0-45,-4-2 0,-1 0 45,13 2 0,-1 0 0,-16-3 0,-1 0 0,0-1 0,0 1 45,-1-1 0,1 1-45,14 0 0,0 0 0,-12-1 0,2-1 0,24 2 0,0 0 0,-26-3 0,1-1 0,9 1 0,6 0 0,-6-1-45,-9 1 0,-1-1 45,29 1 0,-3-1 0,-8 3 0,-14 0 0,-1 0 0,1 2 90,18 8-180,-29-5 180,4 2 560,-14-3-650,-3-1 1717,-1 0-1717,-1-1 1793,-2 0-1793,2-1 914,3 1-914,-2 0 90,8 0 0,-10 0 90,2 0-90,-6-1 90,-2 2 0,-1-1-90,-2 3-90,-2-1 90,-1 4-1,-1 6-89,0-2 0,0 13 90,-19-10-90,15 14 0,-26-13 0,18 23 90,-11-22-180,-1 20 90,7-23-179,-10 11 89,11-14 90,-5 5 0,5-7 0,1-1 0,-2-1 0,0 0 0,-1-2 0,-2 0 0,-13 1 0,7-2-90,-25 2 90,16-6 0,-31 3 0,22-5-1126,-17 1 1036,12-2 90,-5-1-207,-4 1 252,12-1 0,-1 1-90,10-1 0,-2 1-383,-7 0 0,-4 0 1,4 1 427,1 0 0,0 0 0,-7 1 0,-5 0 0,4 0 0,5 1 0,0 0 0,-14 0 0,-3 1 0,1 2 0,3 0 45,13-3 0,-1 0-45,-3 2 0,-5 0 0,4 0-45,5-2 0,-1 1 75,-5 0 0,-5 0 0,5 0-30,3-1 0,0 0 0,-5-1 0,-5 1 0,5-1 0,2 0 0,2 0 0,7-1 0,-1 0 0,0-1-30,-1 1 0,-1-1 0,3 0 75,-9 1 0,-1-1-75,-6 0 0,-5 0 0,5-1-658,5 1 1,2-1 687,6 1 0,-2-1 0,3 1 0,-2-1 0,1 0 45,0 1 0,0 0-45,1-1 0,0 0 0,3 0 0,-1 0 44,1 1 1,1 0-45,3-1 0,-1 0 45,-14 1 0,0 1-45,13-1 0,0 1 0,-1-1 0,-4 1 0,4-1 210,5 1 1,0 0-121,-25 0 0,0-1-90,28 0 0,0 0-123,-11-1 0,1 1 123,-16 0 180,0-1-180,-1 0 135,16 0 0,-1 0-90,12 0 0,-1 0 45,-26 1 0,-1 0-135,26-1 0,0 0 90,-25 0 0,0 1-45,26-1 0,0 0 0,-8 0 0,-1 0 0,3 0 0,2 0 0,-18 0 0,13 0 0,2 0 90,-3 0 298,-15-14-1018,32 11 1069,-6-21 0,25 11 1,-1-10-1</inkml:trace>
+  <inkml:trace contextRef="#ctx0" brushRef="#br0" timeOffset="-143738.73">23085 2536 8612,'-9'29'540,"7"0"-450,-14 2-90,15 1 90,-13-1 0,8 2 0,-5 0 179,5 17-269,3-10 45,2-5 0,0 0-45,1 9 90,8-6 0,1 1 0,-5 10-90,14-5 0,-1 0-959,-12 10 1004,12-18 0,0 1-45,-15 1 0,0-1 0,24 21 0,-24-8 0,-2 0 90,10 8-135,-9-9 0,-2 0 45,1 8 0,-8-11 0,-1-1 0,5 6 0,-11-19 0,1 0-90,10 25-539,-22-16-900,23 26 179,-20-33 1350,21 9 0,-9-19 0,11 0 0</inkml:trace>
+  <inkml:trace contextRef="#ctx0" brushRef="#br0" timeOffset="-143122.73">23068 2864 9422,'-4'31'629,"-1"2"91,2 18-270,1-5-564,1-14 0,0 3 204,1 7 0,0 1 0,0-8 0,0 2-45,0 28 0,0 2-838,-1-26 1,2 0 792,6 13 0,2 1 45,-7-16 0,0-2-45,6-1 0,0 4 0,-3 3 0,-3 5 0,0-3 0,-1-3 0,0 1 0,2 9 0,0 5 0,0-7 0,1-15 0,-1 0 0,-2 23 0,0-1 0,5 6 0,-4-23 0,-1 0 0,0 12-90,4-3 387,-3-2-1106,1 14 179,-2-18-225,-1-9 1,0 0-675,0 0 1529,0 7 0,0-18 0,0-2 0</inkml:trace>
+  <inkml:trace contextRef="#ctx0" brushRef="#br0" timeOffset="-141904.73">23357 2501 7803,'0'-4'89,"0"1"-89,0 0 0,0 1 0,0-1 0,0 1 0,0-1 0,17-2 0,-12 1 0,26-1 0,-9-2 90,6 1-180,16-2 90,-16 2 0,12 0 0,-11 1 0,2 1 0,3-2 0,-1 0-719,4 0 719,3 0 0,1 1 0,2 0 0</inkml:trace>
+  <inkml:trace contextRef="#ctx0" brushRef="#br0" timeOffset="-139964.73">23127 4589 8882,'0'24'450,"0"5"-450,0-5 90,0 9 0,0-5 0,0 6-1,0 3-89,0 2 180,0 3-727,0 3 637,0 4-90,0 2 0,0 4-396,0 0 486,0 3-90,0 1 0,0 0 0,0 1 90,0-1-90,0-19 0,0 1 0,0 20 0,0-11 0,0-2 0,0 6 0,7-10 0,0-1 0,-3 6 0,9-9 0,-1 1 0,-10 7 0,8 14-90,-1 0 180,0-16-1585,-1-7 0,2-2 1405,4 4 180,-2 9 112,0-19-292,1-3 180,1-2 323,3-2-413,2 0 0,5-3 0,19 7 90,-8-8-90,-2-3 0,1-2-90,10 4-781,16 3 871,-13-6 90,2-2-180,1 1 2603,3-2-2423,1-1-90,0 0 0,-15-5 0,1 0 0,19 3 0,-9-3 0,-1-1 0,9 1 0,-22-3 0,0-1 0,13 1 0,-2-1 0,0 0 0,18-1 90,-15 1-135,-9-2 0,0-1 45,7 1 0,-8-1 0,0 0 0,6 0-45,2 0 0,1 0 135,1 0-135,-3 0 0,0 0 45,-2 0 90,13 0-180,-19 0 90,2 0-90,17 12 0,-13-9 90,16 9-90,-2-3 180,-12-7-90,-10 7 0,-1 0 0,7-3 0,9 3 0,-17 0 0,-1-6-46,13 6 46,-12-3 0,10 0 0,-16-2 0,1-1 0,0-1-89,12 2 178,-8-3-89,20 3 0,-22-3 1232,8 3-1232,-13-2 0,-2 1 501,0 2-501,8 2 0,-6 0 90,14 6-90,-17-4 79,17 6-169,-19-5-90,20 7 90,-16-7 90,10 2 0,-8-4 0,2-2 0,3-2 0,20-2 0,-9-1 0,-4 0 0,1-1 0,12 0 0,-7 1 0,2-2-810,11-12 810,-20 11 0,-1 1 0,18-13 0,0 14 0,1-8 45,-15 8 0,1-2-90,-11-5 0,2 0 0,22 3 0,0 2 45,-22-1 0,-1-1-45,22-2 0,0 1 135,9 3-90,-2-2 0,-1-1 0,0 4-180,-4 0 0,-2 0 180,-5 1-45,-10 0 0,0 0 45,3 0-201,-7 0 0,0 0 201,4 0 0,-6 0 0,0 0 0,6 0 0,12 0 90,2 0-90,-14 0-45,-4 0 0,-1 0 135,3 0-90,-4-5 0,-1 0 0,3 2 0,26-7 0,-28 10 0,0-2 0,0-1 0,-2 1 0,26-3 0,-33 5 0,13 0 0,-17 0 0,5 0 0,-11 0 0,-1 0 0,-2 0 776,-2 0-776,0 0 437,-2 0-1157,0 0 270,-2 0 450,0 0 0,-4 0 0,0 0 0</inkml:trace>
+  <inkml:trace contextRef="#ctx0" brushRef="#br0" timeOffset="-139204.73">28782 4708 9961,'-1'-8'1439,"-1"-2"-1169,1 2 0,0-4-180,1 5 90,0 0 0,0 2-180,0 3 0,0-2 270,0 3-180,0 19-90,0 11 0,0 12 0,0-6 0,0 0 0,0 15 0,1-3 0,-2 2 0,-10 12 0,9-7 0,1 0-428,-5-20 1,1-2 427,4 12 0,2-1 0,-1 21 0,0-1 0,0 1 0,0 0 0,0-1 0,0 0 0,9-19 0,1 2 0,-8-13 0,1 2 0,14 25 0,1 0 0,-16-26 0,-1 1 0,13 25 0,-1 1 0,-11-25 0,-1-1 0,5 11 0,-1 0 90,-5 18-180,6-2 90,-5-2 0,2-20 0,0 0-90,-3 19 0,2-13 0,0-2 0,1 4 0,2 8-180,1-23-180,-4-3-179,3-4-451,-2-3-449,2-3-450,-2-1 1979,1-4 0,-1-2 0,-1-2 0</inkml:trace>
+  <inkml:trace contextRef="#ctx0" brushRef="#br0" timeOffset="-117070.73">11208 322 10411,'4'-11'810,"-2"1"-541,0 2 541,0 3-810,0 20 0,0-12 0,0 33 0,1-19 0,1 20 0,-1-6 0,6 16 0,-3-10 0,8 22 90,-5-27-180,3 5 180,4-11-180,-5-11-270,13 1 180,-9-12 0,4-2 0,4-22 180,-6 15 0,13-44 0,-14 31 0,8-35-89,-14 30 89,1-7 0,-5 12 0,-3 8 179,0-2-89,-1 11-90,0-3 0,1 23 0,5 1-269,-1 3-541,6 8-359,-1-27-91,3 29-718,1-29 1978,3 27 0,1-27 0,3 10 0</inkml:trace>
+  <inkml:trace contextRef="#ctx0" brushRef="#br0" timeOffset="-116503.73">11878 367 9602,'-15'13'449,"-7"-9"-449,20 25 0,-14-25 0,15 29 90,-6-20-180,7 18 180,0-7-90,0 1 0,0 2 0,16 0 90,-13 12-180,29-10 90,-29 17 90,24-21 0,-24 10 0,8-20-90,-11 2-720,0-9 91,-21-4 359,16-15-90,-30-4 180,31-16 180,-11 4 0,41 10 0,7-7 0,15 11 0,0-4 90,9-1-180,-10 7 135,-7 3 0,1 0-45,8-4 180,-11 4 0,-1-1 90,2-3-90,9-2 90,-17 0-1,-11 3 91,-3-10-360,-12 9 270,-4-4 0,-1 6 0,0 0-180,-22-1 90,2 2-180,-20 4 0,8 1 90,5 4-90,11 20 0,6 1 0,10 24-180,0-13-450,0 12 0,22-16-989,-1 18 630,4-20 989,8 7 0,-28-14 0,13-2 0</inkml:trace>
+  <inkml:trace contextRef="#ctx0" brushRef="#br0" timeOffset="-116220.73">12560 562 9422,'0'-18'809,"0"25"-629,17 10-270,-13 28 180,30-11-90,-30-1 0,22-9-90,-23-3 630,7-1 89,0-3-629,-8-2 0,14-7-90,-15-19 90,5-13 0,-6-10-809,0-14 179,0 18-1528,0-18 628,16 24 1530,-12-6 0,28 15 0,-12 0 0</inkml:trace>
+  <inkml:trace contextRef="#ctx0" brushRef="#br0" timeOffset="-115866.73">13457 294 12030,'-4'21'540,"2"14"-540,-1-18 90,0 21-90,0-6 0,-1 7 0,-1 2-612,0 6 433,0 2-271,2 4-540,0 4-2384,2 2 1215,0 2 2159,1 0 0,0 2 0,0-1 0</inkml:trace>
+  <inkml:trace contextRef="#ctx0" brushRef="#br0" timeOffset="-114869.73">14053 741 10681,'-5'0'1619,"1"18"-1619,3 4 90,18 12-180,-12-2 90,12-6 0,1 0 90,-13 1-90,30-2 0,-21 0-90,15-4 0,-8-1-90,1-3 0,0-4 90,1-3-90,-1-5 90,0-2 90,0-2 0,5-20 0,-8 14 90,8-33-90,-18 13 90,0-9 180,-9 1-90,0 13 90,0 0-360,0 0 0,-14 10 90,10-5-180,-11 29-809,15 1-181,18 29-269,-14-8-360,28 4 1799,-28-12 0,27-1 0,-8-1 0</inkml:trace>
+  <inkml:trace contextRef="#ctx0" brushRef="#br0" timeOffset="-114519.73">14752 1049 9961,'-21'-6'630,"5"20"-720,16-4-180,19 23 0,-15-3-89,28-12-91,-29 5-450,20-15 810,-15 3 180,10-21-90,-6 6 180,-2-29-90,-2 28 180,1-36 90,-1 24 0,3-20-181,-6 13 1,4 2-90,-4 0 450,0 11-450,-1 1-90,-1 10 0,-1 0 0,2 17 0,1-12-450,8 31-359,1-9-1080,15 19 270,-6-9 1619,12-5 0,-7-21 0,3-3 0</inkml:trace>
+  <inkml:trace contextRef="#ctx0" brushRef="#br0" timeOffset="-114202.73">15315 1045 10051,'-35'-12'720,"16"-2"-630,-9 13-450,16-6 360,20 6 0,7 10 180,32-6 539,-6 7 1,-8-10-540,-14-12-180,-28 24 0,-8 14 0,-5 11-180,14-3 0,3-1-90,5 1-989,0 24 450,0-29-181,0 8 1,0-17-810,0-3 1799,0-1 0,0-5 0,0-1 0</inkml:trace>
+  <inkml:trace contextRef="#ctx0" brushRef="#br0" timeOffset="-113982.73">14373 555 9602,'0'-15'539,"0"0"-449,18 5 270,1 2-630,12 24-1079,-15 4 269,-6 21 1080,-10 3 0,0-10 0,0 1 0</inkml:trace>
+  <inkml:trace contextRef="#ctx0" brushRef="#br0" timeOffset="-113817.73">14882 434 9332,'-22'17'-180,"-11"9"-360,29 9-269,-12 6-451,16-8 1260,0 5 0,0 4 0,0 3 0</inkml:trace>
+  <inkml:trace contextRef="#ctx0" brushRef="#br0" timeOffset="-113346.73">16347 964 10681,'-43'-7'90,"1"1"-90,3 6 0,-10 14 0,15-10 90,-3 26 0,20-6-180,8 8 90,4 9-180,27-18-90,10 7 180,11-19-985,3-2 985,-12-9-69,0 0 69,0 0 0,8-21 90,-12-8 0,-12 1 0,-2-2 90,3-18 90,-10-5-90,-2 13 90,-7-3 90,0 0 134,-10 11 1,-2 0-45,7-15-225,-14 11 0,1 0-225,14 2 0,-27-6 360,28 20 544,-13 28-814,16 17 0,0 18 0,0 12 0,7-20 0,3 0-90,8 23-225,0-9 1,0 1-294,0 6-112,5-12 1,-1-2-1173,-5 2 992,24 5-269,-16-23 1103,-1-9 0,2-7 0,-1-5 1</inkml:trace>
+  <inkml:trace contextRef="#ctx0" brushRef="#br0" timeOffset="-113168.73">16742 1004 10951,'-14'-11'539,"11"24"-808,-10 9-271,13 15-180,16-17 91,-12 10-1,12-15 0,1 6 91,-12 3-1,27-20-180,-19 19 720,13-21 0,-8 6 0,0-8 0</inkml:trace>
+  <inkml:trace contextRef="#ctx0" brushRef="#br0" timeOffset="-112852.73">16950 1101 10141,'0'-29'1259,"0"6"-1259,0 26 0,0 7-269,0 24-91,0-3 90,12-11-360,1 6 450,2-17 91,15 3 89,-20-5 0,22-7 179,-19-17 541,7-3-360,-8-1 90,0-10-181,-4 27-179,-3-24 0,0 25 0,0-17 0,-3 19-180,0 8-989,-1 10 179,-1 18-179,0-7-1892,19 9 2971,5-23 0,0 13 0,-5-12 0</inkml:trace>
+  <inkml:trace contextRef="#ctx0" brushRef="#br0" timeOffset="-112560.73">17518 1141 10321,'-18'13'270,"20"-10"-270,17 19 0,22-20 0,-3 6 90,-4-8 270,-6 0 89,-17-17-89,6 13 360,-11-26-270,4 12-450,-6-12 0,-4 5-180,-13 10-540,9 23 90,-9 18-539,3 8-2429,8 26 3598,-15-20 0,15 17 0,-5-16 0</inkml:trace>
+  <inkml:trace contextRef="#ctx0" brushRef="#br0" timeOffset="-112428.73">17307 1647 12480,'-13'0'0,"0"0"-450,3 0-989,2 0-1349,6-13 2788,-1 9 0,2-10 0,1 14 0</inkml:trace>
+  <inkml:trace contextRef="#ctx0" brushRef="#br0" timeOffset="-106297.73">18835 151 11041,'0'-23'539,"0"3"-359,0 5 0,0 3 1439,0 6-1529,0 22 0,0 3 0,0 24-90,0-1-1385,0 9 1385,0 9 0,0 7 0,0-32 0,0 2 45,0 1 0,0 0-45,0 1 0,0 1 0,0 1 0,0 0-90,0 0 0,0 0-45,0-1 0,0 2-360,0 15 1,0 1 224,-1-16 0,2 0-450,3 2 1,3 4-1,-2-6 0,-4-6 1,1-2 719,12 17 0,-1-2 0,-10 0 0,8 9 0</inkml:trace>
+  <inkml:trace contextRef="#ctx0" brushRef="#br0" timeOffset="-105582.73">19597 723 10681,'0'19'1349,"0"11"-1259,0 33-90,0-9 0,12 5 0,-9 1 0,20-15-900,-21 7 900,15-21 218,-15-7-218,12 2-90,-12-12-270,7-2 360,-6-9 0,3-3-180,3-21 270,-1-12-135,1 2 0,0-3 45,1-23 135,6-5-135,-6 16 0,-1 2-90,1 3 180,2-4-90,-3 17-147,8 4 237,-8 18-90,5 6 90,-5 21-90,1-15 0,-2 40 0,3-8 0,-2 10 0,4 14 0,-5-30 0,0 12 0,-1-30 0,-3 5-180,-1-18 714,-2 3-624,3-26 430,-1 17-340,6-52 0,-2 33 0,3-29 0,-2 20 0,0 5-90,-2 2 90,1 13 0,-2-7 90,-1 17-90,3-8 0,-3 11 0,7 23 90,-2-17-180,3 40-269,0-28-541,-1 24-179,4-12-1080,10 14 2159,-1-13 0,9 6 0,-7-15 0</inkml:trace>
+  <inkml:trace contextRef="#ctx0" brushRef="#br0" timeOffset="-105319.73">20465 884 10321,'-36'-6'1169,"-1"2"-1169,1 22 0,4 0 0,10 16 0,10-5 0,7-2 0,26-6 0,1-9 0,19-6 0,-10-21-90,-13-5-89,1 1-631,-17-14-719,6 12 270,-8-14 1259,-18 7 0,13-1 0,-12 5 0</inkml:trace>
+  <inkml:trace contextRef="#ctx0" brushRef="#br0" timeOffset="-104882.73">20763 439 10141,'-21'20'1709,"-10"-15"-1529,27 30-180,-10-11 0,3 9 90,8 4-180,-8 8 180,11-8-180,0 11 90,0-13 0,0-1 0,0 1-450,17 9 270,-12-12-449,25 12 269,-27-25 90,11-1-359,-2-13 629,-1-18 0,8-11 0,-5-25 179,-7 8 1,3-18-90,-5 28-90,3-8 180,-4 26 360,0-7-360,1 17 359,0-7-269,1 10-180,0 0 0,1 0 90,-1 15-90,1-12-90,1 40 0,-1-25 0,-2 37 0,-3-26 90,-2 18-180,0-23-270,0 5-89,0-15-451,-14-4-2068,10-1 2968,-21-6 0,22-16 0,-8-8 0</inkml:trace>
+  <inkml:trace contextRef="#ctx0" brushRef="#br0" timeOffset="-104716.73">21042 718 10051,'20'26'900,"-2"13"-810,-11-15 0,1 10-90,-8 0-90,3 2-180,-3-8-1259,0 14 719,0-22-1439,0 8 2249,0-18 0,0-1 0,0-7 0</inkml:trace>
+  <inkml:trace contextRef="#ctx0" brushRef="#br0" timeOffset="-104577.73">21062 491 9332,'0'-14'-90,"0"3"90,0 2 0,0 4-990,0 1-1168,0 17 2158,0 5 0,0 0 0,0-3 0</inkml:trace>
+  <inkml:trace contextRef="#ctx0" brushRef="#br0" timeOffset="-104279.73">21438 952 9602,'3'-17'269,"-1"-18"-269,0 15 180,0-17 0,1 3-90,0 1 90,0-2 180,1-15-270,-1 12-904,-1-9 994,-2 17 121,0 3-121,0 1-59,0-3-121,0 9 269,-13 0-269,9 33 0,-9 27-89,13 8-226,0-6 0,0 1-1085,0 8 1040,7-18 0,2 2-450,-2 0 1,2-1 1,10 16 808,0-12 0,0 0 0,-4-1 0,23 7 0</inkml:trace>
+  <inkml:trace contextRef="#ctx0" brushRef="#br0" timeOffset="-103995.73">21743 926 10501,'41'0'90,"2"0"-90,-23-15 90,15 11-180,-21-23 450,4 13 89,-9-13-179,-9 4 0,-20 2-270,-4 9 90,-19 5-90,10 7 0,14 16-90,8 4-360,32 0-539,1 12-270,25-18 1259,-9 3 0,2 0 0,-6-10 0,0-1 0,14 1 0,0 1 0</inkml:trace>
+  <inkml:trace contextRef="#ctx0" brushRef="#br0" timeOffset="-103541.73">19467 1693 10411,'0'-15'1259,"25"0"-809,12-4-180,16 4-135,-11 1 0,2 0-801,20-2 755,-21 6 1,5 0 0,-3 0-1109,5 1 0,1 0 1019,-5 1 0,3 1 0,-1-1 0,13-1 0,0 0 30,-17 4 0,1 0 0,1-1-60,2 0 0,0 0 0,4 0 30,4 0 0,5 0 0,1 0 0,-2 0-467,2 0 1,-1 0-1,5 0 215,-5 1 0,7-1 0,2 0 1,-3 1-1,-6 0-138,5 0 0,-7 0 1,5 1-187,-8 0 0,5 0 1,2 0-1,-3 0 0,-7 1 412,1 0 0,-6 1 0,2-1 1,9 1-1,2 0 0,-5 0 1,-5 1-1,-1 0 0</inkml:trace>
+  <inkml:trace contextRef="#ctx0" brushRef="#br0" timeOffset="-102048.73">20968 1661 10321,'0'-14'1079,"0"0"-809,0 5 0,-15-1-180,11 23 0,-22 19-90,23 17-178,-6-18 0,-1 4 223,8 17 0,2 2-456,-5-10 1,1 4 440,3 11 0,1 8 0,1-4-1073,-2 2 0,2-1 1043,4-6 0,1 3 0,-1-2 0,-4-12 0,-1-2 0,3 0 30,7 2 0,4 0 0,-4 1-60,-8 0 0,-3 0 0,4 1 30,9-1 0,4 1 0,-2-1-771,-5 0 1,-3 1 0,3-1 770,6-2 0,2-1 0,2 3 0,0-3 0,0 3 0,2 0 0,-1-4-261,2 1 0,0-2 0,4 2 261,4 4 0,6 5 0,1-2 0,-3-5-189,-4-10 1,-1-4 0,2 1 158,8 8 0,3 2 0,-2-4 30,3 0 0,-1-3 0,-1-1 0,0-1-90,-1-2 0,0-1-45,-3-1 0,0-1-90,-2-2 0,1-2 0,-4-1 0,1 0 237,8 2 0,-1-1-102,-12-8 0,1-1-180,10 6 0,-2-2 90,-1-4-180,0 0 1786,-17-12-2325,-7-1 565,-2-3 334,-5 1 0,-2-2 0,-2 0 0</inkml:trace>
+  <inkml:trace contextRef="#ctx0" brushRef="#br0" timeOffset="-101647.73">22123 4028 11311,'-11'-1'179,"1"1"271,0 0-450,4 0 90,1 13-90,4 7 0,1 24 0,18-7-938,-14 9 938,34-9 0,-21 2-39,21 2 39,-15-9 0,0 1 0,15 17-409,-7-7 1,-1 1 408,4 7 45,-15-18 0,-2 0-45,0 12 0,-8-2 90,-5 0-180,-4 19-270,-30-14-1834,10-7 1,-4 0 1428,-6-16 1,-3-2-271,1 8 1,0 0 987,5-10 1,0-2-1,-25 18 1,-3-1-1</inkml:trace>
+  <inkml:trace contextRef="#ctx0" brushRef="#br0" timeOffset="-100614.73">19740 4856 10951,'-19'-19'270,"15"2"-91,-31 2 1,31 4-180,-28 1 90,21 4-90,-13 2 0,10 3 0,1 1 0,0 16 90,4 7-90,2 10-90,5 1 90,2-6 0,0 0 0,24 10 0,1-11 0,25 4 90,-25-12-90,13-11 0,-24 1 0,6-28-270,-11-2-269,-26-3-1440,-6-9 810,1 15-271,-16-2 1440,32-3 0,-34 20 0,16-5 0</inkml:trace>
+  <inkml:trace contextRef="#ctx0" brushRef="#br0" timeOffset="-100448.73">19618 5405 9871,'16'3'0,"1"-2"-90,1-1 90,2 0-1529,17-21 360,-6-7 722,13-12 1,-8 1 0,2 9 0</inkml:trace>
+  <inkml:trace contextRef="#ctx0" brushRef="#br0" timeOffset="-100080.73">20238 5102 8432,'0'-34'270,"16"1"-180,-12 2 0,11-3 270,-1-4-270,-10-2-5301,10-23 5391,-14 14 180,0-16-404,0 19 494,0 4 464,0 1-644,0 6-337,0 3 67,0 6 2445,-16 6-2355,13 6 2117,-27 8-2117,26 63 0,-17-18-204,18 5 1,4 3 113,-8 10-89,7 2-181,0 2-180,0 0-270,23-4-89,-18-2-226,14-21 1,5-1-684,7 13 1718,11 5 0,7-26 0,-11-6 0</inkml:trace>
+  <inkml:trace contextRef="#ctx0" brushRef="#br0" timeOffset="-99840.73">20812 4882 10591,'-23'-7'720,"-17"5"-541,11-5-179,-20 7 0,20 17 0,-10-13 0,24 28 0,-5-14 90,9 13-90,11-3 0,23-6 0,5-9 0,19-6 0,-3-7 0,-20-18-449,2 14-811,-24-25-449,7 15 450,-9-9 1259,-22 10 0,16 5 0,-16 8 0</inkml:trace>
+  <inkml:trace contextRef="#ctx0" brushRef="#br0" timeOffset="-99392.73">20545 4729 10681,'0'-22'809,"0"-2"-359,19-10-180,-14 7-180,35-8 0,-35 13-180,39 4 180,-38 0-90,39 5 0,-29 2-630,24 4-179,-14 4-1170,-2 24 1169,-5 14-179,-11 16-1012,-2 6 2001,-6-4 0,0 2 0,0 4 0</inkml:trace>
+  <inkml:trace contextRef="#ctx0" brushRef="#br0" timeOffset="-99247.73">20777 5443 10501,'22'11'630,"-4"0"-540,-18-5-4408,12-1 4318,-3-4 0,10 0 0,-6-1 0</inkml:trace>
+  <inkml:trace contextRef="#ctx0" brushRef="#br0" timeOffset="-99113.73">21555 5114 12840,'4'-5'-360,"-2"0"-809,-1-2-1530,-1 0 2699,0-4 0,0 0 0,0-1 0</inkml:trace>
+</inkml:ink>
+</file>
+
+<file path=ppt/ink/ink9.xml><?xml version="1.0" encoding="utf-8"?>
+<inkml:ink xmlns:inkml="http://www.w3.org/2003/InkML">
+  <inkml:definitions>
+    <inkml:context xml:id="ctx0">
+      <inkml:inkSource xml:id="inkSrc0">
+        <inkml:traceFormat>
+          <inkml:channel name="X" type="integer" min="-2.14748E9" max="2.14748E9" units="cm"/>
+          <inkml:channel name="Y" type="integer" min="-2.14748E9" max="2.14748E9" units="cm"/>
+          <inkml:channel name="F" type="integer" max="32767" units="dev"/>
+        </inkml:traceFormat>
+        <inkml:channelProperties>
+          <inkml:channelProperty channel="X" name="resolution" value="1000" units="1/cm"/>
+          <inkml:channelProperty channel="Y" name="resolution" value="1000" units="1/cm"/>
+          <inkml:channelProperty channel="F" name="resolution" value="0" units="1/dev"/>
+        </inkml:channelProperties>
+      </inkml:inkSource>
+      <inkml:timestamp xml:id="ts0" timeString="2021-10-13T00:28:38.314"/>
+    </inkml:context>
+    <inkml:brush xml:id="br0">
+      <inkml:brushProperty name="width" value="0.09071" units="cm"/>
+      <inkml:brushProperty name="height" value="0.09071" units="cm"/>
+      <inkml:brushProperty name="color" value="#FF0000"/>
+    </inkml:brush>
+  </inkml:definitions>
+  <inkml:trace contextRef="#ctx0" brushRef="#br0">3595 1842 12210,'0'31'1439,"-15"3"-899,11 5-5841,-10 5 5571,0 4-90,10 5-107,-3-8 0,0 2-28,2-10 0,0 1 168,4 14 1,0 0-124,-4-15 0,0 0-90,5 1 0,0 0 45,-1 0 0,2-2-65,6 0 1,3 1 19,0 22 0,2-1 0,-2-24 0,1 1 45,4 27 0,0-4-45,-2-22 2399,1 9-2579,-4-35 1573,-10-22-1483,0-18 1341,0-14-1296,0 6 0,0-1-45,0-15 90,0 19 0,0-3 0,-1 0 0,2 2 0,16-18-45,-6 12 1,3 2-1059,22-1 1103,1-5 0,-5 20-601,1 8 601,3 3-227,14 8 407,-10 3 89,20 17-269,-31-9 0,9 26 90,-26-4-90,-21 36 0,5-16-135,-27-10 1,-6-2-316,7-2-1040,-14-9 1,-2-1 859,0-1-90,-14-3-26,21-11-424,5-6-359,2 0 1592,0-16 1,16 11 0,-1-11 0</inkml:trace>
+  <inkml:trace contextRef="#ctx0" brushRef="#br0" timeOffset="595">4353 2089 11221,'-4'-2'2968,"0"1"-2518,3 20-181,17 12-179,-12 11 0,12 6-1363,0-8 1363,-12 6-90,13-1-90,-4 5 0,-10-3-360,11 1-809,-7 16 449,-5-18-360,4-10 1,0-2-450,-5 2-167,3 4 1786,-4-18 0,0-5 0,0-1 0</inkml:trace>
+  <inkml:trace contextRef="#ctx0" brushRef="#br0" timeOffset="1161">4403 2604 11400,'25'-13'180,"9"10"-180,-30-26 90,29 13 0,-18-13 90,15 4 90,1-9 0,-10 6-180,4-8 90,-16 12 0,1 2 89,-9 1-179,5 2-90,-6 2 180,0 2-90,-19-2-90,15 7 180,-33-2 0,8 8 0,-9 1 90,-4 3-180,11 22 90,-1-17-90,0 41 0,3-24 89,3 24-89,4 12 0,7-13-90,8-5 0,6-1-390,19 7 390,-13 10-270,51-24-90,-25-5-179,30-7-226,-21-12 1,0-3-496,21 2-1034,-8-3 1,0-4 2293,8-21 0,-23 19 0,0-1 0,12-18 0</inkml:trace>
+  <inkml:trace contextRef="#ctx0" brushRef="#br0" timeOffset="2611">21322 2980 8612,'0'-37'-90,"26"-1"-45,-8 8 0,1 0-90,6 5 1,2 0-1625,9-18 0,-1 0 1849,-12 16 0,0 1 0,7-8 0,1 1 0,12-13 0</inkml:trace>
+  <inkml:trace contextRef="#ctx0" brushRef="#br0" timeOffset="2961">21953 2141 11311,'-10'15'2518,"18"-12"-2518,-5 34 90,13-21-90,0 19 90,-12-7-90,22 14 0,-15-10 180,1 7-180,5-14 90,-15-3 0,5-3 180,-2-5-180,-4-4 0,5-3-90,-6-2 0,0-19 0,0-7 0,0-11-180,-14 12 0,11-13-2609,-10 8-1708,4-15 4497,7 9 0,-7 16 0,9 7 0</inkml:trace>
+  <inkml:trace contextRef="#ctx0" brushRef="#br0" timeOffset="3399">22048 2341 10681,'30'0'719,"1"0"-719,-6-16 0,0 11 180,-6-31-90,0 21 90,5-29-90,-7 18 270,3-17-90,-13 20 180,-2-13-271,-5 19 1,0-3-180,-19 8 180,-2 7 0,-23 1 0,11 4 180,-14 19-180,19 6-885,-7 11 795,16 0 90,8-6-90,-1 1-90,10 17 90,-4-13-360,28 22-90,11-28-450,-2-8 1,4-3-953,25-5 862,-25-6 1,-1-1-1349,24-6 2248,2 0 0,3-21 0,-31 8 0,0 1 0</inkml:trace>
+  <inkml:trace contextRef="#ctx0" brushRef="#br0" timeOffset="12178">1783 1175 11041,'0'-7'1259,"0"0"-629,-18 0-181,13-1 1,-31 3 0,16 0-90,-19 5-1,9 18-179,0-14-90,6 40 0,0-24-975,0 25 885,3-9 89,0 3-178,5 1 89,1-1-115,4 13 115,6-16 0,1 16 0,4-26 0,21 0-90,2-13 0,26-6-90,-12-3-90,3-19 1137,-9 11-1047,12-32 90,-13 7 19,-6 4 0,-1-2 71,-2-13 0,5 3 90,-12 17-90,-7-3 0,0 9-90,-7 16-270,1 11 96,-1 20-185,0 0-901,14 1 541,8-8-900,10-7 899,-11-6-719,12-7 450,-21-3 1079,17-3 0,-15 0 0,0 0 0</inkml:trace>
+  <inkml:trace contextRef="#ctx0" brushRef="#br0" timeOffset="12597">2122 1328 10231,'2'-8'2159,"1"-1"-1889,-2 20-180,-1 6 0,17-1-90,-12 19 0,26-6 0,-17 9 0,3 2 0,4-13 90,-19-1-180,15-2 90,-15 0 90,6-3-180,-8-1 180,4 2-450,-3-8-1169,4 2 1169,-25-32 90,0-9 90,-3-15 0,-5-20 180,13 19 0,2 3 0,1-1-1211,-2-7 1211,-1-16-90,14 3 180,-5 16-253,6-22 343,0 32 539,21-11-539,0 27 180,4-1-270,7 13 90,-16 2-90,13 2 0,-13 20-90,1 2 1087,-16 22-997,6-11-180,-7 1 107,0-9-1636,-20 6 270,15-7 1349,-32 8 0,33-15 0,-13 2 0</inkml:trace>
+  <inkml:trace contextRef="#ctx0" brushRef="#br0" timeOffset="13144">2525 1035 12750,'0'37'270,"0"-5"-270,14-4-90,-10-5 90,21 11-180,-22-8-270,8 7-629,-2-4 179,-6-9-1169,12 10 990,-14-16 1079,4 1 0,-2-9 0,1-2 0</inkml:trace>
+  <inkml:trace contextRef="#ctx0" brushRef="#br0" timeOffset="13297">2490 931 8792,'0'0'0</inkml:trace>
+  <inkml:trace contextRef="#ctx0" brushRef="#br0" timeOffset="13601">3053 1344 12480,'0'5'0,"0"-2"0</inkml:trace>
+  <inkml:trace contextRef="#ctx0" brushRef="#br0" timeOffset="14179">3250 1081 11221,'0'17'1349,"14"1"-1349,-10-5 0,19 3 90,-21 2-90,25 15 0,-16-3 0,21 22 0,-18-20-90,3 7 180,-3-7-90,-5-9 0,2 7 0,-7-15-450,0 1 270,-3-27 90,-17-6 90,11-16-180,-30-19 180,31 15-90,-9 0 0,-2 0 180,2-10-135,1 6 0,0-1-555,0-7 600,-2-13 0,13 9 0,-2 16 0,3-10 180,17 27-91,-12 3 91,29 11-90,-17 23-180,2 21 180,-6 2-180,-13 22-629,0-28-181,0 8-179,-17-14 0,12-3 240,-12-3 839,17-3 0,0-4 0,0-1 0</inkml:trace>
+  <inkml:trace contextRef="#ctx0" brushRef="#br0" timeOffset="14499">3642 1017 11760,'0'28'270,"0"2"-360,0 0 90,0 0 0,16-12 0,-12 2 0,26-18 0,-11 5 0,9-7 90,10 0-180,-13-21 90,6 15 90,-4-33 0,-10 13-90,1-16 0,-13 8-90,-3 1 0,-24 21-90,17-6-1259,-39 17 90,13-5 1349,-21 25 0,20-15 0,9 15 0</inkml:trace>
+  <inkml:trace contextRef="#ctx0" brushRef="#br0" timeOffset="14861">4042 1189 9062,'11'-19'719,"1"14"-629,-1-36 270,-1 21-90,4-22 270,6-11-540,-5 11 224,-2 5 1,0 0-564,-1-6 699,3-12-180,-9 21 0,-3 1 89,-2 4 170,-1-3-349,0 12 18,0 0-18,-14 14 0,10 24-90,-11 8 0,15 14 0,0 1 90,0-8 129,0 3-669,18 16 0,-14-13-225,10-8 1,3-1-315,1 1-181,0 5 91,14-17-180,-17-4 1259,16-4 0,-8-5 0,0-3 0</inkml:trace>
+  <inkml:trace contextRef="#ctx0" brushRef="#br0" timeOffset="15261">4552 924 11131,'0'37'629,"0"3"-629,0-10 0,0 2 0,16-20-90,-12 11-359,38-11 269,-22 4 90,20-8 0,-14-23 90,-9 12 0,-3-25 0,-7 24 0,-2-24 0,-1 25 360,-3-27-1,-1 15 91,0-10-540,0 33 270,0 25-270,0 11 135,8-10 0,1 0-135,-5 3 180,29 12-180,-29-16 180,31-2-90,-21-2 0,6-3 270,4-2 0,-20-5-180,19 0 0,-21-7-270,7 1 0,-9-8-450,-25 0-449,19-4-900,-48 0-809,30-1 2788,-27 0 0,12 0 0,1 0 0</inkml:trace>
+  <inkml:trace contextRef="#ctx0" brushRef="#br0" timeOffset="16927">21438 978 9242,'2'34'629,"-1"1"-269,1-2-90,0 1 0,0 4-180,0 22 0,1-12-90,-1-6 0,0-1-341,0 5 341,3 13 0,-2-24 90,2-4-180,-2-4 534,2 0-354,-3-10-630,1-2 450,-2-26 90,-1-12 90,0-13-180,0-6 90,-15 2 0,13 6 0,0-1 0,-12-20-45,12 7 0,4 0 45,-2-8 45,0 14 0,0 1-365,0 0 410,20-6-270,-3 18 630,6 12-19,3 2-71,-10 10-360,11 4 89,-12 21 1,1-15-90,-15 32 236,4-13-236,-5 19-360,0-10-449,-23 0-450,18-12-181,-34 0 1440,20 3 0,-1-6 0,5 4 0</inkml:trace>
+  <inkml:trace contextRef="#ctx0" brushRef="#br0" timeOffset="17326">22055 1130 10861,'0'-43'180,"0"7"0,0-3-180,14 7 90,-10-2-1,10-1 91,-14 0-90,0-2 180,0 2-90,0 0-90,0 6 90,0 1 90,0 2-180,-19 4 90,15 1-90,-15 6-90,0 1 0,15 7 0,-29 1 0,22 4 90,-5 22-180,5-15 180,9 51-180,-2-34-578,4 31 308,0-21-179,0 1-181,16-3-989,4 11 810,-1-13-1080,30 13 1979,-29-23 0,27 3 0,-20-12 0</inkml:trace>
+  <inkml:trace contextRef="#ctx0" brushRef="#br0" timeOffset="18027">21922 1215 11311,'-14'-15'809,"10"-4"-809,-23 17 0,15-6 0,-13 8-90,9 19 90,-1-14 0,8 30 0,2-32 0,3 28-180,2-14 90,0 14-90,23-15 0,1-6 1,24-10-361,-2-18 180,-9 14 180,-2-36-90,-14 23-89,-8-20 179,4 10-180,-13 0 0,5 2-90,-7 2-719,0-5 90,-21 16 1079,15-9 0,-15 20 0,21-5 0</inkml:trace>
+  <inkml:trace contextRef="#ctx0" brushRef="#br0" timeOffset="19294">22387 1229 10501,'0'-29'1079,"0"-2"-1079,0 0 270,0 6-180,0-2-90,0 10 0,-14 5 90,10 2-90,-10 8-90,14-3 90,0 3 0,0 0 0,0 0 0,0 1-540,0-1-1258,0 10 3237,-14-6-1349,10 21-180,-10-11 180,28 4-90,-11 3 0,10-10 0,-3 11 0,-8 0-90,19-3 180,-11 9-90,2-12-270,2 4 90,-10-9 0,6-1 90,-4-3-90,1-1 90,-1-3 90,1 0-90,-2-1 180,2-18-90,-2-1 0,0-2 0,1-13 0,-2 20 0,1-16 90,2 3 90,-3 7-90,2-5-180,-2 17 810,-2-3-630,0 10 89,0-2-268,2 3 89,1 14 0,5-10 89,1 28-178,8-13 178,-3 2-89,12 13 0,-8-23-89,6 9 89,-5-7-90,-2-12 90,2 10 0,3-10 90,-7 3-1,2-4-89,-11 0 0,-3 0 180,0 0 0,-4 14-270,1 6 90,-2 7 0,0 2 0,0-6 0,17 4 90,-12 1-90,27 13 0,-29-12 180,21 21-90,-14-23 0,1 7 0,-3-12-90,-4-3 0,-3 0 0,4-3-90,-5 1-180,-21-1-2158,-14 4 269,-14-9 2041,-9 1 1,8-10 0,-4-2 0</inkml:trace>
+  <inkml:trace contextRef="#ctx0" brushRef="#br0" timeOffset="20464">5443 1169 11221,'0'-4'-743,"0"13"1,14 5 0,4 13 0</inkml:trace>
+  <inkml:trace contextRef="#ctx0" brushRef="#br0" timeOffset="20962">5697 912 11490,'11'17'810,"0"13"-630,2-15-90,0 14-90,3-4 90,11 12 0,-5-6 0,20 20-180,-18-24 180,10 5 0,-3-11 90,-10-9-91,11 1-89,-17-10 0,10-18 0,-13 11-179,7-36-181,-8 21-180,1-22-269,0 9-1440,2-15 990,-3 12 1259,2-18 0,-6 27 0,0-4 0</inkml:trace>
+  <inkml:trace contextRef="#ctx0" brushRef="#br0" timeOffset="21344">6468 877 11311,'5'16'1259,"0"-3"-989,8 3-180,-2 5 0,7 10-90,-3 1 0,2-5 0,0 1 90,7 12-180,-5-13 180,6 15-90,-11-24 0,3 7 0,-10-19 0,2 1 0,-5-7 0,2-23 0,-1-5-180,3-31 270,-1 12-180,2-3 180,0 15-90,0 4 90,-1 2-1,9 0 91,-6 15-180,15 0 0,-8 14-90,7 18-629,-2-14-540,4 39-1080,0-19 2206,5 24 1,1-9 0,4 2-1</inkml:trace>
+  <inkml:trace contextRef="#ctx0" brushRef="#br0" timeOffset="22731">23183 1302 9512,'-6'0'1169,"0"9"540,2-7-1889,14 7 0,-9-19 180,16 8 0,-16-7 0,5 9 0</inkml:trace>
+  <inkml:trace contextRef="#ctx0" brushRef="#br0" timeOffset="23143">23562 1000 10321,'0'-5'2249,"11"1"-2159,-8 21-90,18-12-90,-12 28 180,10-29 0,-2 31-90,0-21 0,1 17 90,-1-11-90,0-2 180,2-3-90,-2-6-1,1 4 1,5-12-90,-5 7 90,10-8-180,-13-21 90,12-9-179,-16-10-181,5-2-180,-10 10-359,-2-1-91,-3 1-1708,0-7 1079,-1 14 1619,0-4 0,0 17 0,0 0 0</inkml:trace>
+  <inkml:trace contextRef="#ctx0" brushRef="#br0" timeOffset="23548">24182 892 11670,'8'20'720,"1"-5"-540,-3 1-90,7 6-90,-2 8 0,6-1 0,1 6 0,-1-10 0,10 21 0,-9-21 0,6 13 0,-11-19 0,2 1 0,-7-11 90,-1-1-90,-3-4-360,-1-2 360,-2-20 0,0-4 0,-15-1-90,10-23 180,-10 23 540,14-19-540,14 25-90,0 23-90,3 12-2339,16 16 360,-22-1 2069,26-1 0,-21-7 0,5-4 0</inkml:trace>
+  <inkml:trace contextRef="#ctx0" brushRef="#br0" timeOffset="23704">24985 1095 12930,'0'0'0</inkml:trace>
+  <inkml:trace contextRef="#ctx0" brushRef="#br0" timeOffset="27693">6315 2134 9152,'0'-13'1619,"0"1"-1259,0 0-1,0 0-89,0 0 90,0 1-90,0 2 0,0 1-90,0 2 0,0 2-1,-16-1 1,-1 2-180,-13 16 0,7-10 0,2 34 90,4-17-90,4 11 0,0 2 0,-5 14 0,5-3 0,1 2-618,3 10 573,4-20 0,2 0-45,3 12-270,0-2-89,27-3-1350,7 14 539,18-19-269,-15-8 0,1-1 1529,14-2 0,-16-10 0,0-1 0,17 3 0</inkml:trace>
+  <inkml:trace contextRef="#ctx0" brushRef="#br0" timeOffset="28143">6818 2437 9691,'-11'11'1889,"2"0"-1889,29 15 90,-16-8-90,30 7 0,-31-5-90,23 3 180,-23 10-90,22-9 90,-22 12-180,16-18 90,-17 4-899,4-15 629,-6-21 270,0-24-90,0-4 90,0-19 0,0 31 0,20-7 180,-16 17-180,16 4 0,-1 9 450,0-4-450,18 10 0,-11-4 0,-3 22 90,-2 3-180,-6 1-90,4 15-540,-7-19 1,0 17-181,0-10-1708,7 7 2608,-2-10 0,4-2 0,-3-13 0</inkml:trace>
+  <inkml:trace contextRef="#ctx0" brushRef="#br0" timeOffset="28416">7483 2413 10231,'-40'0'1619,"0"15"-1619,2 5 90,6 19-90,13 1 0,8 1-90,11-8 90,26-14 90,-19-3-90,40-15 90,-19 5-90,19-24-90,-6 1 0,-11-19-360,-14 6-89,-9 3-181,-24 11 91,12 0-1350,-26 15 1979,11-6 0,-13 21 0,-1 3 0</inkml:trace>
+  <inkml:trace contextRef="#ctx0" brushRef="#br0" timeOffset="28828">7720 2425 10861,'-20'33'360,"15"6"-360,-28-4 90,29 1-180,-9-11 90,13-1 90,0 2-270,0-6-90,21-1 0,2-12 180,20-3 90,-21-25 0,13 16 0,-17-57-90,3 34-12,-8-4 0,-4-1 102,-7-6 0,11-2 90,-12 1-90,5-16 360,-6 12-225,-10 10 0,0 1 135,6-5 148,-35-13-418,34 25 0,-14-1 90,5 16 719,10 3-719,-10 25-90,14 8 0,18 29 0,-13-9-1006,24 1 556,-26-11-179,22-2-331,-21 0-1109,23 13 1080,-9-12 989,13 18 0,-6-25 0,-1 5 0</inkml:trace>
+  <inkml:trace contextRef="#ctx0" brushRef="#br0" timeOffset="29117">8100 2588 9242,'9'0'1169,"1"0"-809,1 0-90,5 0-90,-2 0-90,12 0-90,-9-20 0,14-2 0,-12-12 179,3 14 271,-6-21-360,-8 25 90,0-35-90,-8 31 90,-25-11 0,19 18-90,-37-2 0,17 11 0,-17 1-90,17 16 0,-8-10 90,31 28-90,-11-6 0,14 8-450,0 12 0,24-17-989,7 12 360,16-25-406,-16-3 1,1-1 1484,10-10 0,15 6 0,-16-7 0</inkml:trace>
+  <inkml:trace contextRef="#ctx0" brushRef="#br0" timeOffset="29410">8275 1959 9422,'0'-8'1709,"0"0"-1260,17 0 271,9-4-450,10 4-90,6-3-90,-6 4 0,6 2 179,1 2-134,-10 2 0,1 1-45,18 0 0,-10 7 0,-2 6-1141,5 14 1051,8 13 0,-25 2-346,-4-4 346,-8 4-315,-10-4 1,-2 1-406,1 24-719,-11-1 0,-7 0-875,-3-21 1,0-1 2313,4 14 0,-3 0 0,-12-13 0,-2-3 0,12 1 0,-1 0 0</inkml:trace>
+  <inkml:trace contextRef="#ctx0" brushRef="#br0" timeOffset="30498">24023 1993 11221,'-15'16'179,"-1"-12"271,1 36-180,-2-19-180,1 23 0,-2-5-1301,3 4 1301,0 4 207,4 5-297,3 1-490,4 0 40,3-1-360,18-1-359,-12-3 494,18-25 1,8-2 674,1 6 0,3-3 0,6-8 0,3-2 0,7 2 0,0 1 0</inkml:trace>
+  <inkml:trace contextRef="#ctx0" brushRef="#br0" timeOffset="31909">24758 2334 10231,'6'-10'1799,"-2"1"-1619,-4 1 450,0 3-720,0 17 180,19 8-180,-15 10 180,31 17-90,-15-14 0,-2-3 0,-2 1 0,5 5 90,5 19-90,-14-28 90,2 1-360,-2-14-90,-11-30 90,-16-8 90,10-17-719,-30-11 179,31 19-1439,-24-19 900,25 24 1259,-10-5 0,13 16 0,0 1 0</inkml:trace>
+  <inkml:trace contextRef="#ctx0" brushRef="#br0" timeOffset="32576">25253 2478 9691,'11'0'1080,"-2"0"-810,4-18-270,-4-1 449,7-21-269,-6 11-180,1-1 270,-5 8 0,-3 2-180,-1 1 270,-2-7-270,0 8-90,-18-1 0,13 10 0,-32 5 0,20 1 0,-14 20-90,16 4 90,5 21-270,10-11-540,0 13 451,17-21-1081,10 14 811,9-26 89,5 11-539,11-21 719,-10 6 90,-3-5 0,0-4 270,8-12 270,-9 6 0,-1 0 270,2-10-91,5-9 991,-20 10-811,-12-13-359,-3 6 0,-29 6 0,-8 10 0,-11 3-270,-1 18 0,14-9 89,12 21 1,5-8-269,9 12 89,0 2-90,24-8-360,1-9 540,27-7-180,-16-7 0,13 0 270,-21-17-180,8 12 90,-14-12 90,-5 0-180,-3 13 630,-7-23-450,-2 17 180,-20-2-450,11 16 0,-11 10-180,37 1-180,-17 5-809,34-18 360,-11 12-540,9-13 1529,4 5 0,-9-6 0,1 0 0</inkml:trace>
+  <inkml:trace contextRef="#ctx0" brushRef="#br0" timeOffset="32946">26298 2239 9781,'0'-29'2969,"0"6"-2789,-14 9-180,10 1 0,-24 12 0,16-5 90,-11 25-90,5 2-90,7 21 0,5-3-180,6-7-630,17 3 451,8-17-1350,24 4 539,-8-9 1260,21-6 0,-23-2 0,14-5 0</inkml:trace>
+  <inkml:trace contextRef="#ctx0" brushRef="#br0" timeOffset="33176">26633 1854 9961,'0'-6'2609,"-10"1"-2699,7 22 180,-7 6-90,24 13 0,-10 0 0,24 6-270,-25-8-989,22 21 179,-11-24-1168,10 17 1258,-6-23 990,-2 6 0,-7-15 0,-1 0 0</inkml:trace>
+  <inkml:trace contextRef="#ctx0" brushRef="#br0" timeOffset="33316">26513 2215 9781,'-14'-8'90,"2"-4"-90,12-2 0,0-2-449,24 5-181,-18-1-270,48 0-89,-28-1 921,28 2 1,-9-1-1,1 1 1</inkml:trace>
+  <inkml:trace contextRef="#ctx0" brushRef="#br0" timeOffset="33693">27495 1760 10681,'0'14'1259,"0"1"-1079,0 4 180,0 18-360,0-2 0,0-1 0,0 2 0,0 14-360,0-3 0,0 2-3058,0 11 2833,0-20 0,0 1-944,0 1 0,0-1 1370,0 23 1,5-22 0,2-1-1,8 16 1</inkml:trace>
+  <inkml:trace contextRef="#ctx0" brushRef="#br0" timeOffset="34609">28123 2208 10051,'-45'-1'720,"10"0"-720,-4 16 90,12-12-90,1 25 0,3-25 0,2 28 180,4-8-180,7 15 0,20-5 0,13-11 0,22-9 0,1-9 0,-5-21 0,-7 12 0,-20-27 0,8 13 180,-11 0 89,4-10-89,-8 19-180,-7-12 90,0 29-180,0 2 180,16 10-180,-12 8-989,25-14-720,-25 18-360,23-9 2159,-15 0 0,2-11 0,-5-5 0</inkml:trace>
+  <inkml:trace contextRef="#ctx0" brushRef="#br0" timeOffset="34960">28383 2180 9961,'5'0'810,"-1"16"-720,-1-12 180,1 27-180,0-28-90,1 31 0,2-30 0,2 43 0,0-32 0,2 29 0,-2-33 179,0 12-268,-2-17 89,-2 3-180,1-6 180,-3-3 0,4-16-90,-3-4 180,5-19-180,-3 8 90,6-14 0,-5 29 0,8-16 0,-8 30 0,9-7 0,-5 9 0,4 0 90,-3 18-180,1-13 90,-1 30-270,1-30-270,-1 32 0,1-22-1079,7 25 450,-3-26 1169,6 15 0,-4-26 0,2 9 0</inkml:trace>
+  <inkml:trace contextRef="#ctx0" brushRef="#br0" timeOffset="35376">28972 2181 9242,'-33'0'1529,"13"13"-1439,9 1-90,11 14 90,18-3 180,-1-4-91,12-9 181,-14-20-90,-7-11-360,-8-11 180,-13 11-90,9 28 0,-9 19 90,13 13-90,22 2-319,-16-5 319,30 2 0,-32 3 0,24-1 0,-24-1 0,24-1 0,-25 0 0,17-3 0,-17-3-90,5-6 0,-2-3-270,-4 0 90,5-9-1529,-24 0 1,-4-12 988,-19-2-269,19-23 1079,-16 15 0,33-37 0,-13 17 0</inkml:trace>
+  <inkml:trace contextRef="#ctx0" brushRef="#br0" timeOffset="35744">29343 2247 10141,'6'0'1259,"-2"0"-1259,0 12 90,-1-9-90,3 9-90,-1 2 90,1-10 90,1 26-180,1-18 180,4 22-180,-2-15 90,5 12-89,-6-17 89,3 2 89,-4-8-178,-1-4-1,0-1-90,4-2 180,-4-1 0,4-17 90,-7-3 0,3-20 89,-5 1-179,1 2-179,-3 9-451,0 28-2158,14 7 2788,7 23 0,12-5 0,2 0 0</inkml:trace>
+  <inkml:trace contextRef="#ctx0" brushRef="#br0" timeOffset="36114">29777 2384 10681,'17'-36'1079,"2"-4"-989,2 10-838,7-4 928,-24 8-147,20-2-123,-21-2 270,15-13-90,-16 9 0,5-10-90,-7 13 0,0 0 270,-21-1-181,15 0 91,-33 1-90,34 0-180,-29-9 90,15 13 217,-11-7 52,14 22-269,6 24 0,31 21 0,-16 14 0,12-10 0,4 0-180,1 13-469,-12-15 0,1-2 109,24 15 0,-31-2-792,27-2 523,-20-2-91,14-2 1,-7-6-1833,12 7 2732,-6-15 0,9 1 0,-8-16 0</inkml:trace>
+  <inkml:trace contextRef="#ctx0" brushRef="#br0" timeOffset="36470">30343 2186 9961,'0'-19'1080,"0"2"-631,-17 1-179,13 3-90,-29 0 90,13 2-270,-20 4 0,7 2 0,0 5 0,12 0-90,-1 20 180,4-15-180,2 33 0,4-14 0,7 10-90,1 6 180,4-18-270,19 5 1,4-9-91,22-6 450,1-2-180,1-7 90,-21-19 90,8 12 90,-25-29 449,8 19-899,-11-13-539,-6 29-540,0 3 719,0 22-90,12-15 720,3 13 0,12-21 0,0 11 0</inkml:trace>
+  <inkml:trace contextRef="#ctx0" brushRef="#br0" timeOffset="36778">30498 2222 10591,'0'-20'1529,"0"3"-1439,-14 10 450,10 1-450,-11 23-90,15 0 0,16 5 0,-13 13 0,13-19 0,-3 16 0,1 1 0,2-11 0,2 12 0,-7-18-90,1 1 90,-3-30-90,-7-7 90,-2-16 0,-16 1-360,13-10 270,-13 11-899,16-26 359,0 26-1169,0-15 720,0 25 1079,0-8 0,0 18 0,0-1 0</inkml:trace>
+  <inkml:trace contextRef="#ctx0" brushRef="#br0" timeOffset="37077">30532 1541 11131,'0'-11'989,"21"1"-809,-15 4 360,52 3-360,-34 2-46,11 10 1,3 2-135,1-6 0,-7 23 0,-1 5 0,4-4 0,-9 13 0,-2 5-1015,0 7 925,-10-17 0,-1 1-180,-3 20-90,-3 2-179,-6 1-361,-1 2-45,-11-32 1,0 1-1215,5 33 2159,-19-33 0,-3 1 0,14-1 0,-1 0 0,-13 0 0,-1 0 0</inkml:trace>
+  <inkml:trace contextRef="#ctx0" brushRef="#br0" timeOffset="265109">20878 2508 7982,'7'-52'720,"-5"1"-360,12 1-772,-12 2 772,5 2 0,-7 3 0,0 3-1,0 8-89,0 3 99,0 6-279,0 5-38,-16 6-52,12 3 990,-13 4-810,17 19-90,0 15 90,0 10-180,0 10 0,14-8 248,-10 5-248,10 2-490,4 0 490,-14 0 0,12-13 0,2 0-90,3 19-90,-6-19 0,1 0-269,12 13-1,-6-1-90,1 0-135,-7-15 1,0 0-136,10 16-224,-8-11 0,0-1 1034,2 1 0,1 8 0,-9-19 0</inkml:trace>
+  <inkml:trace contextRef="#ctx0" brushRef="#br0" timeOffset="265260">20885 2644 6813,'32'-51'-150,"-5"0"0,2 24 0,2 1 0,-6-1 0,-1 1 1</inkml:trace>
+  <inkml:trace contextRef="#ctx0" brushRef="#br0" timeOffset="265859">20658 2837 8702,'23'-26'360,"18"-1"-360,-21-4-794,22-5 794,-8-4-540,-8 9 1,0-1-360,17-16 731,-15 16 1,1 0 0,12-9-1,1-1 1</inkml:trace>
+  <inkml:trace contextRef="#ctx0" brushRef="#br0" timeOffset="330962">20462 3136 7982,'-7'-4'540,"0"2"-360,2-3 0,0 3-180,2 1 0,0-2 180,0 1 0,2 0-90,0 0-90,1 0 90,20-3 0,-14-1 0,54-5-1,-33 2-89,14 1 0,3-1-219,6-2 174,-1 1 0,3-1-906,-17 4 1,-1 0 950,12-2 0,3-1 0,8-2 0,0 1 0,-13 3 0,2-1 0,6-1 0,5-1 0,-4 1 0,-5 1 0,1 0 0,4-1 0,4 0 0,-4 1 0,-7 1 0,-1 1 0,13-4 0,-2 2-45,-18 4 0,-3 0-90,-1 1 0,-1-1-199,30 0 109,-23 4 0,-2 0-45,14-1 45,-13 2 0,-3 0 45,-5 0-449,8 13 89,-25-9 583,-2 9 1,-8-13 0,-3 0-1</inkml:trace>
+  <inkml:trace contextRef="#ctx0" brushRef="#br0" timeOffset="331379">22548 1980 7982,'1'-11'540,"1"0"-90,-1 0-90,1-5-360,0 6 0,-1-2-90,0 4 450,0 4-271,2 0 1,1 3 0,2 1-90,2 15 0,0-11 0,4 32 90,8-3-90,-5 11 0,-2-9 0,0 0 90,0 11-135,-2-6 0,-1 1 45,1 8-1164,4 12 894,-7-18 90,1-2 0,-1 1-359,0 15 179,-2-15 90,-3-7 0,0-1 180,0 0-359,0 16-91,-1-32 540,-1 3 0,-1-17 0,0-1 0</inkml:trace>
+  <inkml:trace contextRef="#ctx0" brushRef="#br0" timeOffset="331844">22473 2019 7713,'-18'-18'179,"-1"0"-89,-1 2 0,0-3 0,-10-7 0,7 4 0,-22-14-90,16 14 0,-7-2 0,-2 1 0,-6-1 0,-4 1 0,-1 1-411,-7 3 411,0 6 0,-2 3-829,19 3 0,-1 3 874,-14-1 0,-2 1-45,11 3 0,0 0-45,-2 0 0,-1 1 90,-2 0 0,-2 0-45,1 4 0,-3 2 0,2-1 0,-8-4 0,-2 2 0,13 3 0,-5 3 0,1 0 0,5-3 0,-11-4 0,2 0 30,-3 7 0,-4 2 0,6-2 14,6-7 1,3-1-45,-12 5 0,2 1 0,20-3 0,3 0 0,1-4 0,2 1 0,-29 7 0,26-6 0,1 0 0,-11-1 475,-12 7-475,39-6 0,1 9 0,15-5 179,2 10-179,28 9 0,8-1 45,-3 2 0,2 1-45,18 11 105,-16-2 0,-2 2-105,7 12 45,-7-5 0,-1 2-45,-13-16 0,-3 0-45,7 8 0,-1 3 90,-2 5 0,-1-1-90,-5-11 0,0 1-405,1 6 0,1 4 1,-2-3-181,-1-4 0,-2 0 630,5 13 0,0-1 0,-6-14 0,0-3 0,0 0 0,0 1 0</inkml:trace>
+  <inkml:trace contextRef="#ctx0" brushRef="#br0" timeOffset="400530">32 5162 7533,'0'6'359,"16"-2"-89,-12-1-90,28-3 0,-15 1-90,12-1 0,-2 0 0,-8 0 0,2 0-90,-3 0 90,3 0-90,4 0 90,22 0-90,-7 0 45,1 0 0,2 0-135,14 0 90,-11-4 0,7-1 0,-4 0-450,-7 4 0,0-1 480,14-6 0,7-2 0,-6 0-686,-11 3 0,0 0 626,6-2 0,5-1 0,-4 2-962,-4 1 1,-1 1 991,16-4 0,2 2-45,0 4 0,-1 0 90,-14-1 0,2 1-75,4 0 0,6 1 0,-5 1-644,-3 1 1,0 1 613,-8-1 0,3 0 0,-3 0-75,6 1 0,-2 0 45,3 0 0,0 0 0,0 0 0,2 0-120,-3 0 0,4-1 0,-3 2 120,9 5 1,2 1 66,-14-6 1,5-2-1,0 1 1,-6 3 67,13 8 0,-2 1-45,-12-8 0,5-1 0,0-1 0,-5 1-300,11 3 1,-2 1 299,-8-1 0,1 0 0,1-2 30,1-1 0,0-1 0,-2 0-30,10 2 0,3 0 0,-11-2 0,5-1 0,2 0 0,-6-1 30,-4 1 0,-4-1 0,2-1-239,16 1 0,3 0 0,-3 0 239,-14 0 0,-3 0 0,1 0-30,2 0 0,1 0 0,0 0 0,1 1 0,0 0 0,0-3 30,1-3 0,0-1 0,0 0-30,1 4 0,0 2 0,-1-2 30,0-3 0,-1-2 0,4 1 15,1 2 0,3 0 0,1 0 0,-3 0-45,4-1 0,-3 0 0,5-1 0,-3 0 0,7 0 0,1-1 0,-1 0 0,-6 1 22,-10 0 1,-4 0-1,0 1 1,5 0-8,2 0 0,5 1 0,3-1 0,0 0 0,-3 1 0,-4 0-130,1 0 0,-5 0 1,-1 1-1,4-1 115,-1 1 0,2-1 0,2 0 0,0 0 0,-1 0 18,1 1 0,0-1 0,0 1 0,-1-1 0,-2 1-61,1 0 1,-4 0 0,2 0-1,4-1 28,1 1 0,6-1 0,3 0 0,1 0 0,-4 0 0,-5 1-117,2-1 1,-6 1-1,0 1 1,4-2 131,0 1 0,4-1 0,1 0 0,-1 0 0,-4 1 0,0 0 0,-4 0 0,0 0 0,0 0 0,1-1 0,1 1 0,0 0 0,0-1-38,-1 1 1,0 0-1,2 0 1,3-1 52,-8 1 0,3 0 0,2 1 0,1-1 0,-2 0 0,-2 0 24,-2-1 1,-3 1 0,0 0 0,2 0 0,4 0-40,4-1 0,5 1 0,3-1 0,1 0 0,-1 1 0,-3-1 0,-5 1 0,-3-1 0,-5 1 0,-2 0 0,2 0 0,5-1 0,-4 1 0,4 0 0,3-1 0,1 1 0,0-1 0,-1 1 0,-3 0 0,-4 0-61,5-1 0,-4 1 0,-2 0 0,0 0 0,3 0 48,2 0 1,2 0 0,2-1-1,0 1 1,-3 0 0,-3 0 30,9 0 1,-4-1-1,-1 1 1,0 0-19,1 1 0,0-1 0,0 1 0,0-1-19,0 1 1,0-1-1,0 1 1,0-1 18,0 1 0,0 0 0,0 0 0,0 0 0,1-1 0,-1 1 0,0-1 0,0 1 0,0 0 0,-2 0 0,2 0 0,4 0 0,-10 0 0,4 0 0,2 0 0,0 0 0,-2 0 0,-2 1 0,-2-1 0,-3 0 0,0 1 0,1-1 0,5 1 0,2-1 0,5 1 0,4-1 0,0 0 0,0 0 0,-4 1 0,-5 0 0,-3-1 0,-3 1 0,-3 0 0,1 0 0,3 0 0,1 0 0,3 0 0,1 0 0,1 0 0,-3 0 0,-3 1 0,9-1 0,-4 1 0,0 0 0,-1-1 0,2 1 0,0 0 0,0 0 0,0 0 0,0 0 0,-1 0 0,1 0 0,0 0 0,-1 0 0,1 0 0,-1 0 0,0 0 0,0 0 0,0 0 0,0 0 0,0 0 0,-2 0 0,0 0 0,1 0 0,4 0 0,-8 0 0,3-1 0,2 1 0,1 0 0,-2 0 0,-2 1 0,-3 1 0,-2 0 0,-1 1 0,3 0 0,4-1 0,3-1 0,5 0 0,4-1 0,0 0 0,0 0 0,-3 0 0,-6 1 12,-3 1 0,-4 1 0,-3 0 0,2-1 1,6 1-1,2-2 1,5 1 0,4-1 0,1 0 0,-2 0 0,-2 0-1,-6 0-12,-3-1 0,-4 0 0,-2 0 0,1 1 0,2 0 8,1 1 1,2 0 0,1 1-1,1 0 1,0-1 0,-1 1-9,0-1 0,0-1 0,0 0 0,0 1 0,-1-1 0,-3 1 0,1 0 0,-4 1 0,-1-1 0,3 1 0,4-1 0,2 1 0,5-1 0,4 1 0,1-1 0,-2 0 0,-2 1 0,-6-1 0,-3 0 0,-5 0 0,-2-1 0,2 1 0,5 0 0,2 1 0,6-1 0,3 1 0,0-1 0,0 1 0,-4 0 0,-5-1 0,11 1 0,-7 0 0,0-1 0,3 1 0,-12-1 0,2 0 0,1 1 0,1-1 0,-1 0 0,0 1-18,10-1 0,1 1 0,-1 0 0,-1 0 0,-3 0 18,1-1 0,-3 0 0,0 0 0,6 1 5,-11-1 1,4 1-1,3-1 1,1 1-1,-2-1 1,-2 1-1,-5-1-5,10 1 0,-7-1 0,0 0 0,3 0 0,1 0 0,2 1 0,1-1 0,-1 1 0,-4-1 0,-4 0 0,-2-1 0,-2 1 0,1-1 0,2 1 0,0-1 0,1 1 0,-1-1 0,0 1 0,1 0 0,-1-1 0,0 1-23,2-1 1,-1 0 0,1 0 0,-1 0 22,0 1 0,1-1 0,-1 1 0,0-1 82,0 0 1,-1 0-1,1 0 1,4 0-65,1 1 0,4-1 0,2 1 0,-1 0 0,-4 0 37,1-1 1,-5 1 0,2 0-1,5-1-55,-10 1 0,4-1 0,3 1 0,1 0 0,-1-1 0,-3 1 0,-4 0 0,9 0 0,-5 0 0,-1 0 0,3 0 0,1 0 0,3 0 0,1 0 0,-2 0 0,-4 0-23,-1 1 1,-4-1 0,-1 0-1,0 1 23,2-1 0,-1 0 0,1 0 0,0 1-94,0-1 1,-1 1 0,1 0 0,0-1 93,-1 1 0,1-1 0,-1 1 0,0-1 0,0 1 0,1 0 0,-1 0 0,0 0 50,-1-1 1,-1 1 0,0 0 0,4 0-51,3 1 0,4 0 0,1 0 0,-1 0 0,-3 0 37,-1 0 1,-3-1 0,1 1 0,5 0-38,-11 0 0,6 0 0,2 1 0,1-1 0,-1 1 0,-3-1 0,-5 0 0,9 1 0,-5-1 0,-1 0 0,6 1 15,-1 0 0,5 0 0,3 0 0,0 1 0,-3-1 0,-6 0-38,1-1 1,-5 1 0,-2-1-1,4 1 41,-2-1 0,2 1 0,2-1 0,-1 1 0,0-1 36,1 0 0,0-1 0,0 1 0,-2 0 0,-1-1 26,1 0 1,-3 1 0,1-1-1,5 0-20,0 0 0,6 0 0,2-1 0,1 1 0,-3 0 0,-6-1-38,1 0 1,-5-1-1,-1 1 1,6-1-23,0 1 0,6-1 0,3 0 0,0 0 0,-4 0 0,-5 0-85,1-1 1,-6 0-1,-1 0 1,4 0 84,-1 1 0,2-1 0,1 0 0,0 0 0,0 0-18,0 0 0,1 1 0,-1-1 0,-1 1 0,-2-1-70,1 0 1,-4 0-1,2 0 1,4 0-71,0 1 0,5 0 0,3 0 0,0 0 0,-3 0 0,-6-1 158,0 1 0,-6-1 0,-1 1 0,3 0 0,-1 0 0,4 1 0,-1-1 0,-1 1 0,-4-1 0,9 1 0,0 1 0,0-1 0</inkml:trace>
+  <inkml:trace contextRef="#ctx0" brushRef="#br0" timeOffset="403314">2337 6353 9242,'-4'-12'1079,"-1"-1"-809,1 2 0,1 0-180,0 1 0,3 2 180,0 3 989,0 0-1169,0 22-90,17-14-90,-13 52 180,28-29-1107,-28 33 1017,23-18 90,-24 0-180,16 0 90,-9 9-90,0-16 90,3 9-90,-7-26-450,1-2 360,-1-11 90,-3-2-89,3-2 1105,0-18-1015,4 14-91,6-52 180,-1 32-45,-2-12 0,0-2 135,3 0-180,3-10 90,-8 19 0,-4 8 0,2 3 0,-5 4 0,4 7 90,-4 2-90,1 5-720,3 20 90,-2 5 1,6 13-1170,3 8 360,1-19 1439,6 7 0,-2-22 0,2-3 0</inkml:trace>
+  <inkml:trace contextRef="#ctx0" brushRef="#br0" timeOffset="403698">3028 6427 9062,'-24'16'270,"-6"0"-270,18 16-90,-1-7 90,25-3 0,12-11 0,24-4 0,-24-23 0,17 12 180,-36-26 269,29 26 451,-23-24-720,5 16 90,-8-13-270,-8 37 0,0 0 90,0 30-90,0 10 0,0-10 0,0-6 0,0 0 89,0 5-178,0 6 178,0-19-178,0-4 89,0-4 0,0 2-270,0-7-990,0 2 451,0-10-1800,-16-1 2609,-2-5 0,-1-1 0,5 0 0</inkml:trace>
+  <inkml:trace contextRef="#ctx0" brushRef="#br0" timeOffset="404315">3980 6009 9152,'-19'-3'1259,"-9"1"-989,-10 2-180,-4 16-90,9-11 0,0 30 0,0-19 0,3 20 0,2-7-535,7 3 445,8 0 90,-1 11-90,12-12 85,-6 15 5,28-25-90,-16 3-91,35-15-179,-14-5 360,21-19 0,-9 11 0,-14-23 0,-4-5 0,4 4-910,-3-34 910,-3 22 90,-14 0 0,6-1 359,-9-13-359,0 16 644,0-19-644,-20 32-90,15-9 180,-27 23 180,30-1-270,-10 25-180,12 12 90,0 13 90,0 25-90,0-17 409,0 15-499,0-16-180,20-2-90,-14 1-539,30 10 269,-13-14 91,7 4-181,3-19 180,-10-8-304,13-5 394,-10-6 90,9-4 270,-5-19 360,-9 12 1259,4-27-1079,-16 15 449,1-14-89,-9 4-810,1 32 0,-2 4 254,18 31-1154,1-6-89,17-4-181,-4-13 490,0-7 680,-8-10 0,-4 0 0,-7 0 0</inkml:trace>
+  <inkml:trace contextRef="#ctx0" brushRef="#br0" timeOffset="404598">4450 6293 8972,'6'0'180,"-1"0"-180,0 0 0,4 14 0,-3 2 0,4 1 0,-4 6-180,0-20 0,1 18 90,-3-19 0,3 8-360,-5-4 450,2-5 0,-2 5 0,0-22 0,0 12 180,0-25-180,1 8 180,0 3 540,2-13-720,0 20 270,3-5-180,-1 8-180,6 8 180,-4 0-90,5 16-450,3 1 90,-1 2-899,13 10 179,-7-11 1080,6 1 0,-5 3 0,0-12 0</inkml:trace>
+  <inkml:trace contextRef="#ctx0" brushRef="#br0" timeOffset="404931">4952 6245 9242,'-22'18'449,"5"-2"-538,17 17 89,0-7 0,0-3-180,23-10 270,-3-6 0,17-7 89,-11 0 541,-12-16 0,-5-1-541,-9-16-89,0 8 270,-17 9-360,13 34 0,-12 3 0,16 27 0,23-11 0,-17 7 0,31 0-90,-18 18 0,0-17-405,-6-12 1,-1-1-316,-10 1-2248,9 17 3058,-11-31 0,-24 3 0,-6-19 0</inkml:trace>
+  <inkml:trace contextRef="#ctx0" brushRef="#br0" timeOffset="405063">4235 6157 10951,'-1'-48'360,"0"2"-495,27 17 0,8 2-405,12-14-2322,-3 19 1,9 0 0,-4 4 2861,-2 2 0,-1 2 0,18-3 0,0 2 0,-17 9 0,1 0 0</inkml:trace>
+  <inkml:trace contextRef="#ctx0" brushRef="#br0" timeOffset="406901">12988 6290 8792,'0'-38'1259,"0"5"-989,0-3-90,0 3 0,0-4 90,0-2 90,0-1-271,16-1 91,-12 0 90,11 0 90,-15-9-180,0 13-180,0-12 0,0 25 0,0 2 630,0 11-630,0 32 0,0 10 0,0 18 45,7-3 0,3-1-135,9 7-45,-1-2 0,3 0-225,8-1-135,-8-11 0,-1 1 46,6 5-91,-7-8 0,0-2-892,2 5 982,2 8-855,-10-8 945,-6-11 5,-1 13 265,-6-20 360,-20 3 180,-6-14 0,-24-3-270,11-5-90,-1-2 269,14-20-89,-1-7 0,13-28-270,1 7 0,23 9 0,4 0 184,-8-13-409,21 15 0,3 1-405,-4-16 315,1 26 1,2 0-406,16-23 720,-13 18 0,0 0 0,17-12 0,-19 16 0,1 1 0</inkml:trace>
+  <inkml:trace contextRef="#ctx0" brushRef="#br0" timeOffset="407247">13552 5848 8612,'19'7'630,"3"-2"-540,1-23-180,16 14 180,-12-30 90,12 29-1,4-24 1,-20 14 90,1-8 0,-12 4-270,-7 6 270,-1 2 90,-4-4-180,0 6 269,-17-3-89,-3 8-270,-20 1-90,19 18 0,-16-12 90,33 29 0,-25-28-90,26 32 90,-8-20-90,11 21-1079,54-13 359,-14-7-186,5-11 1,2-3 275,-12-3 1,-1 0-703,4 1 1,0-2 1331,3-9 0,0-1 0,1 9 0,0-1 0,1-7 0,0 0 0</inkml:trace>
+  <inkml:trace contextRef="#ctx0" brushRef="#br0" timeOffset="408515">21917 5356 11400,'-6'-4'450,"0"3"270,3-3-360,0 2-360,0 1 90,2 15-90,-1 14 0,2 8 0,0 8 0,0-8 90,0 3-90,0 16 0,16-16-270,-12 12-90,11-13 270,-15-11 0,11 7-270,-9-21-90,9 0 450,-11-26 0,11-4 0,-3-22 0,21 2 0,-9 15 0,19-9 0,-12 22 90,6-6 90,-3 9-90,-9 6 90,6 14-90,-16 4 0,0 18-90,-9 3 0,-23-6 0,16-2 0,-42-11-360,11 5-90,-11-8-1888,-15 2 899,28-13 1439,-15-3 0,32-3 0,-1 0 0</inkml:trace>
+  <inkml:trace contextRef="#ctx0" brushRef="#br0" timeOffset="408847">22400 5746 8702,'7'12'810,"2"-3"-631,1-3 91,10-5-270,-2 5 180,17-6-90,-13-17 90,20 2 0,-23-18 270,8 6-270,-20 3-180,-3-3 269,-4 11-89,-21-1-180,-5 10 0,-14 23 0,16 8 0,0 13-270,22 9-449,-8-18-271,33 10-269,-17-17-630,47 0 1889,-29-5 0,31-7 0,-12-2 0</inkml:trace>
+  <inkml:trace contextRef="#ctx0" brushRef="#br0" timeOffset="408981">23175 5998 10861,'2'16'90,"1"-3"-1709,1-6 0,1-5 1619,4 5 0,-1-3 0,3 2 0</inkml:trace>
+  <inkml:trace contextRef="#ctx0" brushRef="#br0" timeOffset="411314">28632 5563 9332,'0'-8'899,"0"1"-89,0 1-361,0 1 631,0 2-900,0 15 0,0 6-180,0 10 0,0 6 0,0-3 0,0 8 0,0 3 0,0 3 0,0-10 0,0 0 90,0 19-90,-1-10 0,2 1 0,8 4 0,-8-9 0,0 0 0,8 2 0,-9 23 0,0-32-90,0 4 90,0-18-90,0-5-720,0-4 630,-12-21 0,9-13 0,-9-13 180,12-9 0,0 5 0,0-5-90,0-18 90,0 17 45,9 14 0,1 1 405,-6 5-360,31 4-90,-18 18 90,17 23 0,-10-14-90,-3 35 0,-14-20 0,6 18 0,-9 8 0,4-10 90,-6 22-180,-2-25-90,-16 5-270,12-13-269,-12-5-271,-1-3-89,13-6-1962,-26-2 3041,12-6 0,0 0 0,3-2 0</inkml:trace>
+  <inkml:trace contextRef="#ctx0" brushRef="#br0" timeOffset="411782">29057 5626 9871,'5'16'1350,"0"-12"-1171,-2 25-89,2-26-90,0 29 0,2-14 0,-1 17 180,5 5-180,-3-9 0,5 9 0,-5-11 0,-2-2 90,1-3-90,2 7 0,-1-9 0,0 10 0,-2-13 0,-3 8 0,0-12 0,-3 5 0,0-1 0,0-6 0,0 5-90,0-10 180,0 1-270,0-6-89,0-13-451,0-3 720,0-8 0,0 8 0,0 5 0</inkml:trace>
+  <inkml:trace contextRef="#ctx0" brushRef="#br0" timeOffset="412431">28452 6081 8522,'-20'-16'990,"15"1"-721,-31 1 91,13-5-270,3 8 270,-32-3-270,32 11-90,-40 21 0,30-13 0,5 20 0,2 5 0,-2-5 0,-3 31 0,15-11 0,6-12 90,4 16-180,3-25 90,21 4 90,3-14-90,21-8 90,-2-17-180,-1-15 90,-9-10-45,-14 7 0,-2-1 45,0-13-1270,5-16 1180,-12 11 90,-2-2 0,-4-3 0,-3 0 180,-1 0 180,0 1-225,-10 16 0,-4 1 45,-9-15-45,1 14 0,-1 1-135,3 3 539,-7-4 181,24 24-720,-8 27 90,11 21 0,0 16-135,7-10 0,4 1 135,7 14-420,-8-17 0,3 7 0,-1-5-194,5-8 1,-2 0-781,2 31 0,-1-2 0,10-5 1304,-14-22 0,0 0 0,3 9 0,1-2 0</inkml:trace>
+  <inkml:trace contextRef="#ctx0" brushRef="#br0" timeOffset="416015">5310 8172 9871,'16'-11'630,"1"2"-630,18 9 0,-11 0 90,1 0 0,-6 0-90,1 0 0,2 0 90,2 0-180,1 0 180,4 0-90,1 0 0,6 0-90,2 0 180,3-14-409,1 11 409,3-12-90,-10 8 0,1 0 0,22-6 0,-20 5 0,2-1 0,3 0 0,-1 0 0,-8 3 0,1 1 45,25-3 0,0 0-381,-23 0 1,1 1 335,26 1 0,1 2-1088,-26 1 0,-1 0 1043,13-1 0,2 1 45,-2 2 0,-2 1-124,-10-2 1,1 0 123,25 2 0,0-1-350,-26 0 0,-2-1 350,11 2 0,0 0 0,18-3 0,-2 1 0,0 0 0,-1-2 0,-3 1 0,0-1 0,-17 1 0,0-1 0,23-1 0,-9 0 0,0-1 0,-24 2 0,1 0 0,26-3 0,1-1 45,-23 3 0,-1 0-45,12-2 0,0-1 0,-12 4 0,-2 0 0,2-1 0,0 0 0,-1 0 0,2 0 0,18-2 0,0 0-45,-13 2 0,0-1 45,4 0 0,4-1 0,-5 1 45,-5 1 0,0 0-45,25-3 0,-1 0 0,-29 3 0,-1 1 0,9-1 0,0 1 0,-3 0 0,-3 1 0,23-3 45,-13 2 0,0 0 226,7-1-316,-9 1 0,0 0 135,7 0-135,5 1 0,-1 0 135,4-1-90,-2 2 0,1 0-90,-3-1 90,-6 2 0,-1 0 90,9-1 246,-21 2 1,0 0-337,14 0 0,1 0 255,-2 0-255,-16 0 0,0 0 0,20 0 0,-10 7 0,-1 0 0,8-3 0,-9 7 0,-1-1 681,8-8-681,12 6 0,-20-8 0,-3 8 0,-2-6 0,14 12 0,-13-9 72,22 10-522,-28-7-270,18 8 271,-25-7 1554,4 5-1554,-14-6 89,-2 1-90,-2-3-40,0 1-320,-3-3 859,0-1 0,-2-2 0,0-1 1</inkml:trace>
+  <inkml:trace contextRef="#ctx0" brushRef="#br0" timeOffset="416397">11047 7662 9242,'0'-6'809,"14"1"-539,-10 3-90,23-3-90,-11 4-180,15-1 270,-6 2-180,14 0 0,-16 15 0,22 0 180,-20 2-90,6 4 0,-12-19 180,-2 19-181,-4-19 1,2 26-90,-8-18-90,0 26 1,-5-16-631,-25 29 0,-12-12-501,11-11 0,-1 1 771,-3-4 1,1 1-226,4 0 0,0 1 675,0 2 0,-1-1 0,0 2 0,-1-1 0,1 0 0,0 0 0</inkml:trace>
+  <inkml:trace contextRef="#ctx0" brushRef="#br0" timeOffset="417882">12497 7859 10051,'0'-12'1260,"-17"1"-901,13 2-269,-12 2 0,16-2-90,-11 3-90,-2 2 180,-10 2-90,4 19 0,0-13 0,5 35 0,1-20-90,1 21 90,4 3 0,3-10 0,4 6-180,21-25 180,-15 6-90,38-11-89,-9 3 179,9-6-180,14-22 180,-24 12 90,14-30-90,-22 8-545,-6-10 545,-5-1-77,-12 11 167,6 0-1,-8-8 1,0 11 0,-18-3 0,13 14-90,-32 5 90,21 20-90,-6 19 90,2 9 440,17 12-530,-1-19 0,0 1 0,4 20-1515,9-6 0,0 0 1515,-4 8-45,13-20 0,1-1-95,-15 11 230,16-3-180,-7-3 0,-10-5 1,11-2-181,-14-5-540,0 4 1,-24-12-900,-5 1 719,-14-15-475,4-3 1465,12-4 0,1-25 0,2-6 0</inkml:trace>
+  <inkml:trace contextRef="#ctx0" brushRef="#br0" timeOffset="418314">12912 7852 8792,'9'-9'450,"0"2"-270,2 3 89,-2 1 1,8 3-270,-6 0 90,4 18 0,-4-14 0,-2 34-180,2-21 90,4 31 0,-3-16 0,9 17-90,-7-21-90,4 2 0,-3-19-89,0 2 179,0-12 0,2 5 0,-1-6 180,0-19-180,7-9 90,-8-12 0,8-16 270,-15 20 89,0-10-89,-7 17-90,0 5-90,-1 3 180,0 2 90,0 6-450,0 43-540,20 0-89,-14 24-181,18-29 1,3-3-720,-9 2 1619,29-2 0,-19-3 0,2-6 0</inkml:trace>
+  <inkml:trace contextRef="#ctx0" brushRef="#br0" timeOffset="418715">13807 7720 9062,'-35'0'2249,"-3"0"-2070,6 20-179,0-15 0,12 32 0,0-33 90,6 34-180,5-21 90,-2 34 90,10-21-180,-4 11-89,24-18-91,-14-1-90,35-5 0,-35-3 0,41-8 90,-26-2 91,36-4 179,-23-15 0,21-6 0,-28 2 90,4-19 89,-15 23 1,-8-18 270,-3 12 0,-4-5-270,0 6 0,0-2 89,-16 12-179,12 24-180,-13 9-89,17 22-1081,17-5 541,3-15-2609,19 5 3328,-1-27 0,-8 9 0,-2-12 0</inkml:trace>
+  <inkml:trace contextRef="#ctx0" brushRef="#br0" timeOffset="418998">14168 7727 9062,'-15'19'1799,"2"-2"-1799,30 5 0,-13 9 90,13-16-180,-3 28 180,0-16-180,3 7 90,2-11 0,-17-4 90,14-3 0,-10 1-90,2-9-90,-4-17 90,-4-18 0,0-12-180,0-4-180,0 6 0,0-1-1079,0-17 719,0 17-1258,0-16 1978,0 30 0,0-1 0,0 14 0</inkml:trace>
+  <inkml:trace contextRef="#ctx0" brushRef="#br0" timeOffset="419420">14893 7755 9422,'-17'-21'1349,"12"-8"-1079,-32 26 89,32-22 181,-38 22-540,14-19 0,-12 20 180,4-7-180,13 9 0,4 0 0,1 19 0,3 4 0,8 20 0,1-9 0,7-1 0,27-11-180,7 1 90,17-11 90,-3 0-180,-9-12-90,0 0 181,16-24 89,-15 18 0,-11-23 0,-4-5 0,-1 8 0,-9-11 0,-5-4-90,-2-1-742,-4-16 742,-4 18 180,0-3 0,-23 3 149,-7-15-59,1 15-180,5 11 0,0 1 180,-1 2 449,-4-2-359,0 18-270,26 26 90,10 18-90,4-1 0,3 3-180,-4-4 0,2 1-565,17 15 1,1-2-335,-7 13 179,4-22 1,2 0 899,-6 0 0,-2-3 0,14 14 0,-13-16 0,0 0 0</inkml:trace>
+  <inkml:trace contextRef="#ctx0" brushRef="#br0" timeOffset="419564">15602 7712 7623,'0'17'0,"0"-3"0</inkml:trace>
+  <inkml:trace contextRef="#ctx0" brushRef="#br0" timeOffset="423556">13180 8460 10141,'-4'-2'2519,"0"20"-2429,4 6 0,17 12-180,-12 0 90,26-6-538,-28 4 178,25 1-249,-25 3-201,27 0-179,-26 1-271,25 0-89,-25 0 1349,22 0 0,-23-1 0,9 0 0</inkml:trace>
+  <inkml:trace contextRef="#ctx0" brushRef="#br0" timeOffset="423898">13113 9085 12210,'43'0'450,"2"0"-450,-11 15 90,2-11-90,-11 27 90,0-15-90,-1 16 0,7 14 0,-10-9 0,-4-2 0,-1 1-532,-1 7 532,6 13-90,-3-11 90,-3-14 109,12 2-109,-7-23-270,18-23 90,-13-7-180,8-19-225,-16 8 1,-2-1-225,10-18-496,-7 3 1,0-2 1169,2-8 0,-8 21 0,-1 0 0,3-11 0</inkml:trace>
+  <inkml:trace contextRef="#ctx0" brushRef="#br0" timeOffset="424504">13278 9625 9062,'4'-3'1349,"-1"1"-1079,-1 24-90,-1-4 270,-1 43-361,0-16-525,2-11 0,-4 1 616,-16 26-770,13 5 545,-3-32 0,-2 3 135,1 15 0,1 1-135,0-14 0,-1 2-15,-1 2 0,-1 4 0,1-4-165,2-7 1,0 0-496,-3 20 0,1-1-179,1 2-90,-3 7 952,1-21 1,8-20-1,-4 2 1</inkml:trace>
+  <inkml:trace contextRef="#ctx0" brushRef="#br0" timeOffset="424984">13458 9729 8252,'8'0'450,"-1"0"-270,2 0-90,-2 0 0,0 0 180,-2 0-180,0 0 90,0 0-1,-1 0 1,2 0 0,-3 0 270,2 0 180,3 0-451,0 0-89,4 0 90,0 12-270,1-10 90,5 25 90,0-14-180,4 16 180,1-4-90,16 14-90,-8-8 135,-3-5 0,-1 0-45,7 4-90,-5-5 0,0-1-359,5 5-91,10 8-1079,-5-4 629,-11-8 990,14 14 0,-22-19 0,5 4 0</inkml:trace>
+  <inkml:trace contextRef="#ctx0" brushRef="#br0" timeOffset="426986">13105 10915 7353,'0'7'2788,"16"-9"-2428,-13 30-180,29-24 180,-29 19-360,29-21 90,-20 19 90,16-12-180,5 19-90,-4-10 90,10 6 0,-8-6 0,0 2-450,-1 0-270,0 2-179,-1 0-91,-1 0 990,7 10 0,-12-10 0,6 7 0</inkml:trace>
+  <inkml:trace contextRef="#ctx0" brushRef="#br0" timeOffset="427365">14123 10493 10051,'13'12'900,"-2"6"-810,-11 10 0,0 2-90,0 0 0,0 4 90,0 5-274,-14 5 184,10 2 0,-10 3 0,6-12 0,0 1 0,-10 21-90,1-8 1,-2-1-1281,-9 8 1010,15-22 1,0 1-676,0-2 1,-1-2-585,-4 16 1619,-7 13 0,10-27 0,1-2 0</inkml:trace>
+  <inkml:trace contextRef="#ctx0" brushRef="#br0" timeOffset="428716">13400 10880 8342,'18'-30'810,"-4"-6"-720,-14 8 180,0-6-180,0 9 179,0-3 271,0-13-360,0 10 719,0-33-539,0 34-270,-14-20-90,10 33 0,-10-2 0,7 13 0,5 18 0,-6 13-180,8 12-629,0 20-1,0-20-90,8-4 1,1-1 0,-4 3-271,30 8 1170,-30-19 0,27-2 0,-16-3 0</inkml:trace>
+  <inkml:trace contextRef="#ctx0" brushRef="#br0" timeOffset="428948">13543 10795 8522,'-14'13'0,"3"-2"-90,11 10-180,17-12 270,3-3-359,14-6-811,-15-15 1170,-5 0 0,-14-3 0,0 7 0</inkml:trace>
+  <inkml:trace contextRef="#ctx0" brushRef="#br0" timeOffset="429362">13732 10686 8792,'0'30'270,"0"1"-270,0 0-270,0-2-180,0-4 450,15-11-90,4-7 180,0-21 0,9-6 180,-24-18 90,16 17 0,-18-16-1,6 19 1,-8-12-90,-17 15-270,13 28 0,-12 12 0,16 12 0,0-2 0,0-8 0,0 10 0,0-8 0,0 6-90,16-13 0,-13-2 0,13-3-360,-16-2-89,0-3-91,0-1 630,0-4 0,0-2 0,0-3 0</inkml:trace>
+  <inkml:trace contextRef="#ctx0" brushRef="#br0" timeOffset="429548">13870 10677 9332,'17'0'719,"-6"17"-719,0-13 90,-4 29-180,3-29 0,0 26-359,-3-26-271,-1 22 0,0-22-1258,1 19 1978,-2-14 0,1 3 0,-4-6 0</inkml:trace>
+  <inkml:trace contextRef="#ctx0" brushRef="#br0" timeOffset="429674">13842 10554 7713,'0'0'0</inkml:trace>
+  <inkml:trace contextRef="#ctx0" brushRef="#br0" timeOffset="429983">13923 10542 8882,'13'19'360,"-1"-14"-450,-2 26 180,2-19-90,-1 2-450,3 5 180,-5-17 90,0 14-270,-4-14 1,-1 5 359,-2-7 180,1 0 270,-2-19 449,-1-1-89,0-18-1530,0 8 810,0 32 0,0 16 0,0 31 0</inkml:trace>
+  <inkml:trace contextRef="#ctx0" brushRef="#br0" timeOffset="431098">12928 10915 8522,'-11'0'2609,"2"0"-2429,-17 0-1,3 0 91,5 0-180,-4 0 180,1 0-180,-6 0-90,-5 0 180,-4 0-180,-5 0 90,-3 0-135,8 0 0,0 0 45,-20 0-715,19 0 1,-1 0 714,-14 0-90,0 0-408,1 11 318,-2-8 0,1 19 180,-1-19-180,15 12 0,-1 1 90,-21-4-315,6 5 1,0 2-226,-11-2-488,23-7 0,-1 0 218,-12 1-179,3-5 916,6-2 1,6-2-1,4-2 1</inkml:trace>
+  <inkml:trace contextRef="#ctx0" brushRef="#br0" timeOffset="431649">11742 10519 9152,'-44'15'1529,"6"-11"-1529,15 23 0,-3-24 0,24 20-90,-17-12-630,17 9 181,-4-4-901,30-7 811,3-4-361,16-5 990,-6 0 0,-8-15 0,1-5 0</inkml:trace>
+  <inkml:trace contextRef="#ctx0" brushRef="#br0" timeOffset="432354">11732 10072 9781,'-25'-22'270,"2"3"90,-1 0 270,12 8-630,1 25 0,31 16 45,-7 3 0,1 3-45,11 21 45,-1-24 0,0 1-45,-7 1 0,1-1-45,4-7 0,1 0 45,6 15 0,-1 0-730,2 3 505,-11-16 0,0-3-69,4 6-65,-1-5-181,-5-5 270,-1-5-180,-4-4-179,-2-4-541,-3-5 1080,-2-22 574,-2-7-34,-3-12-180,0 4 0,0 7 539,0-5 540,0 2-1169,13 8-90,1 23 0,10 17-90,-2 15-90,2-3-90,-4-12 0,3 3-179,-4-20-91,1 6 270,1-8-180,11 0 360,-9-14 0,14-5-90,-21 0 540,4-12 0,-13 13 0,-2-12-271,-4 8 181,-15 10-360,11 22 0,-11 7 90,14 9-180,12-10 180,-9-21 0,10-10 90,-13-11 180,0 4-360,0 26 0,20-9-180,-15 34-989,28-14 269,-15 1 91,8 5-361,3-19 1170,-6 8 0,3-10 0,1 0 0</inkml:trace>
+  <inkml:trace contextRef="#ctx0" brushRef="#br0" timeOffset="432649">12760 10340 9961,'-33'0'720,"2"0"-810,18 13-90,3-1-90,27 4 270,4-8 360,10-25-90,-12-2-450,-8-9-989,-11 26 449,0 14-90,17 6 810,-13 7 0,13-23 0,-17 7 0</inkml:trace>
+  <inkml:trace contextRef="#ctx0" brushRef="#br0" timeOffset="432832">12468 10073 9691,'0'-16'1530,"0"0"-1351,0-4 91,23 5-270,2-5-90,2 11-1079,12 0 90,-22 8-540,6 27 1619,-10-3 0,-13 28 0,0-7 0</inkml:trace>
+  <inkml:trace contextRef="#ctx0" brushRef="#br0" timeOffset="434132">11803 11028 7803,'-25'0'809,"3"0"-539,3 0 0,4 0-180,4 0 0,-1 0 0,0 0 0,-1 0 0,-8 0 179,2 0-89,-6 0-90,4 0 0,0 0-90,-3 0 90,-13 0-180,9 15 270,-22-12-270,23 11 270,-19-14 0,21 0-180,-21 0 0,20 0 0,-13 0 180,-6 0-90,6 0-45,5 0 0,-2 0 135,-14 0-1477,-15 0 1297,13 0 90,-2 0-180,-2 0 90,12 0 0,0 0 45,10 0 0,-1 0-45,-25 0 0,-1 0 45,25 0 0,0 0-45,-28 0 0,0 0 0,26 0 0,2 0 0,-15 6 0,1 0 0,14-4 0,2-1 0,-2 5 0,0 0 44,-1-1 1,0-2-90,-2-2 1,1 0 44,-1 6 0,-1 0 0,1-6 0,-3 0 0,-18 7 0,-1 2 0,14-6 0,-2 0 0,-5 2 0,-5 1 0,5 0 0,2-1 0,3-1-768,5-1 1,-2-1 0,3 1 812,-5 0 0,3 0 45,-2-1 0,0 0-281,2 0 0,-1-1 236,-18 1 0,1 0-45,15-2 0,0 0-319,-2-1 1,-3 1 0,4 0 318,7-1 0,1 0 0,-24 0 0,3 0 45,27 1 0,2-2-90,-8-5 0,-1 0 90,4 4 0,3 0-135,-18-10 90,10 6 0,0 2 90,-3 2 0,-12-15 711,21 16-711,3-10-90,2 10 0,-10-11 0,11 7 90,-20-8-90,23 8 0,-20-3 0,19 4 0,-7 0 0,9 1 0,0 0 90,-1 1-90,-13-2 0,8 2 0,-26-1 89,21 1-89,3 1 0,0 1-89,-10-2 89,-15 2 0,16-2 0,-2 2 2232,-1-2-2277,13 1 0,0-1 45,-17 0 0,7 1 0,0 0 90,-5 0-90,8 1 0,1 0-90,-2 0 0,-7 0 296,22 0-566,7 0 1654,7 0-4892,3 0 3631,25 0 0,4 0 0,19 0 1</inkml:trace>
+  <inkml:trace contextRef="#ctx0" brushRef="#br0" timeOffset="434599">6668 10803 11311,'-29'0'629,"-2"0"-629,7 0 180,-4 0-90,1 0-90,-1 0 0,-5 0 0,-2 0 0,-2 0 90,-3 12-90,4-9 0,-2 9 0,4-1 0,-4-1 0,11 2-90,-4 8 90,19-12 90,0 12-270,7-6 0,3 1 0,0 2 0,1 10 180,1-4-539,21 16 89,-16-15-315,26-5 1,6-3-316,0 3-531,2-8 0,3-2 1611,22 3 0,-28-8 0,0 1 0,3-2 0,-1 1 0</inkml:trace>
+  <inkml:trace contextRef="#ctx0" brushRef="#br0" timeOffset="437450">7710 9752 11760,'-8'18'1170,"-6"-1"-1170,5 23-180,-8 2-3020,-3 10 3020,8-21 0,-2 2-180,-12 24 0,-2 3 0,6-12 1,-1 1-181,-4 7 0,-2 6 1,2-6-46,4-6 0,1 0 585,1 0 0,0 4 0,3-6 0,6-10 0,2-3 0,0 8 0,0 1 0</inkml:trace>
+  <inkml:trace contextRef="#ctx0" brushRef="#br0" timeOffset="437868">7883 10607 8702,'18'-21'630,"-4"-4"-540,-14-14 0,10-15-90,-8 18 134,6 3 1,0-2-45,-7-6 90,7-13 0,-7 18 90,1-1 270,-2 2-91,0-9-449,0 14 90,0-10 0,0 23 540,-14 1-720,10 28 180,-10 15-90,14 13-45,0-4 0,0 0 45,0 15-403,0-15 0,0 0 133,0 15-90,17-2-764,-7-9 0,2 0 134,31 7 990,-21-8 0,1-3 0,14-12 0,-1 2 0</inkml:trace>
+  <inkml:trace contextRef="#ctx0" brushRef="#br0" timeOffset="438138">8245 10420 10681,'-15'19'450,"3"2"-360,12 19-90,17-20-90,-12 14 90,30-30-270,-30 23-90,38-24 0,-24 14 180,22-16-90,-12 5 1,9-6 269,-12-16-180,4-2 90,-19-18 90,-5 3-180,-31 13-90,-7-4-180,-14 22-989,3-7 1439,5 9 0,20 0 0,-3 0 0</inkml:trace>
+  <inkml:trace contextRef="#ctx0" brushRef="#br0" timeOffset="438583">8820 10317 10051,'-51'42'900,"21"-8"-900,-11 1 0,36-8 0,-28 1 0,30 0 0,-11 0 0,14-4-270,0-4 0,0-4-180,25-8 1,-19 1 269,45-8-270,-16-13 450,13 8-336,-2-32 336,-17 17 90,-13-21 90,9 8 0,-21-1 89,10 0 1,-14 1 450,0-7-360,-20 11-90,0-7-1,-16 21-269,17 20 0,5 17 0,14 28 0,20-9 0,5 19 0,-1-25-33,17 13 122,-25-16-89,17-1 90,-12-3 90,2 5-270,-12-10 180,0 7-90,-11-18-270,0 2-89,0-9-1170,-25-1-450,-2-3 899,-23 0 1080,24-24 0,-7 17 0,16-17 0</inkml:trace>
+  <inkml:trace contextRef="#ctx0" brushRef="#br0" timeOffset="438782">9257 10213 10051,'6'16'900,"2"6"-810,-3 10-90,3 13-90,-3-15 90,1 10-810,2 0 181,-1-13-1170,6 12 629,-6-22 1170,3 0 0,-3-13 0,-1-1 0</inkml:trace>
+  <inkml:trace contextRef="#ctx0" brushRef="#br0" timeOffset="438932">9200 10020 9422,'-8'-10'-2699,"-3"4"2699,9 18 0,18-8 0,9 12 0</inkml:trace>
+  <inkml:trace contextRef="#ctx0" brushRef="#br0" timeOffset="439249">9573 10224 9332,'10'16'809,"2"0"-449,0-1 0,0 0-270,8 6-180,-6-5 180,9 10-180,-11-9 180,2 1-90,-4-1 0,-5-8-630,1 4 630,-5-30-90,-14 14 90,9-41 90,-10 23 360,14-39-180,0 20 359,0-23-359,0 31-90,17-4-90,2 25-180,15 5 0,-16 25-540,9-1-539,-23 20-270,19-1-1108,-21 2 2547,8 7 0,-10 0 0,0 3 0</inkml:trace>
+  <inkml:trace contextRef="#ctx0" brushRef="#br0" timeOffset="440715">1790 11132 9961,'0'-20'990,"0"1"-630,0 2 89,0-4-89,0 7 90,0 0-360,0 29-180,19-12 180,-15 49-90,34-30 0,-33 29 0,24-6 0,-26-12 0,18 17-270,-18-25 90,14 3-270,-13-9 270,5-12-359,-3 4 449,-2-11 90,1 2 0,1-15 0,3-10-90,7-18 90,-1 5 90,2-1 270,9 13-181,-8 0 181,18 11-180,-14 3-180,19 29 90,-16-14-90,9 37-90,-13-22 90,1 22-90,-3-8-629,8 15-1,-8-13-1349,10 17 810,-13-35 1259,2 7 0,-5-24 0,-1 5 0</inkml:trace>
+  <inkml:trace contextRef="#ctx0" brushRef="#br0" timeOffset="441099">2272 10729 9871,'-23'-23'1080,"-2"4"-271,22 9-179,-11 5-360,12 18-270,-5 18 90,31 10 0,-18 13-45,13-18 0,3 1-338,3 21 293,-4-6 0,2 0 0,-4-22 0,0-1-135,13 26 0,-2-1-224,3-5 89,-2-10 0,-1-3 0,-3-13-360,8 0 360,-15-16-89,0-3 89,-7-4 180,-2-15 180,-1 11-180,2-26 90,-2 10 202,2-17-22,-5 16 270,3-10-180,-4 21 90,3-5-270,-3 7-90,2 8 90,1 0 0,8 17-90,-5 5 0,13 24-90,-9-8-630,17 16 0,-14-22-557,11 7 467,-8-18-193,3-10-76,3 1 1079,-1-11 0,3 4 0,-1-5 0</inkml:trace>
+  <inkml:trace contextRef="#ctx0" brushRef="#br0" timeOffset="441402">3142 11203 10141,'-17'-10'900,"1"2"-900,-3 26 0,-2-14 90,19 29-180,-7-12 90,9 14-90,21-14-270,-16 4 0,35-17 270,-12 2 90,8-3-90,0-7 90,-7 0 270,-6-15 630,-6-6-810,-8-12 89,-23 3-179,10 30-989,-10 12-450,30 26-270,1-2 1709,19-6 0,-2-13 0,5-8 0</inkml:trace>
+  <inkml:trace contextRef="#ctx0" brushRef="#br0" timeOffset="441768">3493 11249 10321,'2'17'1799,"15"5"-1709,-13 21-180,24-3 180,-25-5-90,24 2-90,-9 13 180,0-12-974,8 8 974,-23-17-24,15-5 24,-17-3-630,10-1-359,-9-9 449,2-17 180,-4-19 180,-15-12 0,11-8 90,-10 4 599,14-5-599,0 11 0,0 0 90,0-19 270,0 11 0,0 1 0,0 0-91,16-7 91,-12 26 0,26 8-231,-11 6-129,15 6 0,-1 21 0,-14 8-90,4 22-270,-16-9-516,4 1 67,-6-15-361,-5-3 1,0-1 1169,-23-4 0,17 1 0,-18-3 0</inkml:trace>
+  <inkml:trace contextRef="#ctx0" brushRef="#br0" timeOffset="441956">2725 10988 9691,'-4'-27'1080,"1"1"-630,3 2-360,24 2-1,-18 2-89,41 2 90,-28 3-180,22 3 1,-8 4-901,15 4 91,-8 2-226,-8 17 1,-1 6 1124,4 5 0,-12 3 0,-2 2 0,6 12 0</inkml:trace>
+  <inkml:trace contextRef="#ctx0" brushRef="#br0" timeOffset="442099">3308 11961 10771,'4'9'0,"1"-2"0,-1-4-810,5-1-449,-1-2 1259,17-21 0,-6-5 0,11-21 0</inkml:trace>
+  <inkml:trace contextRef="#ctx0" brushRef="#br0" timeOffset="442466">4108 10883 10591,'5'-4'2069,"2"1"-1709,-1 1-181,1 2-179,-1 20 0,-2-15 0,0 39 0,1-23 0,2 24-629,6 9 89,-1-11-830,4 12 650,-2-19 1,0-3-331,1 0 331,-1-3-47,-1-1 226,-4-4-449,-2 4 539,-4-10 1217,-2 3 223,-25-16 358,-2 0-808,-25-23-10,5-3-440,11-22 0,13 8-90,13-3 0,9-6-180,0 7-360,23-10-539,3-4 539,2 13 540,13-11 0,-36 15 0,15 1 0</inkml:trace>
+  <inkml:trace contextRef="#ctx0" brushRef="#br0" timeOffset="443078">4245 10659 8522,'-29'-1'2878,"12"17"-2428,6 6-360,31 22 0,-15-10 0,33 5-180,-33-9 180,34 1 0,-34 2-180,37-2 90,-36 1 0,33 2 0,-35-2 90,29 1-180,-29-2-450,21 8 271,-14-10-181,6 10 180,-7-23-809,-2 1 1079,-7-29 0,2-5 179,-3-22 271,0 4 450,0 3-900,14 15 0,5 8 0,-1 27 0,9-13-180,-12 30-270,7-15 0,-2 0-809,3 7 629,-6-16-269,15 2 449,-13-6 0,10-7 630,-14-17 540,1 12 269,-8-28-179,-5 13-270,-1-15-91,-20 3 1,13 8 180,-29 11-450,15 8-180,-1 22 90,6 0-180,14 16 180,0-6-180,21-12 180,-15 5-1,29-18 1,-20 5-180,13-7 90,-14-19-359,-3 4-451,-28-17-269,-2 11-360,-15 8 1439,4 5 0,5 8 0,3 0 0</inkml:trace>
+  <inkml:trace contextRef="#ctx0" brushRef="#br0" timeOffset="443649">4783 11052 9781,'18'0'1080,"1"0"-1080,-9 0 0,2 0 0,-3 0 0,1 0 90,1 0-180,-1 12 0,0-9-180,0 19-180,-3-20 1,1 18-1,-3-18 180,1 15-809,-3-16 1168,0-9 451,-2-11 0,-1-18 359,0 2 1,0 5-900,16 27 0,-12 15 0,24 24-450,-16-16-449,14 16 269,-7-19-449,15 3 989,-15-7 90,13-13 90,-19 0 539,-1-16 1,-8-4-180,-3-16 269,-20 1-629,15 4 0,-29 13-180,29-1-90,-11 33-90,31-17-89,2 35 359,19-17 90,-1 4 0,-15 1-1,9-18 181,-26 12-90,19-13 0,-20 10-90,13-6 0,-14 5-90,4 4 0,-6-3-90,0 13-180,0-8-269,0 5-91,-16-7-360,12-2-89,-11 0 1079,-3-2 0,13-3 0,-12-1 0</inkml:trace>
+  <inkml:trace contextRef="#ctx0" brushRef="#br0" timeOffset="443816">4418 10805 8432,'28'-24'-90,"-4"4"-315,7 7 1,2 4-676,5-1 1080,10 0 0,-20 10 0,-3 0 0</inkml:trace>
+  <inkml:trace contextRef="#ctx0" brushRef="#br0" timeOffset="444216">2698 12300 11041,'19'-3'1619,"3"0"-1439,0 17-180,9-10 0,-27 31 90,38-3-90,-26 10-1163,25 6 893,-22-12 0,1 2-744,-1-3 384,-2-2-288,-1-3 108,-1-2-809,-2 5 899,-5-10 720,-2 10 0,-6-18 0,0 2 0</inkml:trace>
+  <inkml:trace contextRef="#ctx0" brushRef="#br0" timeOffset="444368">2702 12649 9602,'0'-19'1529,"0"0"-1349,0 1-180,20-8 0,11 6-540,28-9-90,-7 15-539,-10 6 0,1 1 539,0 2 630,-4 1 0,-1 5 0,-8 15 0,8 4 0</inkml:trace>
+  <inkml:trace contextRef="#ctx0" brushRef="#br0" timeOffset="444502">3233 12649 8882,'6'13'630,"-1"0"-451,-1 1-89,1 0-90,0-2 0,0-1 0,-1 0 0,0-1-90,1 1-89,0-2-361,2-1-360,-2-2-89,3-1 989,-3-1 0,3-1 0,-2-1 0</inkml:trace>
+  <inkml:trace contextRef="#ctx0" brushRef="#br0" timeOffset="444670">3168 12456 10051,'-7'-2'-1349,"20"1"180,-11 15 1169,29-10 0,-28 10 0,10-14 0</inkml:trace>
+  <inkml:trace contextRef="#ctx0" brushRef="#br0" timeOffset="445038">3470 12533 9422,'14'13'719,"2"-9"-449,0 19-180,1-21 0,7 25-90,-6-14 90,11 23-90,-13-15 0,2 5 0,-6-1 0,-6-8-180,1 4-630,-6-13 810,0-20 0,-17-14 270,13-26 0,-13 7 360,16-14-180,0 25 449,0-14-539,0 26-90,19 2-90,-15 11-180,27 7 0,-15-2 0,-1 21 0,14-12-720,-10 31-180,8-11-2608,7 18 3508,-13-9 0,7-4 0,-8-12 0</inkml:trace>
+  <inkml:trace contextRef="#ctx0" brushRef="#br0" timeOffset="446615">2207 8345 8792,'24'-11'1709,"8"8"-1349,-29-19 90,23 19-1,-22-17 91,23 12-450,-15-12 90,3 10-270,-5-1 0,-10 5 180,-20 3-180,15 18 90,-35-11-180,35 31 180,-34-18 0,34 19-90,-31-7 90,31 2-90,-12-1 90,17 0 0,0-1 0,23-2 0,-18 1 90,48-5-1431,-27 1 1431,29-4-90,-13-1-335,2-2 425,-2-2-90,-1-4 180,-7-1 0,-4-3-180,-8 0 0,-10-1-90,0-3 180,-11 3 1028,4-4-1208,-5 4-630,-24 2 0,-3-1-539,-2 2-1529,-15-3 2882,19-3 1,-2-2-1,8-1 1</inkml:trace>
+  <inkml:trace contextRef="#ctx0" brushRef="#br0" timeOffset="446807">2630 8137 10411,'8'17'1529,"5"-13"-1169,-9 39-90,5-21-180,-3 24-90,5 13-90,-1-12 0,2 4 0,0 1-450,5 1-270,-1-5 1,1-2-1015,2-7 654,8 7 1,-8-18 1169,0-4 0,-3-4 0,-1-1 0</inkml:trace>
+  <inkml:trace contextRef="#ctx0" brushRef="#br0" timeOffset="446969">2617 8619 9152,'-10'-15'629,"3"0"-629,7-1-90,18 0-89,-14-1-1,38 1-180,-19 0-135,8 7 0,3 1-44,13-3 539,-7 5 0,0 2 0,9 2 0,11 1 0</inkml:trace>
+  <inkml:trace contextRef="#ctx0" brushRef="#br0" timeOffset="447302">3187 8496 8882,'-37'0'1439,"1"0"-1349,2 0-90,2 0 0,2 14 0,14 1-90,6 14-90,10-4-270,16-10 1,5 1 179,17-14 270,2 4 0,-18-24 0,9 13 0,-28-28 270,20 13 0,-21-16-91,7 4-179,-25 6-89,-3 12-361,0 25-450,4 9-539,32 16 1439,2-7 0,1-12 0,-4-6 0</inkml:trace>
+  <inkml:trace contextRef="#ctx0" brushRef="#br0" timeOffset="447575">3330 8383 8882,'-18'14'1169,"4"5"-1169,14 19 0,0-5 0,20 2 0,-15-9 0,29-1 0,-31-1 0,21-2 0,-21-4 270,17-1 0,-18-4-180,7-3-180,-9-3-270,0-23 90,0-9-89,-17-13-91,13-1 0,-13 9-270,17-2-1348,-13-12 2068,10 12 0,-9-7 0,12 14 0</inkml:trace>
+  <inkml:trace contextRef="#ctx0" brushRef="#br0" timeOffset="447815">3568 8092 10951,'0'34'899,"18"4"-899,-13-7 0,26 4 0,-28-6 0,25-1-90,-24 2-359,27 0-1,-21-2-270,14-1-89,-9-2-990,3 7 629,-5-11 1170,1 5 0,-10-15 0,-2 1 0</inkml:trace>
+  <inkml:trace contextRef="#ctx0" brushRef="#br0" timeOffset="447954">3525 8442 9871,'-8'-32'720,"6"3"-360,-6 10-360,8 1 90,0-5-270,25 7-540,4-6 91,2 14-1800,28 0 2429,-36 6 0,27 1 0,-22 1 0</inkml:trace>
+  <inkml:trace contextRef="#ctx0" brushRef="#br0" timeOffset="448082">3947 8362 11940,'8'0'-989,"-1"0"-3509,-1 0 4498,-2 0 0,0 0 0,0 0 0</inkml:trace>
+  <inkml:trace contextRef="#ctx0" brushRef="#br0" timeOffset="450833">13833 11453 6453,'0'0'0</inkml:trace>
+  <inkml:trace contextRef="#ctx0" brushRef="#br0" timeOffset="452267">13778 11485 9062,'11'-15'2788,"2"21"-2698,11 16 0,-4 18-90,0 8 0,-4 1-2008,3 6 2008,-1 3 0,1 2 0,-1 0-405,0-1 405,-1-4-269,-2-2-91,-6-17 0,1-1-270,3 19-180,-5-11 1,-1-1-270,-1 3-270,-1 12 1349,-4-22 0,-1-4 0,0-2 0</inkml:trace>
+  <inkml:trace contextRef="#ctx0" brushRef="#br0" timeOffset="452670">13878 12140 9691,'-1'31'1080,"1"6"-900,0-6 0,19 5 0,-14-4-180,28 1 269,-14 16-179,-1-12 0,12 19 0,-12-28 450,8 9-270,-11-21-90,-1 2-180,-11-13 0,5-1 0,-5-4 0,2-25 0,5-10-180,-1-15-585,0 14 1,1-1-586,4-10-359,4-15 1709,3 5 0,-6 17 0,4-9 0</inkml:trace>
+  <inkml:trace contextRef="#ctx0" brushRef="#br0" timeOffset="456033">12822 13576 9781,'0'-6'1619,"3"2"-1619,-3 23 90,-15 24-180,10 2 90,-13 12-89,18-22 89,0-3-900,0 8-629,23-15 539,8 3-269,14-19 1259,0-4 0,-10-24 0,1-4 0</inkml:trace>
+  <inkml:trace contextRef="#ctx0" brushRef="#br0" timeOffset="456282">13063 13051 9152,'-11'-7'1889,"8"21"-1619,14 12-1,8 31-179,5-4-90,-10 8 0,-7-22 0,0 0 0,-4 21 0,8-5 0,-1-1-730,-8 10 280,1-12 0,0 1-796,-3 6 841,0-23 0,0-1-584,0 9-1,0-7 990,0-5 0,15-8 0,4-2 0</inkml:trace>
+  <inkml:trace contextRef="#ctx0" brushRef="#br0" timeOffset="456720">13565 13501 9602,'0'32'1169,"0"-4"-989,-13-6-90,10-2-90,-9 1 0,12 0 0,0 3 0,0 0 0,0 8 0,0-7-180,0 8 0,0-15-360,13 2 540,-3-28 0,5-6-90,-4-5 90,-5-16 0,2 12 90,-1-1 450,-1-7-450,-1 21 180,5-4-270,-4 8 90,5 6-90,-1 0 0,-1 16 0,2-13 0,0 29 0,0-29-270,1 31-1079,3-12 629,-3 1-899,9 9 540,-8-20 1079,5 4 0,-4-8 0,1-8 0</inkml:trace>
+  <inkml:trace contextRef="#ctx0" brushRef="#br0" timeOffset="457019">13880 13658 10411,'0'30'0,"0"5"0,0-7 0,0 1-90,0-10 90,13-3-90,-9-2 0,19-2 180,-20-21 90,7-1-180,-10-22-180,-14 8-539,11 26-721,3 10 721,3 26 719,26-7 0,-15-13 0,14-6 0</inkml:trace>
+  <inkml:trace contextRef="#ctx0" brushRef="#br0" timeOffset="457350">14037 13668 9512,'16'34'359,"7"2"-359,-20-2 0,13-13 0,-14 9-269,9-18-1081,-9 8 1350,3-25 0,-3-12 0,-2-21 360,0-1 0,0 3 90,0 9-360,18 13-180,-13 23 90,29-6 0,-30 28-90,25-27-360,-26 32-809,32-14 179,-22 2 1080,20 7 0,-15-27 0,1 10 0</inkml:trace>
+  <inkml:trace contextRef="#ctx0" brushRef="#br0" timeOffset="457651">14413 13729 8162,'0'34'90,"0"-7"-180,17-10 90,5-8 0,13-9 270,-14-16 0,2 12 360,-20-30-1,13 30 181,-14-33-540,4 16-180,-6-13 0,0 30-180,-12 18 90,9 21-270,-10 18-180,13-20-989,0 23 539,0-26-89,0 5 989,0-13 0,0-4 0,0-2 0</inkml:trace>
+  <inkml:trace contextRef="#ctx0" brushRef="#br0" timeOffset="457866">13793 13158 9602,'0'45'-1889,"21"0"270,3-9 1619,14-14 0,-3-7 0,-6-15 0</inkml:trace>
+  <inkml:trace contextRef="#ctx0" brushRef="#br0" timeOffset="458361">12358 13054 9152,'13'-13'1889,"1"4"-1440,12 4-269,-6 31-90,7 15-90,-8 15 90,-3-10 0,1 0-1443,3 16 1398,-6-18 0,-1-1-135,5 21 135,-9-33 0,0 3-45,4 23 0,0 1-90,-5-21 0,0 1-315,4 28 1,0-2 44,-3-8-270,-1 8 90,-3-27 91,-2-8 30,0-5-481,-2-8 900,0-5 0,0-6 0,-1-3 0</inkml:trace>
+  <inkml:trace contextRef="#ctx0" brushRef="#br0" timeOffset="459099">12387 13124 8612,'-5'-30'360,"2"2"-180,1 5 90,2 4-90,0 0-1,23-4-179,6 5 90,16-2-885,2 5 795,-3 4 90,8-2-90,10 5 0,-29 4 0,2 1 0,3 0 0,2 1 0,25 0 0,2 2 0,-14-1 0,2 0-746,8 0 0,7 2 0,-5-1 746,-4 0 0,2 0-45,-12 0 0,5 0 0,1 0 0,-5 0-45,14 0 0,-1 0 60,-10 0 0,2 1 0,1-2-746,-1-4 0,1-1 1,-3 1 775,9 4 0,2-2-23,-14-2 1,4-3-1,1 0 1,-6 3-216,11 3 0,-1 2 238,2-5 0,5 0 0,-6 4 0,-9 10 0,-1 2 0,11-11 0,-1 5 0,-8 20 0,-5 3 0,-13-18 0,0 0 0,19 20 0,-3 2 0,4-2-90,-12-4 1,1 0 4,7 3-5,-19-12 0,0 0 90,15 6 0,-1-3 0,2 0 0,-17-6 0,1 1 0,16 8 0,-13-2 0,-2 1 0,2 7 0,-11-3 0,-2 1 90,-1 8-90,1 13 0,-12-14 90,-2 2 0,-2-1 0,-1 1 1042,-3-1-1042,-2-3-90,-1 13 90,0-13 2544,0 20-2724,-18-22 180,0 19-1,-4-21-178,-9 9 178,2-1-89,-8-8 0,8-5 0,0-1 0,-8 3 0,3-4 0,-1-1 0,-7 1 0,-4 1 0,-2-1-89,-3 0 133,0-1 1,1 0-45,-4-3-45,8-3 1,-2 0 133,-13 1-422,20-6 1,-1-1 332,-21 3 0,30-6 0,-1-1-45,0 1 0,-2-1-342,-18 2 0,-1-1 387,13-1 0,-2 1 0,-5 0 0,-5 1 0,4-1 45,3-1 0,1 0-15,-7 1 0,-4 1 0,5-1-30,2 0 0,1-1 0,-16 2 0,1-1 0,17-1 0,2 0 0,-1-1 0,0 0 45,-1-1 0,-1 0 45,1 0 0,-1 0-45,-1-2 0,0 1 0,1-1 0,-2 1-45,4-1 0,-3 0 0,3 0 0,-7 1 0,-2-2-30,-3-3 0,-6-2 0,7 2-105,6 2 0,3 0-225,-14-4 1,1-2-561,24 2 0,3 2-250,-29 1 1040,12-7 0,11 10 0,8 0 0</inkml:trace>
+  <inkml:trace contextRef="#ctx0" brushRef="#br0" timeOffset="462315">1168 10592 7443,'0'28'1169,"0"0"-1079,0-8 0,0 2 270,9-3-90,-7 15-180,7-4 0,-9 15-90,0 13 0,9-9-478,-3-1 1,2 2 477,2-17 0,2 0 0,0 13 0,1 3 0,6 10 0,0 0 45,-4-10 0,1 2-768,3 10 1,1 6 0,-1-4 767,-2-2 0,0 1-68,-3-11 1,1 6 0,0 0-1,-1-6 23,1 14 0,-1-2 0,-1-11 0,0 3 0,0-1 30,-3-5 0,0-1 0,-1-2-75,1 5 0,1 0 75,-2 0 0,1 3 0,-2-6-30,-1-9 0,0-1-457,0 8 0,0-1 457,1 5-513,0-6 513,-1-7-180,4 7 180,-3-15 619,1 3-619,-2-16 1917,-1-2-1917,2-1-90,3 4 90,-3-4 1218,10 8-1218,-9-8 856,5 4-946,2-1 90,-4-4 29,8 6 61,-3-7-1,12 10-178,-9-10 178,8 7-89,-16-14 180,9 2-180,-9-5 90,15 1-90,-9-2 0,37-26 45,-14 13 0,3-1-214,-3-6 0,3 0 169,2 5 0,4 0 0,-3 3-45,-4 0 0,1 1-75,9-3 0,6-2 0,-3 2-313,-3 2 0,4 0 275,-2-1 1,10-1 0,0 0 0,-7 2-312,-13 4 1,-3 1 0,4-1 378,14-2 0,8-2 0,0 1 0,-8 2 0,3 1 0,-1 1-23,-11 1 1,6 0 0,-1 0-1,-4 1 23,13 0 1,0 0 21,-13 2 1,5 0-1,0 0 1,-2 0-806,7 1 0,-1 1 1,-1 0 872,-2 0 0,0 1 0,1-1 0,9 1 0,2 0 0,-8 0 0,-8 0 0,-2 0 29,1 0 1,3 0 0,-5 0-114,-9 0 1,-2 0 128,21 0 0,-2 0 45,2 0 195,-25 0 1,-1 0 73,21 0-179,-16 0 270,15-19-360,-28 15 180,10-49-180,-19 29 480,2-29-480,-11 18 89,-1-1-269,-3-3 180,-1-2-90,-2-3 0,0-1 0,-2 9 0,0 0-179,0-21 179,0 4 0,0-1-45,0 20 0,0 0 45,-8-27 0,-1-1-90,7 23 0,0 1 90,-6-12 0,0-2-45,7-3 0,2 2 45,-1 13 0,0-2 0,0-2 0,0-4 0,0 4-45,0 5 0,0 1-90,-4-23 0,1 1 135,1-6-90,-7 16 0,0 1 0,2-6 1341,-1 23 1,-1-1-1252,-8-28 0,3 15 0,1 9 0,0 0 0,-4-5-1363,3 8 0,0 0 1363,-1-4 0,-5-11-16,7 17 16,1 1 0,1 1 545,1 1-635,0 2 270,1 2-180,-6-7 0,3 10 90,-11-11-90,9 17 3383,-6-1-3383,5 6 115,0 5-115,-1-2 90,-11 3-90,6 0 90,-21 1-90,14 1 90,-27 1-90,17 1-826,-15 0 916,10 1-180,-3 0 180,-4 0-45,9-1 0,-1 2-45,9 5 0,-1 1 90,-29-6 0,0 2-90,26 9 0,-3 2 30,-15-9 0,-7-3 0,5 3 15,11 6 0,0 1 15,-13-4 0,-6-3 0,6 1-60,13-1 0,0 1 90,-6 0 0,-5 1 0,4-1-577,1-3 1,0 0 546,-8 3 0,-6 1 0,5-1-1355,1-1 1,2-1 1294,7 0 0,-3 0 0,0 0 30,-3 1 0,-1 0 0,2-1-60,12 0 0,1 0 0,-4 0-433,-7 1 1,-7 1 0,1 0 0,5-1 462,8 0 0,5-1 0,-3 1 0,-12 1 0,-2 1 0,5-1-96,-4 1 0,4 0 96,1 0 0,1 0 0,2 0 0,-1 1 0,-14 2 0,1 1-45,18-3 0,-1 1-135,-1-1 0,-3 1 0,5-1-45,9-1 0,1 0-777,-27 5 1,3 0 1001,10 0 0,16-4 0,3-1 0,11 1 0</inkml:trace>
+  <inkml:trace contextRef="#ctx0" brushRef="#br0" timeOffset="464167">4003 13057 7443,'0'-5'270,"0"1"899,0 1-719,13 15-450,-10 8 90,21 13-90,-21 4 45,9-6 0,1 1-45,-3 23 45,4 0 0,2 2-909,-8-19 0,0 1 909,3 13 0,0 1-90,-3-12 0,-1-1 90,2 1 0,0 0-45,0 2 0,-1 2 0,6 19 0,-1 2 45,-2-15 0,0 2-45,0 5 0,0 5 0,0-5 0,-1-4 0,0 1 30,0 4 0,0 6 0,0-6-75,-1-3 0,-1-2-663,-2-7 1,1 3-1,0-4 753,-1 5 0,0-1-45,-1 0 0,1 0-247,0-1 0,0 2 247,-2-5 0,1 4 0,-1-3 0,1 6 0,1 2 0,-1 3 0,0 5 0,-1-5 0,0-8 0,0-1 0,0 3 0,1 4 0,0-5 0,-2-8 0,1-2 0,2 10 0,1 0 0,1-12 0,0-3 0,7 14-105,-1-17 1,2-2 194,7-5-90,27 6 0,-16-20 0,19 0 0,13-7 0,-10-3 45,-4-1 0,1-1-45,12 0 0,-4 0 0,0 0 76,-23 0 1,-1 0-77,13 0 0,0 0 0,-12 0 0,-2 0 0,2 0 0,-1 0 0,3 0 0,0 0-45,2 0 0,0 0 45,2 0 0,1 0 90,1 0 0,3 0-180,1 0 0,5 0 0,-2 0-45,10 0 0,5 0-74,-9 0 0,6 0 1,2 0-1,-5 0 119,-6 0 0,-3 0 0,3 0 0,-1 0 0,3 0 0,0 0 1,-3 0-294,2 0 0,-2 0 1,-1 0 232,2 0 0,1 0 0,-1 0 30,1 0 0,-1 0 0,0 0-30,0 0 0,0 0 1,-1 0-1,0-1 0,-1 1 0,1 1 60,-2 3 0,0 2 0,4 0 90,-1-1 0,3-1 0,1 1 0,-2 0 0,1 1 0,-1 1 0,4 0 18,-5-1 0,6 0 0,2 1 0,-2-1 0,-6-1-252,5 2 1,-6-1 0,4 0 244,-4-1 1,4-1-1,-1 1 1,-4 1 18,-1 2 0,-2 2 0,-1-3 0,0-5 0,0-2 0,-1 1-99,-1 2 1,0 1 0,2-1 61,14-2 0,3-1 0,-3-1 7,-15 1 0,-3 0 0,3 0 0,10 0 0,2 0 0,-5 0 0,2 0 0,-5 0 0,0 0 0,-1 0 0</inkml:trace>
+  <inkml:trace contextRef="#ctx0" brushRef="#br0" timeOffset="466171">7942 16366 7263,'-11'0'0,"-1"0"0,1 0 0,0 0 90,1 0-180,0 0 90,0 0 0,2 0 0,1 0 90,1 0-90,-1 0 0,2 0 0,0 11 0,0-9 0,2 9 90,-2-11-90,-1 0 0,1 0-90,-2 5 90,2-4-270,1 4-180,-1 0-410,0-1 860,0 4 0,0-2 0,1 0 0</inkml:trace>
+  <inkml:trace contextRef="#ctx0" brushRef="#br0" timeOffset="467182">6973 16353 7353,'27'0'539,"-3"0"-449,-3 0-90,-5 0 90,1 0-90,-1-6 0,2 4 0,2-5 0,1 7 0,1 0 90,2-3-90,13-1 0,-8-2 0,22 0 90,-20 1-90,10 0 0,-11-1 90,0 1-90,13-4 180,-8 2-90,12-3-180,4-3 180,-10 3-135,-4-2 0,1 1 135,9-3-180,17-6 180,-18 5-658,2 1 658,2-2-90,-1 1 0,3 1 0,0 1-45,-12 5 0,0 0 135,21-3-90,-7 4 0,0 1 0,9 3 0,-8 1 0,-1 0 0,9 2-844,-21 0 1,-2 0 843,17 0 0,-1 14-9,1-10 9,-16 3 0,0-1 0,23-6-487,-10 0 0,1 0 577,11 0-135,-12 0 0,1 0 45,11 0 45,-26 0 0,2 0-90,1 1 0,-1-2 135,20-11-90,-8 11 0,0-1 0,7-24-45,-9 24 0,-1 1 135,8-21-90,-22 20 0,0 1 0,14-8-404,-2 3 314,0 4 45,-15-3 0,0 1 45,18 3-641,-8-1 1,0 1 640,9 1-45,-19 0 0,1 0-48,14 0 93,1 0 0,0 0 572,1 0-662,0 0 742,-1 0-652,-14 5 0,1 0 0,17-3-45,-7 3 0,0 0 2795,7 3-2750,-20-7 0,0 0 0,14 8 0,-4-6-89,1-2 89,-1 3 0,-2-4-180,3 0-90,15 0 90,-12 0-135,-10-7 0,-1 0-584,6 3 899,10-10 0,-20 14 0,-2 0 0</inkml:trace>
+  <inkml:trace contextRef="#ctx0" brushRef="#br0" timeOffset="468784">12837 15276 9422,'12'-10'1889,"-9"1"-1889,18 4 0,-19 23 89,14-13-89,-13 42 0,14-22 0,-11 26 0,3-18 0,1 1 0,-1 17 0,-1-7 0,-1-1 90,-2 3-90,3 18 0,-6-34-90,1 2 1,-3-19-91,-17-4-270,-1-48 360,-18 13 90,18-36-90,-12 22-504,27-4 594,-21-5 0,22-3-180,-8-2 180,10 1 0,-1 17 0,2 0 90,18-13-90,-10 13 0,2 3 0,12 5 0,9-1 0,-28 21 180,23 3-90,-16 25-90,2 23 0,-5 2-1658,-15-8 1,-3-1 1117,6 1-180,-31 13-65,30-22 66,-26-3 719,28-5 0,-9-3 0,12-1 0</inkml:trace>
+  <inkml:trace contextRef="#ctx0" brushRef="#br0" timeOffset="469084">13400 15112 9691,'-19'29'450,"14"15"-360,-14-26-90,3 20 0,12-9 0,-11-1 90,15 8-180,0-7 180,24-2-180,4-14 90,27-23-90,-5-14 90,-9 4 0,-20-8 0,-4 0 0,-4 7-90,-1-37 0,-12 32-90,0-3-89,-23 20-1,18-6-720,-42 13 361,14-6-181,-9 8 810,1 17 0,27-13 0,3 14 0</inkml:trace>
+  <inkml:trace contextRef="#ctx0" brushRef="#br0" timeOffset="469387">13725 15071 8522,'-22'17'450,"-11"-13"-360,29 26-90,-10-13 90,14 11-90,0 0 0,26-13 0,-19 3 0,41-16 0,-42 10 0,36-11 360,-36 9 89,32-7 91,-34 4-540,21-3 0,-23 4 0,7 0 0,-34 9-450,-10-4-941,-13 8 851,-3-6 1,13 0-271,-2-1 810,-9-2 0,14-6 0,-6-1 0</inkml:trace>
+  <inkml:trace contextRef="#ctx0" brushRef="#br0" timeOffset="469799">14092 14887 10231,'6'0'540,"-2"15"-450,-1-11-90,-1 28 0,1-14 0,0 18 0,1-2 0,0 3-90,1 3-360,1-1-719,3 14 629,-1-14-899,4 19 719,-5-28 720,1 4 0,-4-15 0,-1-2 0</inkml:trace>
+  <inkml:trace contextRef="#ctx0" brushRef="#br0" timeOffset="469937">14045 15309 8612,'0'-28'720,"0"2"-540,0 6-270,24-8-270,-17 9-90,37-10-90,-15 16-462,8 1 282,3 9 720,-13 2 0,-1 1 0,0 0 0</inkml:trace>
+  <inkml:trace contextRef="#ctx0" brushRef="#br0" timeOffset="470383">14742 15348 9332,'-40'-10'989,"1"7"-989,-3-8 90,10 28-180,1-13 90,19 33 0,-11-33 0,20 37 0,-18-25-450,19 32 270,-5-23-539,29 2 359,3-18 270,27-27 0,-15 13 0,3-40-90,-14 23 180,0-26-45,-9 18 0,-3 0 45,2-19 0,-2 6 0,-2-1 0,-10-9-1651,2 7 0,1 0 1921,-5-6-45,-9 18 0,-1 0 91,6-9-46,-15 4 0,-1 6-270,15-1 179,-28 14 271,29 1-360,-9 37-90,13 13 0,7 3 0,2 1-90,-6 25-90,12-15 0,3-1-752,11 10 32,-4-10 1,3-1 1117,21 2-218,-22-17 0,-1-2 0,14 2 0,1-2 0</inkml:trace>
+  <inkml:trace contextRef="#ctx0" brushRef="#br0" timeOffset="470723">15327 15127 9871,'-35'20'1260,"-12"6"-1080,11-1-180,9 2 0,2-1 0,6-7 0,-1 25-90,20-21 90,0-3 0,0-3-90,0-3-360,25-6 90,-19 2-45,24-8 1,7-2 44,-9 5 225,11-10 0,2-6 135,1-10-940,10 2 940,-22-17-3,-4 31 452,-6-31 181,-11 18-90,-2-12-270,-25 14-90,-5 7 759,1 24-849,-9-11-176,28 29-274,-10-8-180,13 17-89,19-17-181,-15 8-1529,32-21 2339,-12 3 0,-2-6 0,-2-9 0</inkml:trace>
+  <inkml:trace contextRef="#ctx0" brushRef="#br0" timeOffset="471405">15715 14853 11041,'4'21'359,"5"25"-359,-5-25 0,10 43 0,-5-26 0,4 14-359,2-1-91,-4-14-450,5 22 541,-7-29-631,0 15 540,-4-25 91,-3 6-1,0-14 0,-2-1 270,0-4 270,-18-3 720,-3-2-631,-21-1 1,21-20 360,-18-1-360,18-3 0,-2-9 89,0 28-89,20-28-180,-5 13-90,8-7 0,0 4-180,21 4-359,2 6 269,2-3-180,15 9-180,-22 3 630,42 1 0,-29 2 0,18 0 0</inkml:trace>
+  <inkml:trace contextRef="#ctx0" brushRef="#br0" timeOffset="471583">16060 15210 9871,'2'27'-2608,"0"-4"1259,-1 3 1349,2-7 0,0-1 0,1-1 0</inkml:trace>
+  <inkml:trace contextRef="#ctx0" brushRef="#br0" timeOffset="471699">16225 15193 7173,'4'0'0,"0"0"0</inkml:trace>
+  <inkml:trace contextRef="#ctx0" brushRef="#br0" timeOffset="474407">12332 14887 9871,'0'23'2069,"0"0"-1889,17 32-2361,-12 0 2181,11-22 0,0 2 0,-14 4 0,-1 2 0,15 5 0,0 0-509,-14 4 0,1 0 509,15 2 0,2 1-45,-12 0 0,0 1 45,9 1 0,1-1 0,-5-1 0,-2-1-90,1 1 0,0-1 0,-2-2 0,1-1-45,-2 0 0,0-1-90,-1-2 1,-1-2-91,-2-1 0,0-1-180,-2-3 1,0 0-676,-2 8 1,0-1 1169,-1 16 0,0-26 0,0-3 0,0 2 0</inkml:trace>
+  <inkml:trace contextRef="#ctx0" brushRef="#br0" timeOffset="475367">12357 14904 8162,'-4'-7'1260,"2"1"-1260,1 3 269,1 1-179,18 1 0,8-4 180,13 1-360,5-5-339,2 0 429,6-2 0,-4 1 0,4-1 45,-10 3 0,0 0-544,18-5 0,3 0 529,-15 3 0,1 1 0,-1-1-75,9-2 0,3-2-45,-11 4 0,6-1 0,1 0 0,-6 1 0,14-3 0,0 1 45,-11 2 0,5-1 0,0 1 0,-5 1-914,13-1 1,-3 0 958,-8 2 0,3-1 0,-5 2-45,5 0 0,-3 1 90,-1 0 0,0-1 0,0 2 0,2-1-45,-4 0 0,3 0 0,-3-1 0,10-1 0,3 0 0,-12 0 0,5 0 0,1 0 0,-6 0 30,-6 0 0,-4 1 0,4-1-53,9-2 1,6 0-1,0-1 1,-5 1-539,-8 1 0,-4 0 1,2 0 530,13-2 0,3-1 0,-5 0 30,6-1 0,-3 1 45,-1-1 0,0 1 0,-2-1 0,2 1 44,-8 0 1,4 1 0,-3 0-90,5-2 0,1 1 90,0 0 0,5-1 0,-7 3-128,-9 1 0,-1 1 68,-1 1 0,4 0 0,-5 1-30,-7 1 0,-2 1 45,10 0 0,0 0 90,-6 2 0,-2 1-135,20 0 44,-14-2 1,-1 4 45,0 17 4,-9-8 1,-3 4-95,0 20 45,-5-8 0,0 0-135,3 9 1641,12 14-1551,-19-21 0,-2-1-90,13 15 135,-5-5 0,-2 0 45,4 7 442,-11-15 0,-1 0-532,3 13 0,0 1-276,-2 2 276,-2 1 0,-4 3 0,-2 5 45,-6-13 0,-2 2-90,-1-9 0,-1 2 0,1 26 0,-2 0 45,2-23 0,-4 0-685,-9 12 1,-1 0 639,10-14 0,-1-2 45,-8 0 0,-1 0-448,0-2 1,3 1 447,4 30-90,-12-33 0,0 0 90,13 27 0,-8-20 0,-3-1 599,-3 20-644,3-14 0,-1-1 45,-9 3-90,3 12 180,6-25 542,1-2-542,0-4-180,-9 5 180,3-11-90,-22 9 90,10-15-90,0-2 0,-2-2-90,-15 2 866,15-4 0,-3 0-776,-8 2 0,-1 0 398,9-2 1,-3 1-339,-7 2 0,-6 2 0,3-1-15,1-1 0,-1 1-45,-10 1 0,-7 3 0,5-3-538,3 0 0,-2 0 560,11-3 1,-6 1-1,-1 0 1,6-2-896,5-1 0,5-1 0,-3-1 903,-11 3 0,-4 0 0,0-1 0,-1-1 0,-1-1 0,2 0-203,14-2 1,1 0 0,-5 0 194,-8-1 1,-6 1 0,-1 0-1,7-2-288,8 0 0,4-1 0,-1 0 266,-15 1 0,-3-1 0,5-1 0,-5 0 0,4 0 0,0 0 0,0 0 0,2 1 0,1-2-45,2-5 0,1-1 0,2 5 0,0 0 90,3-4 0,0-1-90,2 0 0,1 2-273,1 4 1,1 0 47,4-5 0,0 0-630,-8 1 1,0 1 0,-15 2 1154,23-6 0,4 0 0,11 7 0,0-6 1</inkml:trace>
+  <inkml:trace contextRef="#ctx0" brushRef="#br0" timeOffset="479990">17580 15000 10861,'32'0'360,"-1"-12"-1,-8 9-359,-1-10 90,-3 13-90,1-9 180,4 7-90,3-8 90,22 1-180,-6-2-1241,18-6 1331,-10 2 0,5 5 0,-11 1 0,3 1-90,-10 1 0,1 0 0,13-3 0,2-1 0,6 0 0,-1-1 89,-13 4 1,3-1-90,5 0 0,5-1 0,-4 1-812,-2 2 1,-1 0 811,-7 1 0,3 0 0,-3 0 0,5 1 0,-3 1 0,1-1 0,1 1 45,-1 0 0,0 0-45,-1 0 0,-1 0 45,0 1 0,0-1-90,-5 0 0,2 0 90,12-1 0,0-1-45,-16 2 0,0 0-45,20-3 0,-2 0 135,1-1-233,-23 4 0,-2-1 143,4-1 0,-3 1 0,-5-1 0,-2 3-16,-3-1-74,-2 0-629,6-1 269,-11 1 694,7 0 0,-17 2 0,-1 2 0</inkml:trace>
+  <inkml:trace contextRef="#ctx0" brushRef="#br0" timeOffset="480501">20095 14259 10951,'-5'0'1079,"-1"0"-629,2 0 539,0 0-809,1 14-90,2-1-90,19 16 90,3-9-180,23 6 180,-9-11-180,16 9 180,-16-12-180,9 5 180,1-3-90,-12-2 0,11 9 90,-22-6-180,-4 15 180,-11-7-180,-32 27 90,19-13-194,-21-11 1,-6 1-302,8 6 1,-2 0-77,-5-7 0,-4 1-329,2 4 1,-1 3-1,3-3-618,0-2 1,2 0 1517,-10 8 0,1 0 0,13-12 0,2-2 0,-24 23 0</inkml:trace>
+  <inkml:trace contextRef="#ctx0" brushRef="#br0" timeOffset="482451">18412 13794 8882,'0'49'630,"0"-8"-540,0 7-180,0-9 180,0 20-90,0-13 0,0-10 0,0-1 0,0 2 0,14 16 89,-11-31-89,11 3-179,-14-17 179,0-19 90,0-28-90,0-1 0,0-19 37,0 17 142,0-1-89,0-1 90,0-18-270,0 16 270,0-19 180,0 34 360,14-4-630,-11 22 0,21 3-90,-10 8 0,11 22 0,-6-16 0,0 34-630,-1-9 0,-6 8-89,4 3 89,-9-10 143,1 0-142,-1 0-1,-2-2 0,-1 0 630,-3-4 0,0-1 0,-1-2 0</inkml:trace>
+  <inkml:trace contextRef="#ctx0" brushRef="#br0" timeOffset="482569">18505 14149 8702,'-13'-12'180,"3"-2"-180,10-13-450,0 2-899,23 1 1349,1 5 0,23 5 0,-3 3 0</inkml:trace>
+  <inkml:trace contextRef="#ctx0" brushRef="#br0" timeOffset="482986">18920 13947 8792,'2'17'899,"0"10"-629,3-24-180,-1 27 90,1-15-90,-2 15-90,3-6 0,-1 0 0,3-1 90,0 0-180,-1 0 90,0-3 90,4 8-180,-6-7 90,4 4 90,-7-11-90,0 0 0,0-3-270,-2-2-539,0-3 629,0-23 180,-20 14-90,15-41 90,-15 22 0,3-25-429,12 7 429,-25-3 0,18-22 90,-2 15 0,8 10 0,2 0 0,4-1 540,0-17-540,0 32 90,0-2 180,17 18-360,5 5 0,0 18 90,9-9-180,-28 31 269,19-30-268,-20 42 89,7-27-180,-3 38-180,-4-23-899,4 20 449,-6-25 810,-15 12 0,11-24 0,-11 4 0</inkml:trace>
+  <inkml:trace contextRef="#ctx0" brushRef="#br0" timeOffset="483233">19350 13889 9512,'-32'24'989,"13"-1"-989,7-3 0,12-2-90,0-3-180,0 0-359,0 2-1,0-3-90,0 0-1438,18 2 2158,-13-6 0,27 0 0,-14-6 0</inkml:trace>
+  <inkml:trace contextRef="#ctx0" brushRef="#br0" timeOffset="483359">19193 13652 8072,'-7'-5'30,"25"18"0,13 9 0</inkml:trace>
+  <inkml:trace contextRef="#ctx0" brushRef="#br0" timeOffset="485284">21547 13665 9062,'0'-7'2518,"14"3"-2338,-1 1 0,3 21-90,2-13-90,-16 32 0,16-19 0,-16 18 0,18 8 0,-16-11 0,11 20 0,-12-27 0,3 3-540,-4-16-179,-2-4 629,3-26 0,0 14 90,1-44-90,2 24 90,0-23 0,2 7 0,1 2 0,6-15 0,-4 18 540,10-10-540,-9 29 90,4 2 0,-2 13-90,-1 0 0,0 0 0,1 22 90,-1-16-90,1 41-540,2-11-90,-2 10-1349,4 12 990,-6-27-403,3 4 1392,-3-22 0,0 4 0,1-5 0</inkml:trace>
+  <inkml:trace contextRef="#ctx0" brushRef="#br0" timeOffset="485684">22010 13223 9422,'-11'21'1619,"2"11"-1529,9 14-762,19 5 762,-14-8-180,14 1 180,-1 2-180,-1 15 180,4-16-135,-9-11 0,0-1-45,1 1-141,8 12 51,-9-26 201,1 3-380,-10-13-271,2-4 630,-3-23 342,-2-5-342,0-23 0,-12 22 449,9-15 181,-9 23-630,30-4 0,-14 26 0,28 14-270,-17 20-899,9 1 359,-10-8-1169,3 4 1979,-10-19 0,10 2 0,-7-8 0</inkml:trace>
+  <inkml:trace contextRef="#ctx0" brushRef="#br0" timeOffset="486096">22422 13718 8252,'-16'13'720,"-3"-10"-720,17 19 0,-9-20 90,10 17 0,-7-17-90,7 20 0,-3-5 0,3 4 90,0 4-360,1-14 90,16 1-180,-12-7 90,29-3 180,-16-2 90,4-14 0,4-4 90,-15 0 450,4-12 270,-7 11-541,-7-12 91,0 7-360,0 27 0,0 11-180,0 24-719,0 0 449,0-3-90,16-14-719,-13-1 1259,26-18 0,-19 6 0,10-8 0</inkml:trace>
+  <inkml:trace contextRef="#ctx0" brushRef="#br0" timeOffset="486266">22642 13799 8162,'7'0'180,"5"0"-180,-4 18 0,5-1 0,-6 4-360,5 3 1,-5-9 179,3 1 0,-4 2-270,0-16-90,-2 6 26,1-8 514,-2 0 0,-1 0 0,-1 0 0</inkml:trace>
+  <inkml:trace contextRef="#ctx0" brushRef="#br0" timeOffset="486384">22745 13809 8072,'0'-27'1440,"13"11"-1440,-9 21 0,20-2-720,-21 26 270,19-9-989,-13 19 273,3-7 1166,-1-3 0,-10-10 0,3-1 0</inkml:trace>
+  <inkml:trace contextRef="#ctx0" brushRef="#br0" timeOffset="486567">22383 13553 8612,'0'-17'90,"0"4"0,0 0-180,20 6-180,-16 0-1889,38 3 2159,-22 3 0,6 19 0,-11 5 0</inkml:trace>
+  <inkml:trace contextRef="#ctx0" brushRef="#br0" timeOffset="487038">22510 14346 11221,'-5'1'-90,"0"0"90,2 0 0,20-1 0,4 0 0</inkml:trace>
+  <inkml:trace contextRef="#ctx0" brushRef="#br0" timeOffset="487567">23170 13922 9152,'8'0'719,"0"0"-809,1 0 180,1 0-90,-1 0 0,1-17 90,-2 13-180,1-26 90,-2 27 0,0-24 0,-4 8 360,-1-14-270,-21 8-90,15 4 180,-30 10 0,30 2 180,-32 4-270,13 2 90,-17 3-180,17 17-90,-3-13 90,24 28-90,-9-11-90,11 16-450,19-15-179,-15 10-721,34-18 541,-6 3 989,8-2 0,8-13 0,-12 3 0</inkml:trace>
+  <inkml:trace contextRef="#ctx0" brushRef="#br0" timeOffset="488254">23530 13707 9781,'-18'12'630,"4"6"-720,14 10 90,0-2-90,15-4-180,-11-7-359,28 2 179,-28-5 180,24-1 90,-13-7 90,4-1 90,-6-21 0,-2 13 0,-10-28 180,5 10 90,-5-6-90,0-5 1079,-1 11-1259,3 8 0,-1 5 180,3 10-180,0 0 0,5 14 0,-3 6 0,8 16 0,-8-16-180,6 21-90,-5-34 90,2 28-89,-4-32-91,-1 8-90,0-11 180,-1 0 180,-1-16 90,-2-6 0,-1-17 0,0 8 360,0-8 0,0 15 1079,13 4-1079,4 10-90,7 26-180,1-11-90,-4 23 0,-4-14 0,4 10-90,-10-10-90,2 2-90,-5-14 90,-1 4 0,-1-6-180,0 0 360,-3 0-90,4 0 180,-3 0-90,3-14-90,-1 11 0,0-12 90,0 3 270,1 10 90,-2-10-180,0 12-90,2 0-90,-1 0 90,5 0-180,-3 19 90,3-14-180,-2 27-270,0-29-179,2 27-181,-1-26 180,3 25-179,0-26 809,12 23 0,-6-18 0,9 10 0</inkml:trace>
+  <inkml:trace contextRef="#ctx0" brushRef="#br0" timeOffset="488717">24282 13671 9512,'-13'-5'899,"10"17"-809,-18-8-90,19 26 0,-6-9 0,8 7 0,0 0 90,0-9-270,0-1 0,0-2 0,21-8-539,-16 7 539,33-8-90,-22 3 270,14-6 0,-8-21 0,-10-2 0,2-1 450,-13-12-180,5 16 539,-6-13-809,0 30 0,0 7 0,0 24-90,14-16-629,-10 11-91,23-15 450,-14 4-90,3-1-359,1-13 179,-8 3 540,4-22 270,-6-2 900,-4-20-721,-3 6-1798,-15 2 1439,11 28 0,-12-3 0,16 20 0</inkml:trace>
+  <inkml:trace contextRef="#ctx0" brushRef="#br0" timeOffset="489018">24618 13701 9512,'0'25'1709,"6"-10"-1619,-5 5-180,7-18 180,-7 18-180,2-12-180,0 12-360,-3-6-179,4 3-1260,-4-4 809,1-4 1260,-1-2 0,0-4 0,0-2 0</inkml:trace>
+  <inkml:trace contextRef="#ctx0" brushRef="#br0" timeOffset="489189">24460 13336 7533,'0'35'-570,"16"-15"0,5-6 1</inkml:trace>
+  <inkml:trace contextRef="#ctx0" brushRef="#br0" timeOffset="489500">24775 13938 10321,'6'-18'630,"0"14"-270,0-55-181,-2 31-2032,2-37 2123,-3 21-90,0-3 89,-2-1-89,-1 13 0,0-1 90,0-17-45,2 9 0,-4 1 583,-17-2-718,15-18 0,-15 37 0,5-1 152,10 35-242,-11 7 0,15 23-270,0 3-180,-1-3 1,2 1-1781,18 24 1690,-19-19 1,4 0-181,15-13 1,1-1 25,0 27 694,4-20 0,4-2 0,9 13 0,-13-18 0,-1-1 0</inkml:trace>
+  <inkml:trace contextRef="#ctx0" brushRef="#br0" timeOffset="490567">22042 15285 9422,'-5'-6'1079,"2"17"-989,2 16 0,21 25 0,-16-5-45,12-12 0,0-1-45,-14 6 0,10 10 0,-2-20 90,-8-6 90,8-3 359,-5-1-988,-4-8-91,5-20 0,-6-12 360,-14-24 0,10-5 180,-10 6-90,5-12 1,7 23 178,-7-9-89,2 15-89,6 0 178,-6 3-89,4-1 0,2 2-89,-2-1 89,3-8 0,0 6 0,0-17 0,0 17 0,0-7-90,0 11 90,14 1 0,-11 1 359,10 2 181,-13 4-180,11 4-180,0 4-90,12 24-90,-8-14 0,1 47 180,-6-25-731,0 30 551,-1-11 0,-2 4 45,-4-17 0,0 1-45,0 15-45,-3-12 0,1-1 135,-1-1-899,-16 11-91,13-27-2608,-31 0 3508,16-15 0,-4-1 0,8-3 0</inkml:trace>
+  <inkml:trace contextRef="#ctx0" brushRef="#br0" timeOffset="490934">22458 15043 10051,'-16'22'1170,"12"10"-991,-31-11-179,15-2-89,-15 23 89,16-28-450,7 30-180,12-27 90,17 6 271,4-18 269,20 0-90,1-25 180,-8-3 629,2-21 181,-16 3-181,-4 4-719,-8 29-180,-8 15 0,0 30-359,0-5-271,14 0-1169,-11-2 900,30-16 1079,-29 13 0,31-24 0,-16 7 0</inkml:trace>
+  <inkml:trace contextRef="#ctx0" brushRef="#br0" timeOffset="491204">22848 14947 10141,'-22'-8'630,"-10"4"-630,15 1-90,-1 18 90,6 3 0,12 19 0,0 1 0,0-8 0,19-1 90,-14-13-180,30-1 90,-31-1 90,29-3-90,-29-2 180,25 0-180,-26-3 90,10-2-90,-13 0 0,0-1-90,0 2-270,-21-1-180,16 0-179,-33-1-271,34 1-1438,-30-1 2428,20-1 0,-5-2 0,9 0 0</inkml:trace>
+  <inkml:trace contextRef="#ctx0" brushRef="#br0" timeOffset="491504">23012 14951 10321,'-21'23'720,"16"10"-900,-31-13 180,32 16 90,-10-2-180,14-8 90,22-1 90,7-9-180,-1-2 90,35-3 0,-40-5 0,30 0 180,-29-2 90,-11 0 89,7-1-359,-13 3 0,6-3 90,-8 4-90,-24-1 0,15 1 0,-34 0-180,34 0-449,-37 0-1170,14 3 629,-1-5 1170,-6 2 0,31-6 0,-9 1 0</inkml:trace>
+  <inkml:trace contextRef="#ctx0" brushRef="#br0" timeOffset="491801">23340 14930 10501,'47'40'45,"-22"-17"0,0-1-45,14 12 0,-1 4-540,0 4-89,-11-10-406,-5-5 1,0-2-574,3 3 1608,2 5 0,-9-18 0,-3-2 0</inkml:trace>
+  <inkml:trace contextRef="#ctx0" brushRef="#br0" timeOffset="492152">23763 14891 9781,'-16'21'720,"-12"-4"-630,24 19 0,-25-7-90,8 14 0,-4-10-90,-7 17-90,17-24-270,-2 4 1,6-15-91,2-2 90,0-8 90,-4-1 90,2-4-179,-7-14 359,9 11 90,-2-28 0,8 8 90,1-9 270,2-8-91,16 17 451,-13-4 90,29 13-541,-14 6-179,16 3 0,0 20-90,-7 3 0,9 18-270,-16-17-899,15 25 360,-15-38 809,18 37 0,-16-32 0,8 14 0</inkml:trace>
+  <inkml:trace contextRef="#ctx0" brushRef="#br0" timeOffset="492334">24000 14884 10411,'-31'-5'630,"11"17"-720,3 10-90,15 24-270,-5-8-180,7 2-179,0-11 89,17-1 1,-13-1-271,26-4 990,-26-2 0,26-6 0,-10-1 0</inkml:trace>
+  <inkml:trace contextRef="#ctx0" brushRef="#br0" timeOffset="492617">24218 15007 10771,'-39'19'360,"15"3"-450,-1 1 180,22 13-180,-7-21-450,10 24 450,0-17-180,22-3 180,-17-3 0,35-13 90,-17 7-90,16-10 0,-4-16 180,-15-3-90,-8-17 0,-12-1-90,-20 15 0,15-9-269,-37 21-361,13-15-1079,-20 11 1799,6 3 0,19 5 0,10 5 0</inkml:trace>
+  <inkml:trace contextRef="#ctx0" brushRef="#br0" timeOffset="492900">24315 14950 9781,'0'32'630,"17"0"-630,-13-1 0,27-6 90,-27 0-90,10-8 0,-3-1 0,-8-2 0,8-2 270,-3 0-90,-6-4-270,6-2-720,-8-3 450,0-21-449,0-23 89,-15-3-90,13 7 1,0 1 809,-14-4 0,6-10 0,-3 17 0</inkml:trace>
+  <inkml:trace contextRef="#ctx0" brushRef="#br0" timeOffset="493254">24630 14892 9961,'0'9'540,"0"-2"-540,-16-2 180,12-1-180,-13 5 0,3-3 0,11 10 0,-11-5-180,14 11-90,0-9 180,0 4-539,15-4 449,-11-3 90,32-2 90,-17-4 719,18-2 271,-12-1-541,-5-1-449,-11 16-89,-18-1 89,5 19-90,-10-11-360,14 2-180,0-7-359,-8-1-181,6 0 1170,-6 5 0,8-7 0,0 3 0</inkml:trace>
+  <inkml:trace contextRef="#ctx0" brushRef="#br0" timeOffset="493822">24675 14925 8252,'-5'-6'450,"0"0"-180,3 0-90,-1 1 90,0-1 269,-1 1-449,2 2 90,-4 1-270,3 2 90,-5 0 90,2 0-90,-3 14 90,-4 7-90,1 9 0,-9 14 0,10-14 0,-4 24 0,11-23 0,-1 9 90,5-18-180,0-2 180,0-5-180,21-2 0,-2-7 90,22-1 90,-23-20-90,15-8-90,-13-10 180,1-2-180,4 5 90,-23-1 0,10-1 0,-11-2 0,3 1 0,-4 0 180,-19-14 0,15 12 270,-29-16-360,15 25-90,-12-5 269,13 19 1,-3 2-270,18 30-90,-5 9 180,28 29-180,-3-10-1353,6 2 904,4-13-361,-25-4-269,25 2 1169,-11 6 0,0-10 0,-5 4 0</inkml:trace>
+  <inkml:trace contextRef="#ctx0" brushRef="#br0" timeOffset="494876">21482 15217 9602,'-18'-7'629,"4"1"-719,7 4 0,5 12 270,-6 2-90,21 2-90,-10 0 0,10-11 0,-7 5 0,-5-3-90,5-2-180,-6 3 180,0-3-90,0 3-89,0-2 269,0 1-180,0-1 719,0-15-179,0 0 90,0-14-180,0 7 0,16 6 89,0 5-89,18 7-180,-4 0 0,1 16-90,-7 2 0,-2 19 0,-14-8 0,-1 19 0,-7-14 0,-9-2 0,-5 0 0,-14 9 0,-1 12 0,-3-28 0,3-2 0,20 9-45,-19-9 0,1-2 45,23-2-360,-13 0-989,17-13-90,18-1-720,7-20 2159,22-5 0,-21 0 0,-2 4 0</inkml:trace>
+  <inkml:trace contextRef="#ctx0" brushRef="#br0" timeOffset="495088">21343 15277 10321,'-4'14'1799,"0"4"-1709,28 0-90,-17 19 0,42-19-2126,-29 9 1,1 2 1945,33 8-90,-24-11 0,0-1-45,17 14-854,1 0-360,2 1-647,-1 0 2176,1-1 0,-2-1 0,-2 1 0</inkml:trace>
+  <inkml:trace contextRef="#ctx0" brushRef="#br0" timeOffset="497970">12543 15297 7623,'0'64'539,"20"-14"-494,-18-16 0,1-1-1679,34 13 1724,-33 1-90,18-13 0,3 1 90,-4 17 0,9-8 0,3-1-90,1 6 45,-11-18 0,0-1-45,9 12 0,2-4 540,-1 0-540,-12-12 0,1 0 0,11 14 0,-7-6 0,-1-1 282,4 3-282,-5-6 0,-1 0 90,2 0-90,7 11-90,-4-8 180,-7-8-90,12 11 0,-14-17 0,6 4 0,-8-12 902,2-1-902,13-1 0,-5-4 90,11 0-90,9-5 0,-7 0 0,-4 0 0,1 0 0,12 0-1741,-5-6 0,0 0 1831,10 3-90,-17-3 0,0 0-334,17 6 334,1 0-90,0 0 0,0 0 0,-1 0-90,-1 0 135,-14 6 1,-1 1-46,19-4 0,-8 3 0,0 0 0,6-6-386,-19 0 1,0 0 385,14 0-180,-1 0 80,-1 0 55,-13-9 0,1-1-135,17 5 270,-7-10 0,-1-2 0,5 2 0,-17 1 0,-1 0 0</inkml:trace>
+  <inkml:trace contextRef="#ctx0" brushRef="#br0" timeOffset="499185">25535 14540 10051,'52'0'540,"2"0"-6200,-4 0 5660,9 0 0,-26-8 0,2-1 91,1 8 1,1-2-92,3-12 0,0 0-315,-1 13 1,1 1-226,-1-10 0,0-1 45,-2 10 1,0 2-181,-3-5 1,0 0 867,28 5 0,-7 0 1,-4 0-1</inkml:trace>
+  <inkml:trace contextRef="#ctx0" brushRef="#br0" timeOffset="499486">26290 14026 10051,'-9'-8'450,"0"2"989,2-1-1439,31 4 0,11 18 0,18-11-651,4 26 741,-13-27 0,1 26-90,-3-15 89,-4 16-89,-7-6 159,-5 5-428,-7 22-271,-9-7-360,-4 0 1,-6 2-115,-12-16 0,-4 1 1014,-1 25 0,-1 1 0,1-22 0,-1 0 0,5 11 0,-1 0 0</inkml:trace>
+  <inkml:trace contextRef="#ctx0" brushRef="#br0" timeOffset="501184">26000 13071 9332,'6'-3'899,"-1"2"-539,-3 1-360,0 0 0,0 16 0,0-11-90,1 32 180,1-18-180,-1 21-450,2-5 1,-1 5-91,1 3-809,4 23 359,-2-16 990,4 13 0,-3-23 0,1-2 0</inkml:trace>
+  <inkml:trace contextRef="#ctx0" brushRef="#br0" timeOffset="501401">26337 13227 9152,'0'-12'1349,"0"1"-809,-22 7-540,3 1 0,-6 23 0,-3 5 0,15 10-90,-3 11-270,5-18 90,11 11-180,0-13-269,0-1 89,22-3-899,8 3 360,13-10 1169,0-2 0,-8-9 0,1-4 0</inkml:trace>
+  <inkml:trace contextRef="#ctx0" brushRef="#br0" timeOffset="501602">26568 13071 8972,'0'-6'719,"-10"2"-719,7 17 0,-7 12 90,29 10-180,-14 8 180,28-4-270,-23-7 1,-2 1-271,10 21-1831,-4-10 1,-1-1 1650,1 8-449,2 10 959,3-24 1,-17-4 0,7-1 0</inkml:trace>
+  <inkml:trace contextRef="#ctx0" brushRef="#br0" timeOffset="501901">26517 13510 7982,'-6'-18'540,"4"1"-180,-4 2 0,6 2 179,0-3-449,21 5-90,4-2 90,24 8-90,0 2 0,-7 3 0,7 18 0,-22 1 0,4 3 0,-12 6 0,-3-24 0,-2 22 0,-4-23 90,-2 9-450,-3-4 91,-3-24-91,0 0-90,-2-18 90,0-2-89,-14 8-91,10-1-90,-10 1 630,14 2 0,0 2 0,0 3 0</inkml:trace>
+  <inkml:trace contextRef="#ctx0" brushRef="#br0" timeOffset="502251">27173 13300 8882,'-23'6'989,"1"14"-899,-6-9 0,-3 26-90,16-15-90,-3 11 90,7 2 90,11-7-270,0 15 90,0-22-179,19 2-91,-15-13 90,34-6 180,-11-2 90,10-21 0,1 15 0,-2-48 90,-12 32 135,-8-9 0,-2-2 45,4 3 89,-10-7-179,1 12-180,-9 28-90,0 38-359,0 9-687,8-12 0,0 1 236,-4 16 90,14-28 1,4 1 809,1 31 0,-1-31 0,3-1 0,-5 0 0,0 1 0</inkml:trace>
+  <inkml:trace contextRef="#ctx0" brushRef="#br0" timeOffset="505334">27995 13768 9062,'0'46'899,"0"-7"-719,0 4 0,0-6-180,0 2 0,0 21 0,0-15 0,-1-9 0,2-1 0,15 1 90,-13 11-90,34-25-90,-15 0 180,14-15-90,-7-2 0,-8-5-90,1-23 180,-3 17-90,5-54 0,-9 36 0,-5-10 0,-3-3 180,-3 0 180,-1-25 0,-3 27-546,0-8 275,0 17-89,-14 6 0,11 2 180,-11 7 90,14 3-270,0 20 0,0 9 0,0 12 0,20 3-450,-14-5-89,28 1-91,-30 0-899,38 12 719,-24-14-134,9-7 0,1-2 944,1-1 0,10-2 0,-11-12 0</inkml:trace>
+  <inkml:trace contextRef="#ctx0" brushRef="#br0" timeOffset="506151">28657 14023 9332,'-17'-18'449,"12"-4"-179,-26 15-270,17-3 180,-2 23-270,5 13 90,11 10 0,0 4 90,20-8-90,1 17-90,2-12 180,13 10-90,-14-4 0,2-12 0,7 15 0,-20-24 0,4 8-90,-8-18-719,-7 1 89,-17-10 450,-3-1-90,-2-18 270,-10 12-89,28-26 89,-25 26 0,26-37 90,-10 24 0,13-28 0,0 25 0,26-8 0,-20 13 0,43 1 0,-16 3 0,12 5 0,8 1 180,-24 3 719,10 1 180,-19 1-899,-22 0 180,5-14-180,-39 10-90,20-19 0,-15 20 0,17 8-180,4 14 90,10 19 0,0-6 0,15 1-360,2-2-180,2-9-539,11 8 629,-10-20-269,18 5 539,-10-14 0,-1 3 180,-13-4 0,2 0 180,-7-19 90,0 14 359,-5-29-179,-3 15 180,0-13-270,-17 2-360,12 5 719,-25 12-629,27 25-180,9 11 180,16 22-180,12 0 90,-13-10 0,-2-4 0,-18-13 0,13-2 270,-13-2-90,9-1-360,-10-4 0,4-21 180,-19-11-270,10-31 0,-10 7-135,13 11 1,2 0-46,-1-10-90,0-12-179,0 20-271,0 7 990,0 3 0,19 8 0,4 3 0</inkml:trace>
+  <inkml:trace contextRef="#ctx0" brushRef="#br0" timeOffset="506488">29540 14378 10591,'-8'0'450,"1"0"-450,3 0 0,-1-3-720,4 0-1709,-1-1 2429,21 2 0,1 1 0,18 1 0</inkml:trace>
+  <inkml:trace contextRef="#ctx0" brushRef="#br0" timeOffset="506958">29880 14367 9871,'17'-49'1619,"-4"7"-1259,-13-5-180,10 7-90,-8-19-90,8 12 180,-9 8 0,-2 1-404,1-5 314,0-11-1,0 14-89,-17 13-89,12-1 166,-12 15 193,17 7-270,0 18 0,0 12 0,0 11 0,17 8 0,-12-6 237,27 5-327,-21-8 0,-1 0 0,20 20-90,-9-7 0,-2 0 0,4 7-599,-8-19 1,0 0 598,2 11-90,-1 0-1135,2 14 956,-8-17 269,0 8-720,-9-12 630,-1-16-179,-17 5 1692,-3-20-1154,-16-18-89,4-12 0,14-9 90,5-5-269,13-8-181,0 7-585,9 4 1,1-1 944,-5-7 0,16 12 0,5 1 0,9-12 0</inkml:trace>
+  <inkml:trace contextRef="#ctx0" brushRef="#br0" timeOffset="507185">30343 13836 11131,'0'35'809,"17"2"-809,-13-11 0,12 2 0,1-6-180,1 11-359,3-6-451,5 16 91,-11-20 89,6 6 91,-2-14 89,-9-3-360,-1-3 990,-2-4 0,-2-2 0,-1-2 0</inkml:trace>
+  <inkml:trace contextRef="#ctx0" brushRef="#br0" timeOffset="507322">30490 13978 10771,'18'21'-450,"-14"12"0,28-29-449,-28 32-1,24-22 900,-7 27 0,-2-19 0,-2 6 0</inkml:trace>
+  <inkml:trace contextRef="#ctx0" brushRef="#br0" timeOffset="508076">30595 13964 9961,'0'8'900,"0"-1"-540,0 0-270,0 0 89,0-1-89,0 3 0,0-1 0,0 3-90,0 1-90,0 3 90,14 7 0,-10-3 0,22 9 0,-23-14 0,10 5-90,-6-12-1259,-6 0 1259,6-26 0,-7-2 0,0-14 90,0 3 0,0 5 180,0-1-180,0 0 450,0-8 0,0 10 629,14-6-539,1 22-450,16 0-90,0 30 0,-6-15 0,1 36 0,-10-23-270,1 20-180,0-8-899,8 15 359,-6-11-1438,12 19 2428,-12-27 0,6 3 0,-6-14 0</inkml:trace>
+  <inkml:trace contextRef="#ctx0" brushRef="#br0" timeOffset="508484">31175 13904 10051,'-17'-6'630,"0"1"-630,-16 19 0,17 5-90,-5 17 0,19 1 0,-5-4 0,24-14 0,2-8 90,13-11 90,-15-19-180,5 14 90,-20-40 0,16 25 0,-16-25 0,5 11 0,-1-3 90,-5 0 90,4-16-90,-5 14 450,0-28-271,-16 31-269,13-9 0,-13 19 90,16 5 90,0 5 720,0 3-900,16 57 0,-12-19-496,11 10 1,0 1 495,-12 3-270,23 2-270,-24-1-1259,23 14 630,-9-15-1349,13 18 2518,-5-30 0,-2 2 0,-4-14 0</inkml:trace>
+  <inkml:trace contextRef="#ctx0" brushRef="#br0" timeOffset="508986">31837 13174 11760,'-15'23'990,"-4"-3"-900,17 20 0,-11-3-90,12 4 90,-12 6-180,10 6 135,-1-13 0,0 1-135,4 22-1564,12-9 1,1-1 1114,-7 6 179,17-21 0,6-1-975,-9-4 1,1-4 749,5-7 0,2-1 585,10 8 0,-2-3 0,7-4 0,12 0 0</inkml:trace>
+  <inkml:trace contextRef="#ctx0" brushRef="#br0" timeOffset="509234">32268 13089 10321,'27'-5'1619,"15"1"-1439,-12 3-180,10 1 180,2 18-90,-10-13 0,0 33 0,17-5-90,-13 11 0,-8-9 0,-1 1-1632,-1 14 1587,-10-15 0,-2 0-225,-3 19-179,-4 3-181,-4 2-630,-1-15 1,-4 0 494,-11-9 1,-1 0 764,13 10 0,-4-1 0,-20-14 0,-2-2 0,-5 29 0</inkml:trace>
+  <inkml:trace contextRef="#ctx0" brushRef="#br0" timeOffset="510853">29493 14818 9152,'0'12'2338,"0"8"-2338,0 13 0,0 5 90,0 17-90,0-10 0,-9-3 0,-1 1 0,5 10 0,-22 3 0,-4 1 90,6 1-803,1-22 0,-5 4 0,1-6 713,4-7 0,-1-3 0,-23 20 0,-4-1 0,18-17 0,0-2 45,-14 9 0,-2-2-1387,13-9 1,-1-1 1341,-2 0 0,-1-1-45,-2 0 0,-1-1-253,-1 0 0,-2 0 298,-1-1 0,-1-1 0,-2 0 0,-1-2-365,-2 1 1,0-1 364,-3-1 0,0-1 0,0-1 0,-3 0 0,3-2 0,-4-1 0,3-1 0,13-2 0,2 0 0,-4-1 0,-7 1 0,-5-1 0,-1 1 0,7-2-13,-12 0 1,3-1 12,9-1 0,-2 0 0,4 0 44,0-1 1,3 0-90,1 0 1,2 0 44,3 0 0,-1 0-45,-12 0 0,1 0 0,15 1 0,-1 0-90,-23 2 0,2 1-45,-4 2 45,11 0 0,2 1 2051,-7 3-2141,0 2 1,0 1 44,-1 2-45,4-1 0,1 0 836,5-1-1061,9-2 0,2-1-269,-3 2 592,-9 4 127,21-7 0,5 1 0,0-1 0</inkml:trace>
+  <inkml:trace contextRef="#ctx0" brushRef="#br0" timeOffset="511201">26637 15842 9961,'2'-6'1170,"-1"2"-1080,-17-3 89,13 2-89,-31-1-90,12-2 180,-11 5-90,1 0 0,3 3-90,-2 0 0,-5 21-234,-4-16 234,-1 41 0,-4-23-45,14 8 0,0 4 45,-13 10-924,16-14 0,2 1 744,-1 12-179,6 1-1662,10 15 852,4-15-270,29 7 1439,3-22 0,24-6 0,-2-2 0</inkml:trace>
+  <inkml:trace contextRef="#ctx0" brushRef="#br0" timeOffset="513871">22233 16391 8972,'0'-17'989,"6"1"-719,-4 3-90,4 0-180,-6 4 1169,0 0-1259,4 5 180,2 21-90,2-12 0,1 38-359,-1-22-271,3 23 0,2-7-899,6 23 630,-3-13 899,-2-5 0,-1-1 0,3 8 0,-7-17 0,1 0 0</inkml:trace>
+  <inkml:trace contextRef="#ctx0" brushRef="#br0" timeOffset="514034">22202 16788 8702,'0'-18'-90,"0"1"-90,0 2-180,25 0 1,-19-3-271,42 0-539,-29-2 1012,22 1 0,-8 0 0,1-1 1</inkml:trace>
+  <inkml:trace contextRef="#ctx0" brushRef="#br0" timeOffset="514251">22480 16339 10051,'15'30'270,"-11"-3"-270,10-2 0,5-1 0,-15 4-180,27 3-539,-28 3 89,21 3-621,-21 3 442,19 0-496,-20 3 1305,13-1 0,-14 1 0,5-1 0</inkml:trace>
+  <inkml:trace contextRef="#ctx0" brushRef="#br0" timeOffset="514534">22660 16693 7533,'8'-12'-90,"1"1"0,-2 3-90,1 0-1079,-2 3 1259,0 2 0,-2 1 0,0 2 0</inkml:trace>
+  <inkml:trace contextRef="#ctx0" brushRef="#br0" timeOffset="515169">22747 16696 8432,'8'0'900,"5"0"-810,-6 0 90,10 17-180,-7-12 89,4 25-89,-2-13 0,-4-1-89,1 21-1,-5-26 0,-1 25-450,-2-23-539,-1 4 989,-14-13 90,11-19 0,-11-11 0,14-9 0,0 0 0,0 9 0,0 2 539,0 1-179,0 0 360,14 12-540,1-1-90,11 12-1,-5 17-89,-6 0-89,-4 3 178,-6 7-178,0-14 89,-3 2-810,1 1 810,-1-14 0,0-9 0,2-12 0,1 1-90,5-14 180,-2 12 360,7-10-450,-5 11 270,15 9-360,-12 10 180,15 0-90,-16 20 0,8-15 0,-7 36-270,0-24-270,1 19-90,0-10-179,2 1-360,2-1 1169,-1-4 0,4-4 0,0-2 0</inkml:trace>
+  <inkml:trace contextRef="#ctx0" brushRef="#br0" timeOffset="515535">23350 16621 8882,'-19'-3'630,"-10"2"-540,16-1 89,-2 20-179,-2 4 0,16 25 0,-5-12 0,6 3 0,0-13-90,23-1-89,-17-4 89,35-10 0,-36 6-180,34-14 270,-14 7-90,17-26 90,-7-6 90,-15-10 90,-5-13 0,-14 17 449,4-18-359,-5 24-90,-16-8 270,12 17-450,-11 25 0,15 6-90,20 7-450,-15 11 90,30-20-179,-31 16-91,26-10-989,-12 6 1709,0-9 0,11 2 0,-12-9 0</inkml:trace>
+  <inkml:trace contextRef="#ctx0" brushRef="#br0" timeOffset="515863">23618 16671 9242,'20'16'629,"12"-12"-719,-16 27 180,16-15-90,-7 13 90,-5-5-539,-4-6 449,-9-22 0,-3-11-90,-21-24 90,13 7 90,-13-1-90,17 4 179,0 5-89,15 6-180,7 8-89,-2 29-271,8-14-1169,-16 32 1619,1-15 0,3 18 0,-9-1 0</inkml:trace>
+  <inkml:trace contextRef="#ctx0" brushRef="#br0" timeOffset="516101">23343 16235 9602,'0'-6'629,"18"2"-629,0 2 0,16 2-90,-17 17 90,15-13-809,-17 12-91,19-2-179,-8-10 1079,4 10 0,3-14 0,0 0 0</inkml:trace>
+  <inkml:trace contextRef="#ctx0" brushRef="#br0" timeOffset="518658">22933 17122 9422,'0'-14'1349,"0"2"-899,0 1-181,0 2-179,0 0 270,0 4-540,0 18-719,17 20 179,-12 5 0,9-7 1,1 0-180,-13 5-990,20 26 1889,-20-25 0,14 9 0,-9-16 0</inkml:trace>
+  <inkml:trace contextRef="#ctx0" brushRef="#br0" timeOffset="518935">22840 17334 9602,'19'16'89,"14"1"-89,-16 18 0,5-9 0,4 1 0,-13 15 0,11-14 90,-3 21-180,-9-29 270,0 6-270,-8-15-269,1-2 89,-3-7-180,0-2-180,0-15-1169,3-13 1799,0-8 0,1-8 0,-1 8 0</inkml:trace>
+  <inkml:trace contextRef="#ctx0" brushRef="#br0" timeOffset="519535">22667 18044 10501,'0'41'0,"14"-7"-90,-10 0-360,11-8-1079,-1 17 630,0-10 89,3 8 810,3-16 0,-17-2 0,7-3 0</inkml:trace>
+  <inkml:trace contextRef="#ctx0" brushRef="#br0" timeOffset="519701">22563 18202 8432,'0'-12'0,"0"1"0,0 0-360,23 2 91,-18-1-1,40 3-1169,-12 0 1439,11 3 0,1 1 0,-13 3 0</inkml:trace>
+  <inkml:trace contextRef="#ctx0" brushRef="#br0" timeOffset="519974">22965 18206 8882,'-13'5'270,"9"1"-180,-9-4 0,13 4-90,-10-1 0,7 5 0,-7 1 0,10 3 0,0 3 0,0 2 0,0 0 0,17 0 0,3 12-90,2-14-180,13 7 360,-10-19-90,9-1 0,-1-4 0,-9-19 0,-3 14 0,-1-34 0,-4 34 0,-7-35-90,-4 18 0,-5-17-270,-21 17-270,15-2-89,-36 22-271,36-13 990,-36 14 0,37-4 0,-16 5 0</inkml:trace>
+  <inkml:trace contextRef="#ctx0" brushRef="#br0" timeOffset="520258">23240 17933 9512,'24'35'449,"-18"-6"-449,34-1 0,-35-6 0,30 5 0,-12 12 0,8-6-630,-12-5 1,-2 1-181,5 5 1,2 9-529,-8-16 1338,-2-3 0,-4-3 0,1-2 0</inkml:trace>
+  <inkml:trace contextRef="#ctx0" brushRef="#br0" timeOffset="520451">23547 18049 9602,'-11'17'-270,"2"0"-360,9 20 0,20-13-89,-15 2-271,32-17 990,-33 8 0,34-14 0,-12 7 0</inkml:trace>
+  <inkml:trace contextRef="#ctx0" brushRef="#br0" timeOffset="520770">23728 18202 9242,'21'16'90,"1"-3"-180,28-13-90,-13 0 0,5 0 90,-10 0 0,-1 0 90,-1-16-90,-4 12 0,-3-12 0,-6 3 180,-8 0 270,-25-9-180,-10 9 90,-20 7-90,2 6-90,10 15-90,14 2 0,10 15 0,10-1-180,0-8-90,24-7-720,1 8 361,4-15 629,9 15 0,-14-15 0,19 0 0</inkml:trace>
+  <inkml:trace contextRef="#ctx0" brushRef="#br0" timeOffset="521068">24095 18239 9691,'0'32'90,"19"-13"-90,-14 4 0,31-8 0,-15-1-179,16 7 179,-16-14 179,7 3-269,-17-5 90,7-5 90,-8-18 90,-6-1 0,-3-2-90,1-11-90,1 28 0,-1-26 270,1 27 180,2-19-540,0 20-90,7-7-180,-4 9-1529,10 20 360,-7-15 1529,3 31 0,-4-18 0,-1 15 0</inkml:trace>
+  <inkml:trace contextRef="#ctx0" brushRef="#br0" timeOffset="522052">22377 18314 10141,'-29'0'90,"2"0"0,4 0-90,2 0 180,4 0-180,-1 0 0,-2 0 90,-1 0-90,-1 0-90,-3 0 90,-1 0 90,-5 0-90,-19 8 0,6-6 0,2 2 0,-1 1-795,-16 1 840,18-5 0,-2 0-45,-22 5 45,29-6 0,0 0-45,-2 2 0,0-1-466,-4 0 0,0-1 466,-1 2 0,0-1 0,-2-1 0,-3 0 30,4 0 0,-3 0 0,1 0-30,-7 0 0,-2 0 60,-5 0 0,-6 0 0,6 0-15,5 1 0,-1-2-45,-4-3 0,-6-1 0,5 1-796,6 3 1,1-1 765,8-5 0,-3-2 0,1 2 180,-1 5 0,-1 3 0,3-2-105,-10-4 0,-1 1-23,10 3 1,-5 1-1,0 0 1,5 1-23,-13-2 0,-1 2 0,10 2 0,-5 2 0,0 2 0,5 0-503,6 0 0,4 2 0,-2 0 503,-12 2 0,-2 2 0,0 1 0,0 1 0,1 1 0,3-1-45,-9 0 0,-2 0 67,15-4 1,-5 2 0,-1 0-1,6-1-67,-10 2 0,-1 0 45,14-3 0,-4 1 0,-1-1 0,5 0-45,-10 1 0,2 0-15,8-1 0,-1-1 0,1 0-492,-20 2 1,3-1 326,16-3 1,-1 0-46,-1-2 0,-3 0 0,4-2 0,8 0 0,2-2-45,-9 1 1,0-1-410,10-2 0,4 0 724,-15 0 0,-4-18 0,23-5 0</inkml:trace>
+  <inkml:trace contextRef="#ctx0" brushRef="#br0" timeOffset="522518">18075 18232 8342,'-7'-17'1529,"5"-8"-719,-6 13-450,8-10-180,0 7-180,-3 2 0,-1 4 0,-4 3 0,-1-1 0,-2 3 0,-3 1 0,-5 1 179,-19 2-89,5 14 0,-17-10 45,17 17 0,2 4-135,-19-3 0,6 10 0,2 4-658,-4 3 702,18-12 1,2-1-45,0 9 0,10 0 0,7-2 0,25 15 0,-11-15-90,32-5 1,10-4-541,0 0 135,4-9 0,7-4-764,3-5 0,1-3-1038,-12-1 0,1-1 2297,-5 1 0,2-2 0,-2-1 0,6-5 0,-3-3 0,2 0 0,1 0 0</inkml:trace>
+  <inkml:trace contextRef="#ctx0" brushRef="#br0" timeOffset="525701">13023 17813 10141,'0'-21'360,"0"-1"-360,0 5-90,0 0 180,0 0-90,0-2 0,0-5 0,0-2 0,0-6 0,0-1 0,0-21 0,0 12-45,0 6 0,0 0 135,0-5-90,-7 8 0,-2 1 90,5-3 0,-12-8 90,-4 10-180,3 10 450,-15-4-181,10 19-269,10 22 0,5 42 90,7 0-90,-2-5 0,4 0 0,15 4 0,-8-9 0,1 0-180,11 1-484,-4-16 0,0-2 215,-2 4-704,17-3 613,-8-6-1165,14 1 986,-7-10-361,24-3 450,-22-9 630,9-3 0,-14-19 0,-1-3 0</inkml:trace>
+  <inkml:trace contextRef="#ctx0" brushRef="#br0" timeOffset="526152">13367 17637 10051,'0'33'90,"0"0"-180,14-4 90,-10-1-360,25-12 91,-25 3-91,21-17-90,-22 9 90,20-10 90,-14 2 91,10-3 89,-2-17 90,-4 13 90,6-24 179,-13 12 721,3-9 89,-8 3-989,0 23-90,15 8-90,3 16 90,11-10-539,-1 0 359,-7-13 180,-3 5 0,-5-25 0,-3-2 90,-6-2 359,-2-10-269,-2 13-180,-1-12 360,0 9-360,0 25-2339,28 11 2339,-8 14 0,26-3 0,-14-7 0</inkml:trace>
+  <inkml:trace contextRef="#ctx0" brushRef="#br0" timeOffset="526555">13967 17543 9961,'0'26'900,"0"-1"-900,19 0 0,-14-6 0,26 0 0,-28-6-450,23 0-270,-23-2 1,28 0-91,-19-3 810,24-2 0,-15-3 0,8 0 0</inkml:trace>
+  <inkml:trace contextRef="#ctx0" brushRef="#br0" timeOffset="527368">13490 17633 8972,'-6'-14'989,"1"-6"-539,4 8 180,1-7-450,0 4-1,0 2-179,20 6 0,-15 1 90,30 3-90,-13-1-269,7 3-631,9 15 91,-15-10-1,3 31-899,-13 4 520,-5 12 1113,-3 12 0,-5-11 0,0 4 1</inkml:trace>
+  <inkml:trace contextRef="#ctx0" brushRef="#br0" timeOffset="527686">14598 17209 9691,'0'38'810,"0"-6"-810,0 13 0,0-13-450,0 21-89,0-20-991,15 21 631,-11-27 899,23 16 0,-24-23 0,10 4 0</inkml:trace>
+  <inkml:trace contextRef="#ctx0" brushRef="#br0" timeOffset="527859">14420 17503 8882,'-5'-16'989,"19"3"-989,-10 4 0,32 2-359,-32 3-1,38 2 0,-22 1-270,22 1-1618,4 0 2248,-10 0 0,11 0 0,-15 0 0</inkml:trace>
+  <inkml:trace contextRef="#ctx0" brushRef="#br0" timeOffset="528151">14900 17410 8882,'-15'18'360,"3"0"-360,3 3 0,7 11 0,-7-11-270,32 14 0,4-9 180,14-11 90,-4-9 0,-8-6 0,11 0 0,-11-16 0,6-3 90,-16 0 90,-9-32-180,-3 33-90,-28-35-540,-6 34-719,-23-6 1349,3 13 0,20 3 0,7 5 0</inkml:trace>
+  <inkml:trace contextRef="#ctx0" brushRef="#br0" timeOffset="528401">15147 17108 9602,'2'-2'1888,"1"0"-1618,4 2-180,1 0 90,3 17-180,1-13-90,0 30 180,2-17-180,7 32 90,-6-12-450,-2-4 1,-2 2-271,3 8-935,1 13 575,-4-21-179,0-1 1189,2-6 0,2-4 1,0-3-1</inkml:trace>
+  <inkml:trace contextRef="#ctx0" brushRef="#br0" timeOffset="528623">15423 17266 10051,'-24'0'1529,"-1"0"-1529,3 20 0,1-15 0,0 44 0,6-29-90,-2 37-179,11-27-181,2 8-360,4-13 1,20-2-91,-16-3-89,35-3 989,-34-4 0,38-3 0,-14-2 0</inkml:trace>
+  <inkml:trace contextRef="#ctx0" brushRef="#br0" timeOffset="528952">15510 17517 9781,'40'0'-269,"0"0"-1,-7-12 270,-5 9 90,-12-21-90,-8 13 180,-8-10-1,-22 6-89,1 8 0,-20 2 0,11 5 0,13 17-90,6-1-90,11 19-180,0-6-179,19-11-181,-15 7 0,31-22-179,-32 18-450,30-19 1259,-29 12 0,29-13 0,-14 4 0</inkml:trace>
+  <inkml:trace contextRef="#ctx0" brushRef="#br0" timeOffset="529235">15798 17545 8882,'8'0'360,"1"0"-270,-3 13 0,4-10-180,-4 19 90,2-19 90,-3 13-180,1-15 270,-3 12-540,1-12 360,-3-12 0,-18-7-90,13-17 450,-14 4-360,18 3 0,16 12-270,5 7-540,18 28-179,-7 7 989,-1 11 0,-7-1 0,1-8 0</inkml:trace>
+  <inkml:trace contextRef="#ctx0" brushRef="#br0" timeOffset="529589">16147 17531 11131,'-6'-15'899,"2"-10"-899,4-9 0,24-27 0,10 15-347,-11 15 1,3-1-869,11-3 1,0 0 494,-13 8 1,2 0 719,18-15 0,0 2 0,5 0 0,-17 17 0,-1 0 0</inkml:trace>
+  <inkml:trace contextRef="#ctx0" brushRef="#br0" timeOffset="531419">16930 16854 11041,'10'-39'449,"-7"6"-449,18 0-90,-19 5 90,20-1 90,-13-2-90,10 0 270,-5-1-180,-4 2 0,-2 1 0,-5 2 90,-1 3-90,-2 3-90,0 4 90,0 3-180,0 5 90,0 1 0,-14 4 0,10 20 0,-11 13-90,15 10-90,0 5-180,0-6-179,0 1-1,19 0-449,-15-3-46,24-13 1,5-2-316,-6 11 1278,3-14 1,3-2 0,5 1 0,2-5 0</inkml:trace>
+  <inkml:trace contextRef="#ctx0" brushRef="#br0" timeOffset="531669">17515 16625 9062,'-25'16'450,"-15"3"-360,20 1-90,-11 17 89,14-25-89,10 24 0,7-22-89,22 2-271,5-6 90,22-5 270,-4 0 0,-4-5-450,-19-15 90,-8 0-449,-14-15-91,0 5 900,-24 10 0,18-4 0,-17 9 0</inkml:trace>
+  <inkml:trace contextRef="#ctx0" brushRef="#br0" timeOffset="531919">17817 16538 9332,'-37'15'809,"15"-1"-899,0 4 90,20 5-180,-5-3-359,7 5-1530,41 11 1079,-30-20 990,52 3 0,-46-16 0,19-3 0</inkml:trace>
+  <inkml:trace contextRef="#ctx0" brushRef="#br0" timeOffset="532435">18023 16537 8792,'-29'0'1169,"10"13"-1259,9 1 180,10 16-90,0-2-90,0 2 0,0-6-179,18-10-1,-14 0-180,27-8 0,-16 6 360,10-8 90,-4 0 90,-6-4 180,-7-12-180,-3 21 0,15-18-270,0 32-90,20-20 180,-7 8 0,-5-26-90,2-6 90,-14-10 90,4-17-89,-13 13 89,-3-28 89,-4 23-89,0-13 90,-22 4 90,-4 10 90,3 10 0,-2 1 90,-12-3-180,-7-11-180,28 23 270,-18 0 89,31 13-179,-17 2-90,18 21-90,13 16 0,10 5 0,1-9 0,0 0 0,0 2-585,6-4 1,0 1-226,-9 4-582,28 10 1392,-23-13 0,-1 0 0,0 0 0</inkml:trace>
+  <inkml:trace contextRef="#ctx0" brushRef="#br0" timeOffset="532823">18655 16312 9691,'-28'-3'540,"5"1"-450,1 17-180,9 1 90,5 17 90,4-1-180,4 0 180,17-6-180,-12-7 90,13-6 0,-1-2 0,-13 0 0,25-1 90,-14 3-180,0-4 180,9 1-90,-16-4 0,10 0 0,-1 4 0,-7-2 90,3 5-90,-11-6 0,-1 5 0,-1-2-180,-21 3-270,16 0-269,-32-1-271,33 2 990,-27 3 0,15-4 0,-13 3 0</inkml:trace>
+  <inkml:trace contextRef="#ctx0" brushRef="#br0" timeOffset="533213">19058 16380 10141,'-25'0'0,"4"0"-2338,7 0 2338,8-11 0,2 8 0,4-8 0</inkml:trace>
+  <inkml:trace contextRef="#ctx0" brushRef="#br0" timeOffset="533485">18988 16057 11760,'0'30'990,"0"5"-990,0-6 0,0 4 90,0-6-90,20 1 0,-16 2-90,35 14-90,-34-9-1058,29 12 969,-30-16-91,24 1-58,-24-2-841,23 10 719,-15-14-899,8 13 809,-9-22 630,-5 3 0,-6-13 0,0-1 0</inkml:trace>
+  <inkml:trace contextRef="#ctx0" brushRef="#br0" timeOffset="533887">18957 16478 8882,'-11'-19'360,"9"2"-360,-9-4 0,11 6 0,0-6 0,21 10-90,-16-1-180,38 7-90,-23-1-90,20 5-359,8-2 539,-13 3-180,27-1 450,-30 1-32,10 0 572,-18 0-1,-3 0-269,-3 0 180,-5 0 539,-3 0 540,-6-11-1349,-2 1 392,-18-3-482,-1 6-90,-15 21-90,8 5 90,11 18 0,5 0-269,8 0-1,21-16 90,-16 2-90,31-16 180,-18 4 0,14-6 180,-4-5-180,-6-17-360,-10 2-449,-6-18 449,-6 7-449,-20 10 899,1-6 0,-4 14 0,9-9 0</inkml:trace>
+  <inkml:trace contextRef="#ctx0" brushRef="#br0" timeOffset="534219">19445 16334 9602,'25'17'89,"12"-3"-89,-23 17 0,15-6-89,-17-4 178,7 0 181,-17-8-180,11-1-180,-12-21 0,4-8 0,-5-25-89,0 7-181,0-4-180,-14 12 0,10 0-89,-10 2-91,14 1 720,0 3 0,0 3 0,0 3 0</inkml:trace>
+  <inkml:trace contextRef="#ctx0" brushRef="#br0" timeOffset="534807">19917 16295 9422,'-17'-13'719,"-2"3"-539,-18 10-180,2 0 0,1 18-180,4 2-180,15 15-449,5-6 539,10-4-360,21-12 91,-1 1 539,20-13 0,-7 4 719,-4-20 1,-6-3-1,-11-9 181,-5 1-810,-26 8-450,15 23-90,-15 7 1,19 17-361,19-12 450,-3 1 360,16-16-90,-7 6 0,-4-8 0,-2 0 180,-4-15-180,-3 12 180,1-25 90,-4 25 180,1-24 719,-3 9-1079,-4-11-629,0 7-1,-3 27-539,0 5 1169,0 24 0,0-6 0,0 2 0</inkml:trace>
+  <inkml:trace contextRef="#ctx0" brushRef="#br0" timeOffset="535785">20140 16296 10231,'-34'-4'810,"-1"1"-810,9 19 0,-2 1 0,13 2 0,-1 12-90,11-10-180,1 13 90,21-14 90,-13 0-270,32-18 270,-11 6 90,20-8 0,-19-15 0,13 12 180,-22-31 270,8 17-180,-11-17 180,-9 9-361,-5 5-89,-18 4 0,0 9 90,-3 20-180,8 8 180,13 21-90,0-11 0,0 0 0,0-8-90,18 7 180,-14-7-90,27 12 0,-28-17 0,9 8 0,-12-14-269,0 2-91,0-7-1169,0 0 359,-14-4 900,-6-1 91,2-20 179,2-4 0,16-21 0,0 11 0,0 0 90,0 13-1,21 1 91,-16 1-90,32 3 0,-18-2 90,1 6 0,9-4 0,-11 6 0,14-4-180,-8 3 540,6-15-450,-15 9 539,5-17-359,-14 15 450,-1-9-361,-4 12-179,-1 0-90,0 5-180,0 5 90,0 0 90,-14 3-180,10 21-180,-10 3-179,14 23-1530,18-1 989,8-10 338,10-3 652,5-13 0,-9-2 0,2-1 0</inkml:trace>
+  <inkml:trace contextRef="#ctx0" brushRef="#br0" timeOffset="536501">16272 17575 11580,'57'0'-180,"-10"0"-539,3 0-1715,-9 10 1264,1-8 1,1 7-487,-1-9 1656,-1 0 0,-2 8 0,-1 1 0</inkml:trace>
+  <inkml:trace contextRef="#ctx0" brushRef="#br0" timeOffset="537101">17490 17408 9961,'-11'0'540,"0"0"-450,0-8-90,2 6-90,0-5 180,1 7-180,0 0-90,3 0-180,1 17 450,20 2-180,-11 12 0,32-14 90,-17 1 0,15-12 0,-18 7 0,1-5 0,-17-1-90,6 3-179,-7-3-541,-23 8 360,0-6-629,-25 6 0,25-5 1079,-12 0 0,31-4 0,-12 0 0</inkml:trace>
+  <inkml:trace contextRef="#ctx0" brushRef="#br0" timeOffset="537386">17683 17466 7803,'11'0'539,"-1"0"-269,-4 0 270,-1 0-540,-3 16 0,-1 1 90,-1 19-90,0-9-360,16 0-989,7 0 179,-3-8 1170,21 5 0,-24-9 0,18-2 0</inkml:trace>
+  <inkml:trace contextRef="#ctx0" brushRef="#br0" timeOffset="537669">17933 17413 8432,'-9'14'90,"18"-11"-90,-5 26 0,28-25 0,-28 22 0,25-10 0,-26 4 90,10-1 0,-5-8-90,-5-1 90,5-2-90,-8-1 0,0-2-90,0-2 90,0 0 0,0-2 0,0 1 0</inkml:trace>
+  <inkml:trace contextRef="#ctx0" brushRef="#br0" timeOffset="538523">18125 17478 9512,'-2'0'-1530,"9"-10"2070,-36 7-270,27-14 90,-21 16-180,13-6 0,-10 7-1,6 0 91,0 0-90,3 0 0,-1 0 0,-7 17-180,6-13 0,-10 24 0,11-12 0,-2 11 0,10-4 0,1-3-180,3-8 90,0-1-90,22-1 90,3 1 90,2-4 0,13 2 0,-17-6 0,14 0 180,-16-2 180,0 3-360,-19-1-90,6 4 90,-8-2 90,-18 6-180,13-2-180,-29 4-449,30-2-91,-28 0-179,27-1-451,-26 1 1440,27-3 0,-21 1 0,13-3 0</inkml:trace>
+  <inkml:trace contextRef="#ctx0" brushRef="#br0" timeOffset="538755">18197 17491 8882,'5'0'1079,"1"0"-809,3 0-270,-3 14 90,3-11-180,-5 10 180,1 3-180,1-12 90,1 27-360,0-19-89,2 13-991,2 0 451,-1-7 989,7 9 0,-10-16 0,5 2 0</inkml:trace>
+  <inkml:trace contextRef="#ctx0" brushRef="#br0" timeOffset="538923">18292 17331 9332,'0'-5'-1080,"-7"2"-1168,5 14 2248,12-8 0,-6 26 0,12-10 0</inkml:trace>
+  <inkml:trace contextRef="#ctx0" brushRef="#br0" timeOffset="539241">18597 17471 10591,'-37'12'720,"4"2"-631,18 12-178,-2-12-1,15 11 90,-4-15 0,6 10-360,19-4 180,-14-5 90,34-1 0,-21-6 90,15-4-90,-18-16 90,4-3-450,-17-16 91,6 1-91,-8 3-180,-19 13-899,15 2 1529,-32 14 0,32-3 0,-13 5 0</inkml:trace>
+  <inkml:trace contextRef="#ctx0" brushRef="#br0" timeOffset="539591">18710 17465 9512,'7'0'629,"0"0"-539,-1 0 0,1 0-90,5 16 0,-2-1 0,3 3 0,-3 8 0,0-22-180,-1 27 90,2-13-90,-3 7-179,3-5 89,-7-8 90,1-6 90,-4-19 90,0-8 0,-1-21 90,0 8 180,0-10-270,0 19 0,0-5 629,0 14-809,0 2 90,14 7 1,-11 20-811,22-8-1169,-8 29 2069,-2-14 0,13 0 0,-10-4 0</inkml:trace>
+  <inkml:trace contextRef="#ctx0" brushRef="#br0" timeOffset="540335">19343 17384 9871,'-41'-2'90,"7"1"-90,6 18 0,8-13 0,1 27 0,3-27 0,7 27 0,-3-27 0,11 28-90,-5-17 90,23 3 90,-12 3-180,33-14 90,-9 3 180,-2 0 450,18-8-270,-24 3-1,12-1-448,-16-2 178,-9 0-178,-8 1-91,0-1-1170,-20 6 271,16-3-1709,-34 7 2788,21-7 0,-5 2 0,9-5 0</inkml:trace>
+  <inkml:trace contextRef="#ctx0" brushRef="#br0" timeOffset="540552">19597 17087 11850,'0'41'90,"0"-9"-90,0 6 0,19-8-180,-14 20-359,33-11-1416,-34 13 1055,29-17 1,-30-3 403,24-2-223,-24-4-1,19-3 720,-20-2 0,12-4 0,-8-2 0</inkml:trace>
+  <inkml:trace contextRef="#ctx0" brushRef="#br0" timeOffset="540703">19525 17524 8882,'-11'-30'270,"2"-1"-360,9 8 180,19 1-180,-15 9-450,36-3 90,-7 5-539,26-1 359,-10 7 630,2 2 0,-18 2 0,1 1 0</inkml:trace>
+  <inkml:trace contextRef="#ctx0" brushRef="#br0" timeOffset="540952">19970 17350 9781,'-40'0'540,"5"12"-270,15 0-180,8 11 90,29-12 0,4-3-630,10-8-180,-12-16-179,-26 0-181,-13-11-449,-18 12 1439,4 8 0,14 7 0,6 0 0</inkml:trace>
+  <inkml:trace contextRef="#ctx0" brushRef="#br0" timeOffset="541269">20120 17381 9422,'0'31'0,"0"-1"-90,15-12 180,-11 8 0,21-16-90,-23-16-180,9-11-90,-11-20 0,-14 2-90,10 7-719,-22-11 359,23 8 720,-9-5 0,12 13 0,0 2 0</inkml:trace>
+  <inkml:trace contextRef="#ctx0" brushRef="#br0" timeOffset="541673">20425 17247 9152,'-43'14'629,"7"-11"-629,11 27 0,0-26 0,22 26-179,-8-14-181,11 12-270,0-6 630,21-9 0,3-7 90,13-6 90,-15-18 450,-1 1 269,-18-21-179,7 8-630,-10 0-90,0 8-450,0 31-630,0 7 361,19 29-91,-14-13 91,30-10 359,-31 1-719,27-19 1079,-18 17 0,13-19 0,-6 6 0</inkml:trace>
+  <inkml:trace contextRef="#ctx0" brushRef="#br0" timeOffset="542155">20762 17183 9422,'-35'-6'629,"4"15"-539,15 8-450,6 15-269,10 0-1,21-3 360,-16-6 90,33-11 0,-21-5 91,12-7 268,-7-18 361,-6 0 270,-8-18-271,-2 7-449,-6 3-90,0 30 0,0 5 0,0 25 90,0-6 0,10-3 0,-7-3-90,7-3 0,-10-5 0,0 3 90,0-7-90,0 13 0,0-11 0,0 15 0,0-13-90,0 7 180,0-10-90,-10 0-90,7-2 0,-7-1-270,10-4-1259,0-1-90,-6-2 1709,1 0 0,-4-1 0,4 0 0</inkml:trace>
+  <inkml:trace contextRef="#ctx0" brushRef="#br0" timeOffset="542669">20925 17392 8702,'6'0'810,"3"-17"-451,1-2-179,-2-2 180,5-38-180,-9 37 45,-1-11 0,0-1 45,-2 9 89,-1-12-359,0 19 180,0-3-180,-12 14 0,9 24-90,-9 11-180,12 11-179,0 1-181,0-11 0,0 2-1798,43 16 2428,-19-19 0,7-10 0,1-4 0,3-7 0</inkml:trace>
+  <inkml:trace contextRef="#ctx0" brushRef="#br0" timeOffset="542785">21622 17155 8522,'-45'0'-480,"18"0"0,10 0 1</inkml:trace>
+  <inkml:trace contextRef="#ctx0" brushRef="#br0" timeOffset="543886">12473 17273 9512,'-6'-8'2158,"1"3"-1888,3 24-90,0 1-180,19 22 45,-5-8 0,-1 2-45,11 25-1529,1-17 1,0 2 1573,-13-10 0,1 0-45,11 3 0,2-1 123,-7 1 1,0 1-349,9 17 0,1 1 90,-7-15 1,1 2-906,1 3 1,2 5 0,-3-5 724,-1-5 0,-2-3 0,6 16 0,-2-2-274,-7-20 0,-2-1 94,-1-1 0,0-1-674,13 27 1169,-6-10 0,0-7 0,-4-7 0</inkml:trace>
+  <inkml:trace contextRef="#ctx0" brushRef="#br0" timeOffset="544689">12478 17364 8342,'0'-30'540,"21"0"-450,-16 1-90,49-2-2593,-25 1 2638,2 14 0,2 1-45,26-15 0,-26 15 0,3 1 0,25-7 0,3 2 0,-15 4 0,3 0 0,10 0 0,7 0 0,-5 2-849,-3 1 0,-1 2 819,-6 1 0,3 0 0,-3 2-15,5 0 0,-1 1 45,1 0 0,0 1 0,-2 0 0,0 1 0,1 1 0,-1 0 0,-2 1 0,0 0 0,-1 0 0,2 0 30,-6 1 0,4 1 0,-3-1-30,8 0 0,1 0 0,-11 0 0,4 1 0,1 0 0,-6 0 0,12 0 0,-1-1 30,-7 1 0,3 0 0,-4 0-30,4 0 0,-2 0 0,1 0 0,0 0 0,-2 6 0,2 1-464,-7-6 0,4-2 0,-4 4 464,7 8 0,0 1 30,2-10 0,5-2 0,-7 0-152,-6 6 0,-2-1 212,1-2 0,4 0 0,-5-2-45,-8 0 0,-1 0 90,18 8 0,-2 2-45,0-3 722,6 12-722,-20 6 0,-13-4 0,4 26 0,-17-14 0,-6 0 0,-2 1-90,-1 10 645,-2 20-645,-2-17 90,0 1 2590,0 0-2680,0-15 0,0 1 89,0 16-134,0-10 1,0-1 704,0 6-660,8-10 0,3-2-90,7 5 0,5 7-180,5-5 90,-7-12 0,17 17 90,-7-21 90,8 15 0,-17-17 1219,10 14-1219,-16-16 0,-1 7 90,-6 0-90,-5-6-90,-1 16 90,-3-16 0,0 13 90,0-15-90,-20 4 0,14-9 0,-32-4 90,22 1-90,-18-1 0,4 0 0,-5 0 90,-25 2-90,9-3-578,0-2 1,-1-1 577,17-4 0,0 0 45,-12 2 0,-5 0 90,-9-1 0,-1-1-135,13 1 0,-4 0 60,-9 0 0,-7 1 0,5-1-1520,0-1 1,1 0 1429,7 1 0,-3-1 0,-1 0 30,-4-2 0,-1 0 0,3 0 0,12-1 0,3 1 0,-6 0-504,-8-1 1,-8 0 0,1 0 0,6 0 503,10 0 0,4 0 0,-5 0-300,-9 0 1,-6 0-1,0 0 1,6 0 359,9 0 0,5 0 0,-2 0-90,-13 0 0,-3 0 0,0 0 30,2 0 0,1 0 0,2 0 0,13 0 0,2-1 0,-3 2-203,-6 2 1,-6 1 0,1 1-1,6-2-510,-11-2 1,3 2 385,10 7 0,-2 3 0,4-2 327,1-3 0,4 0 0,2 8 0,1 1 0,5-5 0,1 1 0,3-1 0,0 0 0</inkml:trace>
+  <inkml:trace contextRef="#ctx0" brushRef="#br0" timeOffset="546772">12547 18012 8702,'-20'0'0,"7"5"0,4-3 0,6 8 90,-2-9 0,2 5 180,0-4-270,0 1 270,0-1-180,-1-1 0,1-1-90,1 0 0,-3 0 0,1 0 89,-4 0-89,2 0 0,-5 0-89,3 0 89,-3 0 179,-1 0-179,1 0 90,-8 0 0,6 0 0,-12 0-180,5 0 180,-21-11-90,7 8 0,-15-8 90,12 10 0,-2 2-135,7-1 0,-3 0-810,-10 0 1,-5 0 0,2 0 854,-3-1 0,-2 2 0,6 2 0,-7 3 0,0 0 0,4-2 90,1-2 0,4-2 0,-3 3-60,-15 9 0,-4 4 0,2-4-30,13-10 0,2-3 0,0 4 0,-2 9 0,0 4 0,-1-3 0,-1-6 0,0-3 0,0 3 0,-1 4 0,1 2 0,-1-1 0,-1-3 0,0-1 0,0 0 0,2 0 0,0 0 0,-3 0 22,0 0 1,-4 0-1,0-1 1,3 0-53,-2 0 0,2-1 0,-5-1 66,6 0 0,-6 0 0,-1 0 0,1-1 0,6-1-794,-5 0 1,5-2 0,-2 0 779,3 1 1,-1 0-1,-1-1 1,-3-1-41,5-3 0,-3-1 0,0-1 0,1 0 0,5 2-12,-9 1 0,6 2 0,-4-3 30,8-2 0,-4-3 0,-1-1 0,3 2 0,6 2-225,-15 3 0,3 0-105,10-6 0,-2-3 1,3 0-286,-5 2 1,1 1 614,3-1 0,-3-1 0,7 1 0,9 0 0,3 2 0,-7 2 0,-1 0 0</inkml:trace>
+  <inkml:trace contextRef="#ctx0" brushRef="#br0" timeOffset="547286">8025 17868 10051,'-33'16'1709,"-6"-2"-1619,8 4-90,-4 6 90,9-21-90,-3 26 0,0-17 90,-15 23-180,11-13 90,6-2 0,0 0 0,-2 4 0,-4 7 0,14-9-90,7-1 90,4 0-180,4 0-90,4 1-269,0 5-271,27 17 271,12-9-1130,-2-4 0,3-2 1129,-6-11 0,-1-2 540,5 6 0,-2 0 0,22 3 0,1-3 0</inkml:trace>
+  <inkml:trace contextRef="#ctx0" brushRef="#br0" timeOffset="547786">8815 17559 9422,'-3'-14'269,"1"3"451,0 5-540,22 2-270,-16 25 180,30 5-90,-13 12 0,-2-2 0,14 2 0,-14-10 180,12 5 90,-13-12 0,-1-11-360,-15 4 90,4-30 0,-25 15-90,15-33-450,-28 8-1079,29-31 989,-9 17-539,12-13 1169,0 34 0,21-4 0,6 11 0</inkml:trace>
+  <inkml:trace contextRef="#ctx0" brushRef="#br0" timeOffset="548089">9525 17736 9062,'7'0'360,"1"-17"-180,-1 13-1,2-30 1,1 30-90,3-45 90,-2 30 180,3-34-270,-7 28 0,-2-12-90,-4 18 0,-1-4 0,-17 13 0,-2 4-90,-19 20 90,1 13 0,14 10 0,-8 6-90,28-10-90,-9 1-270,12-3 1,0-3-361,17-3 270,-13-5-269,43-10 809,-4 5 0,16-13 0,2 6 0</inkml:trace>
+  <inkml:trace contextRef="#ctx0" brushRef="#br0" timeOffset="548524">9957 17385 8342,'-20'-8'990,"-3"3"-810,-20 1-180,6 3 0,14 23 90,1-17-90,20 35 0,-5-16-180,7 15 90,23-15-90,-17 2-180,35-23 0,-18 8-90,18-11 360,-6-19 90,-7-9 0,-13-11 0,-7-2 0,-8 10 90,0-3 90,0 2-90,0-1 0,0 2 180,-21 0 360,16-11-450,-31 12-180,32-13 0,-22 22 90,23 1 449,-7 11-449,10 22-90,33 30 90,-25 3-827,19-13 1,1-1 736,-10 12 0,21 2-596,-10 2 596,2-3 0,1 2 0,0-6 0,-11-14 0,0 0-270,10 11-1578,-8-11 0,-2 0 1308,1 1-439,3 2 80,-13-14 1121,-2-3 1,-3-2-1,0-2 1</inkml:trace>
+  <inkml:trace contextRef="#ctx0" brushRef="#br0" timeOffset="548910">10345 17401 10591,'0'38'-90,"13"4"-540,-9-12-89,9 0-810,2-11 1529,-1 4 0,14-6 0,-5 5 0</inkml:trace>
+  <inkml:trace contextRef="#ctx0" brushRef="#br0" timeOffset="549069">10288 17212 8342,'-7'-1'-1799,"2"20"1799,26-16 0,-15 28 0,18-16 0</inkml:trace>
+  <inkml:trace contextRef="#ctx0" brushRef="#br0" timeOffset="549324">10578 17417 8522,'0'9'990,"0"1"-721,18 1-89,-13 1-90,26 0 0,-12 7-90,-2-6 0,13 9 0,-14-10 270,1 1 90,3-5-90,-18-2-90,9-1-1080,-10-22 181,2-6-1,-20-16-90,12 2-179,-13 6 989,5 1 0,10 1 0,-11 0 0</inkml:trace>
+  <inkml:trace contextRef="#ctx0" brushRef="#br0" timeOffset="549903">10942 17367 8162,'17'-4'1260,"3"-7"-1170,16-24-90,-17 6 0,10-2 90,-25 11 89,16-7-179,-18 8 0,6-2 0,-8 9 0,-21 6 90,1 2 0,-19 4 0,20 18-90,-9-14 0,25 31 0,-11-12-90,14 19-449,0-9-181,0 0-90,26-12 1,-20-2-495,44-3 1304,-28-3 0,23-6 0,-10-3 0</inkml:trace>
+  <inkml:trace contextRef="#ctx0" brushRef="#br0" timeOffset="550090">11432 17213 9242,'-21'18'180,"-6"1"-180,24 18-270,-8-6-540,32-2-629,5-13 275,26-6 1164,-11-10 0,0 0 0,-12 0 0</inkml:trace>
+  <inkml:trace contextRef="#ctx0" brushRef="#br0" timeOffset="550385">11618 16787 9602,'0'-12'899,"0"4"180,-9 3-1079,7 25 0,10 23 0,-4 4-1619,12 13 1170,-1-20-181,-11 1 0,21-1-804,-11 16 984,0-18-717,6 18 717,-18-29 90,7 5 450,-9-20 1322,-21-2-1142,-4-8 647,-1-22-558,-10 15-269,31-32 453,-22 16-543,24-18-539,-7 9-451,35 1 990,-19 12 0,49 3 0,-19 1 0</inkml:trace>
+  <inkml:trace contextRef="#ctx0" brushRef="#br0" timeOffset="551540">2897 18108 8882,'15'-16'2429,"-18"6"-2429,0 25 0,-26-11 0,26 37 89,-25-22-178,24 20 89,-22-9-90,24 7 0,-9 14-450,11-12-899,17 5 539,11-25-179,11-8-180,5-7 1259,-6-31 0,2 5 0,1-24 0</inkml:trace>
+  <inkml:trace contextRef="#ctx0" brushRef="#br0" timeOffset="551906">3238 17701 10681,'0'45'90,"0"-7"-90,0 8 90,19 14-90,0-11-564,-9-16 1,2 0 563,19 11 0,-27-4 90,31-3-180,-23-4 90,15-4-90,-11-5 361,2 1-451,-6-10-1613,2 0 1523,-10-26 90,0-6 180,-4-22 0,0 7 580,0-1-580,0 10 90,0 1-180,0 2 90,0 3-90,0 2-270,0 4 0,17 20 1,4 6-1</inkml:trace>
+  <inkml:trace contextRef="#ctx0" brushRef="#br0" timeOffset="552404">3325 17424 8792,'-7'0'1079,"2"0"-809,0 0 90,3 19-360,0 13 0,1 12 90,1 12-45,8-17 0,3 1-90,0-7 0,2 1-1186,9 27 1,1 0 1230,-4-23 0,-1-1 0,0 12 0,-1-1-548,-5-16 0,0-1 278,10 29-328,-2 1-77,-7-23 1,-1 0-135,3 21 809,-3-18 0,0-2 0,-2 3 0,4 6 0</inkml:trace>
+  <inkml:trace contextRef="#ctx0" brushRef="#br0" timeOffset="552835">3788 18023 10771,'0'29'270,"0"7"-270,15-9 0,-11 4 0,11-6 0,-4-3 90,-8 1-180,8-3 0,-1-1 90,-7-4-180,7-2-540,-4-2 1,-5-5 269,9-1 450,-7-25 0,3 15 0,-1-31-90,-1 31 180,2-29-180,0 29 360,3-28 180,1 29-450,1-24 179,6 19-89,-3-4 0,14 7-90,-10 6 0,5 0 0,-6 17 0,1-13-90,1 30-719,11-12 179,-8-1-629,19 13 180,-19-19 1079,10 4 0,-12-8 0,0-11 0</inkml:trace>
+  <inkml:trace contextRef="#ctx0" brushRef="#br0" timeOffset="553152">4322 18111 9691,'-14'17'90,"3"2"-359,31 18-631,0-7 180,22-4 91,-6-12 359,-1-8 360,-5-6 270,-14-13 269,-7-7 1,-9-8-90,-15 0-540,11 34-90,12-10-270,-3 38-180,35-30-89,-36 28-181,30-28 810,-30 27 0,33-27 0,-12 9 0</inkml:trace>
+  <inkml:trace contextRef="#ctx0" brushRef="#br0" timeOffset="553456">4643 18202 9602,'39'14'-360,"-15"12"0,5-23 0,-25 20 90,22-15-179,-14 2 269,7-3 539,-9-23-269,-22 12 0,9-26 270,-13 19-810,38 9-179,4-3 629,20 34 0,-9-16 0,-3 14 0</inkml:trace>
+  <inkml:trace contextRef="#ctx0" brushRef="#br0" timeOffset="553785">5068 18182 8342,'0'28'90,"17"-11"-270,-13 3 90,29-17-90,-18 6 180,15-9 90,-11 0 540,-9-20 180,-4 1-91,-6-19-809,-18 8 720,13 6-630,-12 28 0,40-6-90,-17 42 180,42-19-180,-41 22-270,42-6 90,-43 3-270,40 0-899,-31 19 360,8-17 897,-13 13 1,-10-20 0,0-1 0</inkml:trace>
+  <inkml:trace contextRef="#ctx0" brushRef="#br0" timeOffset="566803">14383 16785 7083,'0'38'180,"0"-9"90,0 0-180,0-10-90,0 1 90,0 2 0,0 1-90,0 0 179,0 2-179,0-2 0,0 13 0,0-7 0,16 21 0,-12-19-433,19 11 343,-20-12 90,11 3 0,-12 0-99,11 17 99,-10-10 0,2-5 0,0 0 0,-2 6-90,1 11 180,-3-18-90,1-3 0,-1 0 0,3 8 0,-2-11 513,4 15-513,-2-22 199,4 12-199,0-18 0,-1 5 0,2-6 0,-3-4 0,6 5 0,-5-7 0,4 6 0,-4-5 0,0 2 0,0 3 0,-2-5 0,4 8 90,-3-9-180,4 6 90,-3-8 0,2 2 0,-2-4 0,1 1 0,-1-1 0,7 1 90,-4-3-90,10 4-90,-5-4 180,12 1-90,-10-1 0,6-1 0,-5 1 0,3-2 0,1 0 0,14 0 0,-7 0 0,27-17 0,-19 13 0,-3-11 0,0 0-379,7 11 379,15-22 0,-17 23 0,1-20 0,0 15-90,16-15 180,-11 12-90,-8 1 0,0 0-90,6 0 90,13-3 0,-18 6 90,-1 1-180,-3 1 180,15-1-180,-14 2 90,26-1 90,-26 3-180,8-1 90,-12 2 90,-2-1-180,14 2 90,-11 0-90,21 0 90,-25 0 0,9 0-180,-6 0 180,-8 0-180,10 0 90,-15 0 200,5 0-200,-10 0-90,-1 0-180,-5 0-179,-1 0 539,-2 0 0,0-7 0,-3-2 0</inkml:trace>
+  <inkml:trace contextRef="#ctx0" brushRef="#br0" timeOffset="567220">16242 16841 8162,'21'48'270,"9"-8"-270,-26 4 90,19-5-90,-21 6-450,6-9 1,2 2-2760,1 22 3209,-6-19 0,0-1 0,11 19 0,-6-1 0</inkml:trace>
 </inkml:ink>
 </file>
 
@@ -1929,7 +2702,7 @@
           <a:p>
             <a:fld id="{3DB37BB4-1E1D-7847-AB1B-63B52F2FB864}" type="datetimeFigureOut">
               <a:rPr lang="en-VN" smtClean="0"/>
-              <a:t>11/10/2021</a:t>
+              <a:t>13/10/2021</a:t>
             </a:fld>
             <a:endParaRPr lang="en-VN"/>
           </a:p>
@@ -2129,7 +2902,7 @@
           <a:p>
             <a:fld id="{3DB37BB4-1E1D-7847-AB1B-63B52F2FB864}" type="datetimeFigureOut">
               <a:rPr lang="en-VN" smtClean="0"/>
-              <a:t>11/10/2021</a:t>
+              <a:t>13/10/2021</a:t>
             </a:fld>
             <a:endParaRPr lang="en-VN"/>
           </a:p>
@@ -2339,7 +3112,7 @@
           <a:p>
             <a:fld id="{3DB37BB4-1E1D-7847-AB1B-63B52F2FB864}" type="datetimeFigureOut">
               <a:rPr lang="en-VN" smtClean="0"/>
-              <a:t>11/10/2021</a:t>
+              <a:t>13/10/2021</a:t>
             </a:fld>
             <a:endParaRPr lang="en-VN"/>
           </a:p>
@@ -2539,7 +3312,7 @@
           <a:p>
             <a:fld id="{3DB37BB4-1E1D-7847-AB1B-63B52F2FB864}" type="datetimeFigureOut">
               <a:rPr lang="en-VN" smtClean="0"/>
-              <a:t>11/10/2021</a:t>
+              <a:t>13/10/2021</a:t>
             </a:fld>
             <a:endParaRPr lang="en-VN"/>
           </a:p>
@@ -2815,7 +3588,7 @@
           <a:p>
             <a:fld id="{3DB37BB4-1E1D-7847-AB1B-63B52F2FB864}" type="datetimeFigureOut">
               <a:rPr lang="en-VN" smtClean="0"/>
-              <a:t>11/10/2021</a:t>
+              <a:t>13/10/2021</a:t>
             </a:fld>
             <a:endParaRPr lang="en-VN"/>
           </a:p>
@@ -3083,7 +3856,7 @@
           <a:p>
             <a:fld id="{3DB37BB4-1E1D-7847-AB1B-63B52F2FB864}" type="datetimeFigureOut">
               <a:rPr lang="en-VN" smtClean="0"/>
-              <a:t>11/10/2021</a:t>
+              <a:t>13/10/2021</a:t>
             </a:fld>
             <a:endParaRPr lang="en-VN"/>
           </a:p>
@@ -3498,7 +4271,7 @@
           <a:p>
             <a:fld id="{3DB37BB4-1E1D-7847-AB1B-63B52F2FB864}" type="datetimeFigureOut">
               <a:rPr lang="en-VN" smtClean="0"/>
-              <a:t>11/10/2021</a:t>
+              <a:t>13/10/2021</a:t>
             </a:fld>
             <a:endParaRPr lang="en-VN"/>
           </a:p>
@@ -3640,7 +4413,7 @@
           <a:p>
             <a:fld id="{3DB37BB4-1E1D-7847-AB1B-63B52F2FB864}" type="datetimeFigureOut">
               <a:rPr lang="en-VN" smtClean="0"/>
-              <a:t>11/10/2021</a:t>
+              <a:t>13/10/2021</a:t>
             </a:fld>
             <a:endParaRPr lang="en-VN"/>
           </a:p>
@@ -3753,7 +4526,7 @@
           <a:p>
             <a:fld id="{3DB37BB4-1E1D-7847-AB1B-63B52F2FB864}" type="datetimeFigureOut">
               <a:rPr lang="en-VN" smtClean="0"/>
-              <a:t>11/10/2021</a:t>
+              <a:t>13/10/2021</a:t>
             </a:fld>
             <a:endParaRPr lang="en-VN"/>
           </a:p>
@@ -4066,7 +4839,7 @@
           <a:p>
             <a:fld id="{3DB37BB4-1E1D-7847-AB1B-63B52F2FB864}" type="datetimeFigureOut">
               <a:rPr lang="en-VN" smtClean="0"/>
-              <a:t>11/10/2021</a:t>
+              <a:t>13/10/2021</a:t>
             </a:fld>
             <a:endParaRPr lang="en-VN"/>
           </a:p>
@@ -4355,7 +5128,7 @@
           <a:p>
             <a:fld id="{3DB37BB4-1E1D-7847-AB1B-63B52F2FB864}" type="datetimeFigureOut">
               <a:rPr lang="en-VN" smtClean="0"/>
-              <a:t>11/10/2021</a:t>
+              <a:t>13/10/2021</a:t>
             </a:fld>
             <a:endParaRPr lang="en-VN"/>
           </a:p>
@@ -4598,7 +5371,7 @@
           <a:p>
             <a:fld id="{3DB37BB4-1E1D-7847-AB1B-63B52F2FB864}" type="datetimeFigureOut">
               <a:rPr lang="en-VN" smtClean="0"/>
-              <a:t>11/10/2021</a:t>
+              <a:t>13/10/2021</a:t>
             </a:fld>
             <a:endParaRPr lang="en-VN"/>
           </a:p>
@@ -5096,6 +5869,57 @@
           <a:chExt cx="0" cy="0"/>
         </a:xfrm>
       </p:grpSpPr>
+      <mc:AlternateContent xmlns:mc="http://schemas.openxmlformats.org/markup-compatibility/2006">
+        <mc:Choice xmlns:p14="http://schemas.microsoft.com/office/powerpoint/2010/main" Requires="p14">
+          <p:contentPart p14:bwMode="auto" r:id="rId2">
+            <p14:nvContentPartPr>
+              <p14:cNvPr id="2" name="Ink 1">
+                <a:extLst>
+                  <a:ext uri="{FF2B5EF4-FFF2-40B4-BE49-F238E27FC236}">
+                    <a16:creationId xmlns:a16="http://schemas.microsoft.com/office/drawing/2014/main" id="{8FC4B923-F94F-C94C-9C9C-D4267D05C798}"/>
+                  </a:ext>
+                </a:extLst>
+              </p14:cNvPr>
+              <p14:cNvContentPartPr/>
+              <p14:nvPr/>
+            </p14:nvContentPartPr>
+            <p14:xfrm>
+              <a:off x="725400" y="164520"/>
+              <a:ext cx="11292840" cy="4780440"/>
+            </p14:xfrm>
+          </p:contentPart>
+        </mc:Choice>
+        <mc:Fallback>
+          <p:pic>
+            <p:nvPicPr>
+              <p:cNvPr id="2" name="Ink 1">
+                <a:extLst>
+                  <a:ext uri="{FF2B5EF4-FFF2-40B4-BE49-F238E27FC236}">
+                    <a16:creationId xmlns:a16="http://schemas.microsoft.com/office/drawing/2014/main" id="{8FC4B923-F94F-C94C-9C9C-D4267D05C798}"/>
+                  </a:ext>
+                </a:extLst>
+              </p:cNvPr>
+              <p:cNvPicPr/>
+              <p:nvPr/>
+            </p:nvPicPr>
+            <p:blipFill>
+              <a:blip r:embed="rId3"/>
+              <a:stretch>
+                <a:fillRect/>
+              </a:stretch>
+            </p:blipFill>
+            <p:spPr>
+              <a:xfrm>
+                <a:off x="709200" y="148320"/>
+                <a:ext cx="11325240" cy="4812840"/>
+              </a:xfrm>
+              <a:prstGeom prst="rect">
+                <a:avLst/>
+              </a:prstGeom>
+            </p:spPr>
+          </p:pic>
+        </mc:Fallback>
+      </mc:AlternateContent>
     </p:spTree>
     <p:extLst>
       <p:ext uri="{BB962C8B-B14F-4D97-AF65-F5344CB8AC3E}">
@@ -5621,8 +6445,8 @@
           <a:chExt cx="0" cy="0"/>
         </a:xfrm>
       </p:grpSpPr>
-      <mc:AlternateContent xmlns:mc="http://schemas.openxmlformats.org/markup-compatibility/2006">
-        <mc:Choice xmlns:p14="http://schemas.microsoft.com/office/powerpoint/2010/main" Requires="p14">
+      <mc:AlternateContent xmlns:mc="http://schemas.openxmlformats.org/markup-compatibility/2006" xmlns:p14="http://schemas.microsoft.com/office/powerpoint/2010/main">
+        <mc:Choice Requires="p14">
           <p:contentPart p14:bwMode="auto" r:id="rId2">
             <p14:nvContentPartPr>
               <p14:cNvPr id="2" name="Ink 1">
@@ -5641,7 +6465,7 @@
             </p14:xfrm>
           </p:contentPart>
         </mc:Choice>
-        <mc:Fallback>
+        <mc:Fallback xmlns="">
           <p:pic>
             <p:nvPicPr>
               <p:cNvPr id="2" name="Ink 1">
@@ -5702,8 +6526,8 @@
           <a:chExt cx="0" cy="0"/>
         </a:xfrm>
       </p:grpSpPr>
-      <mc:AlternateContent xmlns:mc="http://schemas.openxmlformats.org/markup-compatibility/2006">
-        <mc:Choice xmlns:p14="http://schemas.microsoft.com/office/powerpoint/2010/main" Requires="p14">
+      <mc:AlternateContent xmlns:mc="http://schemas.openxmlformats.org/markup-compatibility/2006" xmlns:p14="http://schemas.microsoft.com/office/powerpoint/2010/main">
+        <mc:Choice Requires="p14">
           <p:contentPart p14:bwMode="auto" r:id="rId2">
             <p14:nvContentPartPr>
               <p14:cNvPr id="2" name="Ink 1">
@@ -5722,7 +6546,7 @@
             </p14:xfrm>
           </p:contentPart>
         </mc:Choice>
-        <mc:Fallback>
+        <mc:Fallback xmlns="">
           <p:pic>
             <p:nvPicPr>
               <p:cNvPr id="2" name="Ink 1">
@@ -5783,6 +6607,57 @@
           <a:chExt cx="0" cy="0"/>
         </a:xfrm>
       </p:grpSpPr>
+      <mc:AlternateContent xmlns:mc="http://schemas.openxmlformats.org/markup-compatibility/2006">
+        <mc:Choice xmlns:p14="http://schemas.microsoft.com/office/powerpoint/2010/main" Requires="p14">
+          <p:contentPart p14:bwMode="auto" r:id="rId2">
+            <p14:nvContentPartPr>
+              <p14:cNvPr id="2" name="Ink 1">
+                <a:extLst>
+                  <a:ext uri="{FF2B5EF4-FFF2-40B4-BE49-F238E27FC236}">
+                    <a16:creationId xmlns:a16="http://schemas.microsoft.com/office/drawing/2014/main" id="{F4F49AD9-42AD-0C47-94F3-9A90EACB1399}"/>
+                  </a:ext>
+                </a:extLst>
+              </p14:cNvPr>
+              <p14:cNvContentPartPr/>
+              <p14:nvPr/>
+            </p14:nvContentPartPr>
+            <p14:xfrm>
+              <a:off x="11520" y="215640"/>
+              <a:ext cx="11772360" cy="6519600"/>
+            </p14:xfrm>
+          </p:contentPart>
+        </mc:Choice>
+        <mc:Fallback>
+          <p:pic>
+            <p:nvPicPr>
+              <p:cNvPr id="2" name="Ink 1">
+                <a:extLst>
+                  <a:ext uri="{FF2B5EF4-FFF2-40B4-BE49-F238E27FC236}">
+                    <a16:creationId xmlns:a16="http://schemas.microsoft.com/office/drawing/2014/main" id="{F4F49AD9-42AD-0C47-94F3-9A90EACB1399}"/>
+                  </a:ext>
+                </a:extLst>
+              </p:cNvPr>
+              <p:cNvPicPr/>
+              <p:nvPr/>
+            </p:nvPicPr>
+            <p:blipFill>
+              <a:blip r:embed="rId3"/>
+              <a:stretch>
+                <a:fillRect/>
+              </a:stretch>
+            </p:blipFill>
+            <p:spPr>
+              <a:xfrm>
+                <a:off x="-4680" y="199440"/>
+                <a:ext cx="11804760" cy="6552000"/>
+              </a:xfrm>
+              <a:prstGeom prst="rect">
+                <a:avLst/>
+              </a:prstGeom>
+            </p:spPr>
+          </p:pic>
+        </mc:Fallback>
+      </mc:AlternateContent>
     </p:spTree>
     <p:extLst>
       <p:ext uri="{BB962C8B-B14F-4D97-AF65-F5344CB8AC3E}">
@@ -5813,6 +6688,57 @@
           <a:chExt cx="0" cy="0"/>
         </a:xfrm>
       </p:grpSpPr>
+      <mc:AlternateContent xmlns:mc="http://schemas.openxmlformats.org/markup-compatibility/2006">
+        <mc:Choice xmlns:p14="http://schemas.microsoft.com/office/powerpoint/2010/main" Requires="p14">
+          <p:contentPart p14:bwMode="auto" r:id="rId2">
+            <p14:nvContentPartPr>
+              <p14:cNvPr id="2" name="Ink 1">
+                <a:extLst>
+                  <a:ext uri="{FF2B5EF4-FFF2-40B4-BE49-F238E27FC236}">
+                    <a16:creationId xmlns:a16="http://schemas.microsoft.com/office/drawing/2014/main" id="{DE9D3CBD-B533-5A43-A85F-CEED5E3AC782}"/>
+                  </a:ext>
+                </a:extLst>
+              </p14:cNvPr>
+              <p14:cNvContentPartPr/>
+              <p14:nvPr/>
+            </p14:nvContentPartPr>
+            <p14:xfrm>
+              <a:off x="611280" y="63000"/>
+              <a:ext cx="11339280" cy="5157720"/>
+            </p14:xfrm>
+          </p:contentPart>
+        </mc:Choice>
+        <mc:Fallback>
+          <p:pic>
+            <p:nvPicPr>
+              <p:cNvPr id="2" name="Ink 1">
+                <a:extLst>
+                  <a:ext uri="{FF2B5EF4-FFF2-40B4-BE49-F238E27FC236}">
+                    <a16:creationId xmlns:a16="http://schemas.microsoft.com/office/drawing/2014/main" id="{DE9D3CBD-B533-5A43-A85F-CEED5E3AC782}"/>
+                  </a:ext>
+                </a:extLst>
+              </p:cNvPr>
+              <p:cNvPicPr/>
+              <p:nvPr/>
+            </p:nvPicPr>
+            <p:blipFill>
+              <a:blip r:embed="rId3"/>
+              <a:stretch>
+                <a:fillRect/>
+              </a:stretch>
+            </p:blipFill>
+            <p:spPr>
+              <a:xfrm>
+                <a:off x="595080" y="46800"/>
+                <a:ext cx="11371680" cy="5190120"/>
+              </a:xfrm>
+              <a:prstGeom prst="rect">
+                <a:avLst/>
+              </a:prstGeom>
+            </p:spPr>
+          </p:pic>
+        </mc:Fallback>
+      </mc:AlternateContent>
     </p:spTree>
     <p:extLst>
       <p:ext uri="{BB962C8B-B14F-4D97-AF65-F5344CB8AC3E}">

</xml_diff>